<commit_message>
Updates to the Requirements Presentation
</commit_message>
<xml_diff>
--- a/Crimson Clubs (Requirements).pptx
+++ b/Crimson Clubs (Requirements).pptx
@@ -2,23 +2,22 @@
 <file path=ppt/presentation.xml><?xml version="1.0" encoding="utf-8"?>
 <p:presentation xmlns:a="http://schemas.openxmlformats.org/drawingml/2006/main" xmlns:r="http://schemas.openxmlformats.org/officeDocument/2006/relationships" xmlns:p="http://schemas.openxmlformats.org/presentationml/2006/main" saveSubsetFonts="1">
   <p:sldMasterIdLst>
-    <p:sldMasterId id="2147483648" r:id="rId1"/>
+    <p:sldMasterId id="2147483731" r:id="rId1"/>
   </p:sldMasterIdLst>
   <p:sldIdLst>
     <p:sldId id="256" r:id="rId2"/>
     <p:sldId id="268" r:id="rId3"/>
-    <p:sldId id="269" r:id="rId4"/>
-    <p:sldId id="257" r:id="rId5"/>
-    <p:sldId id="258" r:id="rId6"/>
-    <p:sldId id="259" r:id="rId7"/>
-    <p:sldId id="260" r:id="rId8"/>
-    <p:sldId id="261" r:id="rId9"/>
+    <p:sldId id="257" r:id="rId4"/>
+    <p:sldId id="258" r:id="rId5"/>
+    <p:sldId id="259" r:id="rId6"/>
+    <p:sldId id="260" r:id="rId7"/>
+    <p:sldId id="263" r:id="rId8"/>
+    <p:sldId id="271" r:id="rId9"/>
     <p:sldId id="262" r:id="rId10"/>
-    <p:sldId id="263" r:id="rId11"/>
-    <p:sldId id="264" r:id="rId12"/>
-    <p:sldId id="265" r:id="rId13"/>
-    <p:sldId id="266" r:id="rId14"/>
-    <p:sldId id="267" r:id="rId15"/>
+    <p:sldId id="264" r:id="rId11"/>
+    <p:sldId id="272" r:id="rId12"/>
+    <p:sldId id="266" r:id="rId13"/>
+    <p:sldId id="269" r:id="rId14"/>
   </p:sldIdLst>
   <p:sldSz cx="12192000" cy="6858000"/>
   <p:notesSz cx="6858000" cy="9144000"/>
@@ -26,7 +25,7 @@
     <a:defPPr>
       <a:defRPr lang="en-US"/>
     </a:defPPr>
-    <a:lvl1pPr marL="0" algn="l" defTabSz="914400" rtl="0" eaLnBrk="1" latinLnBrk="0" hangingPunct="1">
+    <a:lvl1pPr marL="0" algn="l" defTabSz="457200" rtl="0" eaLnBrk="1" latinLnBrk="0" hangingPunct="1">
       <a:defRPr sz="1800" kern="1200">
         <a:solidFill>
           <a:schemeClr val="tx1"/>
@@ -36,7 +35,7 @@
         <a:cs typeface="+mn-cs"/>
       </a:defRPr>
     </a:lvl1pPr>
-    <a:lvl2pPr marL="457200" algn="l" defTabSz="914400" rtl="0" eaLnBrk="1" latinLnBrk="0" hangingPunct="1">
+    <a:lvl2pPr marL="457200" algn="l" defTabSz="457200" rtl="0" eaLnBrk="1" latinLnBrk="0" hangingPunct="1">
       <a:defRPr sz="1800" kern="1200">
         <a:solidFill>
           <a:schemeClr val="tx1"/>
@@ -46,7 +45,7 @@
         <a:cs typeface="+mn-cs"/>
       </a:defRPr>
     </a:lvl2pPr>
-    <a:lvl3pPr marL="914400" algn="l" defTabSz="914400" rtl="0" eaLnBrk="1" latinLnBrk="0" hangingPunct="1">
+    <a:lvl3pPr marL="914400" algn="l" defTabSz="457200" rtl="0" eaLnBrk="1" latinLnBrk="0" hangingPunct="1">
       <a:defRPr sz="1800" kern="1200">
         <a:solidFill>
           <a:schemeClr val="tx1"/>
@@ -56,7 +55,7 @@
         <a:cs typeface="+mn-cs"/>
       </a:defRPr>
     </a:lvl3pPr>
-    <a:lvl4pPr marL="1371600" algn="l" defTabSz="914400" rtl="0" eaLnBrk="1" latinLnBrk="0" hangingPunct="1">
+    <a:lvl4pPr marL="1371600" algn="l" defTabSz="457200" rtl="0" eaLnBrk="1" latinLnBrk="0" hangingPunct="1">
       <a:defRPr sz="1800" kern="1200">
         <a:solidFill>
           <a:schemeClr val="tx1"/>
@@ -66,7 +65,7 @@
         <a:cs typeface="+mn-cs"/>
       </a:defRPr>
     </a:lvl4pPr>
-    <a:lvl5pPr marL="1828800" algn="l" defTabSz="914400" rtl="0" eaLnBrk="1" latinLnBrk="0" hangingPunct="1">
+    <a:lvl5pPr marL="1828800" algn="l" defTabSz="457200" rtl="0" eaLnBrk="1" latinLnBrk="0" hangingPunct="1">
       <a:defRPr sz="1800" kern="1200">
         <a:solidFill>
           <a:schemeClr val="tx1"/>
@@ -76,7 +75,7 @@
         <a:cs typeface="+mn-cs"/>
       </a:defRPr>
     </a:lvl5pPr>
-    <a:lvl6pPr marL="2286000" algn="l" defTabSz="914400" rtl="0" eaLnBrk="1" latinLnBrk="0" hangingPunct="1">
+    <a:lvl6pPr marL="2286000" algn="l" defTabSz="457200" rtl="0" eaLnBrk="1" latinLnBrk="0" hangingPunct="1">
       <a:defRPr sz="1800" kern="1200">
         <a:solidFill>
           <a:schemeClr val="tx1"/>
@@ -86,7 +85,7 @@
         <a:cs typeface="+mn-cs"/>
       </a:defRPr>
     </a:lvl6pPr>
-    <a:lvl7pPr marL="2743200" algn="l" defTabSz="914400" rtl="0" eaLnBrk="1" latinLnBrk="0" hangingPunct="1">
+    <a:lvl7pPr marL="2743200" algn="l" defTabSz="457200" rtl="0" eaLnBrk="1" latinLnBrk="0" hangingPunct="1">
       <a:defRPr sz="1800" kern="1200">
         <a:solidFill>
           <a:schemeClr val="tx1"/>
@@ -96,7 +95,7 @@
         <a:cs typeface="+mn-cs"/>
       </a:defRPr>
     </a:lvl7pPr>
-    <a:lvl8pPr marL="3200400" algn="l" defTabSz="914400" rtl="0" eaLnBrk="1" latinLnBrk="0" hangingPunct="1">
+    <a:lvl8pPr marL="3200400" algn="l" defTabSz="457200" rtl="0" eaLnBrk="1" latinLnBrk="0" hangingPunct="1">
       <a:defRPr sz="1800" kern="1200">
         <a:solidFill>
           <a:schemeClr val="tx1"/>
@@ -106,7 +105,7 @@
         <a:cs typeface="+mn-cs"/>
       </a:defRPr>
     </a:lvl8pPr>
-    <a:lvl9pPr marL="3657600" algn="l" defTabSz="914400" rtl="0" eaLnBrk="1" latinLnBrk="0" hangingPunct="1">
+    <a:lvl9pPr marL="3657600" algn="l" defTabSz="457200" rtl="0" eaLnBrk="1" latinLnBrk="0" hangingPunct="1">
       <a:defRPr sz="1800" kern="1200">
         <a:solidFill>
           <a:schemeClr val="tx1"/>
@@ -125,21 +124,23 @@
 </p:presentation>
 </file>
 
-<file path=ppt/commentAuthors.xml><?xml version="1.0" encoding="utf-8"?>
-<p:cmAuthorLst xmlns:a="http://schemas.openxmlformats.org/drawingml/2006/main" xmlns:r="http://schemas.openxmlformats.org/officeDocument/2006/relationships" xmlns:p="http://schemas.openxmlformats.org/presentationml/2006/main">
-  <p:cmAuthor id="1" name="Max Livingston" initials="ML" lastIdx="0" clrIdx="0">
-    <p:extLst>
-      <p:ext uri="{19B8F6BF-5375-455C-9EA6-DF929625EA0E}">
-        <p15:presenceInfo xmlns:p15="http://schemas.microsoft.com/office/powerpoint/2012/main" userId="Max Livingston" providerId="None"/>
-      </p:ext>
-    </p:extLst>
-  </p:cmAuthor>
-</p:cmAuthorLst>
+<file path=ppt/revisionInfo.xml><?xml version="1.0" encoding="utf-8"?>
+<p1510:revInfo xmlns:a="http://schemas.openxmlformats.org/drawingml/2006/main" xmlns:r="http://schemas.openxmlformats.org/officeDocument/2006/relationships" xmlns:p1510="http://schemas.microsoft.com/office/powerpoint/2015/10/main"/>
 </file>
 
 <file path=ppt/slideLayouts/slideLayout1.xml><?xml version="1.0" encoding="utf-8"?>
-<p:sldLayout xmlns:a="http://schemas.openxmlformats.org/drawingml/2006/main" xmlns:r="http://schemas.openxmlformats.org/officeDocument/2006/relationships" xmlns:p="http://schemas.openxmlformats.org/presentationml/2006/main" type="title" preserve="1">
+<p:sldLayout xmlns:a="http://schemas.openxmlformats.org/drawingml/2006/main" xmlns:r="http://schemas.openxmlformats.org/officeDocument/2006/relationships" xmlns:p="http://schemas.openxmlformats.org/presentationml/2006/main" showMasterSp="0" type="title" preserve="1">
   <p:cSld name="Title Slide">
+    <p:bg>
+      <p:bgPr>
+        <a:solidFill>
+          <a:schemeClr val="bg2">
+            <a:lumMod val="75000"/>
+          </a:schemeClr>
+        </a:solidFill>
+        <a:effectLst/>
+      </p:bgPr>
+    </p:bg>
     <p:spTree>
       <p:nvGrpSpPr>
         <p:cNvPr id="1" name=""/>
@@ -156,13 +157,7 @@
       </p:grpSpPr>
       <p:sp>
         <p:nvSpPr>
-          <p:cNvPr id="2" name="Title 1">
-            <a:extLst>
-              <a:ext uri="{FF2B5EF4-FFF2-40B4-BE49-F238E27FC236}">
-                <a16:creationId xmlns:a16="http://schemas.microsoft.com/office/drawing/2014/main" id="{255DE6B0-AB94-40FD-BA92-8FE2050B78A2}"/>
-              </a:ext>
-            </a:extLst>
-          </p:cNvPr>
+          <p:cNvPr id="2" name="Title 1"/>
           <p:cNvSpPr>
             <a:spLocks noGrp="1"/>
           </p:cNvSpPr>
@@ -172,15 +167,24 @@
         </p:nvSpPr>
         <p:spPr>
           <a:xfrm>
-            <a:off x="1524000" y="1122363"/>
-            <a:ext cx="9144000" cy="2387600"/>
+            <a:off x="1261872" y="758952"/>
+            <a:ext cx="9418320" cy="4041648"/>
           </a:xfrm>
         </p:spPr>
         <p:txBody>
-          <a:bodyPr anchor="b"/>
+          <a:bodyPr anchor="b">
+            <a:normAutofit/>
+          </a:bodyPr>
           <a:lstStyle>
-            <a:lvl1pPr algn="ctr">
-              <a:defRPr sz="6000"/>
+            <a:lvl1pPr algn="l">
+              <a:lnSpc>
+                <a:spcPct val="85000"/>
+              </a:lnSpc>
+              <a:defRPr sz="7200" baseline="0">
+                <a:solidFill>
+                  <a:schemeClr val="tx1"/>
+                </a:solidFill>
+              </a:defRPr>
             </a:lvl1pPr>
           </a:lstStyle>
           <a:p>
@@ -188,18 +192,13 @@
               <a:rPr lang="en-US"/>
               <a:t>Click to edit Master title style</a:t>
             </a:r>
-          </a:p>
-        </p:txBody>
-      </p:sp>
-      <p:sp>
-        <p:nvSpPr>
-          <p:cNvPr id="3" name="Subtitle 2">
-            <a:extLst>
-              <a:ext uri="{FF2B5EF4-FFF2-40B4-BE49-F238E27FC236}">
-                <a16:creationId xmlns:a16="http://schemas.microsoft.com/office/drawing/2014/main" id="{33B6E9E0-3881-4FC8-A585-4C20A021F746}"/>
-              </a:ext>
-            </a:extLst>
-          </p:cNvPr>
+            <a:endParaRPr lang="en-US" dirty="0"/>
+          </a:p>
+        </p:txBody>
+      </p:sp>
+      <p:sp>
+        <p:nvSpPr>
+          <p:cNvPr id="3" name="Subtitle 2"/>
           <p:cNvSpPr>
             <a:spLocks noGrp="1"/>
           </p:cNvSpPr>
@@ -209,48 +208,56 @@
         </p:nvSpPr>
         <p:spPr>
           <a:xfrm>
-            <a:off x="1524000" y="3602038"/>
-            <a:ext cx="9144000" cy="1655762"/>
+            <a:off x="1261872" y="4800600"/>
+            <a:ext cx="9418320" cy="1691640"/>
           </a:xfrm>
         </p:spPr>
         <p:txBody>
-          <a:bodyPr/>
+          <a:bodyPr>
+            <a:normAutofit/>
+          </a:bodyPr>
           <a:lstStyle>
-            <a:lvl1pPr marL="0" indent="0" algn="ctr">
-              <a:buNone/>
-              <a:defRPr sz="2400"/>
+            <a:lvl1pPr marL="0" indent="0" algn="l">
+              <a:buNone/>
+              <a:defRPr sz="2200" baseline="0">
+                <a:solidFill>
+                  <a:schemeClr val="tx1">
+                    <a:lumMod val="75000"/>
+                  </a:schemeClr>
+                </a:solidFill>
+              </a:defRPr>
             </a:lvl1pPr>
             <a:lvl2pPr marL="457200" indent="0" algn="ctr">
               <a:buNone/>
-              <a:defRPr sz="2000"/>
+              <a:defRPr sz="2200"/>
             </a:lvl2pPr>
             <a:lvl3pPr marL="914400" indent="0" algn="ctr">
               <a:buNone/>
-              <a:defRPr sz="1800"/>
+              <a:defRPr sz="2200"/>
             </a:lvl3pPr>
             <a:lvl4pPr marL="1371600" indent="0" algn="ctr">
               <a:buNone/>
-              <a:defRPr sz="1600"/>
+              <a:defRPr sz="2000"/>
             </a:lvl4pPr>
             <a:lvl5pPr marL="1828800" indent="0" algn="ctr">
               <a:buNone/>
-              <a:defRPr sz="1600"/>
+              <a:defRPr sz="2000"/>
             </a:lvl5pPr>
             <a:lvl6pPr marL="2286000" indent="0" algn="ctr">
               <a:buNone/>
-              <a:defRPr sz="1600"/>
+              <a:defRPr sz="2000"/>
             </a:lvl6pPr>
             <a:lvl7pPr marL="2743200" indent="0" algn="ctr">
               <a:buNone/>
-              <a:defRPr sz="1600"/>
+              <a:defRPr sz="2000"/>
             </a:lvl7pPr>
             <a:lvl8pPr marL="3200400" indent="0" algn="ctr">
               <a:buNone/>
-              <a:defRPr sz="1600"/>
+              <a:defRPr sz="2000"/>
             </a:lvl8pPr>
             <a:lvl9pPr marL="3657600" indent="0" algn="ctr">
               <a:buNone/>
-              <a:defRPr sz="1600"/>
+              <a:defRPr sz="2000"/>
             </a:lvl9pPr>
           </a:lstStyle>
           <a:p>
@@ -258,18 +265,13 @@
               <a:rPr lang="en-US"/>
               <a:t>Click to edit Master subtitle style</a:t>
             </a:r>
-          </a:p>
-        </p:txBody>
-      </p:sp>
-      <p:sp>
-        <p:nvSpPr>
-          <p:cNvPr id="4" name="Date Placeholder 3">
-            <a:extLst>
-              <a:ext uri="{FF2B5EF4-FFF2-40B4-BE49-F238E27FC236}">
-                <a16:creationId xmlns:a16="http://schemas.microsoft.com/office/drawing/2014/main" id="{1D5ECC78-47EE-4EBB-9A0D-5D7BE3B70D23}"/>
-              </a:ext>
-            </a:extLst>
-          </p:cNvPr>
+            <a:endParaRPr lang="en-US" dirty="0"/>
+          </a:p>
+        </p:txBody>
+      </p:sp>
+      <p:sp>
+        <p:nvSpPr>
+          <p:cNvPr id="4" name="Date Placeholder 3"/>
           <p:cNvSpPr>
             <a:spLocks noGrp="1"/>
           </p:cNvSpPr>
@@ -280,7 +282,17 @@
         <p:spPr/>
         <p:txBody>
           <a:bodyPr/>
-          <a:lstStyle/>
+          <a:lstStyle>
+            <a:lvl1pPr>
+              <a:defRPr>
+                <a:solidFill>
+                  <a:schemeClr val="tx1">
+                    <a:lumMod val="50000"/>
+                  </a:schemeClr>
+                </a:solidFill>
+              </a:defRPr>
+            </a:lvl1pPr>
+          </a:lstStyle>
           <a:p>
             <a:fld id="{DC614084-99CB-4937-A8D2-54BEE84FEE74}" type="datetimeFigureOut">
               <a:rPr lang="en-US" smtClean="0"/>
@@ -292,13 +304,7 @@
       </p:sp>
       <p:sp>
         <p:nvSpPr>
-          <p:cNvPr id="5" name="Footer Placeholder 4">
-            <a:extLst>
-              <a:ext uri="{FF2B5EF4-FFF2-40B4-BE49-F238E27FC236}">
-                <a16:creationId xmlns:a16="http://schemas.microsoft.com/office/drawing/2014/main" id="{7302FF9F-F576-4AB9-8278-E65C26472729}"/>
-              </a:ext>
-            </a:extLst>
-          </p:cNvPr>
+          <p:cNvPr id="5" name="Footer Placeholder 4"/>
           <p:cNvSpPr>
             <a:spLocks noGrp="1"/>
           </p:cNvSpPr>
@@ -309,7 +315,17 @@
         <p:spPr/>
         <p:txBody>
           <a:bodyPr/>
-          <a:lstStyle/>
+          <a:lstStyle>
+            <a:lvl1pPr>
+              <a:defRPr>
+                <a:solidFill>
+                  <a:schemeClr val="tx1">
+                    <a:lumMod val="65000"/>
+                  </a:schemeClr>
+                </a:solidFill>
+              </a:defRPr>
+            </a:lvl1pPr>
+          </a:lstStyle>
           <a:p>
             <a:endParaRPr lang="en-US"/>
           </a:p>
@@ -317,13 +333,7 @@
       </p:sp>
       <p:sp>
         <p:nvSpPr>
-          <p:cNvPr id="6" name="Slide Number Placeholder 5">
-            <a:extLst>
-              <a:ext uri="{FF2B5EF4-FFF2-40B4-BE49-F238E27FC236}">
-                <a16:creationId xmlns:a16="http://schemas.microsoft.com/office/drawing/2014/main" id="{41D3375A-1790-4FB9-98E7-CEA325F76682}"/>
-              </a:ext>
-            </a:extLst>
-          </p:cNvPr>
+          <p:cNvPr id="6" name="Slide Number Placeholder 5"/>
           <p:cNvSpPr>
             <a:spLocks noGrp="1"/>
           </p:cNvSpPr>
@@ -334,7 +344,17 @@
         <p:spPr/>
         <p:txBody>
           <a:bodyPr/>
-          <a:lstStyle/>
+          <a:lstStyle>
+            <a:lvl1pPr>
+              <a:defRPr>
+                <a:solidFill>
+                  <a:schemeClr val="tx1">
+                    <a:lumMod val="65000"/>
+                  </a:schemeClr>
+                </a:solidFill>
+              </a:defRPr>
+            </a:lvl1pPr>
+          </a:lstStyle>
           <a:p>
             <a:fld id="{9E2C0B41-26B4-4EDA-90B4-C25F9CBF5138}" type="slidenum">
               <a:rPr lang="en-US" smtClean="0"/>
@@ -344,15 +364,53 @@
           </a:p>
         </p:txBody>
       </p:sp>
+      <p:sp>
+        <p:nvSpPr>
+          <p:cNvPr id="7" name="Rectangle 6"/>
+          <p:cNvSpPr/>
+          <p:nvPr/>
+        </p:nvSpPr>
+        <p:spPr>
+          <a:xfrm>
+            <a:off x="0" y="0"/>
+            <a:ext cx="457200" cy="6858000"/>
+          </a:xfrm>
+          <a:prstGeom prst="rect">
+            <a:avLst/>
+          </a:prstGeom>
+          <a:solidFill>
+            <a:schemeClr val="accent1"/>
+          </a:solidFill>
+          <a:ln>
+            <a:noFill/>
+          </a:ln>
+        </p:spPr>
+        <p:style>
+          <a:lnRef idx="2">
+            <a:schemeClr val="accent1">
+              <a:shade val="50000"/>
+            </a:schemeClr>
+          </a:lnRef>
+          <a:fillRef idx="1">
+            <a:schemeClr val="accent1"/>
+          </a:fillRef>
+          <a:effectRef idx="0">
+            <a:schemeClr val="accent1"/>
+          </a:effectRef>
+          <a:fontRef idx="minor">
+            <a:schemeClr val="lt1"/>
+          </a:fontRef>
+        </p:style>
+      </p:sp>
     </p:spTree>
     <p:extLst>
       <p:ext uri="{BB962C8B-B14F-4D97-AF65-F5344CB8AC3E}">
-        <p14:creationId xmlns:p14="http://schemas.microsoft.com/office/powerpoint/2010/main" val="4275609716"/>
+        <p14:creationId xmlns:p14="http://schemas.microsoft.com/office/powerpoint/2010/main" val="2609610902"/>
       </p:ext>
     </p:extLst>
   </p:cSld>
   <p:clrMapOvr>
-    <a:masterClrMapping/>
+    <a:overrideClrMapping bg1="dk1" tx1="lt1" bg2="dk2" tx2="lt2" accent1="accent1" accent2="accent2" accent3="accent3" accent4="accent4" accent5="accent5" accent6="accent6" hlink="hlink" folHlink="folHlink"/>
   </p:clrMapOvr>
 </p:sldLayout>
 </file>
@@ -376,13 +434,7 @@
       </p:grpSpPr>
       <p:sp>
         <p:nvSpPr>
-          <p:cNvPr id="2" name="Title 1">
-            <a:extLst>
-              <a:ext uri="{FF2B5EF4-FFF2-40B4-BE49-F238E27FC236}">
-                <a16:creationId xmlns:a16="http://schemas.microsoft.com/office/drawing/2014/main" id="{118EF447-D33A-4AA3-8A68-B85D26F55370}"/>
-              </a:ext>
-            </a:extLst>
-          </p:cNvPr>
+          <p:cNvPr id="2" name="Title 1"/>
           <p:cNvSpPr>
             <a:spLocks noGrp="1"/>
           </p:cNvSpPr>
@@ -399,18 +451,13 @@
               <a:rPr lang="en-US"/>
               <a:t>Click to edit Master title style</a:t>
             </a:r>
-          </a:p>
-        </p:txBody>
-      </p:sp>
-      <p:sp>
-        <p:nvSpPr>
-          <p:cNvPr id="3" name="Vertical Text Placeholder 2">
-            <a:extLst>
-              <a:ext uri="{FF2B5EF4-FFF2-40B4-BE49-F238E27FC236}">
-                <a16:creationId xmlns:a16="http://schemas.microsoft.com/office/drawing/2014/main" id="{7A3E0D22-750D-49EE-9A8C-E13650B349A8}"/>
-              </a:ext>
-            </a:extLst>
-          </p:cNvPr>
+            <a:endParaRPr lang="en-US" dirty="0"/>
+          </a:p>
+        </p:txBody>
+      </p:sp>
+      <p:sp>
+        <p:nvSpPr>
+          <p:cNvPr id="3" name="Vertical Text Placeholder 2"/>
           <p:cNvSpPr>
             <a:spLocks noGrp="1"/>
           </p:cNvSpPr>
@@ -456,18 +503,13 @@
               <a:rPr lang="en-US"/>
               <a:t>Fifth level</a:t>
             </a:r>
-          </a:p>
-        </p:txBody>
-      </p:sp>
-      <p:sp>
-        <p:nvSpPr>
-          <p:cNvPr id="4" name="Date Placeholder 3">
-            <a:extLst>
-              <a:ext uri="{FF2B5EF4-FFF2-40B4-BE49-F238E27FC236}">
-                <a16:creationId xmlns:a16="http://schemas.microsoft.com/office/drawing/2014/main" id="{FE933D25-AD7D-4180-9C94-CDD682E53FB4}"/>
-              </a:ext>
-            </a:extLst>
-          </p:cNvPr>
+            <a:endParaRPr lang="en-US" dirty="0"/>
+          </a:p>
+        </p:txBody>
+      </p:sp>
+      <p:sp>
+        <p:nvSpPr>
+          <p:cNvPr id="4" name="Date Placeholder 3"/>
           <p:cNvSpPr>
             <a:spLocks noGrp="1"/>
           </p:cNvSpPr>
@@ -490,13 +532,7 @@
       </p:sp>
       <p:sp>
         <p:nvSpPr>
-          <p:cNvPr id="5" name="Footer Placeholder 4">
-            <a:extLst>
-              <a:ext uri="{FF2B5EF4-FFF2-40B4-BE49-F238E27FC236}">
-                <a16:creationId xmlns:a16="http://schemas.microsoft.com/office/drawing/2014/main" id="{8F7FFCEA-EFB0-475C-B8C8-8A190DE31AB1}"/>
-              </a:ext>
-            </a:extLst>
-          </p:cNvPr>
+          <p:cNvPr id="5" name="Footer Placeholder 4"/>
           <p:cNvSpPr>
             <a:spLocks noGrp="1"/>
           </p:cNvSpPr>
@@ -515,13 +551,7 @@
       </p:sp>
       <p:sp>
         <p:nvSpPr>
-          <p:cNvPr id="6" name="Slide Number Placeholder 5">
-            <a:extLst>
-              <a:ext uri="{FF2B5EF4-FFF2-40B4-BE49-F238E27FC236}">
-                <a16:creationId xmlns:a16="http://schemas.microsoft.com/office/drawing/2014/main" id="{23236907-C052-4CC3-80B5-F45B15D8AB35}"/>
-              </a:ext>
-            </a:extLst>
-          </p:cNvPr>
+          <p:cNvPr id="6" name="Slide Number Placeholder 5"/>
           <p:cNvSpPr>
             <a:spLocks noGrp="1"/>
           </p:cNvSpPr>
@@ -545,7 +575,7 @@
     </p:spTree>
     <p:extLst>
       <p:ext uri="{BB962C8B-B14F-4D97-AF65-F5344CB8AC3E}">
-        <p14:creationId xmlns:p14="http://schemas.microsoft.com/office/powerpoint/2010/main" val="396508372"/>
+        <p14:creationId xmlns:p14="http://schemas.microsoft.com/office/powerpoint/2010/main" val="2975520750"/>
       </p:ext>
     </p:extLst>
   </p:cSld>
@@ -574,13 +604,7 @@
       </p:grpSpPr>
       <p:sp>
         <p:nvSpPr>
-          <p:cNvPr id="2" name="Vertical Title 1">
-            <a:extLst>
-              <a:ext uri="{FF2B5EF4-FFF2-40B4-BE49-F238E27FC236}">
-                <a16:creationId xmlns:a16="http://schemas.microsoft.com/office/drawing/2014/main" id="{4C31D7CD-5445-4318-8581-0F8ADF9B1B7A}"/>
-              </a:ext>
-            </a:extLst>
-          </p:cNvPr>
+          <p:cNvPr id="2" name="Vertical Title 1"/>
           <p:cNvSpPr>
             <a:spLocks noGrp="1"/>
           </p:cNvSpPr>
@@ -590,8 +614,8 @@
         </p:nvSpPr>
         <p:spPr>
           <a:xfrm>
-            <a:off x="8724900" y="365125"/>
-            <a:ext cx="2628900" cy="5811838"/>
+            <a:off x="8648700" y="381000"/>
+            <a:ext cx="2476500" cy="5897562"/>
           </a:xfrm>
         </p:spPr>
         <p:txBody>
@@ -602,18 +626,13 @@
               <a:rPr lang="en-US"/>
               <a:t>Click to edit Master title style</a:t>
             </a:r>
-          </a:p>
-        </p:txBody>
-      </p:sp>
-      <p:sp>
-        <p:nvSpPr>
-          <p:cNvPr id="3" name="Vertical Text Placeholder 2">
-            <a:extLst>
-              <a:ext uri="{FF2B5EF4-FFF2-40B4-BE49-F238E27FC236}">
-                <a16:creationId xmlns:a16="http://schemas.microsoft.com/office/drawing/2014/main" id="{C6F0B7FE-DCD7-4124-AC2B-9FCCB3C6DBD9}"/>
-              </a:ext>
-            </a:extLst>
-          </p:cNvPr>
+            <a:endParaRPr lang="en-US" dirty="0"/>
+          </a:p>
+        </p:txBody>
+      </p:sp>
+      <p:sp>
+        <p:nvSpPr>
+          <p:cNvPr id="3" name="Vertical Text Placeholder 2"/>
           <p:cNvSpPr>
             <a:spLocks noGrp="1"/>
           </p:cNvSpPr>
@@ -623,8 +642,8 @@
         </p:nvSpPr>
         <p:spPr>
           <a:xfrm>
-            <a:off x="838200" y="365125"/>
-            <a:ext cx="7734300" cy="5811838"/>
+            <a:off x="762000" y="381000"/>
+            <a:ext cx="7734300" cy="5897562"/>
           </a:xfrm>
         </p:spPr>
         <p:txBody>
@@ -664,18 +683,13 @@
               <a:rPr lang="en-US"/>
               <a:t>Fifth level</a:t>
             </a:r>
-          </a:p>
-        </p:txBody>
-      </p:sp>
-      <p:sp>
-        <p:nvSpPr>
-          <p:cNvPr id="4" name="Date Placeholder 3">
-            <a:extLst>
-              <a:ext uri="{FF2B5EF4-FFF2-40B4-BE49-F238E27FC236}">
-                <a16:creationId xmlns:a16="http://schemas.microsoft.com/office/drawing/2014/main" id="{750D6EBF-8F08-4454-B9E2-DE06055001F0}"/>
-              </a:ext>
-            </a:extLst>
-          </p:cNvPr>
+            <a:endParaRPr lang="en-US" dirty="0"/>
+          </a:p>
+        </p:txBody>
+      </p:sp>
+      <p:sp>
+        <p:nvSpPr>
+          <p:cNvPr id="4" name="Date Placeholder 3"/>
           <p:cNvSpPr>
             <a:spLocks noGrp="1"/>
           </p:cNvSpPr>
@@ -698,13 +712,7 @@
       </p:sp>
       <p:sp>
         <p:nvSpPr>
-          <p:cNvPr id="5" name="Footer Placeholder 4">
-            <a:extLst>
-              <a:ext uri="{FF2B5EF4-FFF2-40B4-BE49-F238E27FC236}">
-                <a16:creationId xmlns:a16="http://schemas.microsoft.com/office/drawing/2014/main" id="{5C426CF8-EBC3-4930-B495-FA2E4D60D8AA}"/>
-              </a:ext>
-            </a:extLst>
-          </p:cNvPr>
+          <p:cNvPr id="5" name="Footer Placeholder 4"/>
           <p:cNvSpPr>
             <a:spLocks noGrp="1"/>
           </p:cNvSpPr>
@@ -723,13 +731,7 @@
       </p:sp>
       <p:sp>
         <p:nvSpPr>
-          <p:cNvPr id="6" name="Slide Number Placeholder 5">
-            <a:extLst>
-              <a:ext uri="{FF2B5EF4-FFF2-40B4-BE49-F238E27FC236}">
-                <a16:creationId xmlns:a16="http://schemas.microsoft.com/office/drawing/2014/main" id="{8E81BF0F-10E4-4D18-A850-26AE332331F3}"/>
-              </a:ext>
-            </a:extLst>
-          </p:cNvPr>
+          <p:cNvPr id="6" name="Slide Number Placeholder 5"/>
           <p:cNvSpPr>
             <a:spLocks noGrp="1"/>
           </p:cNvSpPr>
@@ -753,7 +755,7 @@
     </p:spTree>
     <p:extLst>
       <p:ext uri="{BB962C8B-B14F-4D97-AF65-F5344CB8AC3E}">
-        <p14:creationId xmlns:p14="http://schemas.microsoft.com/office/powerpoint/2010/main" val="324420394"/>
+        <p14:creationId xmlns:p14="http://schemas.microsoft.com/office/powerpoint/2010/main" val="2579227898"/>
       </p:ext>
     </p:extLst>
   </p:cSld>
@@ -782,13 +784,7 @@
       </p:grpSpPr>
       <p:sp>
         <p:nvSpPr>
-          <p:cNvPr id="2" name="Title 1">
-            <a:extLst>
-              <a:ext uri="{FF2B5EF4-FFF2-40B4-BE49-F238E27FC236}">
-                <a16:creationId xmlns:a16="http://schemas.microsoft.com/office/drawing/2014/main" id="{FD9B380A-9BBB-47E0-A8E0-B51A20E215A2}"/>
-              </a:ext>
-            </a:extLst>
-          </p:cNvPr>
+          <p:cNvPr id="2" name="Title 1"/>
           <p:cNvSpPr>
             <a:spLocks noGrp="1"/>
           </p:cNvSpPr>
@@ -805,18 +801,13 @@
               <a:rPr lang="en-US"/>
               <a:t>Click to edit Master title style</a:t>
             </a:r>
-          </a:p>
-        </p:txBody>
-      </p:sp>
-      <p:sp>
-        <p:nvSpPr>
-          <p:cNvPr id="3" name="Content Placeholder 2">
-            <a:extLst>
-              <a:ext uri="{FF2B5EF4-FFF2-40B4-BE49-F238E27FC236}">
-                <a16:creationId xmlns:a16="http://schemas.microsoft.com/office/drawing/2014/main" id="{138404D5-38D7-408E-A6E4-9EA88427CE90}"/>
-              </a:ext>
-            </a:extLst>
-          </p:cNvPr>
+            <a:endParaRPr lang="en-US" dirty="0"/>
+          </a:p>
+        </p:txBody>
+      </p:sp>
+      <p:sp>
+        <p:nvSpPr>
+          <p:cNvPr id="3" name="Content Placeholder 2"/>
           <p:cNvSpPr>
             <a:spLocks noGrp="1"/>
           </p:cNvSpPr>
@@ -862,18 +853,13 @@
               <a:rPr lang="en-US"/>
               <a:t>Fifth level</a:t>
             </a:r>
-          </a:p>
-        </p:txBody>
-      </p:sp>
-      <p:sp>
-        <p:nvSpPr>
-          <p:cNvPr id="4" name="Date Placeholder 3">
-            <a:extLst>
-              <a:ext uri="{FF2B5EF4-FFF2-40B4-BE49-F238E27FC236}">
-                <a16:creationId xmlns:a16="http://schemas.microsoft.com/office/drawing/2014/main" id="{98D19955-1E21-4EA8-B3D5-BA35B458CC00}"/>
-              </a:ext>
-            </a:extLst>
-          </p:cNvPr>
+            <a:endParaRPr lang="en-US" dirty="0"/>
+          </a:p>
+        </p:txBody>
+      </p:sp>
+      <p:sp>
+        <p:nvSpPr>
+          <p:cNvPr id="4" name="Date Placeholder 3"/>
           <p:cNvSpPr>
             <a:spLocks noGrp="1"/>
           </p:cNvSpPr>
@@ -896,13 +882,7 @@
       </p:sp>
       <p:sp>
         <p:nvSpPr>
-          <p:cNvPr id="5" name="Footer Placeholder 4">
-            <a:extLst>
-              <a:ext uri="{FF2B5EF4-FFF2-40B4-BE49-F238E27FC236}">
-                <a16:creationId xmlns:a16="http://schemas.microsoft.com/office/drawing/2014/main" id="{2F24E218-8A7B-4A0E-91C9-09B6B225D41F}"/>
-              </a:ext>
-            </a:extLst>
-          </p:cNvPr>
+          <p:cNvPr id="5" name="Footer Placeholder 4"/>
           <p:cNvSpPr>
             <a:spLocks noGrp="1"/>
           </p:cNvSpPr>
@@ -921,13 +901,7 @@
       </p:sp>
       <p:sp>
         <p:nvSpPr>
-          <p:cNvPr id="6" name="Slide Number Placeholder 5">
-            <a:extLst>
-              <a:ext uri="{FF2B5EF4-FFF2-40B4-BE49-F238E27FC236}">
-                <a16:creationId xmlns:a16="http://schemas.microsoft.com/office/drawing/2014/main" id="{46780503-3396-4FE1-A2A5-00EA49138AF4}"/>
-              </a:ext>
-            </a:extLst>
-          </p:cNvPr>
+          <p:cNvPr id="6" name="Slide Number Placeholder 5"/>
           <p:cNvSpPr>
             <a:spLocks noGrp="1"/>
           </p:cNvSpPr>
@@ -951,7 +925,7 @@
     </p:spTree>
     <p:extLst>
       <p:ext uri="{BB962C8B-B14F-4D97-AF65-F5344CB8AC3E}">
-        <p14:creationId xmlns:p14="http://schemas.microsoft.com/office/powerpoint/2010/main" val="3965436789"/>
+        <p14:creationId xmlns:p14="http://schemas.microsoft.com/office/powerpoint/2010/main" val="2213960285"/>
       </p:ext>
     </p:extLst>
   </p:cSld>
@@ -980,13 +954,7 @@
       </p:grpSpPr>
       <p:sp>
         <p:nvSpPr>
-          <p:cNvPr id="2" name="Title 1">
-            <a:extLst>
-              <a:ext uri="{FF2B5EF4-FFF2-40B4-BE49-F238E27FC236}">
-                <a16:creationId xmlns:a16="http://schemas.microsoft.com/office/drawing/2014/main" id="{3B0ED686-9833-45F3-8C5A-D7BED08050B9}"/>
-              </a:ext>
-            </a:extLst>
-          </p:cNvPr>
+          <p:cNvPr id="2" name="Title 1"/>
           <p:cNvSpPr>
             <a:spLocks noGrp="1"/>
           </p:cNvSpPr>
@@ -996,15 +964,20 @@
         </p:nvSpPr>
         <p:spPr>
           <a:xfrm>
-            <a:off x="831850" y="1709738"/>
-            <a:ext cx="10515600" cy="2852737"/>
+            <a:off x="1261872" y="758952"/>
+            <a:ext cx="9418320" cy="4041648"/>
           </a:xfrm>
         </p:spPr>
         <p:txBody>
-          <a:bodyPr anchor="b"/>
+          <a:bodyPr anchor="b">
+            <a:normAutofit/>
+          </a:bodyPr>
           <a:lstStyle>
             <a:lvl1pPr>
-              <a:defRPr sz="6000"/>
+              <a:lnSpc>
+                <a:spcPct val="85000"/>
+              </a:lnSpc>
+              <a:defRPr sz="7200" b="0"/>
             </a:lvl1pPr>
           </a:lstStyle>
           <a:p>
@@ -1012,18 +985,13 @@
               <a:rPr lang="en-US"/>
               <a:t>Click to edit Master title style</a:t>
             </a:r>
-          </a:p>
-        </p:txBody>
-      </p:sp>
-      <p:sp>
-        <p:nvSpPr>
-          <p:cNvPr id="3" name="Text Placeholder 2">
-            <a:extLst>
-              <a:ext uri="{FF2B5EF4-FFF2-40B4-BE49-F238E27FC236}">
-                <a16:creationId xmlns:a16="http://schemas.microsoft.com/office/drawing/2014/main" id="{B370BFFF-5316-4048-B3BC-C5BDF4C0EB01}"/>
-              </a:ext>
-            </a:extLst>
-          </p:cNvPr>
+            <a:endParaRPr lang="en-US" dirty="0"/>
+          </a:p>
+        </p:txBody>
+      </p:sp>
+      <p:sp>
+        <p:nvSpPr>
+          <p:cNvPr id="3" name="Text Placeholder 2"/>
           <p:cNvSpPr>
             <a:spLocks noGrp="1"/>
           </p:cNvSpPr>
@@ -1033,26 +1001,29 @@
         </p:nvSpPr>
         <p:spPr>
           <a:xfrm>
-            <a:off x="831850" y="4589463"/>
-            <a:ext cx="10515600" cy="1500187"/>
+            <a:off x="1261872" y="4800600"/>
+            <a:ext cx="9418320" cy="1691640"/>
           </a:xfrm>
         </p:spPr>
         <p:txBody>
-          <a:bodyPr/>
+          <a:bodyPr anchor="t">
+            <a:normAutofit/>
+          </a:bodyPr>
           <a:lstStyle>
             <a:lvl1pPr marL="0" indent="0">
               <a:buNone/>
-              <a:defRPr sz="2400">
+              <a:defRPr sz="2200">
                 <a:solidFill>
                   <a:schemeClr val="tx1">
-                    <a:tint val="75000"/>
+                    <a:lumMod val="65000"/>
+                    <a:lumOff val="35000"/>
                   </a:schemeClr>
                 </a:solidFill>
               </a:defRPr>
             </a:lvl1pPr>
             <a:lvl2pPr marL="457200" indent="0">
               <a:buNone/>
-              <a:defRPr sz="2000">
+              <a:defRPr sz="1800">
                 <a:solidFill>
                   <a:schemeClr val="tx1">
                     <a:tint val="75000"/>
@@ -1062,7 +1033,7 @@
             </a:lvl2pPr>
             <a:lvl3pPr marL="914400" indent="0">
               <a:buNone/>
-              <a:defRPr sz="1800">
+              <a:defRPr sz="1600">
                 <a:solidFill>
                   <a:schemeClr val="tx1">
                     <a:tint val="75000"/>
@@ -1072,7 +1043,7 @@
             </a:lvl3pPr>
             <a:lvl4pPr marL="1371600" indent="0">
               <a:buNone/>
-              <a:defRPr sz="1600">
+              <a:defRPr sz="1400">
                 <a:solidFill>
                   <a:schemeClr val="tx1">
                     <a:tint val="75000"/>
@@ -1082,7 +1053,7 @@
             </a:lvl4pPr>
             <a:lvl5pPr marL="1828800" indent="0">
               <a:buNone/>
-              <a:defRPr sz="1600">
+              <a:defRPr sz="1400">
                 <a:solidFill>
                   <a:schemeClr val="tx1">
                     <a:tint val="75000"/>
@@ -1092,7 +1063,7 @@
             </a:lvl5pPr>
             <a:lvl6pPr marL="2286000" indent="0">
               <a:buNone/>
-              <a:defRPr sz="1600">
+              <a:defRPr sz="1400">
                 <a:solidFill>
                   <a:schemeClr val="tx1">
                     <a:tint val="75000"/>
@@ -1102,7 +1073,7 @@
             </a:lvl6pPr>
             <a:lvl7pPr marL="2743200" indent="0">
               <a:buNone/>
-              <a:defRPr sz="1600">
+              <a:defRPr sz="1400">
                 <a:solidFill>
                   <a:schemeClr val="tx1">
                     <a:tint val="75000"/>
@@ -1112,7 +1083,7 @@
             </a:lvl7pPr>
             <a:lvl8pPr marL="3200400" indent="0">
               <a:buNone/>
-              <a:defRPr sz="1600">
+              <a:defRPr sz="1400">
                 <a:solidFill>
                   <a:schemeClr val="tx1">
                     <a:tint val="75000"/>
@@ -1122,7 +1093,7 @@
             </a:lvl8pPr>
             <a:lvl9pPr marL="3657600" indent="0">
               <a:buNone/>
-              <a:defRPr sz="1600">
+              <a:defRPr sz="1400">
                 <a:solidFill>
                   <a:schemeClr val="tx1">
                     <a:tint val="75000"/>
@@ -1142,13 +1113,7 @@
       </p:sp>
       <p:sp>
         <p:nvSpPr>
-          <p:cNvPr id="4" name="Date Placeholder 3">
-            <a:extLst>
-              <a:ext uri="{FF2B5EF4-FFF2-40B4-BE49-F238E27FC236}">
-                <a16:creationId xmlns:a16="http://schemas.microsoft.com/office/drawing/2014/main" id="{27CC28C3-451A-461B-B99E-EDB1AA8443F7}"/>
-              </a:ext>
-            </a:extLst>
-          </p:cNvPr>
+          <p:cNvPr id="4" name="Date Placeholder 3"/>
           <p:cNvSpPr>
             <a:spLocks noGrp="1"/>
           </p:cNvSpPr>
@@ -1171,13 +1136,7 @@
       </p:sp>
       <p:sp>
         <p:nvSpPr>
-          <p:cNvPr id="5" name="Footer Placeholder 4">
-            <a:extLst>
-              <a:ext uri="{FF2B5EF4-FFF2-40B4-BE49-F238E27FC236}">
-                <a16:creationId xmlns:a16="http://schemas.microsoft.com/office/drawing/2014/main" id="{7A4C58DD-0FB0-4C14-8103-7C94D1841AF6}"/>
-              </a:ext>
-            </a:extLst>
-          </p:cNvPr>
+          <p:cNvPr id="5" name="Footer Placeholder 4"/>
           <p:cNvSpPr>
             <a:spLocks noGrp="1"/>
           </p:cNvSpPr>
@@ -1196,13 +1155,7 @@
       </p:sp>
       <p:sp>
         <p:nvSpPr>
-          <p:cNvPr id="6" name="Slide Number Placeholder 5">
-            <a:extLst>
-              <a:ext uri="{FF2B5EF4-FFF2-40B4-BE49-F238E27FC236}">
-                <a16:creationId xmlns:a16="http://schemas.microsoft.com/office/drawing/2014/main" id="{9C85C70C-0747-46B9-8F63-FEE593A636B4}"/>
-              </a:ext>
-            </a:extLst>
-          </p:cNvPr>
+          <p:cNvPr id="6" name="Slide Number Placeholder 5"/>
           <p:cNvSpPr>
             <a:spLocks noGrp="1"/>
           </p:cNvSpPr>
@@ -1223,10 +1176,48 @@
           </a:p>
         </p:txBody>
       </p:sp>
+      <p:sp>
+        <p:nvSpPr>
+          <p:cNvPr id="7" name="Rectangle 6"/>
+          <p:cNvSpPr/>
+          <p:nvPr/>
+        </p:nvSpPr>
+        <p:spPr>
+          <a:xfrm>
+            <a:off x="0" y="0"/>
+            <a:ext cx="457200" cy="6858000"/>
+          </a:xfrm>
+          <a:prstGeom prst="rect">
+            <a:avLst/>
+          </a:prstGeom>
+          <a:solidFill>
+            <a:schemeClr val="accent1"/>
+          </a:solidFill>
+          <a:ln>
+            <a:noFill/>
+          </a:ln>
+        </p:spPr>
+        <p:style>
+          <a:lnRef idx="2">
+            <a:schemeClr val="accent1">
+              <a:shade val="50000"/>
+            </a:schemeClr>
+          </a:lnRef>
+          <a:fillRef idx="1">
+            <a:schemeClr val="accent1"/>
+          </a:fillRef>
+          <a:effectRef idx="0">
+            <a:schemeClr val="accent1"/>
+          </a:effectRef>
+          <a:fontRef idx="minor">
+            <a:schemeClr val="lt1"/>
+          </a:fontRef>
+        </p:style>
+      </p:sp>
     </p:spTree>
     <p:extLst>
       <p:ext uri="{BB962C8B-B14F-4D97-AF65-F5344CB8AC3E}">
-        <p14:creationId xmlns:p14="http://schemas.microsoft.com/office/powerpoint/2010/main" val="4144396614"/>
+        <p14:creationId xmlns:p14="http://schemas.microsoft.com/office/powerpoint/2010/main" val="2634177581"/>
       </p:ext>
     </p:extLst>
   </p:cSld>
@@ -1255,13 +1246,7 @@
       </p:grpSpPr>
       <p:sp>
         <p:nvSpPr>
-          <p:cNvPr id="2" name="Title 1">
-            <a:extLst>
-              <a:ext uri="{FF2B5EF4-FFF2-40B4-BE49-F238E27FC236}">
-                <a16:creationId xmlns:a16="http://schemas.microsoft.com/office/drawing/2014/main" id="{E385E3CA-8B54-4F5D-8A49-64C6B784F71A}"/>
-              </a:ext>
-            </a:extLst>
-          </p:cNvPr>
+          <p:cNvPr id="2" name="Title 1"/>
           <p:cNvSpPr>
             <a:spLocks noGrp="1"/>
           </p:cNvSpPr>
@@ -1278,18 +1263,13 @@
               <a:rPr lang="en-US"/>
               <a:t>Click to edit Master title style</a:t>
             </a:r>
-          </a:p>
-        </p:txBody>
-      </p:sp>
-      <p:sp>
-        <p:nvSpPr>
-          <p:cNvPr id="3" name="Content Placeholder 2">
-            <a:extLst>
-              <a:ext uri="{FF2B5EF4-FFF2-40B4-BE49-F238E27FC236}">
-                <a16:creationId xmlns:a16="http://schemas.microsoft.com/office/drawing/2014/main" id="{58A590DD-CF7C-4F29-84CE-0F1B5F7AD865}"/>
-              </a:ext>
-            </a:extLst>
-          </p:cNvPr>
+            <a:endParaRPr lang="en-US" dirty="0"/>
+          </a:p>
+        </p:txBody>
+      </p:sp>
+      <p:sp>
+        <p:nvSpPr>
+          <p:cNvPr id="3" name="Content Placeholder 2"/>
           <p:cNvSpPr>
             <a:spLocks noGrp="1"/>
           </p:cNvSpPr>
@@ -1299,13 +1279,41 @@
         </p:nvSpPr>
         <p:spPr>
           <a:xfrm>
-            <a:off x="838200" y="1825625"/>
-            <a:ext cx="5181600" cy="4351338"/>
+            <a:off x="1261872" y="1828800"/>
+            <a:ext cx="4480560" cy="4351337"/>
           </a:xfrm>
         </p:spPr>
         <p:txBody>
           <a:bodyPr/>
-          <a:lstStyle/>
+          <a:lstStyle>
+            <a:lvl1pPr>
+              <a:defRPr sz="1800"/>
+            </a:lvl1pPr>
+            <a:lvl2pPr>
+              <a:defRPr sz="1600"/>
+            </a:lvl2pPr>
+            <a:lvl3pPr>
+              <a:defRPr sz="1400"/>
+            </a:lvl3pPr>
+            <a:lvl4pPr>
+              <a:defRPr sz="1400"/>
+            </a:lvl4pPr>
+            <a:lvl5pPr>
+              <a:defRPr sz="1400"/>
+            </a:lvl5pPr>
+            <a:lvl6pPr>
+              <a:defRPr sz="1400"/>
+            </a:lvl6pPr>
+            <a:lvl7pPr>
+              <a:defRPr sz="1400"/>
+            </a:lvl7pPr>
+            <a:lvl8pPr>
+              <a:defRPr sz="1400"/>
+            </a:lvl8pPr>
+            <a:lvl9pPr>
+              <a:defRPr sz="1400"/>
+            </a:lvl9pPr>
+          </a:lstStyle>
           <a:p>
             <a:pPr lvl="0"/>
             <a:r>
@@ -1340,18 +1348,13 @@
               <a:rPr lang="en-US"/>
               <a:t>Fifth level</a:t>
             </a:r>
-          </a:p>
-        </p:txBody>
-      </p:sp>
-      <p:sp>
-        <p:nvSpPr>
-          <p:cNvPr id="4" name="Content Placeholder 3">
-            <a:extLst>
-              <a:ext uri="{FF2B5EF4-FFF2-40B4-BE49-F238E27FC236}">
-                <a16:creationId xmlns:a16="http://schemas.microsoft.com/office/drawing/2014/main" id="{3C8C2B31-48EF-4180-92B2-A60F263EA518}"/>
-              </a:ext>
-            </a:extLst>
-          </p:cNvPr>
+            <a:endParaRPr lang="en-US" dirty="0"/>
+          </a:p>
+        </p:txBody>
+      </p:sp>
+      <p:sp>
+        <p:nvSpPr>
+          <p:cNvPr id="4" name="Content Placeholder 3"/>
           <p:cNvSpPr>
             <a:spLocks noGrp="1"/>
           </p:cNvSpPr>
@@ -1361,13 +1364,41 @@
         </p:nvSpPr>
         <p:spPr>
           <a:xfrm>
-            <a:off x="6172200" y="1825625"/>
-            <a:ext cx="5181600" cy="4351338"/>
+            <a:off x="6126480" y="1828800"/>
+            <a:ext cx="4480560" cy="4351337"/>
           </a:xfrm>
         </p:spPr>
         <p:txBody>
           <a:bodyPr/>
-          <a:lstStyle/>
+          <a:lstStyle>
+            <a:lvl1pPr>
+              <a:defRPr sz="1800"/>
+            </a:lvl1pPr>
+            <a:lvl2pPr>
+              <a:defRPr sz="1600"/>
+            </a:lvl2pPr>
+            <a:lvl3pPr>
+              <a:defRPr sz="1400"/>
+            </a:lvl3pPr>
+            <a:lvl4pPr>
+              <a:defRPr sz="1400"/>
+            </a:lvl4pPr>
+            <a:lvl5pPr>
+              <a:defRPr sz="1400"/>
+            </a:lvl5pPr>
+            <a:lvl6pPr>
+              <a:defRPr sz="1400"/>
+            </a:lvl6pPr>
+            <a:lvl7pPr>
+              <a:defRPr sz="1400"/>
+            </a:lvl7pPr>
+            <a:lvl8pPr>
+              <a:defRPr sz="1400"/>
+            </a:lvl8pPr>
+            <a:lvl9pPr>
+              <a:defRPr sz="1400"/>
+            </a:lvl9pPr>
+          </a:lstStyle>
           <a:p>
             <a:pPr lvl="0"/>
             <a:r>
@@ -1402,18 +1433,13 @@
               <a:rPr lang="en-US"/>
               <a:t>Fifth level</a:t>
             </a:r>
-          </a:p>
-        </p:txBody>
-      </p:sp>
-      <p:sp>
-        <p:nvSpPr>
-          <p:cNvPr id="5" name="Date Placeholder 4">
-            <a:extLst>
-              <a:ext uri="{FF2B5EF4-FFF2-40B4-BE49-F238E27FC236}">
-                <a16:creationId xmlns:a16="http://schemas.microsoft.com/office/drawing/2014/main" id="{EE3C2516-8140-4F90-AF34-D4DA3A360058}"/>
-              </a:ext>
-            </a:extLst>
-          </p:cNvPr>
+            <a:endParaRPr lang="en-US" dirty="0"/>
+          </a:p>
+        </p:txBody>
+      </p:sp>
+      <p:sp>
+        <p:nvSpPr>
+          <p:cNvPr id="5" name="Date Placeholder 4"/>
           <p:cNvSpPr>
             <a:spLocks noGrp="1"/>
           </p:cNvSpPr>
@@ -1436,13 +1462,7 @@
       </p:sp>
       <p:sp>
         <p:nvSpPr>
-          <p:cNvPr id="6" name="Footer Placeholder 5">
-            <a:extLst>
-              <a:ext uri="{FF2B5EF4-FFF2-40B4-BE49-F238E27FC236}">
-                <a16:creationId xmlns:a16="http://schemas.microsoft.com/office/drawing/2014/main" id="{3B541C29-D339-424C-A4DB-1A1D70A9D1D8}"/>
-              </a:ext>
-            </a:extLst>
-          </p:cNvPr>
+          <p:cNvPr id="6" name="Footer Placeholder 5"/>
           <p:cNvSpPr>
             <a:spLocks noGrp="1"/>
           </p:cNvSpPr>
@@ -1461,13 +1481,7 @@
       </p:sp>
       <p:sp>
         <p:nvSpPr>
-          <p:cNvPr id="7" name="Slide Number Placeholder 6">
-            <a:extLst>
-              <a:ext uri="{FF2B5EF4-FFF2-40B4-BE49-F238E27FC236}">
-                <a16:creationId xmlns:a16="http://schemas.microsoft.com/office/drawing/2014/main" id="{EE896162-DC25-4E9D-97BB-BDF7D3FED6EB}"/>
-              </a:ext>
-            </a:extLst>
-          </p:cNvPr>
+          <p:cNvPr id="7" name="Slide Number Placeholder 6"/>
           <p:cNvSpPr>
             <a:spLocks noGrp="1"/>
           </p:cNvSpPr>
@@ -1491,7 +1505,7 @@
     </p:spTree>
     <p:extLst>
       <p:ext uri="{BB962C8B-B14F-4D97-AF65-F5344CB8AC3E}">
-        <p14:creationId xmlns:p14="http://schemas.microsoft.com/office/powerpoint/2010/main" val="3832228464"/>
+        <p14:creationId xmlns:p14="http://schemas.microsoft.com/office/powerpoint/2010/main" val="3819396863"/>
       </p:ext>
     </p:extLst>
   </p:cSld>
@@ -1520,65 +1534,58 @@
       </p:grpSpPr>
       <p:sp>
         <p:nvSpPr>
-          <p:cNvPr id="2" name="Title 1">
-            <a:extLst>
-              <a:ext uri="{FF2B5EF4-FFF2-40B4-BE49-F238E27FC236}">
-                <a16:creationId xmlns:a16="http://schemas.microsoft.com/office/drawing/2014/main" id="{F83ED0AB-5BF3-46E4-84D9-03E54146D672}"/>
-              </a:ext>
-            </a:extLst>
-          </p:cNvPr>
+          <p:cNvPr id="10" name="Title 9"/>
           <p:cNvSpPr>
             <a:spLocks noGrp="1"/>
           </p:cNvSpPr>
           <p:nvPr>
             <p:ph type="title"/>
+          </p:nvPr>
+        </p:nvSpPr>
+        <p:spPr/>
+        <p:txBody>
+          <a:bodyPr/>
+          <a:lstStyle/>
+          <a:p>
+            <a:r>
+              <a:rPr lang="en-US"/>
+              <a:t>Click to edit Master title style</a:t>
+            </a:r>
+            <a:endParaRPr lang="en-US" dirty="0"/>
+          </a:p>
+        </p:txBody>
+      </p:sp>
+      <p:sp>
+        <p:nvSpPr>
+          <p:cNvPr id="3" name="Text Placeholder 2"/>
+          <p:cNvSpPr>
+            <a:spLocks noGrp="1"/>
+          </p:cNvSpPr>
+          <p:nvPr>
+            <p:ph type="body" idx="1"/>
           </p:nvPr>
         </p:nvSpPr>
         <p:spPr>
           <a:xfrm>
-            <a:off x="839788" y="365125"/>
-            <a:ext cx="10515600" cy="1325563"/>
+            <a:off x="1261872" y="1713655"/>
+            <a:ext cx="4480560" cy="731520"/>
           </a:xfrm>
         </p:spPr>
         <p:txBody>
-          <a:bodyPr/>
-          <a:lstStyle/>
-          <a:p>
-            <a:r>
-              <a:rPr lang="en-US"/>
-              <a:t>Click to edit Master title style</a:t>
-            </a:r>
-          </a:p>
-        </p:txBody>
-      </p:sp>
-      <p:sp>
-        <p:nvSpPr>
-          <p:cNvPr id="3" name="Text Placeholder 2">
-            <a:extLst>
-              <a:ext uri="{FF2B5EF4-FFF2-40B4-BE49-F238E27FC236}">
-                <a16:creationId xmlns:a16="http://schemas.microsoft.com/office/drawing/2014/main" id="{A33C1094-DC8C-4595-82A4-526C4BD8E333}"/>
-              </a:ext>
-            </a:extLst>
-          </p:cNvPr>
-          <p:cNvSpPr>
-            <a:spLocks noGrp="1"/>
-          </p:cNvSpPr>
-          <p:nvPr>
-            <p:ph type="body" idx="1"/>
-          </p:nvPr>
-        </p:nvSpPr>
-        <p:spPr>
-          <a:xfrm>
-            <a:off x="839788" y="1681163"/>
-            <a:ext cx="5157787" cy="823912"/>
-          </a:xfrm>
-        </p:spPr>
-        <p:txBody>
-          <a:bodyPr anchor="b"/>
+          <a:bodyPr anchor="b">
+            <a:normAutofit/>
+          </a:bodyPr>
           <a:lstStyle>
             <a:lvl1pPr marL="0" indent="0">
-              <a:buNone/>
-              <a:defRPr sz="2400" b="1"/>
+              <a:spcBef>
+                <a:spcPts val="0"/>
+              </a:spcBef>
+              <a:buNone/>
+              <a:defRPr sz="2000" b="0">
+                <a:solidFill>
+                  <a:schemeClr val="tx2"/>
+                </a:solidFill>
+              </a:defRPr>
             </a:lvl1pPr>
             <a:lvl2pPr marL="457200" indent="0">
               <a:buNone/>
@@ -1624,13 +1631,7 @@
       </p:sp>
       <p:sp>
         <p:nvSpPr>
-          <p:cNvPr id="4" name="Content Placeholder 3">
-            <a:extLst>
-              <a:ext uri="{FF2B5EF4-FFF2-40B4-BE49-F238E27FC236}">
-                <a16:creationId xmlns:a16="http://schemas.microsoft.com/office/drawing/2014/main" id="{18A9235E-D88F-43CC-AE63-91E0AD0332B6}"/>
-              </a:ext>
-            </a:extLst>
-          </p:cNvPr>
+          <p:cNvPr id="4" name="Content Placeholder 3"/>
           <p:cNvSpPr>
             <a:spLocks noGrp="1"/>
           </p:cNvSpPr>
@@ -1640,13 +1641,41 @@
         </p:nvSpPr>
         <p:spPr>
           <a:xfrm>
-            <a:off x="839788" y="2505075"/>
-            <a:ext cx="5157787" cy="3684588"/>
+            <a:off x="1261872" y="2507550"/>
+            <a:ext cx="4480560" cy="3664650"/>
           </a:xfrm>
         </p:spPr>
         <p:txBody>
           <a:bodyPr/>
-          <a:lstStyle/>
+          <a:lstStyle>
+            <a:lvl1pPr>
+              <a:defRPr sz="1800"/>
+            </a:lvl1pPr>
+            <a:lvl2pPr>
+              <a:defRPr sz="1600"/>
+            </a:lvl2pPr>
+            <a:lvl3pPr>
+              <a:defRPr sz="1400"/>
+            </a:lvl3pPr>
+            <a:lvl4pPr>
+              <a:defRPr sz="1400"/>
+            </a:lvl4pPr>
+            <a:lvl5pPr>
+              <a:defRPr sz="1400"/>
+            </a:lvl5pPr>
+            <a:lvl6pPr>
+              <a:defRPr sz="1400"/>
+            </a:lvl6pPr>
+            <a:lvl7pPr>
+              <a:defRPr sz="1400"/>
+            </a:lvl7pPr>
+            <a:lvl8pPr>
+              <a:defRPr sz="1400"/>
+            </a:lvl8pPr>
+            <a:lvl9pPr>
+              <a:defRPr sz="1400"/>
+            </a:lvl9pPr>
+          </a:lstStyle>
           <a:p>
             <a:pPr lvl="0"/>
             <a:r>
@@ -1681,18 +1710,13 @@
               <a:rPr lang="en-US"/>
               <a:t>Fifth level</a:t>
             </a:r>
-          </a:p>
-        </p:txBody>
-      </p:sp>
-      <p:sp>
-        <p:nvSpPr>
-          <p:cNvPr id="5" name="Text Placeholder 4">
-            <a:extLst>
-              <a:ext uri="{FF2B5EF4-FFF2-40B4-BE49-F238E27FC236}">
-                <a16:creationId xmlns:a16="http://schemas.microsoft.com/office/drawing/2014/main" id="{B3598ACB-E7B4-48AE-9BD8-14C93ED1940C}"/>
-              </a:ext>
-            </a:extLst>
-          </p:cNvPr>
+            <a:endParaRPr lang="en-US" dirty="0"/>
+          </a:p>
+        </p:txBody>
+      </p:sp>
+      <p:sp>
+        <p:nvSpPr>
+          <p:cNvPr id="5" name="Text Placeholder 4"/>
           <p:cNvSpPr>
             <a:spLocks noGrp="1"/>
           </p:cNvSpPr>
@@ -1702,16 +1726,31 @@
         </p:nvSpPr>
         <p:spPr>
           <a:xfrm>
-            <a:off x="6172200" y="1681163"/>
-            <a:ext cx="5183188" cy="823912"/>
+            <a:off x="6126480" y="1713655"/>
+            <a:ext cx="4480560" cy="731520"/>
           </a:xfrm>
         </p:spPr>
         <p:txBody>
-          <a:bodyPr anchor="b"/>
+          <a:bodyPr anchor="b">
+            <a:normAutofit/>
+          </a:bodyPr>
           <a:lstStyle>
             <a:lvl1pPr marL="0" indent="0">
-              <a:buNone/>
-              <a:defRPr sz="2400" b="1"/>
+              <a:lnSpc>
+                <a:spcPct val="95000"/>
+              </a:lnSpc>
+              <a:spcBef>
+                <a:spcPts val="0"/>
+              </a:spcBef>
+              <a:buNone/>
+              <a:defRPr lang="en-US" sz="2000" b="0" kern="1200" dirty="0">
+                <a:solidFill>
+                  <a:schemeClr val="tx2"/>
+                </a:solidFill>
+                <a:latin typeface="+mn-lt"/>
+                <a:ea typeface="+mn-ea"/>
+                <a:cs typeface="+mn-cs"/>
+              </a:defRPr>
             </a:lvl1pPr>
             <a:lvl2pPr marL="457200" indent="0">
               <a:buNone/>
@@ -1747,7 +1786,16 @@
             </a:lvl9pPr>
           </a:lstStyle>
           <a:p>
-            <a:pPr lvl="0"/>
+            <a:pPr marL="0" lvl="0" indent="0" algn="l" defTabSz="914400" rtl="0" eaLnBrk="1" latinLnBrk="0" hangingPunct="1">
+              <a:lnSpc>
+                <a:spcPct val="90000"/>
+              </a:lnSpc>
+              <a:spcBef>
+                <a:spcPts val="2000"/>
+              </a:spcBef>
+              <a:buFontTx/>
+              <a:buNone/>
+            </a:pPr>
             <a:r>
               <a:rPr lang="en-US"/>
               <a:t>Edit Master text styles</a:t>
@@ -1757,13 +1805,7 @@
       </p:sp>
       <p:sp>
         <p:nvSpPr>
-          <p:cNvPr id="6" name="Content Placeholder 5">
-            <a:extLst>
-              <a:ext uri="{FF2B5EF4-FFF2-40B4-BE49-F238E27FC236}">
-                <a16:creationId xmlns:a16="http://schemas.microsoft.com/office/drawing/2014/main" id="{30038E76-BA32-4F61-B032-AB039502B21A}"/>
-              </a:ext>
-            </a:extLst>
-          </p:cNvPr>
+          <p:cNvPr id="6" name="Content Placeholder 5"/>
           <p:cNvSpPr>
             <a:spLocks noGrp="1"/>
           </p:cNvSpPr>
@@ -1773,13 +1815,41 @@
         </p:nvSpPr>
         <p:spPr>
           <a:xfrm>
-            <a:off x="6172200" y="2505075"/>
-            <a:ext cx="5183188" cy="3684588"/>
+            <a:off x="6126480" y="2507550"/>
+            <a:ext cx="4480560" cy="3664650"/>
           </a:xfrm>
         </p:spPr>
         <p:txBody>
           <a:bodyPr/>
-          <a:lstStyle/>
+          <a:lstStyle>
+            <a:lvl1pPr>
+              <a:defRPr sz="1800"/>
+            </a:lvl1pPr>
+            <a:lvl2pPr>
+              <a:defRPr sz="1600"/>
+            </a:lvl2pPr>
+            <a:lvl3pPr>
+              <a:defRPr sz="1400"/>
+            </a:lvl3pPr>
+            <a:lvl4pPr>
+              <a:defRPr sz="1400"/>
+            </a:lvl4pPr>
+            <a:lvl5pPr>
+              <a:defRPr sz="1400"/>
+            </a:lvl5pPr>
+            <a:lvl6pPr>
+              <a:defRPr sz="1400"/>
+            </a:lvl6pPr>
+            <a:lvl7pPr>
+              <a:defRPr sz="1400"/>
+            </a:lvl7pPr>
+            <a:lvl8pPr>
+              <a:defRPr sz="1400"/>
+            </a:lvl8pPr>
+            <a:lvl9pPr>
+              <a:defRPr sz="1400"/>
+            </a:lvl9pPr>
+          </a:lstStyle>
           <a:p>
             <a:pPr lvl="0"/>
             <a:r>
@@ -1814,18 +1884,13 @@
               <a:rPr lang="en-US"/>
               <a:t>Fifth level</a:t>
             </a:r>
-          </a:p>
-        </p:txBody>
-      </p:sp>
-      <p:sp>
-        <p:nvSpPr>
-          <p:cNvPr id="7" name="Date Placeholder 6">
-            <a:extLst>
-              <a:ext uri="{FF2B5EF4-FFF2-40B4-BE49-F238E27FC236}">
-                <a16:creationId xmlns:a16="http://schemas.microsoft.com/office/drawing/2014/main" id="{49000985-D1D2-479F-A734-5B8BB40D50F5}"/>
-              </a:ext>
-            </a:extLst>
-          </p:cNvPr>
+            <a:endParaRPr lang="en-US" dirty="0"/>
+          </a:p>
+        </p:txBody>
+      </p:sp>
+      <p:sp>
+        <p:nvSpPr>
+          <p:cNvPr id="7" name="Date Placeholder 6"/>
           <p:cNvSpPr>
             <a:spLocks noGrp="1"/>
           </p:cNvSpPr>
@@ -1848,13 +1913,7 @@
       </p:sp>
       <p:sp>
         <p:nvSpPr>
-          <p:cNvPr id="8" name="Footer Placeholder 7">
-            <a:extLst>
-              <a:ext uri="{FF2B5EF4-FFF2-40B4-BE49-F238E27FC236}">
-                <a16:creationId xmlns:a16="http://schemas.microsoft.com/office/drawing/2014/main" id="{DAAE4AF5-C4BD-4A66-A945-B4A11B8CC770}"/>
-              </a:ext>
-            </a:extLst>
-          </p:cNvPr>
+          <p:cNvPr id="8" name="Footer Placeholder 7"/>
           <p:cNvSpPr>
             <a:spLocks noGrp="1"/>
           </p:cNvSpPr>
@@ -1873,13 +1932,7 @@
       </p:sp>
       <p:sp>
         <p:nvSpPr>
-          <p:cNvPr id="9" name="Slide Number Placeholder 8">
-            <a:extLst>
-              <a:ext uri="{FF2B5EF4-FFF2-40B4-BE49-F238E27FC236}">
-                <a16:creationId xmlns:a16="http://schemas.microsoft.com/office/drawing/2014/main" id="{CA98D0EB-3110-4ED9-A754-6F166782B342}"/>
-              </a:ext>
-            </a:extLst>
-          </p:cNvPr>
+          <p:cNvPr id="9" name="Slide Number Placeholder 8"/>
           <p:cNvSpPr>
             <a:spLocks noGrp="1"/>
           </p:cNvSpPr>
@@ -1903,7 +1956,7 @@
     </p:spTree>
     <p:extLst>
       <p:ext uri="{BB962C8B-B14F-4D97-AF65-F5344CB8AC3E}">
-        <p14:creationId xmlns:p14="http://schemas.microsoft.com/office/powerpoint/2010/main" val="3815294239"/>
+        <p14:creationId xmlns:p14="http://schemas.microsoft.com/office/powerpoint/2010/main" val="3493949241"/>
       </p:ext>
     </p:extLst>
   </p:cSld>
@@ -1932,13 +1985,7 @@
       </p:grpSpPr>
       <p:sp>
         <p:nvSpPr>
-          <p:cNvPr id="2" name="Title 1">
-            <a:extLst>
-              <a:ext uri="{FF2B5EF4-FFF2-40B4-BE49-F238E27FC236}">
-                <a16:creationId xmlns:a16="http://schemas.microsoft.com/office/drawing/2014/main" id="{111308E4-A310-4945-9C2A-A1DB5F02BB89}"/>
-              </a:ext>
-            </a:extLst>
-          </p:cNvPr>
+          <p:cNvPr id="6" name="Title 5"/>
           <p:cNvSpPr>
             <a:spLocks noGrp="1"/>
           </p:cNvSpPr>
@@ -1955,18 +2002,13 @@
               <a:rPr lang="en-US"/>
               <a:t>Click to edit Master title style</a:t>
             </a:r>
-          </a:p>
-        </p:txBody>
-      </p:sp>
-      <p:sp>
-        <p:nvSpPr>
-          <p:cNvPr id="3" name="Date Placeholder 2">
-            <a:extLst>
-              <a:ext uri="{FF2B5EF4-FFF2-40B4-BE49-F238E27FC236}">
-                <a16:creationId xmlns:a16="http://schemas.microsoft.com/office/drawing/2014/main" id="{344159A8-8AC5-419B-AC2B-CB3702F7F933}"/>
-              </a:ext>
-            </a:extLst>
-          </p:cNvPr>
+            <a:endParaRPr lang="en-US" dirty="0"/>
+          </a:p>
+        </p:txBody>
+      </p:sp>
+      <p:sp>
+        <p:nvSpPr>
+          <p:cNvPr id="3" name="Date Placeholder 2"/>
           <p:cNvSpPr>
             <a:spLocks noGrp="1"/>
           </p:cNvSpPr>
@@ -1989,13 +2031,7 @@
       </p:sp>
       <p:sp>
         <p:nvSpPr>
-          <p:cNvPr id="4" name="Footer Placeholder 3">
-            <a:extLst>
-              <a:ext uri="{FF2B5EF4-FFF2-40B4-BE49-F238E27FC236}">
-                <a16:creationId xmlns:a16="http://schemas.microsoft.com/office/drawing/2014/main" id="{88DAACE6-4123-4077-9F4B-9383AFD0ACCC}"/>
-              </a:ext>
-            </a:extLst>
-          </p:cNvPr>
+          <p:cNvPr id="4" name="Footer Placeholder 3"/>
           <p:cNvSpPr>
             <a:spLocks noGrp="1"/>
           </p:cNvSpPr>
@@ -2014,13 +2050,7 @@
       </p:sp>
       <p:sp>
         <p:nvSpPr>
-          <p:cNvPr id="5" name="Slide Number Placeholder 4">
-            <a:extLst>
-              <a:ext uri="{FF2B5EF4-FFF2-40B4-BE49-F238E27FC236}">
-                <a16:creationId xmlns:a16="http://schemas.microsoft.com/office/drawing/2014/main" id="{79FBB5B4-EC06-4181-9243-1E3103BED868}"/>
-              </a:ext>
-            </a:extLst>
-          </p:cNvPr>
+          <p:cNvPr id="5" name="Slide Number Placeholder 4"/>
           <p:cNvSpPr>
             <a:spLocks noGrp="1"/>
           </p:cNvSpPr>
@@ -2044,7 +2074,7 @@
     </p:spTree>
     <p:extLst>
       <p:ext uri="{BB962C8B-B14F-4D97-AF65-F5344CB8AC3E}">
-        <p14:creationId xmlns:p14="http://schemas.microsoft.com/office/powerpoint/2010/main" val="2698296666"/>
+        <p14:creationId xmlns:p14="http://schemas.microsoft.com/office/powerpoint/2010/main" val="2579546330"/>
       </p:ext>
     </p:extLst>
   </p:cSld>
@@ -2073,13 +2103,7 @@
       </p:grpSpPr>
       <p:sp>
         <p:nvSpPr>
-          <p:cNvPr id="2" name="Date Placeholder 1">
-            <a:extLst>
-              <a:ext uri="{FF2B5EF4-FFF2-40B4-BE49-F238E27FC236}">
-                <a16:creationId xmlns:a16="http://schemas.microsoft.com/office/drawing/2014/main" id="{CF76CD86-7125-492F-BEEE-7874A2A6F33D}"/>
-              </a:ext>
-            </a:extLst>
-          </p:cNvPr>
+          <p:cNvPr id="2" name="Date Placeholder 1"/>
           <p:cNvSpPr>
             <a:spLocks noGrp="1"/>
           </p:cNvSpPr>
@@ -2102,13 +2126,7 @@
       </p:sp>
       <p:sp>
         <p:nvSpPr>
-          <p:cNvPr id="3" name="Footer Placeholder 2">
-            <a:extLst>
-              <a:ext uri="{FF2B5EF4-FFF2-40B4-BE49-F238E27FC236}">
-                <a16:creationId xmlns:a16="http://schemas.microsoft.com/office/drawing/2014/main" id="{F165C802-AA0A-467A-8735-8F632BCB69E5}"/>
-              </a:ext>
-            </a:extLst>
-          </p:cNvPr>
+          <p:cNvPr id="3" name="Footer Placeholder 2"/>
           <p:cNvSpPr>
             <a:spLocks noGrp="1"/>
           </p:cNvSpPr>
@@ -2127,13 +2145,7 @@
       </p:sp>
       <p:sp>
         <p:nvSpPr>
-          <p:cNvPr id="4" name="Slide Number Placeholder 3">
-            <a:extLst>
-              <a:ext uri="{FF2B5EF4-FFF2-40B4-BE49-F238E27FC236}">
-                <a16:creationId xmlns:a16="http://schemas.microsoft.com/office/drawing/2014/main" id="{DDC32F11-862E-4E03-838A-AAA3F79ECFCC}"/>
-              </a:ext>
-            </a:extLst>
-          </p:cNvPr>
+          <p:cNvPr id="4" name="Slide Number Placeholder 3"/>
           <p:cNvSpPr>
             <a:spLocks noGrp="1"/>
           </p:cNvSpPr>
@@ -2157,7 +2169,7 @@
     </p:spTree>
     <p:extLst>
       <p:ext uri="{BB962C8B-B14F-4D97-AF65-F5344CB8AC3E}">
-        <p14:creationId xmlns:p14="http://schemas.microsoft.com/office/powerpoint/2010/main" val="1587325922"/>
+        <p14:creationId xmlns:p14="http://schemas.microsoft.com/office/powerpoint/2010/main" val="3943600997"/>
       </p:ext>
     </p:extLst>
   </p:cSld>
@@ -2186,13 +2198,7 @@
       </p:grpSpPr>
       <p:sp>
         <p:nvSpPr>
-          <p:cNvPr id="2" name="Title 1">
-            <a:extLst>
-              <a:ext uri="{FF2B5EF4-FFF2-40B4-BE49-F238E27FC236}">
-                <a16:creationId xmlns:a16="http://schemas.microsoft.com/office/drawing/2014/main" id="{182A9531-795D-436F-A203-314D2D2E0987}"/>
-              </a:ext>
-            </a:extLst>
-          </p:cNvPr>
+          <p:cNvPr id="2" name="Title 1"/>
           <p:cNvSpPr>
             <a:spLocks noGrp="1"/>
           </p:cNvSpPr>
@@ -2202,15 +2208,17 @@
         </p:nvSpPr>
         <p:spPr>
           <a:xfrm>
-            <a:off x="839788" y="457200"/>
-            <a:ext cx="3932237" cy="1600200"/>
+            <a:off x="841248" y="457200"/>
+            <a:ext cx="3200400" cy="1600197"/>
           </a:xfrm>
         </p:spPr>
         <p:txBody>
-          <a:bodyPr anchor="b"/>
+          <a:bodyPr anchor="b">
+            <a:normAutofit/>
+          </a:bodyPr>
           <a:lstStyle>
             <a:lvl1pPr>
-              <a:defRPr sz="3200"/>
+              <a:defRPr sz="3200" b="0" baseline="0"/>
             </a:lvl1pPr>
           </a:lstStyle>
           <a:p>
@@ -2218,18 +2226,13 @@
               <a:rPr lang="en-US"/>
               <a:t>Click to edit Master title style</a:t>
             </a:r>
-          </a:p>
-        </p:txBody>
-      </p:sp>
-      <p:sp>
-        <p:nvSpPr>
-          <p:cNvPr id="3" name="Content Placeholder 2">
-            <a:extLst>
-              <a:ext uri="{FF2B5EF4-FFF2-40B4-BE49-F238E27FC236}">
-                <a16:creationId xmlns:a16="http://schemas.microsoft.com/office/drawing/2014/main" id="{10BC0CBF-4F74-402A-9B46-A36219E3A5E6}"/>
-              </a:ext>
-            </a:extLst>
-          </p:cNvPr>
+            <a:endParaRPr lang="en-US" dirty="0"/>
+          </a:p>
+        </p:txBody>
+      </p:sp>
+      <p:sp>
+        <p:nvSpPr>
+          <p:cNvPr id="3" name="Content Placeholder 2"/>
           <p:cNvSpPr>
             <a:spLocks noGrp="1"/>
           </p:cNvSpPr>
@@ -2239,39 +2242,39 @@
         </p:nvSpPr>
         <p:spPr>
           <a:xfrm>
-            <a:off x="5183188" y="987425"/>
-            <a:ext cx="6172200" cy="4873625"/>
+            <a:off x="4504267" y="685800"/>
+            <a:ext cx="6079066" cy="5486400"/>
           </a:xfrm>
         </p:spPr>
         <p:txBody>
           <a:bodyPr/>
           <a:lstStyle>
             <a:lvl1pPr>
-              <a:defRPr sz="3200"/>
+              <a:defRPr sz="2000"/>
             </a:lvl1pPr>
             <a:lvl2pPr>
-              <a:defRPr sz="2800"/>
+              <a:defRPr sz="1800"/>
             </a:lvl2pPr>
             <a:lvl3pPr>
-              <a:defRPr sz="2400"/>
+              <a:defRPr sz="1600"/>
             </a:lvl3pPr>
             <a:lvl4pPr>
-              <a:defRPr sz="2000"/>
+              <a:defRPr sz="1400"/>
             </a:lvl4pPr>
             <a:lvl5pPr>
-              <a:defRPr sz="2000"/>
+              <a:defRPr sz="1400"/>
             </a:lvl5pPr>
             <a:lvl6pPr>
-              <a:defRPr sz="2000"/>
+              <a:defRPr sz="1400"/>
             </a:lvl6pPr>
             <a:lvl7pPr>
-              <a:defRPr sz="2000"/>
+              <a:defRPr sz="1400"/>
             </a:lvl7pPr>
             <a:lvl8pPr>
-              <a:defRPr sz="2000"/>
+              <a:defRPr sz="1400"/>
             </a:lvl8pPr>
             <a:lvl9pPr>
-              <a:defRPr sz="2000"/>
+              <a:defRPr sz="1400"/>
             </a:lvl9pPr>
           </a:lstStyle>
           <a:p>
@@ -2308,18 +2311,13 @@
               <a:rPr lang="en-US"/>
               <a:t>Fifth level</a:t>
             </a:r>
-          </a:p>
-        </p:txBody>
-      </p:sp>
-      <p:sp>
-        <p:nvSpPr>
-          <p:cNvPr id="4" name="Text Placeholder 3">
-            <a:extLst>
-              <a:ext uri="{FF2B5EF4-FFF2-40B4-BE49-F238E27FC236}">
-                <a16:creationId xmlns:a16="http://schemas.microsoft.com/office/drawing/2014/main" id="{BF496301-3D7A-4A9D-A7D8-E73E05996B7F}"/>
-              </a:ext>
-            </a:extLst>
-          </p:cNvPr>
+            <a:endParaRPr lang="en-US" dirty="0"/>
+          </a:p>
+        </p:txBody>
+      </p:sp>
+      <p:sp>
+        <p:nvSpPr>
+          <p:cNvPr id="4" name="Text Placeholder 3"/>
           <p:cNvSpPr>
             <a:spLocks noGrp="1"/>
           </p:cNvSpPr>
@@ -2329,48 +2327,56 @@
         </p:nvSpPr>
         <p:spPr>
           <a:xfrm>
-            <a:off x="839788" y="2057400"/>
-            <a:ext cx="3932237" cy="3811588"/>
+            <a:off x="841248" y="2099734"/>
+            <a:ext cx="3200400" cy="3810001"/>
           </a:xfrm>
         </p:spPr>
         <p:txBody>
-          <a:bodyPr/>
+          <a:bodyPr>
+            <a:normAutofit/>
+          </a:bodyPr>
           <a:lstStyle>
             <a:lvl1pPr marL="0" indent="0">
-              <a:buNone/>
-              <a:defRPr sz="1600"/>
+              <a:lnSpc>
+                <a:spcPct val="114000"/>
+              </a:lnSpc>
+              <a:spcBef>
+                <a:spcPts val="800"/>
+              </a:spcBef>
+              <a:buNone/>
+              <a:defRPr sz="1300"/>
             </a:lvl1pPr>
             <a:lvl2pPr marL="457200" indent="0">
               <a:buNone/>
-              <a:defRPr sz="1400"/>
+              <a:defRPr sz="1200"/>
             </a:lvl2pPr>
             <a:lvl3pPr marL="914400" indent="0">
               <a:buNone/>
-              <a:defRPr sz="1200"/>
+              <a:defRPr sz="1000"/>
             </a:lvl3pPr>
             <a:lvl4pPr marL="1371600" indent="0">
               <a:buNone/>
-              <a:defRPr sz="1000"/>
+              <a:defRPr sz="900"/>
             </a:lvl4pPr>
             <a:lvl5pPr marL="1828800" indent="0">
               <a:buNone/>
-              <a:defRPr sz="1000"/>
+              <a:defRPr sz="900"/>
             </a:lvl5pPr>
             <a:lvl6pPr marL="2286000" indent="0">
               <a:buNone/>
-              <a:defRPr sz="1000"/>
+              <a:defRPr sz="900"/>
             </a:lvl6pPr>
             <a:lvl7pPr marL="2743200" indent="0">
               <a:buNone/>
-              <a:defRPr sz="1000"/>
+              <a:defRPr sz="900"/>
             </a:lvl7pPr>
             <a:lvl8pPr marL="3200400" indent="0">
               <a:buNone/>
-              <a:defRPr sz="1000"/>
+              <a:defRPr sz="900"/>
             </a:lvl8pPr>
             <a:lvl9pPr marL="3657600" indent="0">
               <a:buNone/>
-              <a:defRPr sz="1000"/>
+              <a:defRPr sz="900"/>
             </a:lvl9pPr>
           </a:lstStyle>
           <a:p>
@@ -2384,13 +2390,7 @@
       </p:sp>
       <p:sp>
         <p:nvSpPr>
-          <p:cNvPr id="5" name="Date Placeholder 4">
-            <a:extLst>
-              <a:ext uri="{FF2B5EF4-FFF2-40B4-BE49-F238E27FC236}">
-                <a16:creationId xmlns:a16="http://schemas.microsoft.com/office/drawing/2014/main" id="{B27F8D81-D4E4-482D-9C3E-36A649A60C45}"/>
-              </a:ext>
-            </a:extLst>
-          </p:cNvPr>
+          <p:cNvPr id="5" name="Date Placeholder 4"/>
           <p:cNvSpPr>
             <a:spLocks noGrp="1"/>
           </p:cNvSpPr>
@@ -2413,13 +2413,7 @@
       </p:sp>
       <p:sp>
         <p:nvSpPr>
-          <p:cNvPr id="6" name="Footer Placeholder 5">
-            <a:extLst>
-              <a:ext uri="{FF2B5EF4-FFF2-40B4-BE49-F238E27FC236}">
-                <a16:creationId xmlns:a16="http://schemas.microsoft.com/office/drawing/2014/main" id="{776A4498-EA69-4348-B35A-E24C96CE51AB}"/>
-              </a:ext>
-            </a:extLst>
-          </p:cNvPr>
+          <p:cNvPr id="6" name="Footer Placeholder 5"/>
           <p:cNvSpPr>
             <a:spLocks noGrp="1"/>
           </p:cNvSpPr>
@@ -2438,13 +2432,7 @@
       </p:sp>
       <p:sp>
         <p:nvSpPr>
-          <p:cNvPr id="7" name="Slide Number Placeholder 6">
-            <a:extLst>
-              <a:ext uri="{FF2B5EF4-FFF2-40B4-BE49-F238E27FC236}">
-                <a16:creationId xmlns:a16="http://schemas.microsoft.com/office/drawing/2014/main" id="{E95068E8-FC0D-48D7-AE9B-F3477FB3B245}"/>
-              </a:ext>
-            </a:extLst>
-          </p:cNvPr>
+          <p:cNvPr id="7" name="Slide Number Placeholder 6"/>
           <p:cNvSpPr>
             <a:spLocks noGrp="1"/>
           </p:cNvSpPr>
@@ -2468,7 +2456,7 @@
     </p:spTree>
     <p:extLst>
       <p:ext uri="{BB962C8B-B14F-4D97-AF65-F5344CB8AC3E}">
-        <p14:creationId xmlns:p14="http://schemas.microsoft.com/office/powerpoint/2010/main" val="1055987639"/>
+        <p14:creationId xmlns:p14="http://schemas.microsoft.com/office/powerpoint/2010/main" val="3995914879"/>
       </p:ext>
     </p:extLst>
   </p:cSld>
@@ -2497,31 +2485,69 @@
       </p:grpSpPr>
       <p:sp>
         <p:nvSpPr>
-          <p:cNvPr id="2" name="Title 1">
-            <a:extLst>
-              <a:ext uri="{FF2B5EF4-FFF2-40B4-BE49-F238E27FC236}">
-                <a16:creationId xmlns:a16="http://schemas.microsoft.com/office/drawing/2014/main" id="{3A725C46-9471-45F1-8E26-8F8A3AADFD94}"/>
-              </a:ext>
-            </a:extLst>
-          </p:cNvPr>
-          <p:cNvSpPr>
-            <a:spLocks noGrp="1"/>
-          </p:cNvSpPr>
-          <p:nvPr>
-            <p:ph type="title"/>
-          </p:nvPr>
+          <p:cNvPr id="8" name="Rectangle 7"/>
+          <p:cNvSpPr/>
+          <p:nvPr/>
         </p:nvSpPr>
         <p:spPr>
           <a:xfrm>
-            <a:off x="839788" y="457200"/>
-            <a:ext cx="3932237" cy="1600200"/>
+            <a:off x="0" y="5105400"/>
+            <a:ext cx="11292840" cy="1752600"/>
+          </a:xfrm>
+          <a:prstGeom prst="rect">
+            <a:avLst/>
+          </a:prstGeom>
+          <a:solidFill>
+            <a:srgbClr val="000000"/>
+          </a:solidFill>
+          <a:ln>
+            <a:noFill/>
+          </a:ln>
+        </p:spPr>
+        <p:style>
+          <a:lnRef idx="2">
+            <a:schemeClr val="accent1">
+              <a:shade val="50000"/>
+            </a:schemeClr>
+          </a:lnRef>
+          <a:fillRef idx="1">
+            <a:schemeClr val="accent1"/>
+          </a:fillRef>
+          <a:effectRef idx="0">
+            <a:schemeClr val="accent1"/>
+          </a:effectRef>
+          <a:fontRef idx="minor">
+            <a:schemeClr val="lt1"/>
+          </a:fontRef>
+        </p:style>
+      </p:sp>
+      <p:sp>
+        <p:nvSpPr>
+          <p:cNvPr id="2" name="Title 1"/>
+          <p:cNvSpPr>
+            <a:spLocks noGrp="1"/>
+          </p:cNvSpPr>
+          <p:nvPr>
+            <p:ph type="title"/>
+          </p:nvPr>
+        </p:nvSpPr>
+        <p:spPr>
+          <a:xfrm>
+            <a:off x="914400" y="5257800"/>
+            <a:ext cx="9982200" cy="914400"/>
           </a:xfrm>
         </p:spPr>
         <p:txBody>
-          <a:bodyPr anchor="b"/>
+          <a:bodyPr anchor="b">
+            <a:normAutofit/>
+          </a:bodyPr>
           <a:lstStyle>
             <a:lvl1pPr>
-              <a:defRPr sz="3200"/>
+              <a:defRPr sz="2800" b="0">
+                <a:solidFill>
+                  <a:schemeClr val="bg1"/>
+                </a:solidFill>
+              </a:defRPr>
             </a:lvl1pPr>
           </a:lstStyle>
           <a:p>
@@ -2529,20 +2555,15 @@
               <a:rPr lang="en-US"/>
               <a:t>Click to edit Master title style</a:t>
             </a:r>
-          </a:p>
-        </p:txBody>
-      </p:sp>
-      <p:sp>
-        <p:nvSpPr>
-          <p:cNvPr id="3" name="Picture Placeholder 2">
-            <a:extLst>
-              <a:ext uri="{FF2B5EF4-FFF2-40B4-BE49-F238E27FC236}">
-                <a16:creationId xmlns:a16="http://schemas.microsoft.com/office/drawing/2014/main" id="{F1A362ED-3B95-45E3-98EA-9A583C4CE471}"/>
-              </a:ext>
-            </a:extLst>
-          </p:cNvPr>
-          <p:cNvSpPr>
-            <a:spLocks noGrp="1"/>
+            <a:endParaRPr lang="en-US" dirty="0"/>
+          </a:p>
+        </p:txBody>
+      </p:sp>
+      <p:sp>
+        <p:nvSpPr>
+          <p:cNvPr id="3" name="Picture Placeholder 2"/>
+          <p:cNvSpPr>
+            <a:spLocks noGrp="1" noChangeAspect="1"/>
           </p:cNvSpPr>
           <p:nvPr>
             <p:ph type="pic" idx="1"/>
@@ -2550,16 +2571,23 @@
         </p:nvSpPr>
         <p:spPr>
           <a:xfrm>
-            <a:off x="5183188" y="987425"/>
-            <a:ext cx="6172200" cy="4873625"/>
+            <a:off x="0" y="0"/>
+            <a:ext cx="11292840" cy="5128923"/>
           </a:xfrm>
+          <a:solidFill>
+            <a:schemeClr val="accent1"/>
+          </a:solidFill>
         </p:spPr>
         <p:txBody>
-          <a:bodyPr/>
+          <a:bodyPr anchor="t"/>
           <a:lstStyle>
             <a:lvl1pPr marL="0" indent="0">
               <a:buNone/>
-              <a:defRPr sz="3200"/>
+              <a:defRPr sz="3200">
+                <a:solidFill>
+                  <a:schemeClr val="bg1"/>
+                </a:solidFill>
+              </a:defRPr>
             </a:lvl1pPr>
             <a:lvl2pPr marL="457200" indent="0">
               <a:buNone/>
@@ -2595,19 +2623,17 @@
             </a:lvl9pPr>
           </a:lstStyle>
           <a:p>
-            <a:endParaRPr lang="en-US"/>
-          </a:p>
-        </p:txBody>
-      </p:sp>
-      <p:sp>
-        <p:nvSpPr>
-          <p:cNvPr id="4" name="Text Placeholder 3">
-            <a:extLst>
-              <a:ext uri="{FF2B5EF4-FFF2-40B4-BE49-F238E27FC236}">
-                <a16:creationId xmlns:a16="http://schemas.microsoft.com/office/drawing/2014/main" id="{1B3EA3E0-4E63-4987-BCAE-767162C986AD}"/>
-              </a:ext>
-            </a:extLst>
-          </p:cNvPr>
+            <a:r>
+              <a:rPr lang="en-US"/>
+              <a:t>Click icon to add picture</a:t>
+            </a:r>
+            <a:endParaRPr lang="en-US" dirty="0"/>
+          </a:p>
+        </p:txBody>
+      </p:sp>
+      <p:sp>
+        <p:nvSpPr>
+          <p:cNvPr id="4" name="Text Placeholder 3"/>
           <p:cNvSpPr>
             <a:spLocks noGrp="1"/>
           </p:cNvSpPr>
@@ -2617,48 +2643,62 @@
         </p:nvSpPr>
         <p:spPr>
           <a:xfrm>
-            <a:off x="839788" y="2057400"/>
-            <a:ext cx="3932237" cy="3811588"/>
+            <a:off x="914400" y="6108589"/>
+            <a:ext cx="9982200" cy="597011"/>
           </a:xfrm>
         </p:spPr>
         <p:txBody>
-          <a:bodyPr/>
+          <a:bodyPr>
+            <a:normAutofit/>
+          </a:bodyPr>
           <a:lstStyle>
             <a:lvl1pPr marL="0" indent="0">
-              <a:buNone/>
-              <a:defRPr sz="1600"/>
+              <a:lnSpc>
+                <a:spcPct val="100000"/>
+              </a:lnSpc>
+              <a:spcBef>
+                <a:spcPts val="800"/>
+              </a:spcBef>
+              <a:buNone/>
+              <a:defRPr sz="1300">
+                <a:solidFill>
+                  <a:schemeClr val="bg1">
+                    <a:lumMod val="85000"/>
+                  </a:schemeClr>
+                </a:solidFill>
+              </a:defRPr>
             </a:lvl1pPr>
             <a:lvl2pPr marL="457200" indent="0">
               <a:buNone/>
-              <a:defRPr sz="1400"/>
+              <a:defRPr sz="1200"/>
             </a:lvl2pPr>
             <a:lvl3pPr marL="914400" indent="0">
               <a:buNone/>
-              <a:defRPr sz="1200"/>
+              <a:defRPr sz="1000"/>
             </a:lvl3pPr>
             <a:lvl4pPr marL="1371600" indent="0">
               <a:buNone/>
-              <a:defRPr sz="1000"/>
+              <a:defRPr sz="900"/>
             </a:lvl4pPr>
             <a:lvl5pPr marL="1828800" indent="0">
               <a:buNone/>
-              <a:defRPr sz="1000"/>
+              <a:defRPr sz="900"/>
             </a:lvl5pPr>
             <a:lvl6pPr marL="2286000" indent="0">
               <a:buNone/>
-              <a:defRPr sz="1000"/>
+              <a:defRPr sz="900"/>
             </a:lvl6pPr>
             <a:lvl7pPr marL="2743200" indent="0">
               <a:buNone/>
-              <a:defRPr sz="1000"/>
+              <a:defRPr sz="900"/>
             </a:lvl7pPr>
             <a:lvl8pPr marL="3200400" indent="0">
               <a:buNone/>
-              <a:defRPr sz="1000"/>
+              <a:defRPr sz="900"/>
             </a:lvl8pPr>
             <a:lvl9pPr marL="3657600" indent="0">
               <a:buNone/>
-              <a:defRPr sz="1000"/>
+              <a:defRPr sz="900"/>
             </a:lvl9pPr>
           </a:lstStyle>
           <a:p>
@@ -2672,13 +2712,7 @@
       </p:sp>
       <p:sp>
         <p:nvSpPr>
-          <p:cNvPr id="5" name="Date Placeholder 4">
-            <a:extLst>
-              <a:ext uri="{FF2B5EF4-FFF2-40B4-BE49-F238E27FC236}">
-                <a16:creationId xmlns:a16="http://schemas.microsoft.com/office/drawing/2014/main" id="{84D6DC30-91FD-43D0-8289-7498EA7C9EB3}"/>
-              </a:ext>
-            </a:extLst>
-          </p:cNvPr>
+          <p:cNvPr id="5" name="Date Placeholder 4"/>
           <p:cNvSpPr>
             <a:spLocks noGrp="1"/>
           </p:cNvSpPr>
@@ -2701,13 +2735,7 @@
       </p:sp>
       <p:sp>
         <p:nvSpPr>
-          <p:cNvPr id="6" name="Footer Placeholder 5">
-            <a:extLst>
-              <a:ext uri="{FF2B5EF4-FFF2-40B4-BE49-F238E27FC236}">
-                <a16:creationId xmlns:a16="http://schemas.microsoft.com/office/drawing/2014/main" id="{06CAEFEF-9CBB-4E39-AC3C-0C140517DBAE}"/>
-              </a:ext>
-            </a:extLst>
-          </p:cNvPr>
+          <p:cNvPr id="6" name="Footer Placeholder 5"/>
           <p:cNvSpPr>
             <a:spLocks noGrp="1"/>
           </p:cNvSpPr>
@@ -2726,13 +2754,7 @@
       </p:sp>
       <p:sp>
         <p:nvSpPr>
-          <p:cNvPr id="7" name="Slide Number Placeholder 6">
-            <a:extLst>
-              <a:ext uri="{FF2B5EF4-FFF2-40B4-BE49-F238E27FC236}">
-                <a16:creationId xmlns:a16="http://schemas.microsoft.com/office/drawing/2014/main" id="{D915D3D6-9F3F-4A66-AB3A-4F56F85B3A29}"/>
-              </a:ext>
-            </a:extLst>
-          </p:cNvPr>
+          <p:cNvPr id="7" name="Slide Number Placeholder 6"/>
           <p:cNvSpPr>
             <a:spLocks noGrp="1"/>
           </p:cNvSpPr>
@@ -2756,7 +2778,7 @@
     </p:spTree>
     <p:extLst>
       <p:ext uri="{BB962C8B-B14F-4D97-AF65-F5344CB8AC3E}">
-        <p14:creationId xmlns:p14="http://schemas.microsoft.com/office/powerpoint/2010/main" val="2525935981"/>
+        <p14:creationId xmlns:p14="http://schemas.microsoft.com/office/powerpoint/2010/main" val="3082078769"/>
       </p:ext>
     </p:extLst>
   </p:cSld>
@@ -2790,31 +2812,65 @@
       </p:grpSpPr>
       <p:sp>
         <p:nvSpPr>
-          <p:cNvPr id="2" name="Title Placeholder 1">
-            <a:extLst>
-              <a:ext uri="{FF2B5EF4-FFF2-40B4-BE49-F238E27FC236}">
-                <a16:creationId xmlns:a16="http://schemas.microsoft.com/office/drawing/2014/main" id="{1BE689E8-A502-4595-831B-DCD7860517A4}"/>
-              </a:ext>
-            </a:extLst>
-          </p:cNvPr>
-          <p:cNvSpPr>
-            <a:spLocks noGrp="1"/>
-          </p:cNvSpPr>
-          <p:nvPr>
-            <p:ph type="title"/>
-          </p:nvPr>
+          <p:cNvPr id="7" name="Rectangle 6"/>
+          <p:cNvSpPr/>
+          <p:nvPr/>
         </p:nvSpPr>
         <p:spPr>
           <a:xfrm>
-            <a:off x="838200" y="365125"/>
-            <a:ext cx="10515600" cy="1325563"/>
+            <a:off x="11292840" y="0"/>
+            <a:ext cx="914400" cy="6858000"/>
+          </a:xfrm>
+          <a:prstGeom prst="rect">
+            <a:avLst/>
+          </a:prstGeom>
+          <a:solidFill>
+            <a:schemeClr val="tx2">
+              <a:lumMod val="75000"/>
+            </a:schemeClr>
+          </a:solidFill>
+          <a:ln>
+            <a:noFill/>
+          </a:ln>
+        </p:spPr>
+        <p:style>
+          <a:lnRef idx="2">
+            <a:schemeClr val="accent1">
+              <a:shade val="50000"/>
+            </a:schemeClr>
+          </a:lnRef>
+          <a:fillRef idx="1">
+            <a:schemeClr val="accent1"/>
+          </a:fillRef>
+          <a:effectRef idx="0">
+            <a:schemeClr val="accent1"/>
+          </a:effectRef>
+          <a:fontRef idx="minor">
+            <a:schemeClr val="lt1"/>
+          </a:fontRef>
+        </p:style>
+      </p:sp>
+      <p:sp>
+        <p:nvSpPr>
+          <p:cNvPr id="2" name="Title Placeholder 1"/>
+          <p:cNvSpPr>
+            <a:spLocks noGrp="1"/>
+          </p:cNvSpPr>
+          <p:nvPr>
+            <p:ph type="title"/>
+          </p:nvPr>
+        </p:nvSpPr>
+        <p:spPr>
+          <a:xfrm>
+            <a:off x="1261872" y="365760"/>
+            <a:ext cx="9692640" cy="1325562"/>
           </a:xfrm>
           <a:prstGeom prst="rect">
             <a:avLst/>
           </a:prstGeom>
         </p:spPr>
         <p:txBody>
-          <a:bodyPr vert="horz" lIns="91440" tIns="45720" rIns="91440" bIns="45720" rtlCol="0" anchor="ctr">
+          <a:bodyPr vert="horz" lIns="91440" tIns="45720" rIns="91440" bIns="45720" rtlCol="0" anchor="b">
             <a:normAutofit/>
           </a:bodyPr>
           <a:lstStyle/>
@@ -2823,18 +2879,13 @@
               <a:rPr lang="en-US"/>
               <a:t>Click to edit Master title style</a:t>
             </a:r>
-          </a:p>
-        </p:txBody>
-      </p:sp>
-      <p:sp>
-        <p:nvSpPr>
-          <p:cNvPr id="3" name="Text Placeholder 2">
-            <a:extLst>
-              <a:ext uri="{FF2B5EF4-FFF2-40B4-BE49-F238E27FC236}">
-                <a16:creationId xmlns:a16="http://schemas.microsoft.com/office/drawing/2014/main" id="{C11C6552-D8AA-4296-819E-A2EE79F61A09}"/>
-              </a:ext>
-            </a:extLst>
-          </p:cNvPr>
+            <a:endParaRPr lang="en-US" dirty="0"/>
+          </a:p>
+        </p:txBody>
+      </p:sp>
+      <p:sp>
+        <p:nvSpPr>
+          <p:cNvPr id="3" name="Text Placeholder 2"/>
           <p:cNvSpPr>
             <a:spLocks noGrp="1"/>
           </p:cNvSpPr>
@@ -2844,8 +2895,8 @@
         </p:nvSpPr>
         <p:spPr>
           <a:xfrm>
-            <a:off x="838200" y="1825625"/>
-            <a:ext cx="10515600" cy="4351338"/>
+            <a:off x="1261872" y="1828800"/>
+            <a:ext cx="8595360" cy="4351337"/>
           </a:xfrm>
           <a:prstGeom prst="rect">
             <a:avLst/>
@@ -2890,18 +2941,13 @@
               <a:rPr lang="en-US"/>
               <a:t>Fifth level</a:t>
             </a:r>
-          </a:p>
-        </p:txBody>
-      </p:sp>
-      <p:sp>
-        <p:nvSpPr>
-          <p:cNvPr id="4" name="Date Placeholder 3">
-            <a:extLst>
-              <a:ext uri="{FF2B5EF4-FFF2-40B4-BE49-F238E27FC236}">
-                <a16:creationId xmlns:a16="http://schemas.microsoft.com/office/drawing/2014/main" id="{ADAE398E-9A37-4F49-9A4E-59289B070BA6}"/>
-              </a:ext>
-            </a:extLst>
-          </p:cNvPr>
+            <a:endParaRPr lang="en-US" dirty="0"/>
+          </a:p>
+        </p:txBody>
+      </p:sp>
+      <p:sp>
+        <p:nvSpPr>
+          <p:cNvPr id="4" name="Date Placeholder 3"/>
           <p:cNvSpPr>
             <a:spLocks noGrp="1"/>
           </p:cNvSpPr>
@@ -2910,9 +2956,9 @@
           </p:nvPr>
         </p:nvSpPr>
         <p:spPr>
-          <a:xfrm>
-            <a:off x="838200" y="6356350"/>
-            <a:ext cx="2743200" cy="365125"/>
+          <a:xfrm rot="16200000">
+            <a:off x="10797542" y="998537"/>
+            <a:ext cx="1904999" cy="365125"/>
           </a:xfrm>
           <a:prstGeom prst="rect">
             <a:avLst/>
@@ -2921,11 +2967,12 @@
         <p:txBody>
           <a:bodyPr vert="horz" lIns="91440" tIns="45720" rIns="91440" bIns="45720" rtlCol="0" anchor="ctr"/>
           <a:lstStyle>
-            <a:lvl1pPr algn="l">
-              <a:defRPr sz="1200">
+            <a:lvl1pPr algn="r">
+              <a:defRPr sz="1050" b="0">
                 <a:solidFill>
-                  <a:schemeClr val="tx1">
-                    <a:tint val="75000"/>
+                  <a:schemeClr val="tx2">
+                    <a:lumMod val="20000"/>
+                    <a:lumOff val="80000"/>
                   </a:schemeClr>
                 </a:solidFill>
               </a:defRPr>
@@ -2942,13 +2989,7 @@
       </p:sp>
       <p:sp>
         <p:nvSpPr>
-          <p:cNvPr id="5" name="Footer Placeholder 4">
-            <a:extLst>
-              <a:ext uri="{FF2B5EF4-FFF2-40B4-BE49-F238E27FC236}">
-                <a16:creationId xmlns:a16="http://schemas.microsoft.com/office/drawing/2014/main" id="{98E23B65-96DF-401C-8177-88F4A247D97D}"/>
-              </a:ext>
-            </a:extLst>
-          </p:cNvPr>
+          <p:cNvPr id="5" name="Footer Placeholder 4"/>
           <p:cNvSpPr>
             <a:spLocks noGrp="1"/>
           </p:cNvSpPr>
@@ -2957,9 +2998,9 @@
           </p:nvPr>
         </p:nvSpPr>
         <p:spPr>
-          <a:xfrm>
-            <a:off x="4038600" y="6356350"/>
-            <a:ext cx="4114800" cy="365125"/>
+          <a:xfrm rot="16200000">
+            <a:off x="9959341" y="4046537"/>
+            <a:ext cx="3581400" cy="365125"/>
           </a:xfrm>
           <a:prstGeom prst="rect">
             <a:avLst/>
@@ -2968,11 +3009,12 @@
         <p:txBody>
           <a:bodyPr vert="horz" lIns="91440" tIns="45720" rIns="91440" bIns="45720" rtlCol="0" anchor="ctr"/>
           <a:lstStyle>
-            <a:lvl1pPr algn="ctr">
-              <a:defRPr sz="1200">
+            <a:lvl1pPr algn="l">
+              <a:defRPr sz="1050">
                 <a:solidFill>
-                  <a:schemeClr val="tx1">
-                    <a:tint val="75000"/>
+                  <a:schemeClr val="tx2">
+                    <a:lumMod val="20000"/>
+                    <a:lumOff val="80000"/>
                   </a:schemeClr>
                 </a:solidFill>
               </a:defRPr>
@@ -2985,13 +3027,7 @@
       </p:sp>
       <p:sp>
         <p:nvSpPr>
-          <p:cNvPr id="6" name="Slide Number Placeholder 5">
-            <a:extLst>
-              <a:ext uri="{FF2B5EF4-FFF2-40B4-BE49-F238E27FC236}">
-                <a16:creationId xmlns:a16="http://schemas.microsoft.com/office/drawing/2014/main" id="{6D87F454-D21D-47AA-9135-11E6EF2D8E3E}"/>
-              </a:ext>
-            </a:extLst>
-          </p:cNvPr>
+          <p:cNvPr id="6" name="Slide Number Placeholder 5"/>
           <p:cNvSpPr>
             <a:spLocks noGrp="1"/>
           </p:cNvSpPr>
@@ -3001,21 +3037,24 @@
         </p:nvSpPr>
         <p:spPr>
           <a:xfrm>
-            <a:off x="8610600" y="6356350"/>
-            <a:ext cx="2743200" cy="365125"/>
+            <a:off x="11292840" y="6172200"/>
+            <a:ext cx="914400" cy="593725"/>
           </a:xfrm>
           <a:prstGeom prst="rect">
             <a:avLst/>
           </a:prstGeom>
         </p:spPr>
         <p:txBody>
-          <a:bodyPr vert="horz" lIns="91440" tIns="45720" rIns="91440" bIns="45720" rtlCol="0" anchor="ctr"/>
+          <a:bodyPr vert="horz" lIns="45720" tIns="45720" rIns="45720" bIns="45720" rtlCol="0" anchor="ctr">
+            <a:normAutofit/>
+          </a:bodyPr>
           <a:lstStyle>
-            <a:lvl1pPr algn="r">
-              <a:defRPr sz="1200">
+            <a:lvl1pPr algn="ctr">
+              <a:defRPr sz="3600">
                 <a:solidFill>
-                  <a:schemeClr val="tx1">
-                    <a:tint val="75000"/>
+                  <a:schemeClr val="tx2">
+                    <a:lumMod val="60000"/>
+                    <a:lumOff val="40000"/>
                   </a:schemeClr>
                 </a:solidFill>
               </a:defRPr>
@@ -3033,23 +3072,23 @@
     </p:spTree>
     <p:extLst>
       <p:ext uri="{BB962C8B-B14F-4D97-AF65-F5344CB8AC3E}">
-        <p14:creationId xmlns:p14="http://schemas.microsoft.com/office/powerpoint/2010/main" val="4293483283"/>
+        <p14:creationId xmlns:p14="http://schemas.microsoft.com/office/powerpoint/2010/main" val="1865713845"/>
       </p:ext>
     </p:extLst>
   </p:cSld>
   <p:clrMap bg1="lt1" tx1="dk1" bg2="lt2" tx2="dk2" accent1="accent1" accent2="accent2" accent3="accent3" accent4="accent4" accent5="accent5" accent6="accent6" hlink="hlink" folHlink="folHlink"/>
   <p:sldLayoutIdLst>
-    <p:sldLayoutId id="2147483649" r:id="rId1"/>
-    <p:sldLayoutId id="2147483650" r:id="rId2"/>
-    <p:sldLayoutId id="2147483651" r:id="rId3"/>
-    <p:sldLayoutId id="2147483652" r:id="rId4"/>
-    <p:sldLayoutId id="2147483653" r:id="rId5"/>
-    <p:sldLayoutId id="2147483654" r:id="rId6"/>
-    <p:sldLayoutId id="2147483655" r:id="rId7"/>
-    <p:sldLayoutId id="2147483656" r:id="rId8"/>
-    <p:sldLayoutId id="2147483657" r:id="rId9"/>
-    <p:sldLayoutId id="2147483658" r:id="rId10"/>
-    <p:sldLayoutId id="2147483659" r:id="rId11"/>
+    <p:sldLayoutId id="2147483732" r:id="rId1"/>
+    <p:sldLayoutId id="2147483733" r:id="rId2"/>
+    <p:sldLayoutId id="2147483734" r:id="rId3"/>
+    <p:sldLayoutId id="2147483735" r:id="rId4"/>
+    <p:sldLayoutId id="2147483736" r:id="rId5"/>
+    <p:sldLayoutId id="2147483737" r:id="rId6"/>
+    <p:sldLayoutId id="2147483738" r:id="rId7"/>
+    <p:sldLayoutId id="2147483739" r:id="rId8"/>
+    <p:sldLayoutId id="2147483740" r:id="rId9"/>
+    <p:sldLayoutId id="2147483741" r:id="rId10"/>
+    <p:sldLayoutId id="2147483742" r:id="rId11"/>
   </p:sldLayoutIdLst>
   <p:txStyles>
     <p:titleStyle>
@@ -3061,7 +3100,7 @@
           <a:spcPct val="0"/>
         </a:spcBef>
         <a:buNone/>
-        <a:defRPr sz="4400" kern="1200">
+        <a:defRPr sz="4400" kern="1200" spc="-50" baseline="0">
           <a:solidFill>
             <a:schemeClr val="tx1"/>
           </a:solidFill>
@@ -3072,16 +3111,23 @@
       </a:lvl1pPr>
     </p:titleStyle>
     <p:bodyStyle>
-      <a:lvl1pPr marL="228600" indent="-228600" algn="l" defTabSz="914400" rtl="0" eaLnBrk="1" latinLnBrk="0" hangingPunct="1">
+      <a:lvl1pPr marL="182880" indent="-182880" algn="l" defTabSz="914400" rtl="0" eaLnBrk="1" latinLnBrk="0" hangingPunct="1">
         <a:lnSpc>
-          <a:spcPct val="90000"/>
+          <a:spcPct val="95000"/>
         </a:lnSpc>
         <a:spcBef>
-          <a:spcPts val="1000"/>
+          <a:spcPts val="1400"/>
         </a:spcBef>
-        <a:buFont typeface="Arial" panose="020B0604020202020204" pitchFamily="34" charset="0"/>
+        <a:spcAft>
+          <a:spcPts val="200"/>
+        </a:spcAft>
+        <a:buClr>
+          <a:schemeClr val="accent1"/>
+        </a:buClr>
+        <a:buSzPct val="80000"/>
+        <a:buFont typeface="Arial" pitchFamily="34" charset="0"/>
         <a:buChar char="•"/>
-        <a:defRPr sz="2800" kern="1200">
+        <a:defRPr sz="1800" kern="1200" spc="10" baseline="0">
           <a:solidFill>
             <a:schemeClr val="tx1"/>
           </a:solidFill>
@@ -3090,144 +3136,216 @@
           <a:cs typeface="+mn-cs"/>
         </a:defRPr>
       </a:lvl1pPr>
-      <a:lvl2pPr marL="685800" indent="-228600" algn="l" defTabSz="914400" rtl="0" eaLnBrk="1" latinLnBrk="0" hangingPunct="1">
+      <a:lvl2pPr marL="457200" indent="-182880" algn="l" defTabSz="914400" rtl="0" eaLnBrk="1" latinLnBrk="0" hangingPunct="1">
         <a:lnSpc>
           <a:spcPct val="90000"/>
         </a:lnSpc>
         <a:spcBef>
-          <a:spcPts val="500"/>
+          <a:spcPts val="300"/>
         </a:spcBef>
-        <a:buFont typeface="Arial" panose="020B0604020202020204" pitchFamily="34" charset="0"/>
-        <a:buChar char="•"/>
-        <a:defRPr sz="2400" kern="1200">
+        <a:spcAft>
+          <a:spcPts val="300"/>
+        </a:spcAft>
+        <a:buClr>
+          <a:schemeClr val="accent1"/>
+        </a:buClr>
+        <a:buFont typeface="Wingdings 2" pitchFamily="18" charset="2"/>
+        <a:buChar char=""/>
+        <a:defRPr sz="1600" kern="1200">
           <a:solidFill>
-            <a:schemeClr val="tx1"/>
+            <a:schemeClr val="tx1">
+              <a:lumMod val="85000"/>
+              <a:lumOff val="15000"/>
+            </a:schemeClr>
           </a:solidFill>
           <a:latin typeface="+mn-lt"/>
           <a:ea typeface="+mn-ea"/>
           <a:cs typeface="+mn-cs"/>
         </a:defRPr>
       </a:lvl2pPr>
-      <a:lvl3pPr marL="1143000" indent="-228600" algn="l" defTabSz="914400" rtl="0" eaLnBrk="1" latinLnBrk="0" hangingPunct="1">
+      <a:lvl3pPr marL="731520" indent="-182880" algn="l" defTabSz="914400" rtl="0" eaLnBrk="1" latinLnBrk="0" hangingPunct="1">
         <a:lnSpc>
           <a:spcPct val="90000"/>
         </a:lnSpc>
         <a:spcBef>
-          <a:spcPts val="500"/>
+          <a:spcPts val="300"/>
         </a:spcBef>
-        <a:buFont typeface="Arial" panose="020B0604020202020204" pitchFamily="34" charset="0"/>
-        <a:buChar char="•"/>
-        <a:defRPr sz="2000" kern="1200">
+        <a:spcAft>
+          <a:spcPts val="300"/>
+        </a:spcAft>
+        <a:buClr>
+          <a:schemeClr val="accent1"/>
+        </a:buClr>
+        <a:buFont typeface="Wingdings 2" pitchFamily="18" charset="2"/>
+        <a:buChar char=""/>
+        <a:defRPr sz="1400" kern="1200">
           <a:solidFill>
-            <a:schemeClr val="tx1"/>
+            <a:schemeClr val="tx1">
+              <a:lumMod val="85000"/>
+              <a:lumOff val="15000"/>
+            </a:schemeClr>
           </a:solidFill>
           <a:latin typeface="+mn-lt"/>
           <a:ea typeface="+mn-ea"/>
           <a:cs typeface="+mn-cs"/>
         </a:defRPr>
       </a:lvl3pPr>
-      <a:lvl4pPr marL="1600200" indent="-228600" algn="l" defTabSz="914400" rtl="0" eaLnBrk="1" latinLnBrk="0" hangingPunct="1">
+      <a:lvl4pPr marL="1005840" indent="-182880" algn="l" defTabSz="914400" rtl="0" eaLnBrk="1" latinLnBrk="0" hangingPunct="1">
         <a:lnSpc>
           <a:spcPct val="90000"/>
         </a:lnSpc>
         <a:spcBef>
-          <a:spcPts val="500"/>
+          <a:spcPts val="300"/>
         </a:spcBef>
-        <a:buFont typeface="Arial" panose="020B0604020202020204" pitchFamily="34" charset="0"/>
-        <a:buChar char="•"/>
-        <a:defRPr sz="1800" kern="1200">
+        <a:spcAft>
+          <a:spcPts val="300"/>
+        </a:spcAft>
+        <a:buClr>
+          <a:schemeClr val="accent1"/>
+        </a:buClr>
+        <a:buFont typeface="Wingdings 2" pitchFamily="18" charset="2"/>
+        <a:buChar char=""/>
+        <a:defRPr sz="1400" kern="1200">
           <a:solidFill>
-            <a:schemeClr val="tx1"/>
+            <a:schemeClr val="tx1">
+              <a:lumMod val="85000"/>
+              <a:lumOff val="15000"/>
+            </a:schemeClr>
           </a:solidFill>
           <a:latin typeface="+mn-lt"/>
           <a:ea typeface="+mn-ea"/>
           <a:cs typeface="+mn-cs"/>
         </a:defRPr>
       </a:lvl4pPr>
-      <a:lvl5pPr marL="2057400" indent="-228600" algn="l" defTabSz="914400" rtl="0" eaLnBrk="1" latinLnBrk="0" hangingPunct="1">
+      <a:lvl5pPr marL="1280160" indent="-182880" algn="l" defTabSz="914400" rtl="0" eaLnBrk="1" latinLnBrk="0" hangingPunct="1">
         <a:lnSpc>
           <a:spcPct val="90000"/>
         </a:lnSpc>
         <a:spcBef>
-          <a:spcPts val="500"/>
+          <a:spcPts val="300"/>
         </a:spcBef>
-        <a:buFont typeface="Arial" panose="020B0604020202020204" pitchFamily="34" charset="0"/>
-        <a:buChar char="•"/>
-        <a:defRPr sz="1800" kern="1200">
+        <a:spcAft>
+          <a:spcPts val="300"/>
+        </a:spcAft>
+        <a:buClr>
+          <a:schemeClr val="accent1"/>
+        </a:buClr>
+        <a:buFont typeface="Wingdings 2" pitchFamily="18" charset="2"/>
+        <a:buChar char=""/>
+        <a:defRPr sz="1400" kern="1200">
           <a:solidFill>
-            <a:schemeClr val="tx1"/>
+            <a:schemeClr val="tx1">
+              <a:lumMod val="85000"/>
+              <a:lumOff val="15000"/>
+            </a:schemeClr>
           </a:solidFill>
           <a:latin typeface="+mn-lt"/>
           <a:ea typeface="+mn-ea"/>
           <a:cs typeface="+mn-cs"/>
         </a:defRPr>
       </a:lvl5pPr>
-      <a:lvl6pPr marL="2514600" indent="-228600" algn="l" defTabSz="914400" rtl="0" eaLnBrk="1" latinLnBrk="0" hangingPunct="1">
+      <a:lvl6pPr marL="1600000" indent="-228600" algn="l" defTabSz="914400" rtl="0" eaLnBrk="1" latinLnBrk="0" hangingPunct="1">
         <a:lnSpc>
           <a:spcPct val="90000"/>
         </a:lnSpc>
         <a:spcBef>
-          <a:spcPts val="500"/>
+          <a:spcPts val="300"/>
         </a:spcBef>
-        <a:buFont typeface="Arial" panose="020B0604020202020204" pitchFamily="34" charset="0"/>
-        <a:buChar char="•"/>
-        <a:defRPr sz="1800" kern="1200">
+        <a:spcAft>
+          <a:spcPts val="300"/>
+        </a:spcAft>
+        <a:buClr>
+          <a:schemeClr val="accent1"/>
+        </a:buClr>
+        <a:buFont typeface="Wingdings 2" pitchFamily="18" charset="2"/>
+        <a:buChar char=""/>
+        <a:defRPr sz="1400" kern="1200">
           <a:solidFill>
-            <a:schemeClr val="tx1"/>
+            <a:schemeClr val="tx1">
+              <a:lumMod val="85000"/>
+              <a:lumOff val="15000"/>
+            </a:schemeClr>
           </a:solidFill>
           <a:latin typeface="+mn-lt"/>
           <a:ea typeface="+mn-ea"/>
           <a:cs typeface="+mn-cs"/>
         </a:defRPr>
       </a:lvl6pPr>
-      <a:lvl7pPr marL="2971800" indent="-228600" algn="l" defTabSz="914400" rtl="0" eaLnBrk="1" latinLnBrk="0" hangingPunct="1">
+      <a:lvl7pPr marL="1900000" indent="-228600" algn="l" defTabSz="914400" rtl="0" eaLnBrk="1" latinLnBrk="0" hangingPunct="1">
         <a:lnSpc>
           <a:spcPct val="90000"/>
         </a:lnSpc>
         <a:spcBef>
-          <a:spcPts val="500"/>
+          <a:spcPts val="300"/>
         </a:spcBef>
-        <a:buFont typeface="Arial" panose="020B0604020202020204" pitchFamily="34" charset="0"/>
-        <a:buChar char="•"/>
-        <a:defRPr sz="1800" kern="1200">
+        <a:spcAft>
+          <a:spcPts val="300"/>
+        </a:spcAft>
+        <a:buClr>
+          <a:schemeClr val="accent1"/>
+        </a:buClr>
+        <a:buFont typeface="Wingdings 2" pitchFamily="18" charset="2"/>
+        <a:buChar char=""/>
+        <a:defRPr sz="1400" kern="1200">
           <a:solidFill>
-            <a:schemeClr val="tx1"/>
+            <a:schemeClr val="tx1">
+              <a:lumMod val="85000"/>
+              <a:lumOff val="15000"/>
+            </a:schemeClr>
           </a:solidFill>
           <a:latin typeface="+mn-lt"/>
           <a:ea typeface="+mn-ea"/>
           <a:cs typeface="+mn-cs"/>
         </a:defRPr>
       </a:lvl7pPr>
-      <a:lvl8pPr marL="3429000" indent="-228600" algn="l" defTabSz="914400" rtl="0" eaLnBrk="1" latinLnBrk="0" hangingPunct="1">
+      <a:lvl8pPr marL="2200000" indent="-228600" algn="l" defTabSz="914400" rtl="0" eaLnBrk="1" latinLnBrk="0" hangingPunct="1">
         <a:lnSpc>
           <a:spcPct val="90000"/>
         </a:lnSpc>
         <a:spcBef>
-          <a:spcPts val="500"/>
+          <a:spcPts val="300"/>
         </a:spcBef>
-        <a:buFont typeface="Arial" panose="020B0604020202020204" pitchFamily="34" charset="0"/>
-        <a:buChar char="•"/>
-        <a:defRPr sz="1800" kern="1200">
+        <a:spcAft>
+          <a:spcPts val="300"/>
+        </a:spcAft>
+        <a:buClr>
+          <a:schemeClr val="accent1"/>
+        </a:buClr>
+        <a:buFont typeface="Wingdings 2" pitchFamily="18" charset="2"/>
+        <a:buChar char=""/>
+        <a:defRPr sz="1400" kern="1200">
           <a:solidFill>
-            <a:schemeClr val="tx1"/>
+            <a:schemeClr val="tx1">
+              <a:lumMod val="85000"/>
+              <a:lumOff val="15000"/>
+            </a:schemeClr>
           </a:solidFill>
           <a:latin typeface="+mn-lt"/>
           <a:ea typeface="+mn-ea"/>
           <a:cs typeface="+mn-cs"/>
         </a:defRPr>
       </a:lvl8pPr>
-      <a:lvl9pPr marL="3886200" indent="-228600" algn="l" defTabSz="914400" rtl="0" eaLnBrk="1" latinLnBrk="0" hangingPunct="1">
+      <a:lvl9pPr marL="2500000" indent="-228600" algn="l" defTabSz="914400" rtl="0" eaLnBrk="1" latinLnBrk="0" hangingPunct="1">
         <a:lnSpc>
           <a:spcPct val="90000"/>
         </a:lnSpc>
         <a:spcBef>
-          <a:spcPts val="500"/>
+          <a:spcPts val="300"/>
         </a:spcBef>
-        <a:buFont typeface="Arial" panose="020B0604020202020204" pitchFamily="34" charset="0"/>
-        <a:buChar char="•"/>
-        <a:defRPr sz="1800" kern="1200">
+        <a:spcAft>
+          <a:spcPts val="300"/>
+        </a:spcAft>
+        <a:buClr>
+          <a:schemeClr val="accent1"/>
+        </a:buClr>
+        <a:buFont typeface="Wingdings 2" pitchFamily="18" charset="2"/>
+        <a:buChar char=""/>
+        <a:defRPr sz="1400" kern="1200">
           <a:solidFill>
-            <a:schemeClr val="tx1"/>
+            <a:schemeClr val="tx1">
+              <a:lumMod val="85000"/>
+              <a:lumOff val="15000"/>
+            </a:schemeClr>
           </a:solidFill>
           <a:latin typeface="+mn-lt"/>
           <a:ea typeface="+mn-ea"/>
@@ -3402,7 +3520,15 @@
           <a:p>
             <a:r>
               <a:rPr lang="en-US" dirty="0"/>
-              <a:t>Requirements</a:t>
+              <a:t>Adam Gabriel, Max Livingston, Travis Redfield, </a:t>
+            </a:r>
+            <a:r>
+              <a:rPr lang="en-US" dirty="0" err="1"/>
+              <a:t>Maclane</a:t>
+            </a:r>
+            <a:r>
+              <a:rPr lang="en-US" dirty="0"/>
+              <a:t> May, Taylor Meads</a:t>
             </a:r>
           </a:p>
         </p:txBody>
@@ -3442,7 +3568,7 @@
           <p:cNvPr id="2" name="Title 1">
             <a:extLst>
               <a:ext uri="{FF2B5EF4-FFF2-40B4-BE49-F238E27FC236}">
-                <a16:creationId xmlns:a16="http://schemas.microsoft.com/office/drawing/2014/main" id="{EC30254C-B3A4-448B-8ED8-220C2E4C25EA}"/>
+                <a16:creationId xmlns:a16="http://schemas.microsoft.com/office/drawing/2014/main" id="{11F20C4C-79EA-43FD-8726-E67F6A0DA629}"/>
               </a:ext>
             </a:extLst>
           </p:cNvPr>
@@ -3460,7 +3586,7 @@
           <a:p>
             <a:r>
               <a:rPr lang="en-US" dirty="0"/>
-              <a:t>Use Case Diagrams</a:t>
+              <a:t>Activity Diagrams</a:t>
             </a:r>
           </a:p>
         </p:txBody>
@@ -3470,7 +3596,7 @@
           <p:cNvPr id="3" name="Content Placeholder 2">
             <a:extLst>
               <a:ext uri="{FF2B5EF4-FFF2-40B4-BE49-F238E27FC236}">
-                <a16:creationId xmlns:a16="http://schemas.microsoft.com/office/drawing/2014/main" id="{7924D04B-6606-408C-AFFF-47EB1334DCAF}"/>
+                <a16:creationId xmlns:a16="http://schemas.microsoft.com/office/drawing/2014/main" id="{02BC77D9-AF60-4053-9332-7364D8E80411}"/>
               </a:ext>
             </a:extLst>
           </p:cNvPr>
@@ -3493,7 +3619,7 @@
     </p:spTree>
     <p:extLst>
       <p:ext uri="{BB962C8B-B14F-4D97-AF65-F5344CB8AC3E}">
-        <p14:creationId xmlns:p14="http://schemas.microsoft.com/office/powerpoint/2010/main" val="2934480908"/>
+        <p14:creationId xmlns:p14="http://schemas.microsoft.com/office/powerpoint/2010/main" val="1570395640"/>
       </p:ext>
     </p:extLst>
   </p:cSld>
@@ -3525,7 +3651,7 @@
           <p:cNvPr id="2" name="Title 1">
             <a:extLst>
               <a:ext uri="{FF2B5EF4-FFF2-40B4-BE49-F238E27FC236}">
-                <a16:creationId xmlns:a16="http://schemas.microsoft.com/office/drawing/2014/main" id="{11F20C4C-79EA-43FD-8726-E67F6A0DA629}"/>
+                <a16:creationId xmlns:a16="http://schemas.microsoft.com/office/drawing/2014/main" id="{E02B442C-A78C-4B94-B8D0-641237F750F0}"/>
               </a:ext>
             </a:extLst>
           </p:cNvPr>
@@ -3543,7 +3669,7 @@
           <a:p>
             <a:r>
               <a:rPr lang="en-US" dirty="0"/>
-              <a:t>Activity Diagrams</a:t>
+              <a:t>Database Diagram</a:t>
             </a:r>
           </a:p>
         </p:txBody>
@@ -3553,7 +3679,7 @@
           <p:cNvPr id="3" name="Content Placeholder 2">
             <a:extLst>
               <a:ext uri="{FF2B5EF4-FFF2-40B4-BE49-F238E27FC236}">
-                <a16:creationId xmlns:a16="http://schemas.microsoft.com/office/drawing/2014/main" id="{02BC77D9-AF60-4053-9332-7364D8E80411}"/>
+                <a16:creationId xmlns:a16="http://schemas.microsoft.com/office/drawing/2014/main" id="{A189EF5C-3D0B-451F-BE20-83C111832D96}"/>
               </a:ext>
             </a:extLst>
           </p:cNvPr>
@@ -3576,7 +3702,7 @@
     </p:spTree>
     <p:extLst>
       <p:ext uri="{BB962C8B-B14F-4D97-AF65-F5344CB8AC3E}">
-        <p14:creationId xmlns:p14="http://schemas.microsoft.com/office/powerpoint/2010/main" val="1570395640"/>
+        <p14:creationId xmlns:p14="http://schemas.microsoft.com/office/powerpoint/2010/main" val="2993713172"/>
       </p:ext>
     </p:extLst>
   </p:cSld>
@@ -3608,7 +3734,7 @@
           <p:cNvPr id="2" name="Title 1">
             <a:extLst>
               <a:ext uri="{FF2B5EF4-FFF2-40B4-BE49-F238E27FC236}">
-                <a16:creationId xmlns:a16="http://schemas.microsoft.com/office/drawing/2014/main" id="{4237517C-4A4B-41D9-B5CA-BA658B9C1A97}"/>
+                <a16:creationId xmlns:a16="http://schemas.microsoft.com/office/drawing/2014/main" id="{C96486E1-9669-4FD4-A6A4-9A741B10518C}"/>
               </a:ext>
             </a:extLst>
           </p:cNvPr>
@@ -3626,7 +3752,7 @@
           <a:p>
             <a:r>
               <a:rPr lang="en-US" dirty="0"/>
-              <a:t>Screenshots (Maybe)</a:t>
+              <a:t>System Evolution</a:t>
             </a:r>
           </a:p>
         </p:txBody>
@@ -3636,7 +3762,7 @@
           <p:cNvPr id="3" name="Content Placeholder 2">
             <a:extLst>
               <a:ext uri="{FF2B5EF4-FFF2-40B4-BE49-F238E27FC236}">
-                <a16:creationId xmlns:a16="http://schemas.microsoft.com/office/drawing/2014/main" id="{6B50D116-1BB8-4E81-B972-7BAE977DAE55}"/>
+                <a16:creationId xmlns:a16="http://schemas.microsoft.com/office/drawing/2014/main" id="{CFB07D61-2B5F-4F1D-B4BE-A803360792B3}"/>
               </a:ext>
             </a:extLst>
           </p:cNvPr>
@@ -3659,7 +3785,7 @@
     </p:spTree>
     <p:extLst>
       <p:ext uri="{BB962C8B-B14F-4D97-AF65-F5344CB8AC3E}">
-        <p14:creationId xmlns:p14="http://schemas.microsoft.com/office/powerpoint/2010/main" val="1393235951"/>
+        <p14:creationId xmlns:p14="http://schemas.microsoft.com/office/powerpoint/2010/main" val="4002925672"/>
       </p:ext>
     </p:extLst>
   </p:cSld>
@@ -3691,7 +3817,7 @@
           <p:cNvPr id="2" name="Title 1">
             <a:extLst>
               <a:ext uri="{FF2B5EF4-FFF2-40B4-BE49-F238E27FC236}">
-                <a16:creationId xmlns:a16="http://schemas.microsoft.com/office/drawing/2014/main" id="{C96486E1-9669-4FD4-A6A4-9A741B10518C}"/>
+                <a16:creationId xmlns:a16="http://schemas.microsoft.com/office/drawing/2014/main" id="{642F46A1-65B2-4322-BA2F-9B65B842D8B5}"/>
               </a:ext>
             </a:extLst>
           </p:cNvPr>
@@ -3709,7 +3835,7 @@
           <a:p>
             <a:r>
               <a:rPr lang="en-US" dirty="0"/>
-              <a:t>System Evolution</a:t>
+              <a:t>Potential Risks</a:t>
             </a:r>
           </a:p>
         </p:txBody>
@@ -3719,7 +3845,7 @@
           <p:cNvPr id="3" name="Content Placeholder 2">
             <a:extLst>
               <a:ext uri="{FF2B5EF4-FFF2-40B4-BE49-F238E27FC236}">
-                <a16:creationId xmlns:a16="http://schemas.microsoft.com/office/drawing/2014/main" id="{CFB07D61-2B5F-4F1D-B4BE-A803360792B3}"/>
+                <a16:creationId xmlns:a16="http://schemas.microsoft.com/office/drawing/2014/main" id="{6E05FA0E-9C68-437B-90B5-4F41436F04AC}"/>
               </a:ext>
             </a:extLst>
           </p:cNvPr>
@@ -3742,90 +3868,7 @@
     </p:spTree>
     <p:extLst>
       <p:ext uri="{BB962C8B-B14F-4D97-AF65-F5344CB8AC3E}">
-        <p14:creationId xmlns:p14="http://schemas.microsoft.com/office/powerpoint/2010/main" val="4002925672"/>
-      </p:ext>
-    </p:extLst>
-  </p:cSld>
-  <p:clrMapOvr>
-    <a:masterClrMapping/>
-  </p:clrMapOvr>
-</p:sld>
-</file>
-
-<file path=ppt/slides/slide14.xml><?xml version="1.0" encoding="utf-8"?>
-<p:sld xmlns:a="http://schemas.openxmlformats.org/drawingml/2006/main" xmlns:r="http://schemas.openxmlformats.org/officeDocument/2006/relationships" xmlns:p="http://schemas.openxmlformats.org/presentationml/2006/main">
-  <p:cSld>
-    <p:spTree>
-      <p:nvGrpSpPr>
-        <p:cNvPr id="1" name=""/>
-        <p:cNvGrpSpPr/>
-        <p:nvPr/>
-      </p:nvGrpSpPr>
-      <p:grpSpPr>
-        <a:xfrm>
-          <a:off x="0" y="0"/>
-          <a:ext cx="0" cy="0"/>
-          <a:chOff x="0" y="0"/>
-          <a:chExt cx="0" cy="0"/>
-        </a:xfrm>
-      </p:grpSpPr>
-      <p:sp>
-        <p:nvSpPr>
-          <p:cNvPr id="2" name="Title 1">
-            <a:extLst>
-              <a:ext uri="{FF2B5EF4-FFF2-40B4-BE49-F238E27FC236}">
-                <a16:creationId xmlns:a16="http://schemas.microsoft.com/office/drawing/2014/main" id="{A4C580D3-06EC-4956-BFAB-B40EFD8D379D}"/>
-              </a:ext>
-            </a:extLst>
-          </p:cNvPr>
-          <p:cNvSpPr>
-            <a:spLocks noGrp="1"/>
-          </p:cNvSpPr>
-          <p:nvPr>
-            <p:ph type="title"/>
-          </p:nvPr>
-        </p:nvSpPr>
-        <p:spPr/>
-        <p:txBody>
-          <a:bodyPr/>
-          <a:lstStyle/>
-          <a:p>
-            <a:r>
-              <a:rPr lang="en-US" dirty="0"/>
-              <a:t>Questions</a:t>
-            </a:r>
-          </a:p>
-        </p:txBody>
-      </p:sp>
-      <p:sp>
-        <p:nvSpPr>
-          <p:cNvPr id="3" name="Content Placeholder 2">
-            <a:extLst>
-              <a:ext uri="{FF2B5EF4-FFF2-40B4-BE49-F238E27FC236}">
-                <a16:creationId xmlns:a16="http://schemas.microsoft.com/office/drawing/2014/main" id="{D6D088EF-DA23-42CC-BA63-143F242277F4}"/>
-              </a:ext>
-            </a:extLst>
-          </p:cNvPr>
-          <p:cNvSpPr>
-            <a:spLocks noGrp="1"/>
-          </p:cNvSpPr>
-          <p:nvPr>
-            <p:ph idx="1"/>
-          </p:nvPr>
-        </p:nvSpPr>
-        <p:spPr/>
-        <p:txBody>
-          <a:bodyPr/>
-          <a:lstStyle/>
-          <a:p>
-            <a:endParaRPr lang="en-US"/>
-          </a:p>
-        </p:txBody>
-      </p:sp>
-    </p:spTree>
-    <p:extLst>
-      <p:ext uri="{BB962C8B-B14F-4D97-AF65-F5344CB8AC3E}">
-        <p14:creationId xmlns:p14="http://schemas.microsoft.com/office/powerpoint/2010/main" val="1742728387"/>
+        <p14:creationId xmlns:p14="http://schemas.microsoft.com/office/powerpoint/2010/main" val="4130592635"/>
       </p:ext>
     </p:extLst>
   </p:cSld>
@@ -3901,42 +3944,7 @@
           <a:bodyPr/>
           <a:lstStyle/>
           <a:p>
-            <a:r>
-              <a:rPr lang="en-US" dirty="0" smtClean="0"/>
-              <a:t>As presented earlier, Crimson Clubs will help clubs and intramurals at Universities keep track of their statistics and schedules</a:t>
-            </a:r>
-          </a:p>
-          <a:p>
-            <a:r>
-              <a:rPr lang="en-US" dirty="0" smtClean="0"/>
-              <a:t>It will be more efficient than competition</a:t>
-            </a:r>
-          </a:p>
-          <a:p>
-            <a:r>
-              <a:rPr lang="en-US" dirty="0" smtClean="0"/>
-              <a:t>It will be user friendly</a:t>
-            </a:r>
-          </a:p>
-          <a:p>
-            <a:r>
-              <a:rPr lang="en-US" dirty="0" smtClean="0"/>
-              <a:t>It will look clean and organized</a:t>
-            </a:r>
-          </a:p>
-          <a:p>
-            <a:r>
-              <a:rPr lang="en-US" dirty="0" smtClean="0"/>
-              <a:t>There will be no </a:t>
-            </a:r>
-            <a:r>
-              <a:rPr lang="en-US" dirty="0" err="1" smtClean="0"/>
-              <a:t>advertisments</a:t>
-            </a:r>
-            <a:endParaRPr lang="en-US" dirty="0" smtClean="0"/>
-          </a:p>
-          <a:p>
-            <a:endParaRPr lang="en-US" dirty="0"/>
+            <a:endParaRPr lang="en-US" b="1" dirty="0"/>
           </a:p>
         </p:txBody>
       </p:sp>
@@ -3972,65 +3980,79 @@
       </p:grpSpPr>
       <p:sp>
         <p:nvSpPr>
-          <p:cNvPr id="2" name="Title 1"/>
-          <p:cNvSpPr>
-            <a:spLocks noGrp="1"/>
-          </p:cNvSpPr>
-          <p:nvPr>
-            <p:ph type="title"/>
-          </p:nvPr>
-        </p:nvSpPr>
-        <p:spPr>
-          <a:xfrm>
-            <a:off x="0" y="-38637"/>
-            <a:ext cx="10515600" cy="1325563"/>
-          </a:xfrm>
-        </p:spPr>
-        <p:txBody>
-          <a:bodyPr/>
-          <a:lstStyle/>
-          <a:p>
-            <a:r>
-              <a:rPr lang="en-US" dirty="0" smtClean="0"/>
-              <a:t>Website (in-progress)</a:t>
-            </a:r>
-            <a:endParaRPr lang="en-US" dirty="0"/>
-          </a:p>
-        </p:txBody>
-      </p:sp>
-      <p:pic>
-        <p:nvPicPr>
-          <p:cNvPr id="6" name="Content Placeholder 5"/>
-          <p:cNvPicPr>
-            <a:picLocks noGrp="1" noChangeAspect="1"/>
-          </p:cNvPicPr>
-          <p:nvPr>
-            <p:ph idx="1"/>
-          </p:nvPr>
-        </p:nvPicPr>
-        <p:blipFill>
-          <a:blip r:embed="rId2">
+          <p:cNvPr id="2" name="Title 1">
             <a:extLst>
-              <a:ext uri="{28A0092B-C50C-407E-A947-70E740481C1C}">
-                <a14:useLocalDpi xmlns:a14="http://schemas.microsoft.com/office/drawing/2010/main" val="0"/>
+              <a:ext uri="{FF2B5EF4-FFF2-40B4-BE49-F238E27FC236}">
+                <a16:creationId xmlns:a16="http://schemas.microsoft.com/office/drawing/2014/main" id="{E5FBBCDE-D3D1-4218-A02E-EA5A9FCFED54}"/>
               </a:ext>
             </a:extLst>
-          </a:blip>
-          <a:stretch>
-            <a:fillRect/>
-          </a:stretch>
-        </p:blipFill>
-        <p:spPr>
-          <a:xfrm>
-            <a:off x="0" y="1851742"/>
-            <a:ext cx="12192000" cy="5006258"/>
-          </a:xfrm>
-        </p:spPr>
-      </p:pic>
+          </p:cNvPr>
+          <p:cNvSpPr>
+            <a:spLocks noGrp="1"/>
+          </p:cNvSpPr>
+          <p:nvPr>
+            <p:ph type="title"/>
+          </p:nvPr>
+        </p:nvSpPr>
+        <p:spPr/>
+        <p:txBody>
+          <a:bodyPr/>
+          <a:lstStyle/>
+          <a:p>
+            <a:r>
+              <a:rPr lang="en-US" dirty="0"/>
+              <a:t>Definitions</a:t>
+            </a:r>
+          </a:p>
+        </p:txBody>
+      </p:sp>
+      <p:sp>
+        <p:nvSpPr>
+          <p:cNvPr id="3" name="Content Placeholder 2">
+            <a:extLst>
+              <a:ext uri="{FF2B5EF4-FFF2-40B4-BE49-F238E27FC236}">
+                <a16:creationId xmlns:a16="http://schemas.microsoft.com/office/drawing/2014/main" id="{26726A4B-3027-4B2E-A0C1-FCF60C560703}"/>
+              </a:ext>
+            </a:extLst>
+          </p:cNvPr>
+          <p:cNvSpPr>
+            <a:spLocks noGrp="1"/>
+          </p:cNvSpPr>
+          <p:nvPr>
+            <p:ph idx="1"/>
+          </p:nvPr>
+        </p:nvSpPr>
+        <p:spPr/>
+        <p:txBody>
+          <a:bodyPr/>
+          <a:lstStyle/>
+          <a:p>
+            <a:r>
+              <a:rPr lang="en-US" b="1" dirty="0"/>
+              <a:t>Admin User </a:t>
+            </a:r>
+            <a:r>
+              <a:rPr lang="en-US" dirty="0"/>
+              <a:t>– Club leaders, officers, faculty advisors, etc. who have more privileges for a specific club than others. Doubles as a standard user. </a:t>
+            </a:r>
+          </a:p>
+          <a:p>
+            <a:r>
+              <a:rPr lang="en-US" b="1" dirty="0"/>
+              <a:t>Standard User</a:t>
+            </a:r>
+            <a:r>
+              <a:rPr lang="en-US" dirty="0"/>
+              <a:t> – A normal user with normal privileges.</a:t>
+            </a:r>
+            <a:endParaRPr lang="en-US" b="1" dirty="0"/>
+          </a:p>
+        </p:txBody>
+      </p:sp>
     </p:spTree>
     <p:extLst>
       <p:ext uri="{BB962C8B-B14F-4D97-AF65-F5344CB8AC3E}">
-        <p14:creationId xmlns:p14="http://schemas.microsoft.com/office/powerpoint/2010/main" val="3002667066"/>
+        <p14:creationId xmlns:p14="http://schemas.microsoft.com/office/powerpoint/2010/main" val="3995995081"/>
       </p:ext>
     </p:extLst>
   </p:cSld>
@@ -4062,7 +4084,7 @@
           <p:cNvPr id="2" name="Title 1">
             <a:extLst>
               <a:ext uri="{FF2B5EF4-FFF2-40B4-BE49-F238E27FC236}">
-                <a16:creationId xmlns:a16="http://schemas.microsoft.com/office/drawing/2014/main" id="{E5FBBCDE-D3D1-4218-A02E-EA5A9FCFED54}"/>
+                <a16:creationId xmlns:a16="http://schemas.microsoft.com/office/drawing/2014/main" id="{9CFB58D7-CB7F-410F-8820-4B6E9B80F44A}"/>
               </a:ext>
             </a:extLst>
           </p:cNvPr>
@@ -4080,7 +4102,7 @@
           <a:p>
             <a:r>
               <a:rPr lang="en-US" dirty="0"/>
-              <a:t>Definitions</a:t>
+              <a:t>Functional Requirements (Admin)</a:t>
             </a:r>
           </a:p>
         </p:txBody>
@@ -4090,7 +4112,7 @@
           <p:cNvPr id="3" name="Content Placeholder 2">
             <a:extLst>
               <a:ext uri="{FF2B5EF4-FFF2-40B4-BE49-F238E27FC236}">
-                <a16:creationId xmlns:a16="http://schemas.microsoft.com/office/drawing/2014/main" id="{26726A4B-3027-4B2E-A0C1-FCF60C560703}"/>
+                <a16:creationId xmlns:a16="http://schemas.microsoft.com/office/drawing/2014/main" id="{C4FAA8CE-F5AF-4311-B371-BA36A2A74638}"/>
               </a:ext>
             </a:extLst>
           </p:cNvPr>
@@ -4103,20 +4125,71 @@
         </p:nvSpPr>
         <p:spPr/>
         <p:txBody>
-          <a:bodyPr/>
+          <a:bodyPr>
+            <a:normAutofit/>
+          </a:bodyPr>
           <a:lstStyle/>
           <a:p>
             <a:r>
               <a:rPr lang="en-US" dirty="0"/>
-              <a:t>Admin vs. Normal</a:t>
-            </a:r>
+              <a:t>Add other people/Approve people</a:t>
+            </a:r>
+            <a:endParaRPr lang="en-US" b="0" dirty="0">
+              <a:effectLst/>
+            </a:endParaRPr>
+          </a:p>
+          <a:p>
+            <a:r>
+              <a:rPr lang="en-US" dirty="0"/>
+              <a:t>Create Events</a:t>
+            </a:r>
+            <a:endParaRPr lang="en-US" b="0" dirty="0">
+              <a:effectLst/>
+            </a:endParaRPr>
+          </a:p>
+          <a:p>
+            <a:r>
+              <a:rPr lang="en-US" dirty="0"/>
+              <a:t>Push Notifications</a:t>
+            </a:r>
+            <a:endParaRPr lang="en-US" b="0" dirty="0">
+              <a:effectLst/>
+            </a:endParaRPr>
+          </a:p>
+          <a:p>
+            <a:r>
+              <a:rPr lang="en-US" dirty="0"/>
+              <a:t>Remove People</a:t>
+            </a:r>
+            <a:endParaRPr lang="en-US" b="0" dirty="0">
+              <a:effectLst/>
+            </a:endParaRPr>
+          </a:p>
+          <a:p>
+            <a:r>
+              <a:rPr lang="en-US" dirty="0"/>
+              <a:t>Modify Description/Info/Tags</a:t>
+            </a:r>
+            <a:endParaRPr lang="en-US" b="0" dirty="0">
+              <a:effectLst/>
+            </a:endParaRPr>
+          </a:p>
+          <a:p>
+            <a:r>
+              <a:rPr lang="en-US" dirty="0"/>
+              <a:t>Add Stats (Low)</a:t>
+            </a:r>
+            <a:br>
+              <a:rPr lang="en-US" dirty="0"/>
+            </a:br>
+            <a:endParaRPr lang="en-US" dirty="0"/>
           </a:p>
         </p:txBody>
       </p:sp>
     </p:spTree>
     <p:extLst>
       <p:ext uri="{BB962C8B-B14F-4D97-AF65-F5344CB8AC3E}">
-        <p14:creationId xmlns:p14="http://schemas.microsoft.com/office/powerpoint/2010/main" val="3995995081"/>
+        <p14:creationId xmlns:p14="http://schemas.microsoft.com/office/powerpoint/2010/main" val="2210290770"/>
       </p:ext>
     </p:extLst>
   </p:cSld>
@@ -4148,7 +4221,7 @@
           <p:cNvPr id="2" name="Title 1">
             <a:extLst>
               <a:ext uri="{FF2B5EF4-FFF2-40B4-BE49-F238E27FC236}">
-                <a16:creationId xmlns:a16="http://schemas.microsoft.com/office/drawing/2014/main" id="{9CFB58D7-CB7F-410F-8820-4B6E9B80F44A}"/>
+                <a16:creationId xmlns:a16="http://schemas.microsoft.com/office/drawing/2014/main" id="{A4A78AF0-B0BF-408F-915A-F6150028E0BE}"/>
               </a:ext>
             </a:extLst>
           </p:cNvPr>
@@ -4166,7 +4239,7 @@
           <a:p>
             <a:r>
               <a:rPr lang="en-US" dirty="0"/>
-              <a:t>Functional Requirements (Admin)</a:t>
+              <a:t>Functional Requirements (Normal)</a:t>
             </a:r>
           </a:p>
         </p:txBody>
@@ -4176,7 +4249,7 @@
           <p:cNvPr id="3" name="Content Placeholder 2">
             <a:extLst>
               <a:ext uri="{FF2B5EF4-FFF2-40B4-BE49-F238E27FC236}">
-                <a16:creationId xmlns:a16="http://schemas.microsoft.com/office/drawing/2014/main" id="{C4FAA8CE-F5AF-4311-B371-BA36A2A74638}"/>
+                <a16:creationId xmlns:a16="http://schemas.microsoft.com/office/drawing/2014/main" id="{1DC44817-CA2F-45E2-8B6F-3FC58E037D6C}"/>
               </a:ext>
             </a:extLst>
           </p:cNvPr>
@@ -4189,12 +4262,14 @@
         </p:nvSpPr>
         <p:spPr/>
         <p:txBody>
-          <a:bodyPr/>
+          <a:bodyPr>
+            <a:normAutofit/>
+          </a:bodyPr>
           <a:lstStyle/>
           <a:p>
             <a:r>
               <a:rPr lang="en-US" dirty="0"/>
-              <a:t>Add other people/Approve people</a:t>
+              <a:t>Request to Join Club/Join Club</a:t>
             </a:r>
             <a:endParaRPr lang="en-US" b="0" dirty="0">
               <a:effectLst/>
@@ -4203,7 +4278,7 @@
           <a:p>
             <a:r>
               <a:rPr lang="en-US" dirty="0"/>
-              <a:t>Create Events</a:t>
+              <a:t>Search Clubs</a:t>
             </a:r>
             <a:endParaRPr lang="en-US" b="0" dirty="0">
               <a:effectLst/>
@@ -4212,7 +4287,7 @@
           <a:p>
             <a:r>
               <a:rPr lang="en-US" dirty="0"/>
-              <a:t>Push Notifications</a:t>
+              <a:t>Look at Personal Calendar</a:t>
             </a:r>
             <a:endParaRPr lang="en-US" b="0" dirty="0">
               <a:effectLst/>
@@ -4221,7 +4296,7 @@
           <a:p>
             <a:r>
               <a:rPr lang="en-US" dirty="0"/>
-              <a:t>Remove People</a:t>
+              <a:t>Leave Clubs</a:t>
             </a:r>
             <a:endParaRPr lang="en-US" b="0" dirty="0">
               <a:effectLst/>
@@ -4230,7 +4305,7 @@
           <a:p>
             <a:r>
               <a:rPr lang="en-US" dirty="0"/>
-              <a:t>Modify Description/Info/Tags</a:t>
+              <a:t>Look at info</a:t>
             </a:r>
             <a:endParaRPr lang="en-US" b="0" dirty="0">
               <a:effectLst/>
@@ -4239,7 +4314,7 @@
           <a:p>
             <a:r>
               <a:rPr lang="en-US" dirty="0"/>
-              <a:t>Add Stats (Low)</a:t>
+              <a:t>Create Profile</a:t>
             </a:r>
             <a:endParaRPr lang="en-US" b="0" dirty="0">
               <a:effectLst/>
@@ -4248,7 +4323,7 @@
           <a:p>
             <a:r>
               <a:rPr lang="en-US" dirty="0"/>
-              <a:t/>
+              <a:t>View Event Stats/Leagues (Low)</a:t>
             </a:r>
             <a:br>
               <a:rPr lang="en-US" dirty="0"/>
@@ -4260,7 +4335,7 @@
     </p:spTree>
     <p:extLst>
       <p:ext uri="{BB962C8B-B14F-4D97-AF65-F5344CB8AC3E}">
-        <p14:creationId xmlns:p14="http://schemas.microsoft.com/office/powerpoint/2010/main" val="2210290770"/>
+        <p14:creationId xmlns:p14="http://schemas.microsoft.com/office/powerpoint/2010/main" val="2735179493"/>
       </p:ext>
     </p:extLst>
   </p:cSld>
@@ -4292,7 +4367,7 @@
           <p:cNvPr id="2" name="Title 1">
             <a:extLst>
               <a:ext uri="{FF2B5EF4-FFF2-40B4-BE49-F238E27FC236}">
-                <a16:creationId xmlns:a16="http://schemas.microsoft.com/office/drawing/2014/main" id="{A4A78AF0-B0BF-408F-915A-F6150028E0BE}"/>
+                <a16:creationId xmlns:a16="http://schemas.microsoft.com/office/drawing/2014/main" id="{6C97435F-1751-4590-A673-0EBD8B4E9DE8}"/>
               </a:ext>
             </a:extLst>
           </p:cNvPr>
@@ -4310,7 +4385,7 @@
           <a:p>
             <a:r>
               <a:rPr lang="en-US" dirty="0"/>
-              <a:t>Functional Requirements (Normal)</a:t>
+              <a:t>Non-Functional Requirements</a:t>
             </a:r>
           </a:p>
         </p:txBody>
@@ -4320,7 +4395,7 @@
           <p:cNvPr id="3" name="Content Placeholder 2">
             <a:extLst>
               <a:ext uri="{FF2B5EF4-FFF2-40B4-BE49-F238E27FC236}">
-                <a16:creationId xmlns:a16="http://schemas.microsoft.com/office/drawing/2014/main" id="{1DC44817-CA2F-45E2-8B6F-3FC58E037D6C}"/>
+                <a16:creationId xmlns:a16="http://schemas.microsoft.com/office/drawing/2014/main" id="{B8237FEC-E5B4-4101-ABE3-40FD002B4042}"/>
               </a:ext>
             </a:extLst>
           </p:cNvPr>
@@ -4333,81 +4408,39 @@
         </p:nvSpPr>
         <p:spPr/>
         <p:txBody>
-          <a:bodyPr>
-            <a:normAutofit lnSpcReduction="10000"/>
-          </a:bodyPr>
+          <a:bodyPr/>
           <a:lstStyle/>
           <a:p>
             <a:r>
               <a:rPr lang="en-US" dirty="0"/>
-              <a:t>Request to Join Club/Join Club</a:t>
-            </a:r>
-            <a:endParaRPr lang="en-US" b="0" dirty="0">
-              <a:effectLst/>
-            </a:endParaRPr>
+              <a:t>Login</a:t>
+            </a:r>
           </a:p>
           <a:p>
             <a:r>
               <a:rPr lang="en-US" dirty="0"/>
-              <a:t>Search Clubs</a:t>
-            </a:r>
-            <a:endParaRPr lang="en-US" b="0" dirty="0">
-              <a:effectLst/>
-            </a:endParaRPr>
+              <a:t>Save to backend</a:t>
+            </a:r>
           </a:p>
           <a:p>
             <a:r>
               <a:rPr lang="en-US" dirty="0"/>
-              <a:t>Look at Personal Calendar</a:t>
-            </a:r>
-            <a:endParaRPr lang="en-US" b="0" dirty="0">
-              <a:effectLst/>
-            </a:endParaRPr>
+              <a:t>Flexible UI for website and app</a:t>
+            </a:r>
           </a:p>
           <a:p>
             <a:r>
               <a:rPr lang="en-US" dirty="0"/>
-              <a:t>Leave Clubs</a:t>
-            </a:r>
-            <a:endParaRPr lang="en-US" b="0" dirty="0">
-              <a:effectLst/>
-            </a:endParaRPr>
+              <a:t>Profile Management (?)</a:t>
+            </a:r>
           </a:p>
           <a:p>
             <a:r>
               <a:rPr lang="en-US" dirty="0"/>
-              <a:t>Look at info</a:t>
-            </a:r>
-            <a:endParaRPr lang="en-US" b="0" dirty="0">
-              <a:effectLst/>
-            </a:endParaRPr>
-          </a:p>
-          <a:p>
-            <a:r>
-              <a:rPr lang="en-US" dirty="0"/>
-              <a:t>Create Profile</a:t>
-            </a:r>
-            <a:endParaRPr lang="en-US" b="0" dirty="0">
-              <a:effectLst/>
-            </a:endParaRPr>
-          </a:p>
-          <a:p>
-            <a:r>
-              <a:rPr lang="en-US" dirty="0"/>
-              <a:t>View Event Stats/Leagues (Low)</a:t>
-            </a:r>
-            <a:endParaRPr lang="en-US" b="0" dirty="0">
-              <a:effectLst/>
-            </a:endParaRPr>
-          </a:p>
-          <a:p>
-            <a:r>
-              <a:rPr lang="en-US" dirty="0"/>
-              <a:t/>
-            </a:r>
-            <a:br>
-              <a:rPr lang="en-US" dirty="0"/>
-            </a:br>
+              <a:t>Search Algorithm based on Profile/Tags (?)</a:t>
+            </a:r>
+          </a:p>
+          <a:p>
             <a:endParaRPr lang="en-US" dirty="0"/>
           </a:p>
         </p:txBody>
@@ -4415,7 +4448,7 @@
     </p:spTree>
     <p:extLst>
       <p:ext uri="{BB962C8B-B14F-4D97-AF65-F5344CB8AC3E}">
-        <p14:creationId xmlns:p14="http://schemas.microsoft.com/office/powerpoint/2010/main" val="2735179493"/>
+        <p14:creationId xmlns:p14="http://schemas.microsoft.com/office/powerpoint/2010/main" val="953602322"/>
       </p:ext>
     </p:extLst>
   </p:cSld>
@@ -4442,63 +4475,80 @@
           <a:chExt cx="0" cy="0"/>
         </a:xfrm>
       </p:grpSpPr>
-      <p:sp>
-        <p:nvSpPr>
-          <p:cNvPr id="2" name="Title 1">
+      <p:pic>
+        <p:nvPicPr>
+          <p:cNvPr id="5" name="Content Placeholder 4">
             <a:extLst>
               <a:ext uri="{FF2B5EF4-FFF2-40B4-BE49-F238E27FC236}">
-                <a16:creationId xmlns:a16="http://schemas.microsoft.com/office/drawing/2014/main" id="{6C97435F-1751-4590-A673-0EBD8B4E9DE8}"/>
+                <a16:creationId xmlns:a16="http://schemas.microsoft.com/office/drawing/2014/main" id="{64743305-3B93-4D29-A826-D92D8D0755C4}"/>
               </a:ext>
             </a:extLst>
           </p:cNvPr>
-          <p:cNvSpPr>
-            <a:spLocks noGrp="1"/>
-          </p:cNvSpPr>
-          <p:nvPr>
-            <p:ph type="title"/>
-          </p:nvPr>
-        </p:nvSpPr>
-        <p:spPr/>
-        <p:txBody>
-          <a:bodyPr/>
-          <a:lstStyle/>
-          <a:p>
-            <a:r>
-              <a:rPr lang="en-US" dirty="0"/>
-              <a:t>Non-Functional Requirements</a:t>
-            </a:r>
-          </a:p>
-        </p:txBody>
-      </p:sp>
-      <p:sp>
-        <p:nvSpPr>
-          <p:cNvPr id="3" name="Content Placeholder 2">
+          <p:cNvPicPr>
+            <a:picLocks noGrp="1" noChangeAspect="1"/>
+          </p:cNvPicPr>
+          <p:nvPr>
+            <p:ph idx="1"/>
+          </p:nvPr>
+        </p:nvPicPr>
+        <p:blipFill>
+          <a:blip r:embed="rId2">
+            <a:extLst>
+              <a:ext uri="{28A0092B-C50C-407E-A947-70E740481C1C}">
+                <a14:useLocalDpi xmlns:a14="http://schemas.microsoft.com/office/drawing/2010/main" val="0"/>
+              </a:ext>
+            </a:extLst>
+          </a:blip>
+          <a:stretch>
+            <a:fillRect/>
+          </a:stretch>
+        </p:blipFill>
+        <p:spPr>
+          <a:xfrm>
+            <a:off x="4086880" y="138546"/>
+            <a:ext cx="6432150" cy="6353711"/>
+          </a:xfrm>
+        </p:spPr>
+      </p:pic>
+      <p:sp>
+        <p:nvSpPr>
+          <p:cNvPr id="8" name="TextBox 7">
             <a:extLst>
               <a:ext uri="{FF2B5EF4-FFF2-40B4-BE49-F238E27FC236}">
-                <a16:creationId xmlns:a16="http://schemas.microsoft.com/office/drawing/2014/main" id="{B8237FEC-E5B4-4101-ABE3-40FD002B4042}"/>
+                <a16:creationId xmlns:a16="http://schemas.microsoft.com/office/drawing/2014/main" id="{895DDFE7-C656-42DC-B800-408DD11F183C}"/>
               </a:ext>
             </a:extLst>
           </p:cNvPr>
-          <p:cNvSpPr>
-            <a:spLocks noGrp="1"/>
-          </p:cNvSpPr>
-          <p:nvPr>
-            <p:ph idx="1"/>
-          </p:nvPr>
-        </p:nvSpPr>
-        <p:spPr/>
-        <p:txBody>
-          <a:bodyPr/>
-          <a:lstStyle/>
-          <a:p>
-            <a:endParaRPr lang="en-US"/>
+          <p:cNvSpPr txBox="1"/>
+          <p:nvPr/>
+        </p:nvSpPr>
+        <p:spPr>
+          <a:xfrm>
+            <a:off x="563372" y="249381"/>
+            <a:ext cx="2484628" cy="2554545"/>
+          </a:xfrm>
+          <a:prstGeom prst="rect">
+            <a:avLst/>
+          </a:prstGeom>
+          <a:noFill/>
+        </p:spPr>
+        <p:txBody>
+          <a:bodyPr wrap="square" rtlCol="0">
+            <a:spAutoFit/>
+          </a:bodyPr>
+          <a:lstStyle/>
+          <a:p>
+            <a:r>
+              <a:rPr lang="en-US" sz="4000" dirty="0"/>
+              <a:t>Normal User Use Case Diagram</a:t>
+            </a:r>
           </a:p>
         </p:txBody>
       </p:sp>
     </p:spTree>
     <p:extLst>
       <p:ext uri="{BB962C8B-B14F-4D97-AF65-F5344CB8AC3E}">
-        <p14:creationId xmlns:p14="http://schemas.microsoft.com/office/powerpoint/2010/main" val="953602322"/>
+        <p14:creationId xmlns:p14="http://schemas.microsoft.com/office/powerpoint/2010/main" val="2934480908"/>
       </p:ext>
     </p:extLst>
   </p:cSld>
@@ -4530,7 +4580,7 @@
           <p:cNvPr id="2" name="Title 1">
             <a:extLst>
               <a:ext uri="{FF2B5EF4-FFF2-40B4-BE49-F238E27FC236}">
-                <a16:creationId xmlns:a16="http://schemas.microsoft.com/office/drawing/2014/main" id="{4E995F8E-9EB6-4B9C-B2BC-FE943926A530}"/>
+                <a16:creationId xmlns:a16="http://schemas.microsoft.com/office/drawing/2014/main" id="{EC30254C-B3A4-448B-8ED8-220C2E4C25EA}"/>
               </a:ext>
             </a:extLst>
           </p:cNvPr>
@@ -4541,47 +4591,99 @@
             <p:ph type="title"/>
           </p:nvPr>
         </p:nvSpPr>
-        <p:spPr/>
-        <p:txBody>
-          <a:bodyPr/>
-          <a:lstStyle/>
-          <a:p>
-            <a:r>
+        <p:spPr>
+          <a:xfrm>
+            <a:off x="563372" y="249381"/>
+            <a:ext cx="2996619" cy="4396740"/>
+          </a:xfrm>
+        </p:spPr>
+        <p:txBody>
+          <a:bodyPr>
+            <a:normAutofit/>
+          </a:bodyPr>
+          <a:lstStyle/>
+          <a:p>
+            <a:br>
               <a:rPr lang="en-US" dirty="0"/>
-              <a:t>System Architecture</a:t>
-            </a:r>
-          </a:p>
-        </p:txBody>
-      </p:sp>
-      <p:sp>
-        <p:nvSpPr>
-          <p:cNvPr id="3" name="Content Placeholder 2">
+            </a:br>
+            <a:endParaRPr lang="en-US" dirty="0"/>
+          </a:p>
+        </p:txBody>
+      </p:sp>
+      <p:pic>
+        <p:nvPicPr>
+          <p:cNvPr id="7" name="Content Placeholder 6">
             <a:extLst>
               <a:ext uri="{FF2B5EF4-FFF2-40B4-BE49-F238E27FC236}">
-                <a16:creationId xmlns:a16="http://schemas.microsoft.com/office/drawing/2014/main" id="{CF5497FB-82B7-4F31-A87F-038731772006}"/>
+                <a16:creationId xmlns:a16="http://schemas.microsoft.com/office/drawing/2014/main" id="{41611B0C-A7FD-49C2-A66E-F7B0AE3D71AD}"/>
               </a:ext>
             </a:extLst>
           </p:cNvPr>
-          <p:cNvSpPr>
-            <a:spLocks noGrp="1"/>
-          </p:cNvSpPr>
+          <p:cNvPicPr>
+            <a:picLocks noGrp="1" noChangeAspect="1"/>
+          </p:cNvPicPr>
           <p:nvPr>
             <p:ph idx="1"/>
           </p:nvPr>
-        </p:nvSpPr>
-        <p:spPr/>
-        <p:txBody>
-          <a:bodyPr/>
-          <a:lstStyle/>
-          <a:p>
-            <a:endParaRPr lang="en-US"/>
+        </p:nvPicPr>
+        <p:blipFill>
+          <a:blip r:embed="rId2">
+            <a:extLst>
+              <a:ext uri="{28A0092B-C50C-407E-A947-70E740481C1C}">
+                <a14:useLocalDpi xmlns:a14="http://schemas.microsoft.com/office/drawing/2010/main" val="0"/>
+              </a:ext>
+            </a:extLst>
+          </a:blip>
+          <a:stretch>
+            <a:fillRect/>
+          </a:stretch>
+        </p:blipFill>
+        <p:spPr>
+          <a:xfrm>
+            <a:off x="3925981" y="249381"/>
+            <a:ext cx="6767703" cy="6022110"/>
+          </a:xfrm>
+        </p:spPr>
+      </p:pic>
+      <p:sp>
+        <p:nvSpPr>
+          <p:cNvPr id="8" name="TextBox 7">
+            <a:extLst>
+              <a:ext uri="{FF2B5EF4-FFF2-40B4-BE49-F238E27FC236}">
+                <a16:creationId xmlns:a16="http://schemas.microsoft.com/office/drawing/2014/main" id="{FA95455C-C973-4F55-80EE-7E2D6B95A590}"/>
+              </a:ext>
+            </a:extLst>
+          </p:cNvPr>
+          <p:cNvSpPr txBox="1"/>
+          <p:nvPr/>
+        </p:nvSpPr>
+        <p:spPr>
+          <a:xfrm>
+            <a:off x="563372" y="249381"/>
+            <a:ext cx="2484628" cy="2554545"/>
+          </a:xfrm>
+          <a:prstGeom prst="rect">
+            <a:avLst/>
+          </a:prstGeom>
+          <a:noFill/>
+        </p:spPr>
+        <p:txBody>
+          <a:bodyPr wrap="square" rtlCol="0">
+            <a:spAutoFit/>
+          </a:bodyPr>
+          <a:lstStyle/>
+          <a:p>
+            <a:r>
+              <a:rPr lang="en-US" sz="4000" dirty="0"/>
+              <a:t>Admin User Use Case Diagram</a:t>
+            </a:r>
           </a:p>
         </p:txBody>
       </p:sp>
     </p:spTree>
     <p:extLst>
       <p:ext uri="{BB962C8B-B14F-4D97-AF65-F5344CB8AC3E}">
-        <p14:creationId xmlns:p14="http://schemas.microsoft.com/office/powerpoint/2010/main" val="469231888"/>
+        <p14:creationId xmlns:p14="http://schemas.microsoft.com/office/powerpoint/2010/main" val="410290249"/>
       </p:ext>
     </p:extLst>
   </p:cSld>
@@ -4675,110 +4777,58 @@
 </file>
 
 <file path=ppt/theme/theme1.xml><?xml version="1.0" encoding="utf-8"?>
-<a:theme xmlns:a="http://schemas.openxmlformats.org/drawingml/2006/main" name="Office Theme">
+<a:theme xmlns:a="http://schemas.openxmlformats.org/drawingml/2006/main" name="View">
   <a:themeElements>
-    <a:clrScheme name="Office">
+    <a:clrScheme name="View">
       <a:dk1>
-        <a:sysClr val="windowText" lastClr="000000"/>
+        <a:srgbClr val="000000"/>
       </a:dk1>
       <a:lt1>
-        <a:sysClr val="window" lastClr="FFFFFF"/>
+        <a:srgbClr val="FFFFFF"/>
       </a:lt1>
       <a:dk2>
-        <a:srgbClr val="44546A"/>
+        <a:srgbClr val="46464A"/>
       </a:dk2>
       <a:lt2>
-        <a:srgbClr val="E7E6E6"/>
+        <a:srgbClr val="D6D3CC"/>
       </a:lt2>
       <a:accent1>
-        <a:srgbClr val="4472C4"/>
+        <a:srgbClr val="6F6F74"/>
       </a:accent1>
       <a:accent2>
-        <a:srgbClr val="ED7D31"/>
+        <a:srgbClr val="92A9B9"/>
       </a:accent2>
       <a:accent3>
-        <a:srgbClr val="A5A5A5"/>
+        <a:srgbClr val="A7B789"/>
       </a:accent3>
       <a:accent4>
-        <a:srgbClr val="FFC000"/>
+        <a:srgbClr val="B9A489"/>
       </a:accent4>
       <a:accent5>
-        <a:srgbClr val="5B9BD5"/>
+        <a:srgbClr val="8D6374"/>
       </a:accent5>
       <a:accent6>
-        <a:srgbClr val="70AD47"/>
+        <a:srgbClr val="9B7362"/>
       </a:accent6>
       <a:hlink>
-        <a:srgbClr val="0563C1"/>
+        <a:srgbClr val="67AABF"/>
       </a:hlink>
       <a:folHlink>
-        <a:srgbClr val="954F72"/>
+        <a:srgbClr val="ABAFA5"/>
       </a:folHlink>
     </a:clrScheme>
-    <a:fontScheme name="Office">
+    <a:fontScheme name="View">
       <a:majorFont>
-        <a:latin typeface="Calibri Light" panose="020F0302020204030204"/>
+        <a:latin typeface="Century Schoolbook" panose="02040604050505020304"/>
         <a:ea typeface=""/>
         <a:cs typeface=""/>
-        <a:font script="Jpan" typeface="游ゴシック Light"/>
+        <a:font script="Jpan" typeface="ＭＳ ゴシック"/>
         <a:font script="Hang" typeface="맑은 고딕"/>
-        <a:font script="Hans" typeface="等线 Light"/>
+        <a:font script="Hans" typeface="宋体"/>
         <a:font script="Hant" typeface="新細明體"/>
-        <a:font script="Arab" typeface="Times New Roman"/>
-        <a:font script="Hebr" typeface="Times New Roman"/>
-        <a:font script="Thai" typeface="Angsana New"/>
-        <a:font script="Ethi" typeface="Nyala"/>
-        <a:font script="Beng" typeface="Vrinda"/>
-        <a:font script="Gujr" typeface="Shruti"/>
-        <a:font script="Khmr" typeface="MoolBoran"/>
-        <a:font script="Knda" typeface="Tunga"/>
-        <a:font script="Guru" typeface="Raavi"/>
-        <a:font script="Cans" typeface="Euphemia"/>
-        <a:font script="Cher" typeface="Plantagenet Cherokee"/>
-        <a:font script="Yiii" typeface="Microsoft Yi Baiti"/>
-        <a:font script="Tibt" typeface="Microsoft Himalaya"/>
-        <a:font script="Thaa" typeface="MV Boli"/>
-        <a:font script="Deva" typeface="Mangal"/>
-        <a:font script="Telu" typeface="Gautami"/>
-        <a:font script="Taml" typeface="Latha"/>
-        <a:font script="Syrc" typeface="Estrangelo Edessa"/>
-        <a:font script="Orya" typeface="Kalinga"/>
-        <a:font script="Mlym" typeface="Kartika"/>
-        <a:font script="Laoo" typeface="DokChampa"/>
-        <a:font script="Sinh" typeface="Iskoola Pota"/>
-        <a:font script="Mong" typeface="Mongolian Baiti"/>
-        <a:font script="Viet" typeface="Times New Roman"/>
-        <a:font script="Uigh" typeface="Microsoft Uighur"/>
-        <a:font script="Geor" typeface="Sylfaen"/>
-        <a:font script="Armn" typeface="Arial"/>
-        <a:font script="Bugi" typeface="Leelawadee UI"/>
-        <a:font script="Bopo" typeface="Microsoft JhengHei"/>
-        <a:font script="Java" typeface="Javanese Text"/>
-        <a:font script="Lisu" typeface="Segoe UI"/>
-        <a:font script="Mymr" typeface="Myanmar Text"/>
-        <a:font script="Nkoo" typeface="Ebrima"/>
-        <a:font script="Olck" typeface="Nirmala UI"/>
-        <a:font script="Osma" typeface="Ebrima"/>
-        <a:font script="Phag" typeface="Phagspa"/>
-        <a:font script="Syrn" typeface="Estrangelo Edessa"/>
-        <a:font script="Syrj" typeface="Estrangelo Edessa"/>
-        <a:font script="Syre" typeface="Estrangelo Edessa"/>
-        <a:font script="Sora" typeface="Nirmala UI"/>
-        <a:font script="Tale" typeface="Microsoft Tai Le"/>
-        <a:font script="Talu" typeface="Microsoft New Tai Lue"/>
-        <a:font script="Tfng" typeface="Ebrima"/>
-      </a:majorFont>
-      <a:minorFont>
-        <a:latin typeface="Calibri" panose="020F0502020204030204"/>
-        <a:ea typeface=""/>
-        <a:cs typeface=""/>
-        <a:font script="Jpan" typeface="游ゴシック"/>
-        <a:font script="Hang" typeface="맑은 고딕"/>
-        <a:font script="Hans" typeface="等线"/>
-        <a:font script="Hant" typeface="新細明體"/>
-        <a:font script="Arab" typeface="Arial"/>
-        <a:font script="Hebr" typeface="Arial"/>
-        <a:font script="Thai" typeface="Cordia New"/>
+        <a:font script="Arab" typeface="Tahoma"/>
+        <a:font script="Hebr" typeface="Gisha"/>
+        <a:font script="Thai" typeface="DilleniaUPC"/>
         <a:font script="Ethi" typeface="Nyala"/>
         <a:font script="Beng" typeface="Vrinda"/>
         <a:font script="Gujr" typeface="Shruti"/>
@@ -4799,107 +4849,86 @@
         <a:font script="Laoo" typeface="DokChampa"/>
         <a:font script="Sinh" typeface="Iskoola Pota"/>
         <a:font script="Mong" typeface="Mongolian Baiti"/>
-        <a:font script="Viet" typeface="Arial"/>
+        <a:font script="Viet" typeface="Tahoma"/>
         <a:font script="Uigh" typeface="Microsoft Uighur"/>
         <a:font script="Geor" typeface="Sylfaen"/>
-        <a:font script="Armn" typeface="Arial"/>
-        <a:font script="Bugi" typeface="Leelawadee UI"/>
-        <a:font script="Bopo" typeface="Microsoft JhengHei"/>
-        <a:font script="Java" typeface="Javanese Text"/>
-        <a:font script="Lisu" typeface="Segoe UI"/>
-        <a:font script="Mymr" typeface="Myanmar Text"/>
-        <a:font script="Nkoo" typeface="Ebrima"/>
-        <a:font script="Olck" typeface="Nirmala UI"/>
-        <a:font script="Osma" typeface="Ebrima"/>
-        <a:font script="Phag" typeface="Phagspa"/>
-        <a:font script="Syrn" typeface="Estrangelo Edessa"/>
-        <a:font script="Syrj" typeface="Estrangelo Edessa"/>
-        <a:font script="Syre" typeface="Estrangelo Edessa"/>
-        <a:font script="Sora" typeface="Nirmala UI"/>
-        <a:font script="Tale" typeface="Microsoft Tai Le"/>
-        <a:font script="Talu" typeface="Microsoft New Tai Lue"/>
-        <a:font script="Tfng" typeface="Ebrima"/>
+      </a:majorFont>
+      <a:minorFont>
+        <a:latin typeface="Century Schoolbook" panose="02040604050505020304"/>
+        <a:ea typeface=""/>
+        <a:cs typeface=""/>
+        <a:font script="Jpan" typeface="ＭＳ ゴシック"/>
+        <a:font script="Hang" typeface="맑은 고딕"/>
+        <a:font script="Hans" typeface="宋体"/>
+        <a:font script="Hant" typeface="新細明體"/>
+        <a:font script="Arab" typeface="Tahoma"/>
+        <a:font script="Hebr" typeface="Gisha"/>
+        <a:font script="Thai" typeface="DilleniaUPC"/>
+        <a:font script="Ethi" typeface="Nyala"/>
+        <a:font script="Beng" typeface="Vrinda"/>
+        <a:font script="Gujr" typeface="Shruti"/>
+        <a:font script="Khmr" typeface="DaunPenh"/>
+        <a:font script="Knda" typeface="Tunga"/>
+        <a:font script="Guru" typeface="Raavi"/>
+        <a:font script="Cans" typeface="Euphemia"/>
+        <a:font script="Cher" typeface="Plantagenet Cherokee"/>
+        <a:font script="Yiii" typeface="Microsoft Yi Baiti"/>
+        <a:font script="Tibt" typeface="Microsoft Himalaya"/>
+        <a:font script="Thaa" typeface="MV Boli"/>
+        <a:font script="Deva" typeface="Mangal"/>
+        <a:font script="Telu" typeface="Gautami"/>
+        <a:font script="Taml" typeface="Latha"/>
+        <a:font script="Syrc" typeface="Estrangelo Edessa"/>
+        <a:font script="Orya" typeface="Kalinga"/>
+        <a:font script="Mlym" typeface="Kartika"/>
+        <a:font script="Laoo" typeface="DokChampa"/>
+        <a:font script="Sinh" typeface="Iskoola Pota"/>
+        <a:font script="Mong" typeface="Mongolian Baiti"/>
+        <a:font script="Viet" typeface="Verdana"/>
+        <a:font script="Uigh" typeface="Microsoft Uighur"/>
+        <a:font script="Geor" typeface="Sylfaen"/>
       </a:minorFont>
     </a:fontScheme>
-    <a:fmtScheme name="Office">
+    <a:fmtScheme name="View">
       <a:fillStyleLst>
         <a:solidFill>
           <a:schemeClr val="phClr"/>
         </a:solidFill>
-        <a:gradFill rotWithShape="1">
-          <a:gsLst>
-            <a:gs pos="0">
-              <a:schemeClr val="phClr">
-                <a:lumMod val="110000"/>
-                <a:satMod val="105000"/>
-                <a:tint val="67000"/>
-              </a:schemeClr>
-            </a:gs>
-            <a:gs pos="50000">
-              <a:schemeClr val="phClr">
-                <a:lumMod val="105000"/>
-                <a:satMod val="103000"/>
-                <a:tint val="73000"/>
-              </a:schemeClr>
-            </a:gs>
-            <a:gs pos="100000">
-              <a:schemeClr val="phClr">
-                <a:lumMod val="105000"/>
-                <a:satMod val="109000"/>
-                <a:tint val="81000"/>
-              </a:schemeClr>
-            </a:gs>
-          </a:gsLst>
-          <a:lin ang="5400000" scaled="0"/>
-        </a:gradFill>
-        <a:gradFill rotWithShape="1">
-          <a:gsLst>
-            <a:gs pos="0">
-              <a:schemeClr val="phClr">
-                <a:satMod val="103000"/>
-                <a:lumMod val="102000"/>
-                <a:tint val="94000"/>
-              </a:schemeClr>
-            </a:gs>
-            <a:gs pos="50000">
-              <a:schemeClr val="phClr">
-                <a:satMod val="110000"/>
-                <a:lumMod val="100000"/>
-                <a:shade val="100000"/>
-              </a:schemeClr>
-            </a:gs>
-            <a:gs pos="100000">
-              <a:schemeClr val="phClr">
-                <a:lumMod val="99000"/>
-                <a:satMod val="120000"/>
-                <a:shade val="78000"/>
-              </a:schemeClr>
-            </a:gs>
-          </a:gsLst>
-          <a:lin ang="5400000" scaled="0"/>
-        </a:gradFill>
+        <a:solidFill>
+          <a:schemeClr val="phClr">
+            <a:tint val="60000"/>
+            <a:satMod val="120000"/>
+          </a:schemeClr>
+        </a:solidFill>
+        <a:solidFill>
+          <a:schemeClr val="phClr">
+            <a:shade val="75000"/>
+            <a:satMod val="160000"/>
+          </a:schemeClr>
+        </a:solidFill>
       </a:fillStyleLst>
       <a:lnStyleLst>
-        <a:ln w="6350" cap="flat" cmpd="sng" algn="ctr">
+        <a:ln w="9525" cap="flat" cmpd="sng" algn="ctr">
           <a:solidFill>
             <a:schemeClr val="phClr"/>
           </a:solidFill>
           <a:prstDash val="solid"/>
-          <a:miter lim="800000"/>
         </a:ln>
-        <a:ln w="12700" cap="flat" cmpd="sng" algn="ctr">
+        <a:ln w="13970" cap="flat" cmpd="sng" algn="ctr">
           <a:solidFill>
             <a:schemeClr val="phClr"/>
           </a:solidFill>
           <a:prstDash val="solid"/>
-          <a:miter lim="800000"/>
         </a:ln>
-        <a:ln w="19050" cap="flat" cmpd="sng" algn="ctr">
+        <a:ln w="17145" cap="flat" cmpd="sng" algn="ctr">
           <a:solidFill>
-            <a:schemeClr val="phClr"/>
+            <a:schemeClr val="phClr">
+              <a:shade val="95000"/>
+              <a:alpha val="95000"/>
+              <a:satMod val="150000"/>
+            </a:schemeClr>
           </a:solidFill>
           <a:prstDash val="solid"/>
-          <a:miter lim="800000"/>
         </a:ln>
       </a:lnStyleLst>
       <a:effectStyleLst>
@@ -4907,16 +4936,52 @@
           <a:effectLst/>
         </a:effectStyle>
         <a:effectStyle>
-          <a:effectLst/>
+          <a:effectLst>
+            <a:outerShdw blurRad="50800" dist="15240" dir="5400000" algn="tl" rotWithShape="0">
+              <a:srgbClr val="000000">
+                <a:alpha val="75000"/>
+              </a:srgbClr>
+            </a:outerShdw>
+          </a:effectLst>
+          <a:scene3d>
+            <a:camera prst="orthographicFront">
+              <a:rot lat="0" lon="0" rev="0"/>
+            </a:camera>
+            <a:lightRig rig="brightRoom" dir="tl"/>
+          </a:scene3d>
+          <a:sp3d contourW="9525" prstMaterial="flat">
+            <a:bevelT w="0" h="0" prst="coolSlant"/>
+            <a:contourClr>
+              <a:schemeClr val="phClr">
+                <a:shade val="35000"/>
+                <a:satMod val="130000"/>
+              </a:schemeClr>
+            </a:contourClr>
+          </a:sp3d>
         </a:effectStyle>
         <a:effectStyle>
           <a:effectLst>
-            <a:outerShdw blurRad="57150" dist="19050" dir="5400000" algn="ctr" rotWithShape="0">
+            <a:outerShdw blurRad="76200" dist="25400" dir="5400000" algn="tl" rotWithShape="0">
               <a:srgbClr val="000000">
-                <a:alpha val="63000"/>
+                <a:alpha val="55000"/>
               </a:srgbClr>
             </a:outerShdw>
           </a:effectLst>
+          <a:scene3d>
+            <a:camera prst="orthographicFront">
+              <a:rot lat="0" lon="0" rev="0"/>
+            </a:camera>
+            <a:lightRig rig="brightRoom" dir="tl"/>
+          </a:scene3d>
+          <a:sp3d contourW="19050" prstMaterial="flat">
+            <a:bevelT w="0" h="0" prst="coolSlant"/>
+            <a:contourClr>
+              <a:schemeClr val="phClr">
+                <a:shade val="25000"/>
+                <a:satMod val="140000"/>
+              </a:schemeClr>
+            </a:contourClr>
+          </a:sp3d>
         </a:effectStyle>
       </a:effectStyleLst>
       <a:bgFillStyleLst>
@@ -4933,28 +4998,23 @@
           <a:gsLst>
             <a:gs pos="0">
               <a:schemeClr val="phClr">
-                <a:tint val="93000"/>
-                <a:satMod val="150000"/>
+                <a:tint val="94000"/>
                 <a:shade val="98000"/>
+                <a:satMod val="130000"/>
                 <a:lumMod val="102000"/>
-              </a:schemeClr>
-            </a:gs>
-            <a:gs pos="50000">
-              <a:schemeClr val="phClr">
-                <a:tint val="98000"/>
-                <a:satMod val="130000"/>
-                <a:shade val="90000"/>
-                <a:lumMod val="103000"/>
               </a:schemeClr>
             </a:gs>
             <a:gs pos="100000">
               <a:schemeClr val="phClr">
-                <a:shade val="63000"/>
-                <a:satMod val="120000"/>
+                <a:tint val="98000"/>
+                <a:shade val="78000"/>
+                <a:satMod val="140000"/>
               </a:schemeClr>
             </a:gs>
           </a:gsLst>
-          <a:lin ang="5400000" scaled="0"/>
+          <a:path path="circle">
+            <a:fillToRect l="100000" t="100000" r="100000" b="100000"/>
+          </a:path>
         </a:gradFill>
       </a:bgFillStyleLst>
     </a:fmtScheme>
@@ -4963,7 +5023,7 @@
   <a:extraClrSchemeLst/>
   <a:extLst>
     <a:ext uri="{05A4C25C-085E-4340-85A3-A5531E510DB2}">
-      <thm15:themeFamily xmlns:thm15="http://schemas.microsoft.com/office/thememl/2012/main" name="Office Theme" id="{62F939B6-93AF-4DB8-9C6B-D6C7DFDC589F}" vid="{4A3C46E8-61CC-4603-A589-7422A47A8E4A}"/>
+      <thm15:themeFamily xmlns:thm15="http://schemas.microsoft.com/office/thememl/2012/main" name="View" id="{BA0EB5A6-F2D4-4F82-977B-64ADEE4A2A69}" vid="{3969A8A2-35DB-4E3B-8885-16FD20568674}"/>
     </a:ext>
   </a:extLst>
 </a:theme>

</xml_diff>

<commit_message>
Small Changes to the presentation
</commit_message>
<xml_diff>
--- a/Crimson Clubs (Requirements).pptx
+++ b/Crimson Clubs (Requirements).pptx
@@ -11,17 +11,18 @@
     <p:sldId id="258" r:id="rId5"/>
     <p:sldId id="259" r:id="rId6"/>
     <p:sldId id="260" r:id="rId7"/>
-    <p:sldId id="263" r:id="rId8"/>
-    <p:sldId id="271" r:id="rId9"/>
-    <p:sldId id="262" r:id="rId10"/>
-    <p:sldId id="264" r:id="rId11"/>
-    <p:sldId id="273" r:id="rId12"/>
-    <p:sldId id="274" r:id="rId13"/>
-    <p:sldId id="275" r:id="rId14"/>
-    <p:sldId id="276" r:id="rId15"/>
-    <p:sldId id="272" r:id="rId16"/>
-    <p:sldId id="266" r:id="rId17"/>
-    <p:sldId id="269" r:id="rId18"/>
+    <p:sldId id="277" r:id="rId8"/>
+    <p:sldId id="263" r:id="rId9"/>
+    <p:sldId id="271" r:id="rId10"/>
+    <p:sldId id="262" r:id="rId11"/>
+    <p:sldId id="264" r:id="rId12"/>
+    <p:sldId id="273" r:id="rId13"/>
+    <p:sldId id="274" r:id="rId14"/>
+    <p:sldId id="275" r:id="rId15"/>
+    <p:sldId id="276" r:id="rId16"/>
+    <p:sldId id="272" r:id="rId17"/>
+    <p:sldId id="266" r:id="rId18"/>
+    <p:sldId id="269" r:id="rId19"/>
   </p:sldIdLst>
   <p:sldSz cx="12192000" cy="6858000"/>
   <p:notesSz cx="6858000" cy="9144000"/>
@@ -3478,7 +3479,7 @@
           <p:cNvPr id="2" name="Title 1">
             <a:extLst>
               <a:ext uri="{FF2B5EF4-FFF2-40B4-BE49-F238E27FC236}">
-                <a16:creationId xmlns:a16="http://schemas.microsoft.com/office/drawing/2014/main" xmlns="" id="{477C7B4C-EAD8-45AE-BE2A-EA608AE8F9F1}"/>
+                <a16:creationId xmlns:a16="http://schemas.microsoft.com/office/drawing/2014/main" id="{477C7B4C-EAD8-45AE-BE2A-EA608AE8F9F1}"/>
               </a:ext>
             </a:extLst>
           </p:cNvPr>
@@ -3506,7 +3507,7 @@
           <p:cNvPr id="3" name="Subtitle 2">
             <a:extLst>
               <a:ext uri="{FF2B5EF4-FFF2-40B4-BE49-F238E27FC236}">
-                <a16:creationId xmlns:a16="http://schemas.microsoft.com/office/drawing/2014/main" xmlns="" id="{7C9C489E-E1D4-4C33-931B-BCA06CB6F998}"/>
+                <a16:creationId xmlns:a16="http://schemas.microsoft.com/office/drawing/2014/main" id="{7C9C489E-E1D4-4C33-931B-BCA06CB6F998}"/>
               </a:ext>
             </a:extLst>
           </p:cNvPr>
@@ -3567,38 +3568,15 @@
           <a:chExt cx="0" cy="0"/>
         </a:xfrm>
       </p:grpSpPr>
-      <p:pic>
-        <p:nvPicPr>
-          <p:cNvPr id="4" name="Content Placeholder 3"/>
-          <p:cNvPicPr>
-            <a:picLocks noGrp="1" noChangeAspect="1"/>
-          </p:cNvPicPr>
-          <p:nvPr>
-            <p:ph idx="1"/>
-          </p:nvPr>
-        </p:nvPicPr>
-        <p:blipFill>
-          <a:blip r:embed="rId2">
+      <p:sp>
+        <p:nvSpPr>
+          <p:cNvPr id="2" name="Title 1">
             <a:extLst>
-              <a:ext uri="{28A0092B-C50C-407E-A947-70E740481C1C}">
-                <a14:useLocalDpi xmlns:a14="http://schemas.microsoft.com/office/drawing/2010/main" val="0"/>
+              <a:ext uri="{FF2B5EF4-FFF2-40B4-BE49-F238E27FC236}">
+                <a16:creationId xmlns:a16="http://schemas.microsoft.com/office/drawing/2014/main" id="{6C4E2730-1D7B-4651-8B68-1D2515A5CE80}"/>
               </a:ext>
             </a:extLst>
-          </a:blip>
-          <a:stretch>
-            <a:fillRect/>
-          </a:stretch>
-        </p:blipFill>
-        <p:spPr>
-          <a:xfrm>
-            <a:off x="4116387" y="562753"/>
-            <a:ext cx="5906153" cy="5935758"/>
-          </a:xfrm>
-        </p:spPr>
-      </p:pic>
-      <p:sp>
-        <p:nvSpPr>
-          <p:cNvPr id="5" name="Title 4"/>
+          </p:cNvPr>
           <p:cNvSpPr>
             <a:spLocks noGrp="1"/>
           </p:cNvSpPr>
@@ -3612,17 +3590,41 @@
           <a:lstStyle/>
           <a:p>
             <a:r>
-              <a:rPr lang="en-US" dirty="0" smtClean="0"/>
-              <a:t>Add User</a:t>
-            </a:r>
-            <a:endParaRPr lang="en-US" dirty="0"/>
+              <a:rPr lang="en-US" dirty="0"/>
+              <a:t>Class Diagram</a:t>
+            </a:r>
+          </a:p>
+        </p:txBody>
+      </p:sp>
+      <p:sp>
+        <p:nvSpPr>
+          <p:cNvPr id="3" name="Content Placeholder 2">
+            <a:extLst>
+              <a:ext uri="{FF2B5EF4-FFF2-40B4-BE49-F238E27FC236}">
+                <a16:creationId xmlns:a16="http://schemas.microsoft.com/office/drawing/2014/main" id="{E279546A-AE2E-4085-AA67-4EB4D5F78254}"/>
+              </a:ext>
+            </a:extLst>
+          </p:cNvPr>
+          <p:cNvSpPr>
+            <a:spLocks noGrp="1"/>
+          </p:cNvSpPr>
+          <p:nvPr>
+            <p:ph idx="1"/>
+          </p:nvPr>
+        </p:nvSpPr>
+        <p:spPr/>
+        <p:txBody>
+          <a:bodyPr/>
+          <a:lstStyle/>
+          <a:p>
+            <a:endParaRPr lang="en-US"/>
           </a:p>
         </p:txBody>
       </p:sp>
     </p:spTree>
     <p:extLst>
       <p:ext uri="{BB962C8B-B14F-4D97-AF65-F5344CB8AC3E}">
-        <p14:creationId xmlns:p14="http://schemas.microsoft.com/office/powerpoint/2010/main" val="1570395640"/>
+        <p14:creationId xmlns:p14="http://schemas.microsoft.com/office/powerpoint/2010/main" val="278486715"/>
       </p:ext>
     </p:extLst>
   </p:cSld>
@@ -3673,8 +3675,8 @@
         </p:blipFill>
         <p:spPr>
           <a:xfrm>
-            <a:off x="6370352" y="365760"/>
-            <a:ext cx="2849848" cy="5871671"/>
+            <a:off x="4116387" y="562753"/>
+            <a:ext cx="5906153" cy="5935758"/>
           </a:xfrm>
         </p:spPr>
       </p:pic>
@@ -3694,17 +3696,16 @@
           <a:lstStyle/>
           <a:p>
             <a:r>
-              <a:rPr lang="en-US" dirty="0" smtClean="0"/>
-              <a:t>Create Event</a:t>
-            </a:r>
-            <a:endParaRPr lang="en-US" dirty="0"/>
+              <a:rPr lang="en-US" dirty="0"/>
+              <a:t>Add User</a:t>
+            </a:r>
           </a:p>
         </p:txBody>
       </p:sp>
     </p:spTree>
     <p:extLst>
       <p:ext uri="{BB962C8B-B14F-4D97-AF65-F5344CB8AC3E}">
-        <p14:creationId xmlns:p14="http://schemas.microsoft.com/office/powerpoint/2010/main" val="549276236"/>
+        <p14:creationId xmlns:p14="http://schemas.microsoft.com/office/powerpoint/2010/main" val="1570395640"/>
       </p:ext>
     </p:extLst>
   </p:cSld>
@@ -3731,6 +3732,87 @@
           <a:chExt cx="0" cy="0"/>
         </a:xfrm>
       </p:grpSpPr>
+      <p:pic>
+        <p:nvPicPr>
+          <p:cNvPr id="4" name="Content Placeholder 3"/>
+          <p:cNvPicPr>
+            <a:picLocks noGrp="1" noChangeAspect="1"/>
+          </p:cNvPicPr>
+          <p:nvPr>
+            <p:ph idx="1"/>
+          </p:nvPr>
+        </p:nvPicPr>
+        <p:blipFill>
+          <a:blip r:embed="rId2">
+            <a:extLst>
+              <a:ext uri="{28A0092B-C50C-407E-A947-70E740481C1C}">
+                <a14:useLocalDpi xmlns:a14="http://schemas.microsoft.com/office/drawing/2010/main" val="0"/>
+              </a:ext>
+            </a:extLst>
+          </a:blip>
+          <a:stretch>
+            <a:fillRect/>
+          </a:stretch>
+        </p:blipFill>
+        <p:spPr>
+          <a:xfrm>
+            <a:off x="6370352" y="365760"/>
+            <a:ext cx="2849848" cy="5871671"/>
+          </a:xfrm>
+        </p:spPr>
+      </p:pic>
+      <p:sp>
+        <p:nvSpPr>
+          <p:cNvPr id="5" name="Title 4"/>
+          <p:cNvSpPr>
+            <a:spLocks noGrp="1"/>
+          </p:cNvSpPr>
+          <p:nvPr>
+            <p:ph type="title"/>
+          </p:nvPr>
+        </p:nvSpPr>
+        <p:spPr/>
+        <p:txBody>
+          <a:bodyPr/>
+          <a:lstStyle/>
+          <a:p>
+            <a:r>
+              <a:rPr lang="en-US" dirty="0"/>
+              <a:t>Create Event</a:t>
+            </a:r>
+          </a:p>
+        </p:txBody>
+      </p:sp>
+    </p:spTree>
+    <p:extLst>
+      <p:ext uri="{BB962C8B-B14F-4D97-AF65-F5344CB8AC3E}">
+        <p14:creationId xmlns:p14="http://schemas.microsoft.com/office/powerpoint/2010/main" val="549276236"/>
+      </p:ext>
+    </p:extLst>
+  </p:cSld>
+  <p:clrMapOvr>
+    <a:masterClrMapping/>
+  </p:clrMapOvr>
+</p:sld>
+</file>
+
+<file path=ppt/slides/slide13.xml><?xml version="1.0" encoding="utf-8"?>
+<p:sld xmlns:a="http://schemas.openxmlformats.org/drawingml/2006/main" xmlns:r="http://schemas.openxmlformats.org/officeDocument/2006/relationships" xmlns:p="http://schemas.openxmlformats.org/presentationml/2006/main">
+  <p:cSld>
+    <p:spTree>
+      <p:nvGrpSpPr>
+        <p:cNvPr id="1" name=""/>
+        <p:cNvGrpSpPr/>
+        <p:nvPr/>
+      </p:nvGrpSpPr>
+      <p:grpSpPr>
+        <a:xfrm>
+          <a:off x="0" y="0"/>
+          <a:ext cx="0" cy="0"/>
+          <a:chOff x="0" y="0"/>
+          <a:chExt cx="0" cy="0"/>
+        </a:xfrm>
+      </p:grpSpPr>
       <p:sp>
         <p:nvSpPr>
           <p:cNvPr id="2" name="Title 1"/>
@@ -3747,17 +3829,16 @@
           <a:lstStyle/>
           <a:p>
             <a:r>
-              <a:rPr lang="en-US" dirty="0" smtClean="0"/>
+              <a:rPr lang="en-US" dirty="0"/>
               <a:t>Display Personal</a:t>
             </a:r>
             <a:br>
-              <a:rPr lang="en-US" dirty="0" smtClean="0"/>
+              <a:rPr lang="en-US" dirty="0"/>
             </a:br>
             <a:r>
-              <a:rPr lang="en-US" dirty="0" smtClean="0"/>
+              <a:rPr lang="en-US" dirty="0"/>
               <a:t> Calendar</a:t>
             </a:r>
-            <a:endParaRPr lang="en-US" dirty="0"/>
           </a:p>
         </p:txBody>
       </p:sp>
@@ -3803,7 +3884,7 @@
 </p:sld>
 </file>
 
-<file path=ppt/slides/slide13.xml><?xml version="1.0" encoding="utf-8"?>
+<file path=ppt/slides/slide14.xml><?xml version="1.0" encoding="utf-8"?>
 <p:sld xmlns:a="http://schemas.openxmlformats.org/drawingml/2006/main" xmlns:r="http://schemas.openxmlformats.org/officeDocument/2006/relationships" xmlns:p="http://schemas.openxmlformats.org/presentationml/2006/main">
   <p:cSld>
     <p:spTree>
@@ -3836,10 +3917,9 @@
           <a:lstStyle/>
           <a:p>
             <a:r>
-              <a:rPr lang="en-US" dirty="0" smtClean="0"/>
+              <a:rPr lang="en-US" dirty="0"/>
               <a:t>Search Clubs</a:t>
             </a:r>
-            <a:endParaRPr lang="en-US" dirty="0"/>
           </a:p>
         </p:txBody>
       </p:sp>
@@ -3885,7 +3965,7 @@
 </p:sld>
 </file>
 
-<file path=ppt/slides/slide14.xml><?xml version="1.0" encoding="utf-8"?>
+<file path=ppt/slides/slide15.xml><?xml version="1.0" encoding="utf-8"?>
 <p:sld xmlns:a="http://schemas.openxmlformats.org/drawingml/2006/main" xmlns:r="http://schemas.openxmlformats.org/officeDocument/2006/relationships" xmlns:p="http://schemas.openxmlformats.org/presentationml/2006/main">
   <p:cSld>
     <p:spTree>
@@ -3918,10 +3998,9 @@
           <a:lstStyle/>
           <a:p>
             <a:r>
-              <a:rPr lang="en-US" dirty="0" smtClean="0"/>
+              <a:rPr lang="en-US" dirty="0"/>
               <a:t>Update Club Info</a:t>
             </a:r>
-            <a:endParaRPr lang="en-US" dirty="0"/>
           </a:p>
         </p:txBody>
       </p:sp>
@@ -3967,89 +4046,6 @@
 </p:sld>
 </file>
 
-<file path=ppt/slides/slide15.xml><?xml version="1.0" encoding="utf-8"?>
-<p:sld xmlns:a="http://schemas.openxmlformats.org/drawingml/2006/main" xmlns:r="http://schemas.openxmlformats.org/officeDocument/2006/relationships" xmlns:p="http://schemas.openxmlformats.org/presentationml/2006/main">
-  <p:cSld>
-    <p:spTree>
-      <p:nvGrpSpPr>
-        <p:cNvPr id="1" name=""/>
-        <p:cNvGrpSpPr/>
-        <p:nvPr/>
-      </p:nvGrpSpPr>
-      <p:grpSpPr>
-        <a:xfrm>
-          <a:off x="0" y="0"/>
-          <a:ext cx="0" cy="0"/>
-          <a:chOff x="0" y="0"/>
-          <a:chExt cx="0" cy="0"/>
-        </a:xfrm>
-      </p:grpSpPr>
-      <p:sp>
-        <p:nvSpPr>
-          <p:cNvPr id="2" name="Title 1">
-            <a:extLst>
-              <a:ext uri="{FF2B5EF4-FFF2-40B4-BE49-F238E27FC236}">
-                <a16:creationId xmlns:a16="http://schemas.microsoft.com/office/drawing/2014/main" xmlns="" id="{E02B442C-A78C-4B94-B8D0-641237F750F0}"/>
-              </a:ext>
-            </a:extLst>
-          </p:cNvPr>
-          <p:cNvSpPr>
-            <a:spLocks noGrp="1"/>
-          </p:cNvSpPr>
-          <p:nvPr>
-            <p:ph type="title"/>
-          </p:nvPr>
-        </p:nvSpPr>
-        <p:spPr/>
-        <p:txBody>
-          <a:bodyPr/>
-          <a:lstStyle/>
-          <a:p>
-            <a:r>
-              <a:rPr lang="en-US" dirty="0"/>
-              <a:t>Database Diagram</a:t>
-            </a:r>
-          </a:p>
-        </p:txBody>
-      </p:sp>
-      <p:sp>
-        <p:nvSpPr>
-          <p:cNvPr id="3" name="Content Placeholder 2">
-            <a:extLst>
-              <a:ext uri="{FF2B5EF4-FFF2-40B4-BE49-F238E27FC236}">
-                <a16:creationId xmlns:a16="http://schemas.microsoft.com/office/drawing/2014/main" xmlns="" id="{A189EF5C-3D0B-451F-BE20-83C111832D96}"/>
-              </a:ext>
-            </a:extLst>
-          </p:cNvPr>
-          <p:cNvSpPr>
-            <a:spLocks noGrp="1"/>
-          </p:cNvSpPr>
-          <p:nvPr>
-            <p:ph idx="1"/>
-          </p:nvPr>
-        </p:nvSpPr>
-        <p:spPr/>
-        <p:txBody>
-          <a:bodyPr/>
-          <a:lstStyle/>
-          <a:p>
-            <a:endParaRPr lang="en-US"/>
-          </a:p>
-        </p:txBody>
-      </p:sp>
-    </p:spTree>
-    <p:extLst>
-      <p:ext uri="{BB962C8B-B14F-4D97-AF65-F5344CB8AC3E}">
-        <p14:creationId xmlns:p14="http://schemas.microsoft.com/office/powerpoint/2010/main" val="2993713172"/>
-      </p:ext>
-    </p:extLst>
-  </p:cSld>
-  <p:clrMapOvr>
-    <a:masterClrMapping/>
-  </p:clrMapOvr>
-</p:sld>
-</file>
-
 <file path=ppt/slides/slide16.xml><?xml version="1.0" encoding="utf-8"?>
 <p:sld xmlns:a="http://schemas.openxmlformats.org/drawingml/2006/main" xmlns:r="http://schemas.openxmlformats.org/officeDocument/2006/relationships" xmlns:p="http://schemas.openxmlformats.org/presentationml/2006/main">
   <p:cSld>
@@ -4072,7 +4068,7 @@
           <p:cNvPr id="2" name="Title 1">
             <a:extLst>
               <a:ext uri="{FF2B5EF4-FFF2-40B4-BE49-F238E27FC236}">
-                <a16:creationId xmlns:a16="http://schemas.microsoft.com/office/drawing/2014/main" xmlns="" id="{C96486E1-9669-4FD4-A6A4-9A741B10518C}"/>
+                <a16:creationId xmlns:a16="http://schemas.microsoft.com/office/drawing/2014/main" id="{E02B442C-A78C-4B94-B8D0-641237F750F0}"/>
               </a:ext>
             </a:extLst>
           </p:cNvPr>
@@ -4090,7 +4086,7 @@
           <a:p>
             <a:r>
               <a:rPr lang="en-US" dirty="0"/>
-              <a:t>System Evolution</a:t>
+              <a:t>Database Diagram</a:t>
             </a:r>
           </a:p>
         </p:txBody>
@@ -4100,7 +4096,7 @@
           <p:cNvPr id="3" name="Content Placeholder 2">
             <a:extLst>
               <a:ext uri="{FF2B5EF4-FFF2-40B4-BE49-F238E27FC236}">
-                <a16:creationId xmlns:a16="http://schemas.microsoft.com/office/drawing/2014/main" xmlns="" id="{CFB07D61-2B5F-4F1D-B4BE-A803360792B3}"/>
+                <a16:creationId xmlns:a16="http://schemas.microsoft.com/office/drawing/2014/main" id="{A189EF5C-3D0B-451F-BE20-83C111832D96}"/>
               </a:ext>
             </a:extLst>
           </p:cNvPr>
@@ -4123,7 +4119,7 @@
     </p:spTree>
     <p:extLst>
       <p:ext uri="{BB962C8B-B14F-4D97-AF65-F5344CB8AC3E}">
-        <p14:creationId xmlns:p14="http://schemas.microsoft.com/office/powerpoint/2010/main" val="4002925672"/>
+        <p14:creationId xmlns:p14="http://schemas.microsoft.com/office/powerpoint/2010/main" val="2993713172"/>
       </p:ext>
     </p:extLst>
   </p:cSld>
@@ -4155,7 +4151,7 @@
           <p:cNvPr id="2" name="Title 1">
             <a:extLst>
               <a:ext uri="{FF2B5EF4-FFF2-40B4-BE49-F238E27FC236}">
-                <a16:creationId xmlns:a16="http://schemas.microsoft.com/office/drawing/2014/main" xmlns="" id="{642F46A1-65B2-4322-BA2F-9B65B842D8B5}"/>
+                <a16:creationId xmlns:a16="http://schemas.microsoft.com/office/drawing/2014/main" id="{C96486E1-9669-4FD4-A6A4-9A741B10518C}"/>
               </a:ext>
             </a:extLst>
           </p:cNvPr>
@@ -4173,7 +4169,7 @@
           <a:p>
             <a:r>
               <a:rPr lang="en-US" dirty="0"/>
-              <a:t>Potential Risks</a:t>
+              <a:t>System Evolution</a:t>
             </a:r>
           </a:p>
         </p:txBody>
@@ -4183,7 +4179,7 @@
           <p:cNvPr id="3" name="Content Placeholder 2">
             <a:extLst>
               <a:ext uri="{FF2B5EF4-FFF2-40B4-BE49-F238E27FC236}">
-                <a16:creationId xmlns:a16="http://schemas.microsoft.com/office/drawing/2014/main" xmlns="" id="{6E05FA0E-9C68-437B-90B5-4F41436F04AC}"/>
+                <a16:creationId xmlns:a16="http://schemas.microsoft.com/office/drawing/2014/main" id="{CFB07D61-2B5F-4F1D-B4BE-A803360792B3}"/>
               </a:ext>
             </a:extLst>
           </p:cNvPr>
@@ -4199,7 +4195,108 @@
           <a:bodyPr/>
           <a:lstStyle/>
           <a:p>
-            <a:endParaRPr lang="en-US"/>
+            <a:r>
+              <a:rPr lang="en-US" dirty="0"/>
+              <a:t>Intramural Referee tools</a:t>
+            </a:r>
+          </a:p>
+          <a:p>
+            <a:r>
+              <a:rPr lang="en-US" dirty="0"/>
+              <a:t>Club matching algorithm</a:t>
+            </a:r>
+          </a:p>
+          <a:p>
+            <a:endParaRPr lang="en-US" dirty="0"/>
+          </a:p>
+        </p:txBody>
+      </p:sp>
+    </p:spTree>
+    <p:extLst>
+      <p:ext uri="{BB962C8B-B14F-4D97-AF65-F5344CB8AC3E}">
+        <p14:creationId xmlns:p14="http://schemas.microsoft.com/office/powerpoint/2010/main" val="4002925672"/>
+      </p:ext>
+    </p:extLst>
+  </p:cSld>
+  <p:clrMapOvr>
+    <a:masterClrMapping/>
+  </p:clrMapOvr>
+</p:sld>
+</file>
+
+<file path=ppt/slides/slide18.xml><?xml version="1.0" encoding="utf-8"?>
+<p:sld xmlns:a="http://schemas.openxmlformats.org/drawingml/2006/main" xmlns:r="http://schemas.openxmlformats.org/officeDocument/2006/relationships" xmlns:p="http://schemas.openxmlformats.org/presentationml/2006/main">
+  <p:cSld>
+    <p:spTree>
+      <p:nvGrpSpPr>
+        <p:cNvPr id="1" name=""/>
+        <p:cNvGrpSpPr/>
+        <p:nvPr/>
+      </p:nvGrpSpPr>
+      <p:grpSpPr>
+        <a:xfrm>
+          <a:off x="0" y="0"/>
+          <a:ext cx="0" cy="0"/>
+          <a:chOff x="0" y="0"/>
+          <a:chExt cx="0" cy="0"/>
+        </a:xfrm>
+      </p:grpSpPr>
+      <p:sp>
+        <p:nvSpPr>
+          <p:cNvPr id="2" name="Title 1">
+            <a:extLst>
+              <a:ext uri="{FF2B5EF4-FFF2-40B4-BE49-F238E27FC236}">
+                <a16:creationId xmlns:a16="http://schemas.microsoft.com/office/drawing/2014/main" id="{642F46A1-65B2-4322-BA2F-9B65B842D8B5}"/>
+              </a:ext>
+            </a:extLst>
+          </p:cNvPr>
+          <p:cNvSpPr>
+            <a:spLocks noGrp="1"/>
+          </p:cNvSpPr>
+          <p:nvPr>
+            <p:ph type="title"/>
+          </p:nvPr>
+        </p:nvSpPr>
+        <p:spPr/>
+        <p:txBody>
+          <a:bodyPr/>
+          <a:lstStyle/>
+          <a:p>
+            <a:r>
+              <a:rPr lang="en-US" dirty="0"/>
+              <a:t>Potential Risks</a:t>
+            </a:r>
+          </a:p>
+        </p:txBody>
+      </p:sp>
+      <p:sp>
+        <p:nvSpPr>
+          <p:cNvPr id="3" name="Content Placeholder 2">
+            <a:extLst>
+              <a:ext uri="{FF2B5EF4-FFF2-40B4-BE49-F238E27FC236}">
+                <a16:creationId xmlns:a16="http://schemas.microsoft.com/office/drawing/2014/main" id="{6E05FA0E-9C68-437B-90B5-4F41436F04AC}"/>
+              </a:ext>
+            </a:extLst>
+          </p:cNvPr>
+          <p:cNvSpPr>
+            <a:spLocks noGrp="1"/>
+          </p:cNvSpPr>
+          <p:nvPr>
+            <p:ph idx="1"/>
+          </p:nvPr>
+        </p:nvSpPr>
+        <p:spPr/>
+        <p:txBody>
+          <a:bodyPr/>
+          <a:lstStyle/>
+          <a:p>
+            <a:r>
+              <a:rPr lang="en-US" dirty="0"/>
+              <a:t>Security (login and personal information)</a:t>
+            </a:r>
+          </a:p>
+          <a:p>
+            <a:endParaRPr lang="en-US" dirty="0"/>
           </a:p>
         </p:txBody>
       </p:sp>
@@ -4238,7 +4335,7 @@
           <p:cNvPr id="2" name="Title 1">
             <a:extLst>
               <a:ext uri="{FF2B5EF4-FFF2-40B4-BE49-F238E27FC236}">
-                <a16:creationId xmlns:a16="http://schemas.microsoft.com/office/drawing/2014/main" xmlns="" id="{F9B5D511-1E1A-42A3-B869-45523D04EA63}"/>
+                <a16:creationId xmlns:a16="http://schemas.microsoft.com/office/drawing/2014/main" id="{F9B5D511-1E1A-42A3-B869-45523D04EA63}"/>
               </a:ext>
             </a:extLst>
           </p:cNvPr>
@@ -4256,7 +4353,7 @@
           <a:p>
             <a:r>
               <a:rPr lang="en-US" dirty="0"/>
-              <a:t>Description Review</a:t>
+              <a:t>Review</a:t>
             </a:r>
           </a:p>
         </p:txBody>
@@ -4266,7 +4363,7 @@
           <p:cNvPr id="3" name="Content Placeholder 2">
             <a:extLst>
               <a:ext uri="{FF2B5EF4-FFF2-40B4-BE49-F238E27FC236}">
-                <a16:creationId xmlns:a16="http://schemas.microsoft.com/office/drawing/2014/main" xmlns="" id="{6FD9B3FB-D65F-44E4-AB8D-BA6E36BB0B91}"/>
+                <a16:creationId xmlns:a16="http://schemas.microsoft.com/office/drawing/2014/main" id="{6FD9B3FB-D65F-44E4-AB8D-BA6E36BB0B91}"/>
               </a:ext>
             </a:extLst>
           </p:cNvPr>
@@ -4282,7 +4379,25 @@
           <a:bodyPr/>
           <a:lstStyle/>
           <a:p>
-            <a:endParaRPr lang="en-US" b="1" dirty="0"/>
+            <a:r>
+              <a:rPr lang="en-US" dirty="0"/>
+              <a:t>App/Website</a:t>
+            </a:r>
+          </a:p>
+          <a:p>
+            <a:r>
+              <a:rPr lang="en-US" dirty="0"/>
+              <a:t>Allows students to manage their clubs and teams</a:t>
+            </a:r>
+          </a:p>
+          <a:p>
+            <a:r>
+              <a:rPr lang="en-US" dirty="0"/>
+              <a:t>Can work for clubs/intramurals/informal groups</a:t>
+            </a:r>
+          </a:p>
+          <a:p>
+            <a:endParaRPr lang="en-US" dirty="0"/>
           </a:p>
         </p:txBody>
       </p:sp>
@@ -4321,7 +4436,7 @@
           <p:cNvPr id="2" name="Title 1">
             <a:extLst>
               <a:ext uri="{FF2B5EF4-FFF2-40B4-BE49-F238E27FC236}">
-                <a16:creationId xmlns:a16="http://schemas.microsoft.com/office/drawing/2014/main" xmlns="" id="{E5FBBCDE-D3D1-4218-A02E-EA5A9FCFED54}"/>
+                <a16:creationId xmlns:a16="http://schemas.microsoft.com/office/drawing/2014/main" id="{E5FBBCDE-D3D1-4218-A02E-EA5A9FCFED54}"/>
               </a:ext>
             </a:extLst>
           </p:cNvPr>
@@ -4349,7 +4464,7 @@
           <p:cNvPr id="3" name="Content Placeholder 2">
             <a:extLst>
               <a:ext uri="{FF2B5EF4-FFF2-40B4-BE49-F238E27FC236}">
-                <a16:creationId xmlns:a16="http://schemas.microsoft.com/office/drawing/2014/main" xmlns="" id="{26726A4B-3027-4B2E-A0C1-FCF60C560703}"/>
+                <a16:creationId xmlns:a16="http://schemas.microsoft.com/office/drawing/2014/main" id="{26726A4B-3027-4B2E-A0C1-FCF60C560703}"/>
               </a:ext>
             </a:extLst>
           </p:cNvPr>
@@ -4422,7 +4537,7 @@
           <p:cNvPr id="2" name="Title 1">
             <a:extLst>
               <a:ext uri="{FF2B5EF4-FFF2-40B4-BE49-F238E27FC236}">
-                <a16:creationId xmlns:a16="http://schemas.microsoft.com/office/drawing/2014/main" xmlns="" id="{9CFB58D7-CB7F-410F-8820-4B6E9B80F44A}"/>
+                <a16:creationId xmlns:a16="http://schemas.microsoft.com/office/drawing/2014/main" id="{9CFB58D7-CB7F-410F-8820-4B6E9B80F44A}"/>
               </a:ext>
             </a:extLst>
           </p:cNvPr>
@@ -4450,7 +4565,7 @@
           <p:cNvPr id="3" name="Content Placeholder 2">
             <a:extLst>
               <a:ext uri="{FF2B5EF4-FFF2-40B4-BE49-F238E27FC236}">
-                <a16:creationId xmlns:a16="http://schemas.microsoft.com/office/drawing/2014/main" xmlns="" id="{C4FAA8CE-F5AF-4311-B371-BA36A2A74638}"/>
+                <a16:creationId xmlns:a16="http://schemas.microsoft.com/office/drawing/2014/main" id="{C4FAA8CE-F5AF-4311-B371-BA36A2A74638}"/>
               </a:ext>
             </a:extLst>
           </p:cNvPr>
@@ -4559,7 +4674,7 @@
           <p:cNvPr id="2" name="Title 1">
             <a:extLst>
               <a:ext uri="{FF2B5EF4-FFF2-40B4-BE49-F238E27FC236}">
-                <a16:creationId xmlns:a16="http://schemas.microsoft.com/office/drawing/2014/main" xmlns="" id="{A4A78AF0-B0BF-408F-915A-F6150028E0BE}"/>
+                <a16:creationId xmlns:a16="http://schemas.microsoft.com/office/drawing/2014/main" id="{A4A78AF0-B0BF-408F-915A-F6150028E0BE}"/>
               </a:ext>
             </a:extLst>
           </p:cNvPr>
@@ -4587,7 +4702,7 @@
           <p:cNvPr id="3" name="Content Placeholder 2">
             <a:extLst>
               <a:ext uri="{FF2B5EF4-FFF2-40B4-BE49-F238E27FC236}">
-                <a16:creationId xmlns:a16="http://schemas.microsoft.com/office/drawing/2014/main" xmlns="" id="{1DC44817-CA2F-45E2-8B6F-3FC58E037D6C}"/>
+                <a16:creationId xmlns:a16="http://schemas.microsoft.com/office/drawing/2014/main" id="{1DC44817-CA2F-45E2-8B6F-3FC58E037D6C}"/>
               </a:ext>
             </a:extLst>
           </p:cNvPr>
@@ -4705,7 +4820,7 @@
           <p:cNvPr id="2" name="Title 1">
             <a:extLst>
               <a:ext uri="{FF2B5EF4-FFF2-40B4-BE49-F238E27FC236}">
-                <a16:creationId xmlns:a16="http://schemas.microsoft.com/office/drawing/2014/main" xmlns="" id="{6C97435F-1751-4590-A673-0EBD8B4E9DE8}"/>
+                <a16:creationId xmlns:a16="http://schemas.microsoft.com/office/drawing/2014/main" id="{6C97435F-1751-4590-A673-0EBD8B4E9DE8}"/>
               </a:ext>
             </a:extLst>
           </p:cNvPr>
@@ -4733,7 +4848,7 @@
           <p:cNvPr id="3" name="Content Placeholder 2">
             <a:extLst>
               <a:ext uri="{FF2B5EF4-FFF2-40B4-BE49-F238E27FC236}">
-                <a16:creationId xmlns:a16="http://schemas.microsoft.com/office/drawing/2014/main" xmlns="" id="{B8237FEC-E5B4-4101-ABE3-40FD002B4042}"/>
+                <a16:creationId xmlns:a16="http://schemas.microsoft.com/office/drawing/2014/main" id="{B8237FEC-E5B4-4101-ABE3-40FD002B4042}"/>
               </a:ext>
             </a:extLst>
           </p:cNvPr>
@@ -4813,72 +4928,58 @@
           <a:chExt cx="0" cy="0"/>
         </a:xfrm>
       </p:grpSpPr>
-      <p:pic>
-        <p:nvPicPr>
-          <p:cNvPr id="5" name="Content Placeholder 4">
+      <p:sp>
+        <p:nvSpPr>
+          <p:cNvPr id="2" name="Title 1">
             <a:extLst>
               <a:ext uri="{FF2B5EF4-FFF2-40B4-BE49-F238E27FC236}">
-                <a16:creationId xmlns:a16="http://schemas.microsoft.com/office/drawing/2014/main" xmlns="" id="{64743305-3B93-4D29-A826-D92D8D0755C4}"/>
+                <a16:creationId xmlns:a16="http://schemas.microsoft.com/office/drawing/2014/main" id="{02EDD2D6-253E-4E4E-A149-F13C8AB9F10C}"/>
               </a:ext>
             </a:extLst>
           </p:cNvPr>
-          <p:cNvPicPr>
-            <a:picLocks noGrp="1" noChangeAspect="1"/>
-          </p:cNvPicPr>
-          <p:nvPr>
-            <p:ph idx="1"/>
-          </p:nvPr>
-        </p:nvPicPr>
-        <p:blipFill>
-          <a:blip r:embed="rId2">
-            <a:extLst>
-              <a:ext uri="{28A0092B-C50C-407E-A947-70E740481C1C}">
-                <a14:useLocalDpi xmlns:a14="http://schemas.microsoft.com/office/drawing/2010/main" val="0"/>
-              </a:ext>
-            </a:extLst>
-          </a:blip>
-          <a:stretch>
-            <a:fillRect/>
-          </a:stretch>
-        </p:blipFill>
-        <p:spPr>
-          <a:xfrm>
-            <a:off x="4086880" y="138546"/>
-            <a:ext cx="6432150" cy="6353711"/>
-          </a:xfrm>
-        </p:spPr>
-      </p:pic>
-      <p:sp>
-        <p:nvSpPr>
-          <p:cNvPr id="8" name="TextBox 7">
+          <p:cNvSpPr>
+            <a:spLocks noGrp="1"/>
+          </p:cNvSpPr>
+          <p:nvPr>
+            <p:ph type="title"/>
+          </p:nvPr>
+        </p:nvSpPr>
+        <p:spPr/>
+        <p:txBody>
+          <a:bodyPr/>
+          <a:lstStyle/>
+          <a:p>
+            <a:r>
+              <a:rPr lang="en-US" dirty="0"/>
+              <a:t>Discussion of what is required/possible/low priority/future</a:t>
+            </a:r>
+          </a:p>
+        </p:txBody>
+      </p:sp>
+      <p:sp>
+        <p:nvSpPr>
+          <p:cNvPr id="3" name="Content Placeholder 2">
             <a:extLst>
               <a:ext uri="{FF2B5EF4-FFF2-40B4-BE49-F238E27FC236}">
-                <a16:creationId xmlns:a16="http://schemas.microsoft.com/office/drawing/2014/main" xmlns="" id="{895DDFE7-C656-42DC-B800-408DD11F183C}"/>
+                <a16:creationId xmlns:a16="http://schemas.microsoft.com/office/drawing/2014/main" id="{93CC6E2C-64D5-4B07-A0DA-2CB675EE406E}"/>
               </a:ext>
             </a:extLst>
           </p:cNvPr>
-          <p:cNvSpPr txBox="1"/>
-          <p:nvPr/>
-        </p:nvSpPr>
-        <p:spPr>
-          <a:xfrm>
-            <a:off x="563372" y="249381"/>
-            <a:ext cx="2484628" cy="2554545"/>
-          </a:xfrm>
-          <a:prstGeom prst="rect">
-            <a:avLst/>
-          </a:prstGeom>
-          <a:noFill/>
-        </p:spPr>
-        <p:txBody>
-          <a:bodyPr wrap="square" rtlCol="0">
-            <a:spAutoFit/>
-          </a:bodyPr>
-          <a:lstStyle/>
-          <a:p>
-            <a:r>
-              <a:rPr lang="en-US" sz="4000" dirty="0"/>
-              <a:t>Normal User Use Case Diagram</a:t>
+          <p:cNvSpPr>
+            <a:spLocks noGrp="1"/>
+          </p:cNvSpPr>
+          <p:nvPr>
+            <p:ph idx="1"/>
+          </p:nvPr>
+        </p:nvSpPr>
+        <p:spPr/>
+        <p:txBody>
+          <a:bodyPr/>
+          <a:lstStyle/>
+          <a:p>
+            <a:r>
+              <a:rPr lang="en-US" dirty="0"/>
+              <a:t>I’m not totally sure if we need this slide or if it can be merged with the requirements slides or the System evolution slide.</a:t>
             </a:r>
           </a:p>
         </p:txBody>
@@ -4886,7 +4987,7 @@
     </p:spTree>
     <p:extLst>
       <p:ext uri="{BB962C8B-B14F-4D97-AF65-F5344CB8AC3E}">
-        <p14:creationId xmlns:p14="http://schemas.microsoft.com/office/powerpoint/2010/main" val="2934480908"/>
+        <p14:creationId xmlns:p14="http://schemas.microsoft.com/office/powerpoint/2010/main" val="3259724479"/>
       </p:ext>
     </p:extLst>
   </p:cSld>
@@ -4913,51 +5014,12 @@
           <a:chExt cx="0" cy="0"/>
         </a:xfrm>
       </p:grpSpPr>
-      <p:sp>
-        <p:nvSpPr>
-          <p:cNvPr id="2" name="Title 1">
+      <p:pic>
+        <p:nvPicPr>
+          <p:cNvPr id="5" name="Content Placeholder 4">
             <a:extLst>
               <a:ext uri="{FF2B5EF4-FFF2-40B4-BE49-F238E27FC236}">
-                <a16:creationId xmlns:a16="http://schemas.microsoft.com/office/drawing/2014/main" xmlns="" id="{EC30254C-B3A4-448B-8ED8-220C2E4C25EA}"/>
-              </a:ext>
-            </a:extLst>
-          </p:cNvPr>
-          <p:cNvSpPr>
-            <a:spLocks noGrp="1"/>
-          </p:cNvSpPr>
-          <p:nvPr>
-            <p:ph type="title"/>
-          </p:nvPr>
-        </p:nvSpPr>
-        <p:spPr>
-          <a:xfrm>
-            <a:off x="563372" y="249381"/>
-            <a:ext cx="2996619" cy="4396740"/>
-          </a:xfrm>
-        </p:spPr>
-        <p:txBody>
-          <a:bodyPr>
-            <a:normAutofit/>
-          </a:bodyPr>
-          <a:lstStyle/>
-          <a:p>
-            <a:r>
-              <a:rPr lang="en-US" dirty="0"/>
-              <a:t/>
-            </a:r>
-            <a:br>
-              <a:rPr lang="en-US" dirty="0"/>
-            </a:br>
-            <a:endParaRPr lang="en-US" dirty="0"/>
-          </a:p>
-        </p:txBody>
-      </p:sp>
-      <p:pic>
-        <p:nvPicPr>
-          <p:cNvPr id="7" name="Content Placeholder 6">
-            <a:extLst>
-              <a:ext uri="{FF2B5EF4-FFF2-40B4-BE49-F238E27FC236}">
-                <a16:creationId xmlns:a16="http://schemas.microsoft.com/office/drawing/2014/main" xmlns="" id="{41611B0C-A7FD-49C2-A66E-F7B0AE3D71AD}"/>
+                <a16:creationId xmlns:a16="http://schemas.microsoft.com/office/drawing/2014/main" id="{64743305-3B93-4D29-A826-D92D8D0755C4}"/>
               </a:ext>
             </a:extLst>
           </p:cNvPr>
@@ -4982,8 +5044,8 @@
         </p:blipFill>
         <p:spPr>
           <a:xfrm>
-            <a:off x="3925981" y="249381"/>
-            <a:ext cx="6767703" cy="6022110"/>
+            <a:off x="4086880" y="138546"/>
+            <a:ext cx="6432150" cy="6353711"/>
           </a:xfrm>
         </p:spPr>
       </p:pic>
@@ -4992,7 +5054,7 @@
           <p:cNvPr id="8" name="TextBox 7">
             <a:extLst>
               <a:ext uri="{FF2B5EF4-FFF2-40B4-BE49-F238E27FC236}">
-                <a16:creationId xmlns:a16="http://schemas.microsoft.com/office/drawing/2014/main" xmlns="" id="{FA95455C-C973-4F55-80EE-7E2D6B95A590}"/>
+                <a16:creationId xmlns:a16="http://schemas.microsoft.com/office/drawing/2014/main" id="{895DDFE7-C656-42DC-B800-408DD11F183C}"/>
               </a:ext>
             </a:extLst>
           </p:cNvPr>
@@ -5017,7 +5079,7 @@
           <a:p>
             <a:r>
               <a:rPr lang="en-US" sz="4000" dirty="0"/>
-              <a:t>Admin User Use Case Diagram</a:t>
+              <a:t>Normal User Use Case Diagram</a:t>
             </a:r>
           </a:p>
         </p:txBody>
@@ -5025,7 +5087,7 @@
     </p:spTree>
     <p:extLst>
       <p:ext uri="{BB962C8B-B14F-4D97-AF65-F5344CB8AC3E}">
-        <p14:creationId xmlns:p14="http://schemas.microsoft.com/office/powerpoint/2010/main" val="410290249"/>
+        <p14:creationId xmlns:p14="http://schemas.microsoft.com/office/powerpoint/2010/main" val="2934480908"/>
       </p:ext>
     </p:extLst>
   </p:cSld>
@@ -5057,7 +5119,7 @@
           <p:cNvPr id="2" name="Title 1">
             <a:extLst>
               <a:ext uri="{FF2B5EF4-FFF2-40B4-BE49-F238E27FC236}">
-                <a16:creationId xmlns:a16="http://schemas.microsoft.com/office/drawing/2014/main" xmlns="" id="{6C4E2730-1D7B-4651-8B68-1D2515A5CE80}"/>
+                <a16:creationId xmlns:a16="http://schemas.microsoft.com/office/drawing/2014/main" id="{EC30254C-B3A4-448B-8ED8-220C2E4C25EA}"/>
               </a:ext>
             </a:extLst>
           </p:cNvPr>
@@ -5068,47 +5130,99 @@
             <p:ph type="title"/>
           </p:nvPr>
         </p:nvSpPr>
-        <p:spPr/>
-        <p:txBody>
-          <a:bodyPr/>
-          <a:lstStyle/>
-          <a:p>
-            <a:r>
+        <p:spPr>
+          <a:xfrm>
+            <a:off x="563372" y="249381"/>
+            <a:ext cx="2996619" cy="4396740"/>
+          </a:xfrm>
+        </p:spPr>
+        <p:txBody>
+          <a:bodyPr>
+            <a:normAutofit/>
+          </a:bodyPr>
+          <a:lstStyle/>
+          <a:p>
+            <a:br>
               <a:rPr lang="en-US" dirty="0"/>
-              <a:t>Class Diagram</a:t>
-            </a:r>
-          </a:p>
-        </p:txBody>
-      </p:sp>
-      <p:sp>
-        <p:nvSpPr>
-          <p:cNvPr id="3" name="Content Placeholder 2">
+            </a:br>
+            <a:endParaRPr lang="en-US" dirty="0"/>
+          </a:p>
+        </p:txBody>
+      </p:sp>
+      <p:pic>
+        <p:nvPicPr>
+          <p:cNvPr id="7" name="Content Placeholder 6">
             <a:extLst>
               <a:ext uri="{FF2B5EF4-FFF2-40B4-BE49-F238E27FC236}">
-                <a16:creationId xmlns:a16="http://schemas.microsoft.com/office/drawing/2014/main" xmlns="" id="{E279546A-AE2E-4085-AA67-4EB4D5F78254}"/>
+                <a16:creationId xmlns:a16="http://schemas.microsoft.com/office/drawing/2014/main" id="{41611B0C-A7FD-49C2-A66E-F7B0AE3D71AD}"/>
               </a:ext>
             </a:extLst>
           </p:cNvPr>
-          <p:cNvSpPr>
-            <a:spLocks noGrp="1"/>
-          </p:cNvSpPr>
+          <p:cNvPicPr>
+            <a:picLocks noGrp="1" noChangeAspect="1"/>
+          </p:cNvPicPr>
           <p:nvPr>
             <p:ph idx="1"/>
           </p:nvPr>
-        </p:nvSpPr>
-        <p:spPr/>
-        <p:txBody>
-          <a:bodyPr/>
-          <a:lstStyle/>
-          <a:p>
-            <a:endParaRPr lang="en-US"/>
+        </p:nvPicPr>
+        <p:blipFill>
+          <a:blip r:embed="rId2">
+            <a:extLst>
+              <a:ext uri="{28A0092B-C50C-407E-A947-70E740481C1C}">
+                <a14:useLocalDpi xmlns:a14="http://schemas.microsoft.com/office/drawing/2010/main" val="0"/>
+              </a:ext>
+            </a:extLst>
+          </a:blip>
+          <a:stretch>
+            <a:fillRect/>
+          </a:stretch>
+        </p:blipFill>
+        <p:spPr>
+          <a:xfrm>
+            <a:off x="3925981" y="249381"/>
+            <a:ext cx="6767703" cy="6022110"/>
+          </a:xfrm>
+        </p:spPr>
+      </p:pic>
+      <p:sp>
+        <p:nvSpPr>
+          <p:cNvPr id="8" name="TextBox 7">
+            <a:extLst>
+              <a:ext uri="{FF2B5EF4-FFF2-40B4-BE49-F238E27FC236}">
+                <a16:creationId xmlns:a16="http://schemas.microsoft.com/office/drawing/2014/main" id="{FA95455C-C973-4F55-80EE-7E2D6B95A590}"/>
+              </a:ext>
+            </a:extLst>
+          </p:cNvPr>
+          <p:cNvSpPr txBox="1"/>
+          <p:nvPr/>
+        </p:nvSpPr>
+        <p:spPr>
+          <a:xfrm>
+            <a:off x="563372" y="249381"/>
+            <a:ext cx="2484628" cy="2554545"/>
+          </a:xfrm>
+          <a:prstGeom prst="rect">
+            <a:avLst/>
+          </a:prstGeom>
+          <a:noFill/>
+        </p:spPr>
+        <p:txBody>
+          <a:bodyPr wrap="square" rtlCol="0">
+            <a:spAutoFit/>
+          </a:bodyPr>
+          <a:lstStyle/>
+          <a:p>
+            <a:r>
+              <a:rPr lang="en-US" sz="4000" dirty="0"/>
+              <a:t>Admin User Use Case Diagram</a:t>
+            </a:r>
           </a:p>
         </p:txBody>
       </p:sp>
     </p:spTree>
     <p:extLst>
       <p:ext uri="{BB962C8B-B14F-4D97-AF65-F5344CB8AC3E}">
-        <p14:creationId xmlns:p14="http://schemas.microsoft.com/office/powerpoint/2010/main" val="278486715"/>
+        <p14:creationId xmlns:p14="http://schemas.microsoft.com/office/powerpoint/2010/main" val="410290249"/>
       </p:ext>
     </p:extLst>
   </p:cSld>

</xml_diff>

<commit_message>
- Added database slide to requirements presentation
</commit_message>
<xml_diff>
--- a/Crimson Clubs (Requirements).pptx
+++ b/Crimson Clubs (Requirements).pptx
@@ -21,8 +21,9 @@
     <p:sldId id="275" r:id="rId15"/>
     <p:sldId id="276" r:id="rId16"/>
     <p:sldId id="272" r:id="rId17"/>
-    <p:sldId id="266" r:id="rId18"/>
-    <p:sldId id="269" r:id="rId19"/>
+    <p:sldId id="278" r:id="rId18"/>
+    <p:sldId id="266" r:id="rId19"/>
+    <p:sldId id="269" r:id="rId20"/>
   </p:sldIdLst>
   <p:sldSz cx="12192000" cy="6858000"/>
   <p:notesSz cx="6858000" cy="9144000"/>
@@ -301,7 +302,7 @@
           <a:p>
             <a:fld id="{DC614084-99CB-4937-A8D2-54BEE84FEE74}" type="datetimeFigureOut">
               <a:rPr lang="en-US" smtClean="0"/>
-              <a:t>2/26/2018</a:t>
+              <a:t>2/27/2018</a:t>
             </a:fld>
             <a:endParaRPr lang="en-US"/>
           </a:p>
@@ -529,7 +530,7 @@
           <a:p>
             <a:fld id="{DC614084-99CB-4937-A8D2-54BEE84FEE74}" type="datetimeFigureOut">
               <a:rPr lang="en-US" smtClean="0"/>
-              <a:t>2/26/2018</a:t>
+              <a:t>2/27/2018</a:t>
             </a:fld>
             <a:endParaRPr lang="en-US"/>
           </a:p>
@@ -709,7 +710,7 @@
           <a:p>
             <a:fld id="{DC614084-99CB-4937-A8D2-54BEE84FEE74}" type="datetimeFigureOut">
               <a:rPr lang="en-US" smtClean="0"/>
-              <a:t>2/26/2018</a:t>
+              <a:t>2/27/2018</a:t>
             </a:fld>
             <a:endParaRPr lang="en-US"/>
           </a:p>
@@ -879,7 +880,7 @@
           <a:p>
             <a:fld id="{DC614084-99CB-4937-A8D2-54BEE84FEE74}" type="datetimeFigureOut">
               <a:rPr lang="en-US" smtClean="0"/>
-              <a:t>2/26/2018</a:t>
+              <a:t>2/27/2018</a:t>
             </a:fld>
             <a:endParaRPr lang="en-US"/>
           </a:p>
@@ -1133,7 +1134,7 @@
           <a:p>
             <a:fld id="{DC614084-99CB-4937-A8D2-54BEE84FEE74}" type="datetimeFigureOut">
               <a:rPr lang="en-US" smtClean="0"/>
-              <a:t>2/26/2018</a:t>
+              <a:t>2/27/2018</a:t>
             </a:fld>
             <a:endParaRPr lang="en-US"/>
           </a:p>
@@ -1459,7 +1460,7 @@
           <a:p>
             <a:fld id="{DC614084-99CB-4937-A8D2-54BEE84FEE74}" type="datetimeFigureOut">
               <a:rPr lang="en-US" smtClean="0"/>
-              <a:t>2/26/2018</a:t>
+              <a:t>2/27/2018</a:t>
             </a:fld>
             <a:endParaRPr lang="en-US"/>
           </a:p>
@@ -1910,7 +1911,7 @@
           <a:p>
             <a:fld id="{DC614084-99CB-4937-A8D2-54BEE84FEE74}" type="datetimeFigureOut">
               <a:rPr lang="en-US" smtClean="0"/>
-              <a:t>2/26/2018</a:t>
+              <a:t>2/27/2018</a:t>
             </a:fld>
             <a:endParaRPr lang="en-US"/>
           </a:p>
@@ -2028,7 +2029,7 @@
           <a:p>
             <a:fld id="{DC614084-99CB-4937-A8D2-54BEE84FEE74}" type="datetimeFigureOut">
               <a:rPr lang="en-US" smtClean="0"/>
-              <a:t>2/26/2018</a:t>
+              <a:t>2/27/2018</a:t>
             </a:fld>
             <a:endParaRPr lang="en-US"/>
           </a:p>
@@ -2123,7 +2124,7 @@
           <a:p>
             <a:fld id="{DC614084-99CB-4937-A8D2-54BEE84FEE74}" type="datetimeFigureOut">
               <a:rPr lang="en-US" smtClean="0"/>
-              <a:t>2/26/2018</a:t>
+              <a:t>2/27/2018</a:t>
             </a:fld>
             <a:endParaRPr lang="en-US"/>
           </a:p>
@@ -2410,7 +2411,7 @@
           <a:p>
             <a:fld id="{DC614084-99CB-4937-A8D2-54BEE84FEE74}" type="datetimeFigureOut">
               <a:rPr lang="en-US" smtClean="0"/>
-              <a:t>2/26/2018</a:t>
+              <a:t>2/27/2018</a:t>
             </a:fld>
             <a:endParaRPr lang="en-US"/>
           </a:p>
@@ -2732,7 +2733,7 @@
           <a:p>
             <a:fld id="{DC614084-99CB-4937-A8D2-54BEE84FEE74}" type="datetimeFigureOut">
               <a:rPr lang="en-US" smtClean="0"/>
-              <a:t>2/26/2018</a:t>
+              <a:t>2/27/2018</a:t>
             </a:fld>
             <a:endParaRPr lang="en-US"/>
           </a:p>
@@ -2986,7 +2987,7 @@
           <a:p>
             <a:fld id="{DC614084-99CB-4937-A8D2-54BEE84FEE74}" type="datetimeFigureOut">
               <a:rPr lang="en-US" smtClean="0"/>
-              <a:t>2/26/2018</a:t>
+              <a:t>2/27/2018</a:t>
             </a:fld>
             <a:endParaRPr lang="en-US"/>
           </a:p>
@@ -3548,6 +3549,13 @@
   <p:clrMapOvr>
     <a:masterClrMapping/>
   </p:clrMapOvr>
+  <p:timing>
+    <p:tnLst>
+      <p:par>
+        <p:cTn id="1" dur="indefinite" restart="never" nodeType="tmRoot"/>
+      </p:par>
+    </p:tnLst>
+  </p:timing>
 </p:sld>
 </file>
 
@@ -3631,6 +3639,13 @@
   <p:clrMapOvr>
     <a:masterClrMapping/>
   </p:clrMapOvr>
+  <p:timing>
+    <p:tnLst>
+      <p:par>
+        <p:cTn id="1" dur="indefinite" restart="never" nodeType="tmRoot"/>
+      </p:par>
+    </p:tnLst>
+  </p:timing>
 </p:sld>
 </file>
 
@@ -3712,6 +3727,13 @@
   <p:clrMapOvr>
     <a:masterClrMapping/>
   </p:clrMapOvr>
+  <p:timing>
+    <p:tnLst>
+      <p:par>
+        <p:cTn id="1" dur="indefinite" restart="never" nodeType="tmRoot"/>
+      </p:par>
+    </p:tnLst>
+  </p:timing>
 </p:sld>
 </file>
 
@@ -3793,6 +3815,13 @@
   <p:clrMapOvr>
     <a:masterClrMapping/>
   </p:clrMapOvr>
+  <p:timing>
+    <p:tnLst>
+      <p:par>
+        <p:cTn id="1" dur="indefinite" restart="never" nodeType="tmRoot"/>
+      </p:par>
+    </p:tnLst>
+  </p:timing>
 </p:sld>
 </file>
 
@@ -3881,6 +3910,13 @@
   <p:clrMapOvr>
     <a:masterClrMapping/>
   </p:clrMapOvr>
+  <p:timing>
+    <p:tnLst>
+      <p:par>
+        <p:cTn id="1" dur="indefinite" restart="never" nodeType="tmRoot"/>
+      </p:par>
+    </p:tnLst>
+  </p:timing>
 </p:sld>
 </file>
 
@@ -3962,6 +3998,13 @@
   <p:clrMapOvr>
     <a:masterClrMapping/>
   </p:clrMapOvr>
+  <p:timing>
+    <p:tnLst>
+      <p:par>
+        <p:cTn id="1" dur="indefinite" restart="never" nodeType="tmRoot"/>
+      </p:par>
+    </p:tnLst>
+  </p:timing>
 </p:sld>
 </file>
 
@@ -4043,6 +4086,13 @@
   <p:clrMapOvr>
     <a:masterClrMapping/>
   </p:clrMapOvr>
+  <p:timing>
+    <p:tnLst>
+      <p:par>
+        <p:cTn id="1" dur="indefinite" restart="never" nodeType="tmRoot"/>
+      </p:par>
+    </p:tnLst>
+  </p:timing>
 </p:sld>
 </file>
 
@@ -4084,34 +4134,3921 @@
           <a:bodyPr/>
           <a:lstStyle/>
           <a:p>
-            <a:r>
-              <a:rPr lang="en-US" dirty="0"/>
-              <a:t>Database Diagram</a:t>
-            </a:r>
+            <a:endParaRPr lang="en-US" dirty="0"/>
           </a:p>
         </p:txBody>
       </p:sp>
-      <p:sp>
-        <p:nvSpPr>
-          <p:cNvPr id="3" name="Content Placeholder 2">
-            <a:extLst>
-              <a:ext uri="{FF2B5EF4-FFF2-40B4-BE49-F238E27FC236}">
-                <a16:creationId xmlns:a16="http://schemas.microsoft.com/office/drawing/2014/main" id="{A189EF5C-3D0B-451F-BE20-83C111832D96}"/>
-              </a:ext>
-            </a:extLst>
-          </p:cNvPr>
-          <p:cNvSpPr>
-            <a:spLocks noGrp="1"/>
-          </p:cNvSpPr>
+      <p:pic>
+        <p:nvPicPr>
+          <p:cNvPr id="4" name="Content Placeholder 3"/>
+          <p:cNvPicPr>
+            <a:picLocks noGrp="1" noChangeAspect="1"/>
+          </p:cNvPicPr>
           <p:nvPr>
             <p:ph idx="1"/>
           </p:nvPr>
-        </p:nvSpPr>
-        <p:spPr/>
+        </p:nvPicPr>
+        <p:blipFill>
+          <a:blip r:embed="rId2">
+            <a:extLst>
+              <a:ext uri="{28A0092B-C50C-407E-A947-70E740481C1C}">
+                <a14:useLocalDpi xmlns:a14="http://schemas.microsoft.com/office/drawing/2010/main" val="0"/>
+              </a:ext>
+            </a:extLst>
+          </a:blip>
+          <a:stretch>
+            <a:fillRect/>
+          </a:stretch>
+        </p:blipFill>
+        <p:spPr>
+          <a:xfrm>
+            <a:off x="588936" y="124519"/>
+            <a:ext cx="10516471" cy="6733481"/>
+          </a:xfrm>
+        </p:spPr>
+      </p:pic>
+      <p:sp>
+        <p:nvSpPr>
+          <p:cNvPr id="7" name="Rounded Rectangle 6"/>
+          <p:cNvSpPr/>
+          <p:nvPr/>
+        </p:nvSpPr>
+        <p:spPr>
+          <a:xfrm>
+            <a:off x="325463" y="124519"/>
+            <a:ext cx="5680129" cy="5113908"/>
+          </a:xfrm>
+          <a:prstGeom prst="roundRect">
+            <a:avLst/>
+          </a:prstGeom>
+          <a:noFill/>
+          <a:ln w="57150">
+            <a:solidFill>
+              <a:srgbClr val="FF0000"/>
+            </a:solidFill>
+          </a:ln>
+        </p:spPr>
+        <p:style>
+          <a:lnRef idx="2">
+            <a:schemeClr val="accent1">
+              <a:shade val="50000"/>
+            </a:schemeClr>
+          </a:lnRef>
+          <a:fillRef idx="1">
+            <a:schemeClr val="accent1"/>
+          </a:fillRef>
+          <a:effectRef idx="0">
+            <a:schemeClr val="accent1"/>
+          </a:effectRef>
+          <a:fontRef idx="minor">
+            <a:schemeClr val="lt1"/>
+          </a:fontRef>
+        </p:style>
         <p:txBody>
-          <a:bodyPr/>
+          <a:bodyPr rtlCol="0" anchor="ctr"/>
           <a:lstStyle/>
           <a:p>
+            <a:pPr algn="ctr"/>
+            <a:endParaRPr lang="en-US"/>
+          </a:p>
+        </p:txBody>
+      </p:sp>
+      <p:sp>
+        <p:nvSpPr>
+          <p:cNvPr id="8" name="Rounded Rectangle 7"/>
+          <p:cNvSpPr/>
+          <p:nvPr/>
+        </p:nvSpPr>
+        <p:spPr>
+          <a:xfrm>
+            <a:off x="3735092" y="4207790"/>
+            <a:ext cx="6896745" cy="2508142"/>
+          </a:xfrm>
+          <a:prstGeom prst="roundRect">
+            <a:avLst/>
+          </a:prstGeom>
+          <a:noFill/>
+          <a:ln w="57150">
+            <a:solidFill>
+              <a:srgbClr val="FF0000"/>
+            </a:solidFill>
+          </a:ln>
+        </p:spPr>
+        <p:style>
+          <a:lnRef idx="2">
+            <a:schemeClr val="accent1">
+              <a:shade val="50000"/>
+            </a:schemeClr>
+          </a:lnRef>
+          <a:fillRef idx="1">
+            <a:schemeClr val="accent1"/>
+          </a:fillRef>
+          <a:effectRef idx="0">
+            <a:schemeClr val="accent1"/>
+          </a:effectRef>
+          <a:fontRef idx="minor">
+            <a:schemeClr val="lt1"/>
+          </a:fontRef>
+        </p:style>
+        <p:txBody>
+          <a:bodyPr rtlCol="0" anchor="ctr"/>
+          <a:lstStyle/>
+          <a:p>
+            <a:pPr algn="ctr"/>
+            <a:endParaRPr lang="en-US"/>
+          </a:p>
+        </p:txBody>
+      </p:sp>
+      <p:sp>
+        <p:nvSpPr>
+          <p:cNvPr id="15" name="Freeform 14"/>
+          <p:cNvSpPr/>
+          <p:nvPr/>
+        </p:nvSpPr>
+        <p:spPr>
+          <a:xfrm>
+            <a:off x="2937845" y="52490"/>
+            <a:ext cx="8198387" cy="5632375"/>
+          </a:xfrm>
+          <a:custGeom>
+            <a:avLst/>
+            <a:gdLst>
+              <a:gd name="connsiteX0" fmla="*/ 3481754 w 3675287"/>
+              <a:gd name="connsiteY0" fmla="*/ 0 h 5374882"/>
+              <a:gd name="connsiteX1" fmla="*/ 3622431 w 3675287"/>
+              <a:gd name="connsiteY1" fmla="*/ 3130062 h 5374882"/>
+              <a:gd name="connsiteX2" fmla="*/ 2699239 w 3675287"/>
+              <a:gd name="connsiteY2" fmla="*/ 2980593 h 5374882"/>
+              <a:gd name="connsiteX3" fmla="*/ 1169377 w 3675287"/>
+              <a:gd name="connsiteY3" fmla="*/ 2883877 h 5374882"/>
+              <a:gd name="connsiteX4" fmla="*/ 1169377 w 3675287"/>
+              <a:gd name="connsiteY4" fmla="*/ 5363308 h 5374882"/>
+              <a:gd name="connsiteX5" fmla="*/ 0 w 3675287"/>
+              <a:gd name="connsiteY5" fmla="*/ 3640016 h 5374882"/>
+              <a:gd name="connsiteX0" fmla="*/ 3481754 w 3675287"/>
+              <a:gd name="connsiteY0" fmla="*/ 0 h 5368803"/>
+              <a:gd name="connsiteX1" fmla="*/ 3622431 w 3675287"/>
+              <a:gd name="connsiteY1" fmla="*/ 3130062 h 5368803"/>
+              <a:gd name="connsiteX2" fmla="*/ 2699239 w 3675287"/>
+              <a:gd name="connsiteY2" fmla="*/ 2980593 h 5368803"/>
+              <a:gd name="connsiteX3" fmla="*/ 1459523 w 3675287"/>
+              <a:gd name="connsiteY3" fmla="*/ 3138854 h 5368803"/>
+              <a:gd name="connsiteX4" fmla="*/ 1169377 w 3675287"/>
+              <a:gd name="connsiteY4" fmla="*/ 5363308 h 5368803"/>
+              <a:gd name="connsiteX5" fmla="*/ 0 w 3675287"/>
+              <a:gd name="connsiteY5" fmla="*/ 3640016 h 5368803"/>
+              <a:gd name="connsiteX0" fmla="*/ 3481754 w 3693290"/>
+              <a:gd name="connsiteY0" fmla="*/ 0 h 5368803"/>
+              <a:gd name="connsiteX1" fmla="*/ 3622431 w 3693290"/>
+              <a:gd name="connsiteY1" fmla="*/ 3130062 h 5368803"/>
+              <a:gd name="connsiteX2" fmla="*/ 2453054 w 3693290"/>
+              <a:gd name="connsiteY2" fmla="*/ 2787163 h 5368803"/>
+              <a:gd name="connsiteX3" fmla="*/ 1459523 w 3693290"/>
+              <a:gd name="connsiteY3" fmla="*/ 3138854 h 5368803"/>
+              <a:gd name="connsiteX4" fmla="*/ 1169377 w 3693290"/>
+              <a:gd name="connsiteY4" fmla="*/ 5363308 h 5368803"/>
+              <a:gd name="connsiteX5" fmla="*/ 0 w 3693290"/>
+              <a:gd name="connsiteY5" fmla="*/ 3640016 h 5368803"/>
+              <a:gd name="connsiteX0" fmla="*/ 3481754 w 3592584"/>
+              <a:gd name="connsiteY0" fmla="*/ 0 h 5368803"/>
+              <a:gd name="connsiteX1" fmla="*/ 3472962 w 3592584"/>
+              <a:gd name="connsiteY1" fmla="*/ 2576147 h 5368803"/>
+              <a:gd name="connsiteX2" fmla="*/ 2453054 w 3592584"/>
+              <a:gd name="connsiteY2" fmla="*/ 2787163 h 5368803"/>
+              <a:gd name="connsiteX3" fmla="*/ 1459523 w 3592584"/>
+              <a:gd name="connsiteY3" fmla="*/ 3138854 h 5368803"/>
+              <a:gd name="connsiteX4" fmla="*/ 1169377 w 3592584"/>
+              <a:gd name="connsiteY4" fmla="*/ 5363308 h 5368803"/>
+              <a:gd name="connsiteX5" fmla="*/ 0 w 3592584"/>
+              <a:gd name="connsiteY5" fmla="*/ 3640016 h 5368803"/>
+              <a:gd name="connsiteX0" fmla="*/ 3464169 w 3583370"/>
+              <a:gd name="connsiteY0" fmla="*/ 0 h 5386388"/>
+              <a:gd name="connsiteX1" fmla="*/ 3472962 w 3583370"/>
+              <a:gd name="connsiteY1" fmla="*/ 2593732 h 5386388"/>
+              <a:gd name="connsiteX2" fmla="*/ 2453054 w 3583370"/>
+              <a:gd name="connsiteY2" fmla="*/ 2804748 h 5386388"/>
+              <a:gd name="connsiteX3" fmla="*/ 1459523 w 3583370"/>
+              <a:gd name="connsiteY3" fmla="*/ 3156439 h 5386388"/>
+              <a:gd name="connsiteX4" fmla="*/ 1169377 w 3583370"/>
+              <a:gd name="connsiteY4" fmla="*/ 5380893 h 5386388"/>
+              <a:gd name="connsiteX5" fmla="*/ 0 w 3583370"/>
+              <a:gd name="connsiteY5" fmla="*/ 3657601 h 5386388"/>
+              <a:gd name="connsiteX0" fmla="*/ 3464169 w 3646910"/>
+              <a:gd name="connsiteY0" fmla="*/ 0 h 5386388"/>
+              <a:gd name="connsiteX1" fmla="*/ 3472962 w 3646910"/>
+              <a:gd name="connsiteY1" fmla="*/ 2593732 h 5386388"/>
+              <a:gd name="connsiteX2" fmla="*/ 1547446 w 3646910"/>
+              <a:gd name="connsiteY2" fmla="*/ 2734410 h 5386388"/>
+              <a:gd name="connsiteX3" fmla="*/ 1459523 w 3646910"/>
+              <a:gd name="connsiteY3" fmla="*/ 3156439 h 5386388"/>
+              <a:gd name="connsiteX4" fmla="*/ 1169377 w 3646910"/>
+              <a:gd name="connsiteY4" fmla="*/ 5380893 h 5386388"/>
+              <a:gd name="connsiteX5" fmla="*/ 0 w 3646910"/>
+              <a:gd name="connsiteY5" fmla="*/ 3657601 h 5386388"/>
+              <a:gd name="connsiteX0" fmla="*/ 3464169 w 3646910"/>
+              <a:gd name="connsiteY0" fmla="*/ 0 h 5445514"/>
+              <a:gd name="connsiteX1" fmla="*/ 3472962 w 3646910"/>
+              <a:gd name="connsiteY1" fmla="*/ 2593732 h 5445514"/>
+              <a:gd name="connsiteX2" fmla="*/ 1547446 w 3646910"/>
+              <a:gd name="connsiteY2" fmla="*/ 2734410 h 5445514"/>
+              <a:gd name="connsiteX3" fmla="*/ 1248507 w 3646910"/>
+              <a:gd name="connsiteY3" fmla="*/ 4853355 h 5445514"/>
+              <a:gd name="connsiteX4" fmla="*/ 1169377 w 3646910"/>
+              <a:gd name="connsiteY4" fmla="*/ 5380893 h 5445514"/>
+              <a:gd name="connsiteX5" fmla="*/ 0 w 3646910"/>
+              <a:gd name="connsiteY5" fmla="*/ 3657601 h 5445514"/>
+              <a:gd name="connsiteX0" fmla="*/ 4902949 w 5085690"/>
+              <a:gd name="connsiteY0" fmla="*/ 0 h 5338461"/>
+              <a:gd name="connsiteX1" fmla="*/ 4911742 w 5085690"/>
+              <a:gd name="connsiteY1" fmla="*/ 2593732 h 5338461"/>
+              <a:gd name="connsiteX2" fmla="*/ 2986226 w 5085690"/>
+              <a:gd name="connsiteY2" fmla="*/ 2734410 h 5338461"/>
+              <a:gd name="connsiteX3" fmla="*/ 2687287 w 5085690"/>
+              <a:gd name="connsiteY3" fmla="*/ 4853355 h 5338461"/>
+              <a:gd name="connsiteX4" fmla="*/ 14426 w 5085690"/>
+              <a:gd name="connsiteY4" fmla="*/ 5257800 h 5338461"/>
+              <a:gd name="connsiteX5" fmla="*/ 1438780 w 5085690"/>
+              <a:gd name="connsiteY5" fmla="*/ 3657601 h 5338461"/>
+              <a:gd name="connsiteX0" fmla="*/ 4945839 w 5128580"/>
+              <a:gd name="connsiteY0" fmla="*/ 0 h 5348008"/>
+              <a:gd name="connsiteX1" fmla="*/ 4954632 w 5128580"/>
+              <a:gd name="connsiteY1" fmla="*/ 2593732 h 5348008"/>
+              <a:gd name="connsiteX2" fmla="*/ 3029116 w 5128580"/>
+              <a:gd name="connsiteY2" fmla="*/ 2734410 h 5348008"/>
+              <a:gd name="connsiteX3" fmla="*/ 2730177 w 5128580"/>
+              <a:gd name="connsiteY3" fmla="*/ 4853355 h 5348008"/>
+              <a:gd name="connsiteX4" fmla="*/ 57316 w 5128580"/>
+              <a:gd name="connsiteY4" fmla="*/ 5257800 h 5348008"/>
+              <a:gd name="connsiteX5" fmla="*/ 620024 w 5128580"/>
+              <a:gd name="connsiteY5" fmla="*/ 3525717 h 5348008"/>
+              <a:gd name="connsiteX0" fmla="*/ 5165202 w 5347943"/>
+              <a:gd name="connsiteY0" fmla="*/ 0 h 5348008"/>
+              <a:gd name="connsiteX1" fmla="*/ 5173995 w 5347943"/>
+              <a:gd name="connsiteY1" fmla="*/ 2593732 h 5348008"/>
+              <a:gd name="connsiteX2" fmla="*/ 3248479 w 5347943"/>
+              <a:gd name="connsiteY2" fmla="*/ 2734410 h 5348008"/>
+              <a:gd name="connsiteX3" fmla="*/ 2949540 w 5347943"/>
+              <a:gd name="connsiteY3" fmla="*/ 4853355 h 5348008"/>
+              <a:gd name="connsiteX4" fmla="*/ 276679 w 5347943"/>
+              <a:gd name="connsiteY4" fmla="*/ 5257800 h 5348008"/>
+              <a:gd name="connsiteX5" fmla="*/ 839387 w 5347943"/>
+              <a:gd name="connsiteY5" fmla="*/ 3525717 h 5348008"/>
+              <a:gd name="connsiteX0" fmla="*/ 5165202 w 5346047"/>
+              <a:gd name="connsiteY0" fmla="*/ 0 h 5344184"/>
+              <a:gd name="connsiteX1" fmla="*/ 5173995 w 5346047"/>
+              <a:gd name="connsiteY1" fmla="*/ 2593732 h 5344184"/>
+              <a:gd name="connsiteX2" fmla="*/ 3274856 w 5346047"/>
+              <a:gd name="connsiteY2" fmla="*/ 2875087 h 5344184"/>
+              <a:gd name="connsiteX3" fmla="*/ 2949540 w 5346047"/>
+              <a:gd name="connsiteY3" fmla="*/ 4853355 h 5344184"/>
+              <a:gd name="connsiteX4" fmla="*/ 276679 w 5346047"/>
+              <a:gd name="connsiteY4" fmla="*/ 5257800 h 5344184"/>
+              <a:gd name="connsiteX5" fmla="*/ 839387 w 5346047"/>
+              <a:gd name="connsiteY5" fmla="*/ 3525717 h 5344184"/>
+              <a:gd name="connsiteX0" fmla="*/ 5165202 w 5283224"/>
+              <a:gd name="connsiteY0" fmla="*/ 0 h 5344184"/>
+              <a:gd name="connsiteX1" fmla="*/ 5173995 w 5283224"/>
+              <a:gd name="connsiteY1" fmla="*/ 2593732 h 5344184"/>
+              <a:gd name="connsiteX2" fmla="*/ 3274856 w 5283224"/>
+              <a:gd name="connsiteY2" fmla="*/ 2875087 h 5344184"/>
+              <a:gd name="connsiteX3" fmla="*/ 2949540 w 5283224"/>
+              <a:gd name="connsiteY3" fmla="*/ 4853355 h 5344184"/>
+              <a:gd name="connsiteX4" fmla="*/ 276679 w 5283224"/>
+              <a:gd name="connsiteY4" fmla="*/ 5257800 h 5344184"/>
+              <a:gd name="connsiteX5" fmla="*/ 839387 w 5283224"/>
+              <a:gd name="connsiteY5" fmla="*/ 3525717 h 5344184"/>
+              <a:gd name="connsiteX0" fmla="*/ 5165202 w 5229586"/>
+              <a:gd name="connsiteY0" fmla="*/ 0 h 5344184"/>
+              <a:gd name="connsiteX1" fmla="*/ 5173995 w 5229586"/>
+              <a:gd name="connsiteY1" fmla="*/ 2593732 h 5344184"/>
+              <a:gd name="connsiteX2" fmla="*/ 3274856 w 5229586"/>
+              <a:gd name="connsiteY2" fmla="*/ 2875087 h 5344184"/>
+              <a:gd name="connsiteX3" fmla="*/ 2949540 w 5229586"/>
+              <a:gd name="connsiteY3" fmla="*/ 4853355 h 5344184"/>
+              <a:gd name="connsiteX4" fmla="*/ 276679 w 5229586"/>
+              <a:gd name="connsiteY4" fmla="*/ 5257800 h 5344184"/>
+              <a:gd name="connsiteX5" fmla="*/ 839387 w 5229586"/>
+              <a:gd name="connsiteY5" fmla="*/ 3525717 h 5344184"/>
+              <a:gd name="connsiteX0" fmla="*/ 5165202 w 5177743"/>
+              <a:gd name="connsiteY0" fmla="*/ 0 h 5344184"/>
+              <a:gd name="connsiteX1" fmla="*/ 5173995 w 5177743"/>
+              <a:gd name="connsiteY1" fmla="*/ 2593732 h 5344184"/>
+              <a:gd name="connsiteX2" fmla="*/ 3274856 w 5177743"/>
+              <a:gd name="connsiteY2" fmla="*/ 2875087 h 5344184"/>
+              <a:gd name="connsiteX3" fmla="*/ 2949540 w 5177743"/>
+              <a:gd name="connsiteY3" fmla="*/ 4853355 h 5344184"/>
+              <a:gd name="connsiteX4" fmla="*/ 276679 w 5177743"/>
+              <a:gd name="connsiteY4" fmla="*/ 5257800 h 5344184"/>
+              <a:gd name="connsiteX5" fmla="*/ 839387 w 5177743"/>
+              <a:gd name="connsiteY5" fmla="*/ 3525717 h 5344184"/>
+              <a:gd name="connsiteX0" fmla="*/ 5165202 w 5377031"/>
+              <a:gd name="connsiteY0" fmla="*/ 0 h 5344184"/>
+              <a:gd name="connsiteX1" fmla="*/ 5173995 w 5377031"/>
+              <a:gd name="connsiteY1" fmla="*/ 2593732 h 5344184"/>
+              <a:gd name="connsiteX2" fmla="*/ 3274856 w 5377031"/>
+              <a:gd name="connsiteY2" fmla="*/ 2875087 h 5344184"/>
+              <a:gd name="connsiteX3" fmla="*/ 2949540 w 5377031"/>
+              <a:gd name="connsiteY3" fmla="*/ 4853355 h 5344184"/>
+              <a:gd name="connsiteX4" fmla="*/ 276679 w 5377031"/>
+              <a:gd name="connsiteY4" fmla="*/ 5257800 h 5344184"/>
+              <a:gd name="connsiteX5" fmla="*/ 839387 w 5377031"/>
+              <a:gd name="connsiteY5" fmla="*/ 3525717 h 5344184"/>
+              <a:gd name="connsiteX0" fmla="*/ 5270710 w 5355665"/>
+              <a:gd name="connsiteY0" fmla="*/ 0 h 5352976"/>
+              <a:gd name="connsiteX1" fmla="*/ 5173995 w 5355665"/>
+              <a:gd name="connsiteY1" fmla="*/ 2602524 h 5352976"/>
+              <a:gd name="connsiteX2" fmla="*/ 3274856 w 5355665"/>
+              <a:gd name="connsiteY2" fmla="*/ 2883879 h 5352976"/>
+              <a:gd name="connsiteX3" fmla="*/ 2949540 w 5355665"/>
+              <a:gd name="connsiteY3" fmla="*/ 4862147 h 5352976"/>
+              <a:gd name="connsiteX4" fmla="*/ 276679 w 5355665"/>
+              <a:gd name="connsiteY4" fmla="*/ 5266592 h 5352976"/>
+              <a:gd name="connsiteX5" fmla="*/ 839387 w 5355665"/>
+              <a:gd name="connsiteY5" fmla="*/ 3534509 h 5352976"/>
+              <a:gd name="connsiteX0" fmla="*/ 5270710 w 5325507"/>
+              <a:gd name="connsiteY0" fmla="*/ 0 h 5352976"/>
+              <a:gd name="connsiteX1" fmla="*/ 5121241 w 5325507"/>
+              <a:gd name="connsiteY1" fmla="*/ 2672863 h 5352976"/>
+              <a:gd name="connsiteX2" fmla="*/ 3274856 w 5325507"/>
+              <a:gd name="connsiteY2" fmla="*/ 2883879 h 5352976"/>
+              <a:gd name="connsiteX3" fmla="*/ 2949540 w 5325507"/>
+              <a:gd name="connsiteY3" fmla="*/ 4862147 h 5352976"/>
+              <a:gd name="connsiteX4" fmla="*/ 276679 w 5325507"/>
+              <a:gd name="connsiteY4" fmla="*/ 5266592 h 5352976"/>
+              <a:gd name="connsiteX5" fmla="*/ 839387 w 5325507"/>
+              <a:gd name="connsiteY5" fmla="*/ 3534509 h 5352976"/>
+              <a:gd name="connsiteX0" fmla="*/ 5270710 w 5336991"/>
+              <a:gd name="connsiteY0" fmla="*/ 0 h 5348300"/>
+              <a:gd name="connsiteX1" fmla="*/ 5121241 w 5336991"/>
+              <a:gd name="connsiteY1" fmla="*/ 2672863 h 5348300"/>
+              <a:gd name="connsiteX2" fmla="*/ 3099010 w 5336991"/>
+              <a:gd name="connsiteY2" fmla="*/ 3068517 h 5348300"/>
+              <a:gd name="connsiteX3" fmla="*/ 2949540 w 5336991"/>
+              <a:gd name="connsiteY3" fmla="*/ 4862147 h 5348300"/>
+              <a:gd name="connsiteX4" fmla="*/ 276679 w 5336991"/>
+              <a:gd name="connsiteY4" fmla="*/ 5266592 h 5348300"/>
+              <a:gd name="connsiteX5" fmla="*/ 839387 w 5336991"/>
+              <a:gd name="connsiteY5" fmla="*/ 3534509 h 5348300"/>
+              <a:gd name="connsiteX0" fmla="*/ 5246398 w 5312679"/>
+              <a:gd name="connsiteY0" fmla="*/ 0 h 5376914"/>
+              <a:gd name="connsiteX1" fmla="*/ 5096929 w 5312679"/>
+              <a:gd name="connsiteY1" fmla="*/ 2672863 h 5376914"/>
+              <a:gd name="connsiteX2" fmla="*/ 3074698 w 5312679"/>
+              <a:gd name="connsiteY2" fmla="*/ 3068517 h 5376914"/>
+              <a:gd name="connsiteX3" fmla="*/ 2573536 w 5312679"/>
+              <a:gd name="connsiteY3" fmla="*/ 4967655 h 5376914"/>
+              <a:gd name="connsiteX4" fmla="*/ 252367 w 5312679"/>
+              <a:gd name="connsiteY4" fmla="*/ 5266592 h 5376914"/>
+              <a:gd name="connsiteX5" fmla="*/ 815075 w 5312679"/>
+              <a:gd name="connsiteY5" fmla="*/ 3534509 h 5376914"/>
+              <a:gd name="connsiteX0" fmla="*/ 5250027 w 5316308"/>
+              <a:gd name="connsiteY0" fmla="*/ 0 h 5473046"/>
+              <a:gd name="connsiteX1" fmla="*/ 5100558 w 5316308"/>
+              <a:gd name="connsiteY1" fmla="*/ 2672863 h 5473046"/>
+              <a:gd name="connsiteX2" fmla="*/ 3078327 w 5316308"/>
+              <a:gd name="connsiteY2" fmla="*/ 3068517 h 5473046"/>
+              <a:gd name="connsiteX3" fmla="*/ 2629919 w 5316308"/>
+              <a:gd name="connsiteY3" fmla="*/ 5196255 h 5473046"/>
+              <a:gd name="connsiteX4" fmla="*/ 255996 w 5316308"/>
+              <a:gd name="connsiteY4" fmla="*/ 5266592 h 5473046"/>
+              <a:gd name="connsiteX5" fmla="*/ 818704 w 5316308"/>
+              <a:gd name="connsiteY5" fmla="*/ 3534509 h 5473046"/>
+              <a:gd name="connsiteX0" fmla="*/ 5080423 w 5146704"/>
+              <a:gd name="connsiteY0" fmla="*/ 0 h 5458401"/>
+              <a:gd name="connsiteX1" fmla="*/ 4930954 w 5146704"/>
+              <a:gd name="connsiteY1" fmla="*/ 2672863 h 5458401"/>
+              <a:gd name="connsiteX2" fmla="*/ 2908723 w 5146704"/>
+              <a:gd name="connsiteY2" fmla="*/ 3068517 h 5458401"/>
+              <a:gd name="connsiteX3" fmla="*/ 2460315 w 5146704"/>
+              <a:gd name="connsiteY3" fmla="*/ 5196255 h 5458401"/>
+              <a:gd name="connsiteX4" fmla="*/ 86392 w 5146704"/>
+              <a:gd name="connsiteY4" fmla="*/ 5266592 h 5458401"/>
+              <a:gd name="connsiteX5" fmla="*/ 1132677 w 5146704"/>
+              <a:gd name="connsiteY5" fmla="*/ 3763109 h 5458401"/>
+              <a:gd name="connsiteX0" fmla="*/ 5195236 w 5261517"/>
+              <a:gd name="connsiteY0" fmla="*/ 0 h 5443730"/>
+              <a:gd name="connsiteX1" fmla="*/ 5045767 w 5261517"/>
+              <a:gd name="connsiteY1" fmla="*/ 2672863 h 5443730"/>
+              <a:gd name="connsiteX2" fmla="*/ 3023536 w 5261517"/>
+              <a:gd name="connsiteY2" fmla="*/ 3068517 h 5443730"/>
+              <a:gd name="connsiteX3" fmla="*/ 2575128 w 5261517"/>
+              <a:gd name="connsiteY3" fmla="*/ 5196255 h 5443730"/>
+              <a:gd name="connsiteX4" fmla="*/ 69321 w 5261517"/>
+              <a:gd name="connsiteY4" fmla="*/ 5240216 h 5443730"/>
+              <a:gd name="connsiteX5" fmla="*/ 1247490 w 5261517"/>
+              <a:gd name="connsiteY5" fmla="*/ 3763109 h 5443730"/>
+              <a:gd name="connsiteX0" fmla="*/ 5358727 w 5425008"/>
+              <a:gd name="connsiteY0" fmla="*/ 0 h 5431673"/>
+              <a:gd name="connsiteX1" fmla="*/ 5209258 w 5425008"/>
+              <a:gd name="connsiteY1" fmla="*/ 2672863 h 5431673"/>
+              <a:gd name="connsiteX2" fmla="*/ 3187027 w 5425008"/>
+              <a:gd name="connsiteY2" fmla="*/ 3068517 h 5431673"/>
+              <a:gd name="connsiteX3" fmla="*/ 2738619 w 5425008"/>
+              <a:gd name="connsiteY3" fmla="*/ 5196255 h 5431673"/>
+              <a:gd name="connsiteX4" fmla="*/ 232812 w 5425008"/>
+              <a:gd name="connsiteY4" fmla="*/ 5240216 h 5431673"/>
+              <a:gd name="connsiteX5" fmla="*/ 865858 w 5425008"/>
+              <a:gd name="connsiteY5" fmla="*/ 3965332 h 5431673"/>
+              <a:gd name="connsiteX0" fmla="*/ 5358727 w 5425008"/>
+              <a:gd name="connsiteY0" fmla="*/ 0 h 5431673"/>
+              <a:gd name="connsiteX1" fmla="*/ 5209258 w 5425008"/>
+              <a:gd name="connsiteY1" fmla="*/ 2672863 h 5431673"/>
+              <a:gd name="connsiteX2" fmla="*/ 3187027 w 5425008"/>
+              <a:gd name="connsiteY2" fmla="*/ 3068517 h 5431673"/>
+              <a:gd name="connsiteX3" fmla="*/ 2738619 w 5425008"/>
+              <a:gd name="connsiteY3" fmla="*/ 5196255 h 5431673"/>
+              <a:gd name="connsiteX4" fmla="*/ 232812 w 5425008"/>
+              <a:gd name="connsiteY4" fmla="*/ 5240216 h 5431673"/>
+              <a:gd name="connsiteX5" fmla="*/ 865858 w 5425008"/>
+              <a:gd name="connsiteY5" fmla="*/ 3965332 h 5431673"/>
+              <a:gd name="connsiteX6" fmla="*/ 901029 w 5425008"/>
+              <a:gd name="connsiteY6" fmla="*/ 3947750 h 5431673"/>
+              <a:gd name="connsiteX0" fmla="*/ 5358727 w 5425008"/>
+              <a:gd name="connsiteY0" fmla="*/ 0 h 5431673"/>
+              <a:gd name="connsiteX1" fmla="*/ 5209258 w 5425008"/>
+              <a:gd name="connsiteY1" fmla="*/ 2672863 h 5431673"/>
+              <a:gd name="connsiteX2" fmla="*/ 3187027 w 5425008"/>
+              <a:gd name="connsiteY2" fmla="*/ 3068517 h 5431673"/>
+              <a:gd name="connsiteX3" fmla="*/ 2738619 w 5425008"/>
+              <a:gd name="connsiteY3" fmla="*/ 5196255 h 5431673"/>
+              <a:gd name="connsiteX4" fmla="*/ 232812 w 5425008"/>
+              <a:gd name="connsiteY4" fmla="*/ 5240216 h 5431673"/>
+              <a:gd name="connsiteX5" fmla="*/ 865858 w 5425008"/>
+              <a:gd name="connsiteY5" fmla="*/ 3965332 h 5431673"/>
+              <a:gd name="connsiteX6" fmla="*/ 1560452 w 5425008"/>
+              <a:gd name="connsiteY6" fmla="*/ 3683981 h 5431673"/>
+              <a:gd name="connsiteX0" fmla="*/ 5225177 w 5291458"/>
+              <a:gd name="connsiteY0" fmla="*/ 0 h 5431673"/>
+              <a:gd name="connsiteX1" fmla="*/ 5075708 w 5291458"/>
+              <a:gd name="connsiteY1" fmla="*/ 2672863 h 5431673"/>
+              <a:gd name="connsiteX2" fmla="*/ 3053477 w 5291458"/>
+              <a:gd name="connsiteY2" fmla="*/ 3068517 h 5431673"/>
+              <a:gd name="connsiteX3" fmla="*/ 2605069 w 5291458"/>
+              <a:gd name="connsiteY3" fmla="*/ 5196255 h 5431673"/>
+              <a:gd name="connsiteX4" fmla="*/ 99262 w 5291458"/>
+              <a:gd name="connsiteY4" fmla="*/ 5240216 h 5431673"/>
+              <a:gd name="connsiteX5" fmla="*/ 732308 w 5291458"/>
+              <a:gd name="connsiteY5" fmla="*/ 3965332 h 5431673"/>
+              <a:gd name="connsiteX6" fmla="*/ 1426902 w 5291458"/>
+              <a:gd name="connsiteY6" fmla="*/ 3683981 h 5431673"/>
+              <a:gd name="connsiteX0" fmla="*/ 5285808 w 5352089"/>
+              <a:gd name="connsiteY0" fmla="*/ 0 h 5433221"/>
+              <a:gd name="connsiteX1" fmla="*/ 5136339 w 5352089"/>
+              <a:gd name="connsiteY1" fmla="*/ 2672863 h 5433221"/>
+              <a:gd name="connsiteX2" fmla="*/ 3114108 w 5352089"/>
+              <a:gd name="connsiteY2" fmla="*/ 3068517 h 5433221"/>
+              <a:gd name="connsiteX3" fmla="*/ 2665700 w 5352089"/>
+              <a:gd name="connsiteY3" fmla="*/ 5196255 h 5433221"/>
+              <a:gd name="connsiteX4" fmla="*/ 159893 w 5352089"/>
+              <a:gd name="connsiteY4" fmla="*/ 5240216 h 5433221"/>
+              <a:gd name="connsiteX5" fmla="*/ 546755 w 5352089"/>
+              <a:gd name="connsiteY5" fmla="*/ 3938955 h 5433221"/>
+              <a:gd name="connsiteX6" fmla="*/ 1487533 w 5352089"/>
+              <a:gd name="connsiteY6" fmla="*/ 3683981 h 5433221"/>
+              <a:gd name="connsiteX0" fmla="*/ 5285808 w 5352089"/>
+              <a:gd name="connsiteY0" fmla="*/ 0 h 5433221"/>
+              <a:gd name="connsiteX1" fmla="*/ 5136339 w 5352089"/>
+              <a:gd name="connsiteY1" fmla="*/ 2672863 h 5433221"/>
+              <a:gd name="connsiteX2" fmla="*/ 3114108 w 5352089"/>
+              <a:gd name="connsiteY2" fmla="*/ 3068517 h 5433221"/>
+              <a:gd name="connsiteX3" fmla="*/ 2665700 w 5352089"/>
+              <a:gd name="connsiteY3" fmla="*/ 5196255 h 5433221"/>
+              <a:gd name="connsiteX4" fmla="*/ 159893 w 5352089"/>
+              <a:gd name="connsiteY4" fmla="*/ 5240216 h 5433221"/>
+              <a:gd name="connsiteX5" fmla="*/ 546755 w 5352089"/>
+              <a:gd name="connsiteY5" fmla="*/ 3938955 h 5433221"/>
+              <a:gd name="connsiteX6" fmla="*/ 2507441 w 5352089"/>
+              <a:gd name="connsiteY6" fmla="*/ 3842243 h 5433221"/>
+              <a:gd name="connsiteX0" fmla="*/ 5285808 w 5352089"/>
+              <a:gd name="connsiteY0" fmla="*/ 0 h 5433221"/>
+              <a:gd name="connsiteX1" fmla="*/ 5136339 w 5352089"/>
+              <a:gd name="connsiteY1" fmla="*/ 2672863 h 5433221"/>
+              <a:gd name="connsiteX2" fmla="*/ 3114108 w 5352089"/>
+              <a:gd name="connsiteY2" fmla="*/ 3068517 h 5433221"/>
+              <a:gd name="connsiteX3" fmla="*/ 2665700 w 5352089"/>
+              <a:gd name="connsiteY3" fmla="*/ 5196255 h 5433221"/>
+              <a:gd name="connsiteX4" fmla="*/ 159893 w 5352089"/>
+              <a:gd name="connsiteY4" fmla="*/ 5240216 h 5433221"/>
+              <a:gd name="connsiteX5" fmla="*/ 546755 w 5352089"/>
+              <a:gd name="connsiteY5" fmla="*/ 3938955 h 5433221"/>
+              <a:gd name="connsiteX6" fmla="*/ 2507441 w 5352089"/>
+              <a:gd name="connsiteY6" fmla="*/ 3842243 h 5433221"/>
+              <a:gd name="connsiteX7" fmla="*/ 2498650 w 5352089"/>
+              <a:gd name="connsiteY7" fmla="*/ 3798280 h 5433221"/>
+              <a:gd name="connsiteX0" fmla="*/ 5285808 w 5352089"/>
+              <a:gd name="connsiteY0" fmla="*/ 0 h 5433221"/>
+              <a:gd name="connsiteX1" fmla="*/ 5136339 w 5352089"/>
+              <a:gd name="connsiteY1" fmla="*/ 2672863 h 5433221"/>
+              <a:gd name="connsiteX2" fmla="*/ 3114108 w 5352089"/>
+              <a:gd name="connsiteY2" fmla="*/ 3068517 h 5433221"/>
+              <a:gd name="connsiteX3" fmla="*/ 2665700 w 5352089"/>
+              <a:gd name="connsiteY3" fmla="*/ 5196255 h 5433221"/>
+              <a:gd name="connsiteX4" fmla="*/ 159893 w 5352089"/>
+              <a:gd name="connsiteY4" fmla="*/ 5240216 h 5433221"/>
+              <a:gd name="connsiteX5" fmla="*/ 546755 w 5352089"/>
+              <a:gd name="connsiteY5" fmla="*/ 3938955 h 5433221"/>
+              <a:gd name="connsiteX6" fmla="*/ 2507441 w 5352089"/>
+              <a:gd name="connsiteY6" fmla="*/ 3842243 h 5433221"/>
+              <a:gd name="connsiteX7" fmla="*/ 2270050 w 5352089"/>
+              <a:gd name="connsiteY7" fmla="*/ 2127742 h 5433221"/>
+              <a:gd name="connsiteX0" fmla="*/ 5285808 w 5352089"/>
+              <a:gd name="connsiteY0" fmla="*/ 0 h 5433221"/>
+              <a:gd name="connsiteX1" fmla="*/ 5136339 w 5352089"/>
+              <a:gd name="connsiteY1" fmla="*/ 2672863 h 5433221"/>
+              <a:gd name="connsiteX2" fmla="*/ 3114108 w 5352089"/>
+              <a:gd name="connsiteY2" fmla="*/ 3068517 h 5433221"/>
+              <a:gd name="connsiteX3" fmla="*/ 2665700 w 5352089"/>
+              <a:gd name="connsiteY3" fmla="*/ 5196255 h 5433221"/>
+              <a:gd name="connsiteX4" fmla="*/ 159893 w 5352089"/>
+              <a:gd name="connsiteY4" fmla="*/ 5240216 h 5433221"/>
+              <a:gd name="connsiteX5" fmla="*/ 546755 w 5352089"/>
+              <a:gd name="connsiteY5" fmla="*/ 3938955 h 5433221"/>
+              <a:gd name="connsiteX6" fmla="*/ 2507441 w 5352089"/>
+              <a:gd name="connsiteY6" fmla="*/ 3842243 h 5433221"/>
+              <a:gd name="connsiteX7" fmla="*/ 2270050 w 5352089"/>
+              <a:gd name="connsiteY7" fmla="*/ 2127742 h 5433221"/>
+              <a:gd name="connsiteX8" fmla="*/ 2270050 w 5352089"/>
+              <a:gd name="connsiteY8" fmla="*/ 2083780 h 5433221"/>
+              <a:gd name="connsiteX0" fmla="*/ 5285808 w 5352089"/>
+              <a:gd name="connsiteY0" fmla="*/ 0 h 5433221"/>
+              <a:gd name="connsiteX1" fmla="*/ 5136339 w 5352089"/>
+              <a:gd name="connsiteY1" fmla="*/ 2672863 h 5433221"/>
+              <a:gd name="connsiteX2" fmla="*/ 3114108 w 5352089"/>
+              <a:gd name="connsiteY2" fmla="*/ 3068517 h 5433221"/>
+              <a:gd name="connsiteX3" fmla="*/ 2665700 w 5352089"/>
+              <a:gd name="connsiteY3" fmla="*/ 5196255 h 5433221"/>
+              <a:gd name="connsiteX4" fmla="*/ 159893 w 5352089"/>
+              <a:gd name="connsiteY4" fmla="*/ 5240216 h 5433221"/>
+              <a:gd name="connsiteX5" fmla="*/ 546755 w 5352089"/>
+              <a:gd name="connsiteY5" fmla="*/ 3938955 h 5433221"/>
+              <a:gd name="connsiteX6" fmla="*/ 2507441 w 5352089"/>
+              <a:gd name="connsiteY6" fmla="*/ 3842243 h 5433221"/>
+              <a:gd name="connsiteX7" fmla="*/ 2270050 w 5352089"/>
+              <a:gd name="connsiteY7" fmla="*/ 2127742 h 5433221"/>
+              <a:gd name="connsiteX8" fmla="*/ 2393143 w 5352089"/>
+              <a:gd name="connsiteY8" fmla="*/ 17587 h 5433221"/>
+              <a:gd name="connsiteX0" fmla="*/ 5285808 w 5327158"/>
+              <a:gd name="connsiteY0" fmla="*/ 197987 h 5631208"/>
+              <a:gd name="connsiteX1" fmla="*/ 5259434 w 5327158"/>
+              <a:gd name="connsiteY1" fmla="*/ 197990 h 5631208"/>
+              <a:gd name="connsiteX2" fmla="*/ 5136339 w 5327158"/>
+              <a:gd name="connsiteY2" fmla="*/ 2870850 h 5631208"/>
+              <a:gd name="connsiteX3" fmla="*/ 3114108 w 5327158"/>
+              <a:gd name="connsiteY3" fmla="*/ 3266504 h 5631208"/>
+              <a:gd name="connsiteX4" fmla="*/ 2665700 w 5327158"/>
+              <a:gd name="connsiteY4" fmla="*/ 5394242 h 5631208"/>
+              <a:gd name="connsiteX5" fmla="*/ 159893 w 5327158"/>
+              <a:gd name="connsiteY5" fmla="*/ 5438203 h 5631208"/>
+              <a:gd name="connsiteX6" fmla="*/ 546755 w 5327158"/>
+              <a:gd name="connsiteY6" fmla="*/ 4136942 h 5631208"/>
+              <a:gd name="connsiteX7" fmla="*/ 2507441 w 5327158"/>
+              <a:gd name="connsiteY7" fmla="*/ 4040230 h 5631208"/>
+              <a:gd name="connsiteX8" fmla="*/ 2270050 w 5327158"/>
+              <a:gd name="connsiteY8" fmla="*/ 2325729 h 5631208"/>
+              <a:gd name="connsiteX9" fmla="*/ 2393143 w 5327158"/>
+              <a:gd name="connsiteY9" fmla="*/ 215574 h 5631208"/>
+              <a:gd name="connsiteX0" fmla="*/ 5285808 w 5285808"/>
+              <a:gd name="connsiteY0" fmla="*/ 217749 h 5650970"/>
+              <a:gd name="connsiteX1" fmla="*/ 3483388 w 5285808"/>
+              <a:gd name="connsiteY1" fmla="*/ 191375 h 5650970"/>
+              <a:gd name="connsiteX2" fmla="*/ 5136339 w 5285808"/>
+              <a:gd name="connsiteY2" fmla="*/ 2890612 h 5650970"/>
+              <a:gd name="connsiteX3" fmla="*/ 3114108 w 5285808"/>
+              <a:gd name="connsiteY3" fmla="*/ 3286266 h 5650970"/>
+              <a:gd name="connsiteX4" fmla="*/ 2665700 w 5285808"/>
+              <a:gd name="connsiteY4" fmla="*/ 5414004 h 5650970"/>
+              <a:gd name="connsiteX5" fmla="*/ 159893 w 5285808"/>
+              <a:gd name="connsiteY5" fmla="*/ 5457965 h 5650970"/>
+              <a:gd name="connsiteX6" fmla="*/ 546755 w 5285808"/>
+              <a:gd name="connsiteY6" fmla="*/ 4156704 h 5650970"/>
+              <a:gd name="connsiteX7" fmla="*/ 2507441 w 5285808"/>
+              <a:gd name="connsiteY7" fmla="*/ 4059992 h 5650970"/>
+              <a:gd name="connsiteX8" fmla="*/ 2270050 w 5285808"/>
+              <a:gd name="connsiteY8" fmla="*/ 2345491 h 5650970"/>
+              <a:gd name="connsiteX9" fmla="*/ 2393143 w 5285808"/>
+              <a:gd name="connsiteY9" fmla="*/ 235336 h 5650970"/>
+              <a:gd name="connsiteX0" fmla="*/ 2498646 w 5137934"/>
+              <a:gd name="connsiteY0" fmla="*/ 224433 h 5648862"/>
+              <a:gd name="connsiteX1" fmla="*/ 3483388 w 5137934"/>
+              <a:gd name="connsiteY1" fmla="*/ 189267 h 5648862"/>
+              <a:gd name="connsiteX2" fmla="*/ 5136339 w 5137934"/>
+              <a:gd name="connsiteY2" fmla="*/ 2888504 h 5648862"/>
+              <a:gd name="connsiteX3" fmla="*/ 3114108 w 5137934"/>
+              <a:gd name="connsiteY3" fmla="*/ 3284158 h 5648862"/>
+              <a:gd name="connsiteX4" fmla="*/ 2665700 w 5137934"/>
+              <a:gd name="connsiteY4" fmla="*/ 5411896 h 5648862"/>
+              <a:gd name="connsiteX5" fmla="*/ 159893 w 5137934"/>
+              <a:gd name="connsiteY5" fmla="*/ 5455857 h 5648862"/>
+              <a:gd name="connsiteX6" fmla="*/ 546755 w 5137934"/>
+              <a:gd name="connsiteY6" fmla="*/ 4154596 h 5648862"/>
+              <a:gd name="connsiteX7" fmla="*/ 2507441 w 5137934"/>
+              <a:gd name="connsiteY7" fmla="*/ 4057884 h 5648862"/>
+              <a:gd name="connsiteX8" fmla="*/ 2270050 w 5137934"/>
+              <a:gd name="connsiteY8" fmla="*/ 2343383 h 5648862"/>
+              <a:gd name="connsiteX9" fmla="*/ 2393143 w 5137934"/>
+              <a:gd name="connsiteY9" fmla="*/ 233228 h 5648862"/>
+              <a:gd name="connsiteX0" fmla="*/ 2498646 w 5367160"/>
+              <a:gd name="connsiteY0" fmla="*/ 61659 h 5486088"/>
+              <a:gd name="connsiteX1" fmla="*/ 5338565 w 5367160"/>
+              <a:gd name="connsiteY1" fmla="*/ 272677 h 5486088"/>
+              <a:gd name="connsiteX2" fmla="*/ 5136339 w 5367160"/>
+              <a:gd name="connsiteY2" fmla="*/ 2725730 h 5486088"/>
+              <a:gd name="connsiteX3" fmla="*/ 3114108 w 5367160"/>
+              <a:gd name="connsiteY3" fmla="*/ 3121384 h 5486088"/>
+              <a:gd name="connsiteX4" fmla="*/ 2665700 w 5367160"/>
+              <a:gd name="connsiteY4" fmla="*/ 5249122 h 5486088"/>
+              <a:gd name="connsiteX5" fmla="*/ 159893 w 5367160"/>
+              <a:gd name="connsiteY5" fmla="*/ 5293083 h 5486088"/>
+              <a:gd name="connsiteX6" fmla="*/ 546755 w 5367160"/>
+              <a:gd name="connsiteY6" fmla="*/ 3991822 h 5486088"/>
+              <a:gd name="connsiteX7" fmla="*/ 2507441 w 5367160"/>
+              <a:gd name="connsiteY7" fmla="*/ 3895110 h 5486088"/>
+              <a:gd name="connsiteX8" fmla="*/ 2270050 w 5367160"/>
+              <a:gd name="connsiteY8" fmla="*/ 2180609 h 5486088"/>
+              <a:gd name="connsiteX9" fmla="*/ 2393143 w 5367160"/>
+              <a:gd name="connsiteY9" fmla="*/ 70454 h 5486088"/>
+              <a:gd name="connsiteX0" fmla="*/ 2498646 w 5367160"/>
+              <a:gd name="connsiteY0" fmla="*/ 61659 h 5486088"/>
+              <a:gd name="connsiteX1" fmla="*/ 5338565 w 5367160"/>
+              <a:gd name="connsiteY1" fmla="*/ 272677 h 5486088"/>
+              <a:gd name="connsiteX2" fmla="*/ 5136339 w 5367160"/>
+              <a:gd name="connsiteY2" fmla="*/ 2725730 h 5486088"/>
+              <a:gd name="connsiteX3" fmla="*/ 3114108 w 5367160"/>
+              <a:gd name="connsiteY3" fmla="*/ 3121384 h 5486088"/>
+              <a:gd name="connsiteX4" fmla="*/ 2665700 w 5367160"/>
+              <a:gd name="connsiteY4" fmla="*/ 5249122 h 5486088"/>
+              <a:gd name="connsiteX5" fmla="*/ 159893 w 5367160"/>
+              <a:gd name="connsiteY5" fmla="*/ 5293083 h 5486088"/>
+              <a:gd name="connsiteX6" fmla="*/ 546755 w 5367160"/>
+              <a:gd name="connsiteY6" fmla="*/ 3991822 h 5486088"/>
+              <a:gd name="connsiteX7" fmla="*/ 2507441 w 5367160"/>
+              <a:gd name="connsiteY7" fmla="*/ 3895110 h 5486088"/>
+              <a:gd name="connsiteX8" fmla="*/ 2270050 w 5367160"/>
+              <a:gd name="connsiteY8" fmla="*/ 2180609 h 5486088"/>
+              <a:gd name="connsiteX9" fmla="*/ 2393143 w 5367160"/>
+              <a:gd name="connsiteY9" fmla="*/ 70454 h 5486088"/>
+              <a:gd name="connsiteX0" fmla="*/ 2498646 w 5367160"/>
+              <a:gd name="connsiteY0" fmla="*/ 61659 h 5486088"/>
+              <a:gd name="connsiteX1" fmla="*/ 5338565 w 5367160"/>
+              <a:gd name="connsiteY1" fmla="*/ 272677 h 5486088"/>
+              <a:gd name="connsiteX2" fmla="*/ 5136339 w 5367160"/>
+              <a:gd name="connsiteY2" fmla="*/ 2725730 h 5486088"/>
+              <a:gd name="connsiteX3" fmla="*/ 3114108 w 5367160"/>
+              <a:gd name="connsiteY3" fmla="*/ 3121384 h 5486088"/>
+              <a:gd name="connsiteX4" fmla="*/ 2665700 w 5367160"/>
+              <a:gd name="connsiteY4" fmla="*/ 5249122 h 5486088"/>
+              <a:gd name="connsiteX5" fmla="*/ 159893 w 5367160"/>
+              <a:gd name="connsiteY5" fmla="*/ 5293083 h 5486088"/>
+              <a:gd name="connsiteX6" fmla="*/ 546755 w 5367160"/>
+              <a:gd name="connsiteY6" fmla="*/ 3991822 h 5486088"/>
+              <a:gd name="connsiteX7" fmla="*/ 2507441 w 5367160"/>
+              <a:gd name="connsiteY7" fmla="*/ 3895110 h 5486088"/>
+              <a:gd name="connsiteX8" fmla="*/ 2270050 w 5367160"/>
+              <a:gd name="connsiteY8" fmla="*/ 2180609 h 5486088"/>
+              <a:gd name="connsiteX9" fmla="*/ 2393143 w 5367160"/>
+              <a:gd name="connsiteY9" fmla="*/ 70454 h 5486088"/>
+              <a:gd name="connsiteX0" fmla="*/ 2498646 w 5406249"/>
+              <a:gd name="connsiteY0" fmla="*/ 4 h 5424433"/>
+              <a:gd name="connsiteX1" fmla="*/ 5400111 w 5406249"/>
+              <a:gd name="connsiteY1" fmla="*/ 439622 h 5424433"/>
+              <a:gd name="connsiteX2" fmla="*/ 5136339 w 5406249"/>
+              <a:gd name="connsiteY2" fmla="*/ 2664075 h 5424433"/>
+              <a:gd name="connsiteX3" fmla="*/ 3114108 w 5406249"/>
+              <a:gd name="connsiteY3" fmla="*/ 3059729 h 5424433"/>
+              <a:gd name="connsiteX4" fmla="*/ 2665700 w 5406249"/>
+              <a:gd name="connsiteY4" fmla="*/ 5187467 h 5424433"/>
+              <a:gd name="connsiteX5" fmla="*/ 159893 w 5406249"/>
+              <a:gd name="connsiteY5" fmla="*/ 5231428 h 5424433"/>
+              <a:gd name="connsiteX6" fmla="*/ 546755 w 5406249"/>
+              <a:gd name="connsiteY6" fmla="*/ 3930167 h 5424433"/>
+              <a:gd name="connsiteX7" fmla="*/ 2507441 w 5406249"/>
+              <a:gd name="connsiteY7" fmla="*/ 3833455 h 5424433"/>
+              <a:gd name="connsiteX8" fmla="*/ 2270050 w 5406249"/>
+              <a:gd name="connsiteY8" fmla="*/ 2118954 h 5424433"/>
+              <a:gd name="connsiteX9" fmla="*/ 2393143 w 5406249"/>
+              <a:gd name="connsiteY9" fmla="*/ 8799 h 5424433"/>
+              <a:gd name="connsiteX0" fmla="*/ 2498646 w 5406249"/>
+              <a:gd name="connsiteY0" fmla="*/ 4 h 5424433"/>
+              <a:gd name="connsiteX1" fmla="*/ 5400111 w 5406249"/>
+              <a:gd name="connsiteY1" fmla="*/ 439622 h 5424433"/>
+              <a:gd name="connsiteX2" fmla="*/ 5136339 w 5406249"/>
+              <a:gd name="connsiteY2" fmla="*/ 2664075 h 5424433"/>
+              <a:gd name="connsiteX3" fmla="*/ 3114108 w 5406249"/>
+              <a:gd name="connsiteY3" fmla="*/ 3059729 h 5424433"/>
+              <a:gd name="connsiteX4" fmla="*/ 2665700 w 5406249"/>
+              <a:gd name="connsiteY4" fmla="*/ 5187467 h 5424433"/>
+              <a:gd name="connsiteX5" fmla="*/ 159893 w 5406249"/>
+              <a:gd name="connsiteY5" fmla="*/ 5231428 h 5424433"/>
+              <a:gd name="connsiteX6" fmla="*/ 546755 w 5406249"/>
+              <a:gd name="connsiteY6" fmla="*/ 3930167 h 5424433"/>
+              <a:gd name="connsiteX7" fmla="*/ 2507441 w 5406249"/>
+              <a:gd name="connsiteY7" fmla="*/ 3833455 h 5424433"/>
+              <a:gd name="connsiteX8" fmla="*/ 2270050 w 5406249"/>
+              <a:gd name="connsiteY8" fmla="*/ 2118954 h 5424433"/>
+              <a:gd name="connsiteX9" fmla="*/ 2393143 w 5406249"/>
+              <a:gd name="connsiteY9" fmla="*/ 8799 h 5424433"/>
+              <a:gd name="connsiteX0" fmla="*/ 2498646 w 5406249"/>
+              <a:gd name="connsiteY0" fmla="*/ 4 h 5424433"/>
+              <a:gd name="connsiteX1" fmla="*/ 5400111 w 5406249"/>
+              <a:gd name="connsiteY1" fmla="*/ 439622 h 5424433"/>
+              <a:gd name="connsiteX2" fmla="*/ 5136339 w 5406249"/>
+              <a:gd name="connsiteY2" fmla="*/ 2664075 h 5424433"/>
+              <a:gd name="connsiteX3" fmla="*/ 3114108 w 5406249"/>
+              <a:gd name="connsiteY3" fmla="*/ 3059729 h 5424433"/>
+              <a:gd name="connsiteX4" fmla="*/ 2665700 w 5406249"/>
+              <a:gd name="connsiteY4" fmla="*/ 5187467 h 5424433"/>
+              <a:gd name="connsiteX5" fmla="*/ 159893 w 5406249"/>
+              <a:gd name="connsiteY5" fmla="*/ 5231428 h 5424433"/>
+              <a:gd name="connsiteX6" fmla="*/ 546755 w 5406249"/>
+              <a:gd name="connsiteY6" fmla="*/ 3930167 h 5424433"/>
+              <a:gd name="connsiteX7" fmla="*/ 2507441 w 5406249"/>
+              <a:gd name="connsiteY7" fmla="*/ 3833455 h 5424433"/>
+              <a:gd name="connsiteX8" fmla="*/ 2270050 w 5406249"/>
+              <a:gd name="connsiteY8" fmla="*/ 2118954 h 5424433"/>
+              <a:gd name="connsiteX9" fmla="*/ 2393143 w 5406249"/>
+              <a:gd name="connsiteY9" fmla="*/ 8799 h 5424433"/>
+              <a:gd name="connsiteX0" fmla="*/ 2498646 w 5406249"/>
+              <a:gd name="connsiteY0" fmla="*/ 4 h 5424433"/>
+              <a:gd name="connsiteX1" fmla="*/ 5400111 w 5406249"/>
+              <a:gd name="connsiteY1" fmla="*/ 439622 h 5424433"/>
+              <a:gd name="connsiteX2" fmla="*/ 5136339 w 5406249"/>
+              <a:gd name="connsiteY2" fmla="*/ 2664075 h 5424433"/>
+              <a:gd name="connsiteX3" fmla="*/ 3114108 w 5406249"/>
+              <a:gd name="connsiteY3" fmla="*/ 3059729 h 5424433"/>
+              <a:gd name="connsiteX4" fmla="*/ 2665700 w 5406249"/>
+              <a:gd name="connsiteY4" fmla="*/ 5187467 h 5424433"/>
+              <a:gd name="connsiteX5" fmla="*/ 159893 w 5406249"/>
+              <a:gd name="connsiteY5" fmla="*/ 5231428 h 5424433"/>
+              <a:gd name="connsiteX6" fmla="*/ 546755 w 5406249"/>
+              <a:gd name="connsiteY6" fmla="*/ 3930167 h 5424433"/>
+              <a:gd name="connsiteX7" fmla="*/ 2507441 w 5406249"/>
+              <a:gd name="connsiteY7" fmla="*/ 3833455 h 5424433"/>
+              <a:gd name="connsiteX8" fmla="*/ 2270050 w 5406249"/>
+              <a:gd name="connsiteY8" fmla="*/ 2118954 h 5424433"/>
+              <a:gd name="connsiteX9" fmla="*/ 2393143 w 5406249"/>
+              <a:gd name="connsiteY9" fmla="*/ 8799 h 5424433"/>
+              <a:gd name="connsiteX0" fmla="*/ 2498646 w 5406249"/>
+              <a:gd name="connsiteY0" fmla="*/ 8790 h 5433219"/>
+              <a:gd name="connsiteX1" fmla="*/ 5400111 w 5406249"/>
+              <a:gd name="connsiteY1" fmla="*/ 448408 h 5433219"/>
+              <a:gd name="connsiteX2" fmla="*/ 5136339 w 5406249"/>
+              <a:gd name="connsiteY2" fmla="*/ 2672861 h 5433219"/>
+              <a:gd name="connsiteX3" fmla="*/ 3114108 w 5406249"/>
+              <a:gd name="connsiteY3" fmla="*/ 3068515 h 5433219"/>
+              <a:gd name="connsiteX4" fmla="*/ 2665700 w 5406249"/>
+              <a:gd name="connsiteY4" fmla="*/ 5196253 h 5433219"/>
+              <a:gd name="connsiteX5" fmla="*/ 159893 w 5406249"/>
+              <a:gd name="connsiteY5" fmla="*/ 5240214 h 5433219"/>
+              <a:gd name="connsiteX6" fmla="*/ 546755 w 5406249"/>
+              <a:gd name="connsiteY6" fmla="*/ 3938953 h 5433219"/>
+              <a:gd name="connsiteX7" fmla="*/ 2507441 w 5406249"/>
+              <a:gd name="connsiteY7" fmla="*/ 3842241 h 5433219"/>
+              <a:gd name="connsiteX8" fmla="*/ 2270050 w 5406249"/>
+              <a:gd name="connsiteY8" fmla="*/ 2127740 h 5433219"/>
+              <a:gd name="connsiteX9" fmla="*/ 2525028 w 5406249"/>
+              <a:gd name="connsiteY9" fmla="*/ 0 h 5433219"/>
+              <a:gd name="connsiteX0" fmla="*/ 2498646 w 5406249"/>
+              <a:gd name="connsiteY0" fmla="*/ 8790 h 5433219"/>
+              <a:gd name="connsiteX1" fmla="*/ 5400111 w 5406249"/>
+              <a:gd name="connsiteY1" fmla="*/ 448408 h 5433219"/>
+              <a:gd name="connsiteX2" fmla="*/ 5136339 w 5406249"/>
+              <a:gd name="connsiteY2" fmla="*/ 2672861 h 5433219"/>
+              <a:gd name="connsiteX3" fmla="*/ 3114108 w 5406249"/>
+              <a:gd name="connsiteY3" fmla="*/ 3068515 h 5433219"/>
+              <a:gd name="connsiteX4" fmla="*/ 2665700 w 5406249"/>
+              <a:gd name="connsiteY4" fmla="*/ 5196253 h 5433219"/>
+              <a:gd name="connsiteX5" fmla="*/ 159893 w 5406249"/>
+              <a:gd name="connsiteY5" fmla="*/ 5240214 h 5433219"/>
+              <a:gd name="connsiteX6" fmla="*/ 546755 w 5406249"/>
+              <a:gd name="connsiteY6" fmla="*/ 3938953 h 5433219"/>
+              <a:gd name="connsiteX7" fmla="*/ 2507441 w 5406249"/>
+              <a:gd name="connsiteY7" fmla="*/ 3842241 h 5433219"/>
+              <a:gd name="connsiteX8" fmla="*/ 2270050 w 5406249"/>
+              <a:gd name="connsiteY8" fmla="*/ 2127740 h 5433219"/>
+              <a:gd name="connsiteX9" fmla="*/ 2525028 w 5406249"/>
+              <a:gd name="connsiteY9" fmla="*/ 0 h 5433219"/>
+              <a:gd name="connsiteX0" fmla="*/ 2498646 w 5406249"/>
+              <a:gd name="connsiteY0" fmla="*/ 4 h 5424433"/>
+              <a:gd name="connsiteX1" fmla="*/ 5400111 w 5406249"/>
+              <a:gd name="connsiteY1" fmla="*/ 439622 h 5424433"/>
+              <a:gd name="connsiteX2" fmla="*/ 5136339 w 5406249"/>
+              <a:gd name="connsiteY2" fmla="*/ 2664075 h 5424433"/>
+              <a:gd name="connsiteX3" fmla="*/ 3114108 w 5406249"/>
+              <a:gd name="connsiteY3" fmla="*/ 3059729 h 5424433"/>
+              <a:gd name="connsiteX4" fmla="*/ 2665700 w 5406249"/>
+              <a:gd name="connsiteY4" fmla="*/ 5187467 h 5424433"/>
+              <a:gd name="connsiteX5" fmla="*/ 159893 w 5406249"/>
+              <a:gd name="connsiteY5" fmla="*/ 5231428 h 5424433"/>
+              <a:gd name="connsiteX6" fmla="*/ 546755 w 5406249"/>
+              <a:gd name="connsiteY6" fmla="*/ 3930167 h 5424433"/>
+              <a:gd name="connsiteX7" fmla="*/ 2507441 w 5406249"/>
+              <a:gd name="connsiteY7" fmla="*/ 3833455 h 5424433"/>
+              <a:gd name="connsiteX8" fmla="*/ 2270050 w 5406249"/>
+              <a:gd name="connsiteY8" fmla="*/ 2118954 h 5424433"/>
+              <a:gd name="connsiteX9" fmla="*/ 2454689 w 5406249"/>
+              <a:gd name="connsiteY9" fmla="*/ 6 h 5424433"/>
+              <a:gd name="connsiteX0" fmla="*/ 2498646 w 5394218"/>
+              <a:gd name="connsiteY0" fmla="*/ 66284 h 5490713"/>
+              <a:gd name="connsiteX1" fmla="*/ 5382526 w 5394218"/>
+              <a:gd name="connsiteY1" fmla="*/ 268510 h 5490713"/>
+              <a:gd name="connsiteX2" fmla="*/ 5136339 w 5394218"/>
+              <a:gd name="connsiteY2" fmla="*/ 2730355 h 5490713"/>
+              <a:gd name="connsiteX3" fmla="*/ 3114108 w 5394218"/>
+              <a:gd name="connsiteY3" fmla="*/ 3126009 h 5490713"/>
+              <a:gd name="connsiteX4" fmla="*/ 2665700 w 5394218"/>
+              <a:gd name="connsiteY4" fmla="*/ 5253747 h 5490713"/>
+              <a:gd name="connsiteX5" fmla="*/ 159893 w 5394218"/>
+              <a:gd name="connsiteY5" fmla="*/ 5297708 h 5490713"/>
+              <a:gd name="connsiteX6" fmla="*/ 546755 w 5394218"/>
+              <a:gd name="connsiteY6" fmla="*/ 3996447 h 5490713"/>
+              <a:gd name="connsiteX7" fmla="*/ 2507441 w 5394218"/>
+              <a:gd name="connsiteY7" fmla="*/ 3899735 h 5490713"/>
+              <a:gd name="connsiteX8" fmla="*/ 2270050 w 5394218"/>
+              <a:gd name="connsiteY8" fmla="*/ 2185234 h 5490713"/>
+              <a:gd name="connsiteX9" fmla="*/ 2454689 w 5394218"/>
+              <a:gd name="connsiteY9" fmla="*/ 66286 h 5490713"/>
+              <a:gd name="connsiteX0" fmla="*/ 2498646 w 5442810"/>
+              <a:gd name="connsiteY0" fmla="*/ 66284 h 5490713"/>
+              <a:gd name="connsiteX1" fmla="*/ 5382526 w 5442810"/>
+              <a:gd name="connsiteY1" fmla="*/ 268510 h 5490713"/>
+              <a:gd name="connsiteX2" fmla="*/ 5233055 w 5442810"/>
+              <a:gd name="connsiteY2" fmla="*/ 2783109 h 5490713"/>
+              <a:gd name="connsiteX3" fmla="*/ 3114108 w 5442810"/>
+              <a:gd name="connsiteY3" fmla="*/ 3126009 h 5490713"/>
+              <a:gd name="connsiteX4" fmla="*/ 2665700 w 5442810"/>
+              <a:gd name="connsiteY4" fmla="*/ 5253747 h 5490713"/>
+              <a:gd name="connsiteX5" fmla="*/ 159893 w 5442810"/>
+              <a:gd name="connsiteY5" fmla="*/ 5297708 h 5490713"/>
+              <a:gd name="connsiteX6" fmla="*/ 546755 w 5442810"/>
+              <a:gd name="connsiteY6" fmla="*/ 3996447 h 5490713"/>
+              <a:gd name="connsiteX7" fmla="*/ 2507441 w 5442810"/>
+              <a:gd name="connsiteY7" fmla="*/ 3899735 h 5490713"/>
+              <a:gd name="connsiteX8" fmla="*/ 2270050 w 5442810"/>
+              <a:gd name="connsiteY8" fmla="*/ 2185234 h 5490713"/>
+              <a:gd name="connsiteX9" fmla="*/ 2454689 w 5442810"/>
+              <a:gd name="connsiteY9" fmla="*/ 66286 h 5490713"/>
+              <a:gd name="connsiteX0" fmla="*/ 2498646 w 5442810"/>
+              <a:gd name="connsiteY0" fmla="*/ 66284 h 5490713"/>
+              <a:gd name="connsiteX1" fmla="*/ 5382526 w 5442810"/>
+              <a:gd name="connsiteY1" fmla="*/ 268510 h 5490713"/>
+              <a:gd name="connsiteX2" fmla="*/ 5233055 w 5442810"/>
+              <a:gd name="connsiteY2" fmla="*/ 2783109 h 5490713"/>
+              <a:gd name="connsiteX3" fmla="*/ 3114108 w 5442810"/>
+              <a:gd name="connsiteY3" fmla="*/ 3126009 h 5490713"/>
+              <a:gd name="connsiteX4" fmla="*/ 2665700 w 5442810"/>
+              <a:gd name="connsiteY4" fmla="*/ 5253747 h 5490713"/>
+              <a:gd name="connsiteX5" fmla="*/ 159893 w 5442810"/>
+              <a:gd name="connsiteY5" fmla="*/ 5297708 h 5490713"/>
+              <a:gd name="connsiteX6" fmla="*/ 546755 w 5442810"/>
+              <a:gd name="connsiteY6" fmla="*/ 3996447 h 5490713"/>
+              <a:gd name="connsiteX7" fmla="*/ 2507441 w 5442810"/>
+              <a:gd name="connsiteY7" fmla="*/ 3899735 h 5490713"/>
+              <a:gd name="connsiteX8" fmla="*/ 2481065 w 5442810"/>
+              <a:gd name="connsiteY8" fmla="*/ 2220403 h 5490713"/>
+              <a:gd name="connsiteX9" fmla="*/ 2454689 w 5442810"/>
+              <a:gd name="connsiteY9" fmla="*/ 66286 h 5490713"/>
+              <a:gd name="connsiteX0" fmla="*/ 2498646 w 5442810"/>
+              <a:gd name="connsiteY0" fmla="*/ 66284 h 5490713"/>
+              <a:gd name="connsiteX1" fmla="*/ 5382526 w 5442810"/>
+              <a:gd name="connsiteY1" fmla="*/ 268510 h 5490713"/>
+              <a:gd name="connsiteX2" fmla="*/ 5233055 w 5442810"/>
+              <a:gd name="connsiteY2" fmla="*/ 2783109 h 5490713"/>
+              <a:gd name="connsiteX3" fmla="*/ 3114108 w 5442810"/>
+              <a:gd name="connsiteY3" fmla="*/ 3126009 h 5490713"/>
+              <a:gd name="connsiteX4" fmla="*/ 2665700 w 5442810"/>
+              <a:gd name="connsiteY4" fmla="*/ 5253747 h 5490713"/>
+              <a:gd name="connsiteX5" fmla="*/ 159893 w 5442810"/>
+              <a:gd name="connsiteY5" fmla="*/ 5297708 h 5490713"/>
+              <a:gd name="connsiteX6" fmla="*/ 546755 w 5442810"/>
+              <a:gd name="connsiteY6" fmla="*/ 3996447 h 5490713"/>
+              <a:gd name="connsiteX7" fmla="*/ 2349180 w 5442810"/>
+              <a:gd name="connsiteY7" fmla="*/ 3890943 h 5490713"/>
+              <a:gd name="connsiteX8" fmla="*/ 2481065 w 5442810"/>
+              <a:gd name="connsiteY8" fmla="*/ 2220403 h 5490713"/>
+              <a:gd name="connsiteX9" fmla="*/ 2454689 w 5442810"/>
+              <a:gd name="connsiteY9" fmla="*/ 66286 h 5490713"/>
+              <a:gd name="connsiteX0" fmla="*/ 3386669 w 5442810"/>
+              <a:gd name="connsiteY0" fmla="*/ 40482 h 5517665"/>
+              <a:gd name="connsiteX1" fmla="*/ 5382526 w 5442810"/>
+              <a:gd name="connsiteY1" fmla="*/ 295462 h 5517665"/>
+              <a:gd name="connsiteX2" fmla="*/ 5233055 w 5442810"/>
+              <a:gd name="connsiteY2" fmla="*/ 2810061 h 5517665"/>
+              <a:gd name="connsiteX3" fmla="*/ 3114108 w 5442810"/>
+              <a:gd name="connsiteY3" fmla="*/ 3152961 h 5517665"/>
+              <a:gd name="connsiteX4" fmla="*/ 2665700 w 5442810"/>
+              <a:gd name="connsiteY4" fmla="*/ 5280699 h 5517665"/>
+              <a:gd name="connsiteX5" fmla="*/ 159893 w 5442810"/>
+              <a:gd name="connsiteY5" fmla="*/ 5324660 h 5517665"/>
+              <a:gd name="connsiteX6" fmla="*/ 546755 w 5442810"/>
+              <a:gd name="connsiteY6" fmla="*/ 4023399 h 5517665"/>
+              <a:gd name="connsiteX7" fmla="*/ 2349180 w 5442810"/>
+              <a:gd name="connsiteY7" fmla="*/ 3917895 h 5517665"/>
+              <a:gd name="connsiteX8" fmla="*/ 2481065 w 5442810"/>
+              <a:gd name="connsiteY8" fmla="*/ 2247355 h 5517665"/>
+              <a:gd name="connsiteX9" fmla="*/ 2454689 w 5442810"/>
+              <a:gd name="connsiteY9" fmla="*/ 93238 h 5517665"/>
+              <a:gd name="connsiteX0" fmla="*/ 3386669 w 5442810"/>
+              <a:gd name="connsiteY0" fmla="*/ 40482 h 5517665"/>
+              <a:gd name="connsiteX1" fmla="*/ 5382526 w 5442810"/>
+              <a:gd name="connsiteY1" fmla="*/ 295462 h 5517665"/>
+              <a:gd name="connsiteX2" fmla="*/ 5233055 w 5442810"/>
+              <a:gd name="connsiteY2" fmla="*/ 2810061 h 5517665"/>
+              <a:gd name="connsiteX3" fmla="*/ 3114108 w 5442810"/>
+              <a:gd name="connsiteY3" fmla="*/ 3152961 h 5517665"/>
+              <a:gd name="connsiteX4" fmla="*/ 2665700 w 5442810"/>
+              <a:gd name="connsiteY4" fmla="*/ 5280699 h 5517665"/>
+              <a:gd name="connsiteX5" fmla="*/ 159893 w 5442810"/>
+              <a:gd name="connsiteY5" fmla="*/ 5324660 h 5517665"/>
+              <a:gd name="connsiteX6" fmla="*/ 546755 w 5442810"/>
+              <a:gd name="connsiteY6" fmla="*/ 4023399 h 5517665"/>
+              <a:gd name="connsiteX7" fmla="*/ 2349180 w 5442810"/>
+              <a:gd name="connsiteY7" fmla="*/ 3917895 h 5517665"/>
+              <a:gd name="connsiteX8" fmla="*/ 2481065 w 5442810"/>
+              <a:gd name="connsiteY8" fmla="*/ 2247355 h 5517665"/>
+              <a:gd name="connsiteX9" fmla="*/ 3369089 w 5442810"/>
+              <a:gd name="connsiteY9" fmla="*/ 31692 h 5517665"/>
+              <a:gd name="connsiteX0" fmla="*/ 3386669 w 5442810"/>
+              <a:gd name="connsiteY0" fmla="*/ 40482 h 5517665"/>
+              <a:gd name="connsiteX1" fmla="*/ 5382526 w 5442810"/>
+              <a:gd name="connsiteY1" fmla="*/ 295462 h 5517665"/>
+              <a:gd name="connsiteX2" fmla="*/ 5233055 w 5442810"/>
+              <a:gd name="connsiteY2" fmla="*/ 2810061 h 5517665"/>
+              <a:gd name="connsiteX3" fmla="*/ 3114108 w 5442810"/>
+              <a:gd name="connsiteY3" fmla="*/ 3152961 h 5517665"/>
+              <a:gd name="connsiteX4" fmla="*/ 2665700 w 5442810"/>
+              <a:gd name="connsiteY4" fmla="*/ 5280699 h 5517665"/>
+              <a:gd name="connsiteX5" fmla="*/ 159893 w 5442810"/>
+              <a:gd name="connsiteY5" fmla="*/ 5324660 h 5517665"/>
+              <a:gd name="connsiteX6" fmla="*/ 546755 w 5442810"/>
+              <a:gd name="connsiteY6" fmla="*/ 4023399 h 5517665"/>
+              <a:gd name="connsiteX7" fmla="*/ 2349180 w 5442810"/>
+              <a:gd name="connsiteY7" fmla="*/ 3917895 h 5517665"/>
+              <a:gd name="connsiteX8" fmla="*/ 2481065 w 5442810"/>
+              <a:gd name="connsiteY8" fmla="*/ 2247355 h 5517665"/>
+              <a:gd name="connsiteX9" fmla="*/ 3369089 w 5442810"/>
+              <a:gd name="connsiteY9" fmla="*/ 31692 h 5517665"/>
+              <a:gd name="connsiteX0" fmla="*/ 3386669 w 5442810"/>
+              <a:gd name="connsiteY0" fmla="*/ 40482 h 5517665"/>
+              <a:gd name="connsiteX1" fmla="*/ 5382526 w 5442810"/>
+              <a:gd name="connsiteY1" fmla="*/ 295462 h 5517665"/>
+              <a:gd name="connsiteX2" fmla="*/ 5233055 w 5442810"/>
+              <a:gd name="connsiteY2" fmla="*/ 2810061 h 5517665"/>
+              <a:gd name="connsiteX3" fmla="*/ 3114108 w 5442810"/>
+              <a:gd name="connsiteY3" fmla="*/ 3152961 h 5517665"/>
+              <a:gd name="connsiteX4" fmla="*/ 2665700 w 5442810"/>
+              <a:gd name="connsiteY4" fmla="*/ 5280699 h 5517665"/>
+              <a:gd name="connsiteX5" fmla="*/ 159893 w 5442810"/>
+              <a:gd name="connsiteY5" fmla="*/ 5324660 h 5517665"/>
+              <a:gd name="connsiteX6" fmla="*/ 546755 w 5442810"/>
+              <a:gd name="connsiteY6" fmla="*/ 4023399 h 5517665"/>
+              <a:gd name="connsiteX7" fmla="*/ 2349180 w 5442810"/>
+              <a:gd name="connsiteY7" fmla="*/ 3917895 h 5517665"/>
+              <a:gd name="connsiteX8" fmla="*/ 2481065 w 5442810"/>
+              <a:gd name="connsiteY8" fmla="*/ 2247355 h 5517665"/>
+              <a:gd name="connsiteX9" fmla="*/ 3193243 w 5442810"/>
+              <a:gd name="connsiteY9" fmla="*/ 31692 h 5517665"/>
+              <a:gd name="connsiteX0" fmla="*/ 3386669 w 5442810"/>
+              <a:gd name="connsiteY0" fmla="*/ 40482 h 5517665"/>
+              <a:gd name="connsiteX1" fmla="*/ 5382526 w 5442810"/>
+              <a:gd name="connsiteY1" fmla="*/ 295462 h 5517665"/>
+              <a:gd name="connsiteX2" fmla="*/ 5233055 w 5442810"/>
+              <a:gd name="connsiteY2" fmla="*/ 2810061 h 5517665"/>
+              <a:gd name="connsiteX3" fmla="*/ 3114108 w 5442810"/>
+              <a:gd name="connsiteY3" fmla="*/ 3152961 h 5517665"/>
+              <a:gd name="connsiteX4" fmla="*/ 2665700 w 5442810"/>
+              <a:gd name="connsiteY4" fmla="*/ 5280699 h 5517665"/>
+              <a:gd name="connsiteX5" fmla="*/ 159893 w 5442810"/>
+              <a:gd name="connsiteY5" fmla="*/ 5324660 h 5517665"/>
+              <a:gd name="connsiteX6" fmla="*/ 546755 w 5442810"/>
+              <a:gd name="connsiteY6" fmla="*/ 4023399 h 5517665"/>
+              <a:gd name="connsiteX7" fmla="*/ 2349180 w 5442810"/>
+              <a:gd name="connsiteY7" fmla="*/ 3917895 h 5517665"/>
+              <a:gd name="connsiteX8" fmla="*/ 2481065 w 5442810"/>
+              <a:gd name="connsiteY8" fmla="*/ 2247355 h 5517665"/>
+              <a:gd name="connsiteX9" fmla="*/ 3193243 w 5442810"/>
+              <a:gd name="connsiteY9" fmla="*/ 31692 h 5517665"/>
+              <a:gd name="connsiteX0" fmla="*/ 3386669 w 5412517"/>
+              <a:gd name="connsiteY0" fmla="*/ 40482 h 5517665"/>
+              <a:gd name="connsiteX1" fmla="*/ 5312188 w 5412517"/>
+              <a:gd name="connsiteY1" fmla="*/ 295462 h 5517665"/>
+              <a:gd name="connsiteX2" fmla="*/ 5233055 w 5412517"/>
+              <a:gd name="connsiteY2" fmla="*/ 2810061 h 5517665"/>
+              <a:gd name="connsiteX3" fmla="*/ 3114108 w 5412517"/>
+              <a:gd name="connsiteY3" fmla="*/ 3152961 h 5517665"/>
+              <a:gd name="connsiteX4" fmla="*/ 2665700 w 5412517"/>
+              <a:gd name="connsiteY4" fmla="*/ 5280699 h 5517665"/>
+              <a:gd name="connsiteX5" fmla="*/ 159893 w 5412517"/>
+              <a:gd name="connsiteY5" fmla="*/ 5324660 h 5517665"/>
+              <a:gd name="connsiteX6" fmla="*/ 546755 w 5412517"/>
+              <a:gd name="connsiteY6" fmla="*/ 4023399 h 5517665"/>
+              <a:gd name="connsiteX7" fmla="*/ 2349180 w 5412517"/>
+              <a:gd name="connsiteY7" fmla="*/ 3917895 h 5517665"/>
+              <a:gd name="connsiteX8" fmla="*/ 2481065 w 5412517"/>
+              <a:gd name="connsiteY8" fmla="*/ 2247355 h 5517665"/>
+              <a:gd name="connsiteX9" fmla="*/ 3193243 w 5412517"/>
+              <a:gd name="connsiteY9" fmla="*/ 31692 h 5517665"/>
+              <a:gd name="connsiteX0" fmla="*/ 3386669 w 5516867"/>
+              <a:gd name="connsiteY0" fmla="*/ 40482 h 5517665"/>
+              <a:gd name="connsiteX1" fmla="*/ 5312188 w 5516867"/>
+              <a:gd name="connsiteY1" fmla="*/ 295462 h 5517665"/>
+              <a:gd name="connsiteX2" fmla="*/ 5233055 w 5516867"/>
+              <a:gd name="connsiteY2" fmla="*/ 2810061 h 5517665"/>
+              <a:gd name="connsiteX3" fmla="*/ 3114108 w 5516867"/>
+              <a:gd name="connsiteY3" fmla="*/ 3152961 h 5517665"/>
+              <a:gd name="connsiteX4" fmla="*/ 2665700 w 5516867"/>
+              <a:gd name="connsiteY4" fmla="*/ 5280699 h 5517665"/>
+              <a:gd name="connsiteX5" fmla="*/ 159893 w 5516867"/>
+              <a:gd name="connsiteY5" fmla="*/ 5324660 h 5517665"/>
+              <a:gd name="connsiteX6" fmla="*/ 546755 w 5516867"/>
+              <a:gd name="connsiteY6" fmla="*/ 4023399 h 5517665"/>
+              <a:gd name="connsiteX7" fmla="*/ 2349180 w 5516867"/>
+              <a:gd name="connsiteY7" fmla="*/ 3917895 h 5517665"/>
+              <a:gd name="connsiteX8" fmla="*/ 2481065 w 5516867"/>
+              <a:gd name="connsiteY8" fmla="*/ 2247355 h 5517665"/>
+              <a:gd name="connsiteX9" fmla="*/ 3193243 w 5516867"/>
+              <a:gd name="connsiteY9" fmla="*/ 31692 h 5517665"/>
+              <a:gd name="connsiteX0" fmla="*/ 3386669 w 5440613"/>
+              <a:gd name="connsiteY0" fmla="*/ 40482 h 5517665"/>
+              <a:gd name="connsiteX1" fmla="*/ 5312188 w 5440613"/>
+              <a:gd name="connsiteY1" fmla="*/ 295462 h 5517665"/>
+              <a:gd name="connsiteX2" fmla="*/ 5233055 w 5440613"/>
+              <a:gd name="connsiteY2" fmla="*/ 2810061 h 5517665"/>
+              <a:gd name="connsiteX3" fmla="*/ 3114108 w 5440613"/>
+              <a:gd name="connsiteY3" fmla="*/ 3152961 h 5517665"/>
+              <a:gd name="connsiteX4" fmla="*/ 2665700 w 5440613"/>
+              <a:gd name="connsiteY4" fmla="*/ 5280699 h 5517665"/>
+              <a:gd name="connsiteX5" fmla="*/ 159893 w 5440613"/>
+              <a:gd name="connsiteY5" fmla="*/ 5324660 h 5517665"/>
+              <a:gd name="connsiteX6" fmla="*/ 546755 w 5440613"/>
+              <a:gd name="connsiteY6" fmla="*/ 4023399 h 5517665"/>
+              <a:gd name="connsiteX7" fmla="*/ 2349180 w 5440613"/>
+              <a:gd name="connsiteY7" fmla="*/ 3917895 h 5517665"/>
+              <a:gd name="connsiteX8" fmla="*/ 2481065 w 5440613"/>
+              <a:gd name="connsiteY8" fmla="*/ 2247355 h 5517665"/>
+              <a:gd name="connsiteX9" fmla="*/ 3193243 w 5440613"/>
+              <a:gd name="connsiteY9" fmla="*/ 31692 h 5517665"/>
+              <a:gd name="connsiteX0" fmla="*/ 3386669 w 5410610"/>
+              <a:gd name="connsiteY0" fmla="*/ 85931 h 5563114"/>
+              <a:gd name="connsiteX1" fmla="*/ 5241849 w 5410610"/>
+              <a:gd name="connsiteY1" fmla="*/ 252987 h 5563114"/>
+              <a:gd name="connsiteX2" fmla="*/ 5233055 w 5410610"/>
+              <a:gd name="connsiteY2" fmla="*/ 2855510 h 5563114"/>
+              <a:gd name="connsiteX3" fmla="*/ 3114108 w 5410610"/>
+              <a:gd name="connsiteY3" fmla="*/ 3198410 h 5563114"/>
+              <a:gd name="connsiteX4" fmla="*/ 2665700 w 5410610"/>
+              <a:gd name="connsiteY4" fmla="*/ 5326148 h 5563114"/>
+              <a:gd name="connsiteX5" fmla="*/ 159893 w 5410610"/>
+              <a:gd name="connsiteY5" fmla="*/ 5370109 h 5563114"/>
+              <a:gd name="connsiteX6" fmla="*/ 546755 w 5410610"/>
+              <a:gd name="connsiteY6" fmla="*/ 4068848 h 5563114"/>
+              <a:gd name="connsiteX7" fmla="*/ 2349180 w 5410610"/>
+              <a:gd name="connsiteY7" fmla="*/ 3963344 h 5563114"/>
+              <a:gd name="connsiteX8" fmla="*/ 2481065 w 5410610"/>
+              <a:gd name="connsiteY8" fmla="*/ 2292804 h 5563114"/>
+              <a:gd name="connsiteX9" fmla="*/ 3193243 w 5410610"/>
+              <a:gd name="connsiteY9" fmla="*/ 77141 h 5563114"/>
+              <a:gd name="connsiteX0" fmla="*/ 3386669 w 5410610"/>
+              <a:gd name="connsiteY0" fmla="*/ 85931 h 5563114"/>
+              <a:gd name="connsiteX1" fmla="*/ 5241849 w 5410610"/>
+              <a:gd name="connsiteY1" fmla="*/ 252987 h 5563114"/>
+              <a:gd name="connsiteX2" fmla="*/ 5233055 w 5410610"/>
+              <a:gd name="connsiteY2" fmla="*/ 2855510 h 5563114"/>
+              <a:gd name="connsiteX3" fmla="*/ 3114108 w 5410610"/>
+              <a:gd name="connsiteY3" fmla="*/ 3198410 h 5563114"/>
+              <a:gd name="connsiteX4" fmla="*/ 2665700 w 5410610"/>
+              <a:gd name="connsiteY4" fmla="*/ 5326148 h 5563114"/>
+              <a:gd name="connsiteX5" fmla="*/ 159893 w 5410610"/>
+              <a:gd name="connsiteY5" fmla="*/ 5370109 h 5563114"/>
+              <a:gd name="connsiteX6" fmla="*/ 546755 w 5410610"/>
+              <a:gd name="connsiteY6" fmla="*/ 4068848 h 5563114"/>
+              <a:gd name="connsiteX7" fmla="*/ 2349180 w 5410610"/>
+              <a:gd name="connsiteY7" fmla="*/ 3963344 h 5563114"/>
+              <a:gd name="connsiteX8" fmla="*/ 2481065 w 5410610"/>
+              <a:gd name="connsiteY8" fmla="*/ 2292804 h 5563114"/>
+              <a:gd name="connsiteX9" fmla="*/ 3325128 w 5410610"/>
+              <a:gd name="connsiteY9" fmla="*/ 138688 h 5563114"/>
+              <a:gd name="connsiteX0" fmla="*/ 3386669 w 5410610"/>
+              <a:gd name="connsiteY0" fmla="*/ 85931 h 5563114"/>
+              <a:gd name="connsiteX1" fmla="*/ 5241849 w 5410610"/>
+              <a:gd name="connsiteY1" fmla="*/ 252987 h 5563114"/>
+              <a:gd name="connsiteX2" fmla="*/ 5233055 w 5410610"/>
+              <a:gd name="connsiteY2" fmla="*/ 2855510 h 5563114"/>
+              <a:gd name="connsiteX3" fmla="*/ 3114108 w 5410610"/>
+              <a:gd name="connsiteY3" fmla="*/ 3198410 h 5563114"/>
+              <a:gd name="connsiteX4" fmla="*/ 2665700 w 5410610"/>
+              <a:gd name="connsiteY4" fmla="*/ 5326148 h 5563114"/>
+              <a:gd name="connsiteX5" fmla="*/ 159893 w 5410610"/>
+              <a:gd name="connsiteY5" fmla="*/ 5370109 h 5563114"/>
+              <a:gd name="connsiteX6" fmla="*/ 546755 w 5410610"/>
+              <a:gd name="connsiteY6" fmla="*/ 4068848 h 5563114"/>
+              <a:gd name="connsiteX7" fmla="*/ 2349180 w 5410610"/>
+              <a:gd name="connsiteY7" fmla="*/ 3963344 h 5563114"/>
+              <a:gd name="connsiteX8" fmla="*/ 2481065 w 5410610"/>
+              <a:gd name="connsiteY8" fmla="*/ 2292804 h 5563114"/>
+              <a:gd name="connsiteX9" fmla="*/ 3395466 w 5410610"/>
+              <a:gd name="connsiteY9" fmla="*/ 41973 h 5563114"/>
+              <a:gd name="connsiteX0" fmla="*/ 3386669 w 5410610"/>
+              <a:gd name="connsiteY0" fmla="*/ 85931 h 5563114"/>
+              <a:gd name="connsiteX1" fmla="*/ 5241849 w 5410610"/>
+              <a:gd name="connsiteY1" fmla="*/ 252987 h 5563114"/>
+              <a:gd name="connsiteX2" fmla="*/ 5233055 w 5410610"/>
+              <a:gd name="connsiteY2" fmla="*/ 2855510 h 5563114"/>
+              <a:gd name="connsiteX3" fmla="*/ 3114108 w 5410610"/>
+              <a:gd name="connsiteY3" fmla="*/ 3198410 h 5563114"/>
+              <a:gd name="connsiteX4" fmla="*/ 2665700 w 5410610"/>
+              <a:gd name="connsiteY4" fmla="*/ 5326148 h 5563114"/>
+              <a:gd name="connsiteX5" fmla="*/ 159893 w 5410610"/>
+              <a:gd name="connsiteY5" fmla="*/ 5370109 h 5563114"/>
+              <a:gd name="connsiteX6" fmla="*/ 546755 w 5410610"/>
+              <a:gd name="connsiteY6" fmla="*/ 4068848 h 5563114"/>
+              <a:gd name="connsiteX7" fmla="*/ 2349180 w 5410610"/>
+              <a:gd name="connsiteY7" fmla="*/ 3963344 h 5563114"/>
+              <a:gd name="connsiteX8" fmla="*/ 2481065 w 5410610"/>
+              <a:gd name="connsiteY8" fmla="*/ 2292804 h 5563114"/>
+              <a:gd name="connsiteX9" fmla="*/ 3413051 w 5410610"/>
+              <a:gd name="connsiteY9" fmla="*/ 85935 h 5563114"/>
+              <a:gd name="connsiteX0" fmla="*/ 3386669 w 5410610"/>
+              <a:gd name="connsiteY0" fmla="*/ 85931 h 5563114"/>
+              <a:gd name="connsiteX1" fmla="*/ 5241849 w 5410610"/>
+              <a:gd name="connsiteY1" fmla="*/ 252987 h 5563114"/>
+              <a:gd name="connsiteX2" fmla="*/ 5233055 w 5410610"/>
+              <a:gd name="connsiteY2" fmla="*/ 2855510 h 5563114"/>
+              <a:gd name="connsiteX3" fmla="*/ 3114108 w 5410610"/>
+              <a:gd name="connsiteY3" fmla="*/ 3198410 h 5563114"/>
+              <a:gd name="connsiteX4" fmla="*/ 2665700 w 5410610"/>
+              <a:gd name="connsiteY4" fmla="*/ 5326148 h 5563114"/>
+              <a:gd name="connsiteX5" fmla="*/ 159893 w 5410610"/>
+              <a:gd name="connsiteY5" fmla="*/ 5370109 h 5563114"/>
+              <a:gd name="connsiteX6" fmla="*/ 546755 w 5410610"/>
+              <a:gd name="connsiteY6" fmla="*/ 4068848 h 5563114"/>
+              <a:gd name="connsiteX7" fmla="*/ 2349180 w 5410610"/>
+              <a:gd name="connsiteY7" fmla="*/ 3963344 h 5563114"/>
+              <a:gd name="connsiteX8" fmla="*/ 2481065 w 5410610"/>
+              <a:gd name="connsiteY8" fmla="*/ 2292804 h 5563114"/>
+              <a:gd name="connsiteX9" fmla="*/ 3369089 w 5410610"/>
+              <a:gd name="connsiteY9" fmla="*/ 68350 h 5563114"/>
+              <a:gd name="connsiteX0" fmla="*/ 3147080 w 5171021"/>
+              <a:gd name="connsiteY0" fmla="*/ 85931 h 5630123"/>
+              <a:gd name="connsiteX1" fmla="*/ 5002260 w 5171021"/>
+              <a:gd name="connsiteY1" fmla="*/ 252987 h 5630123"/>
+              <a:gd name="connsiteX2" fmla="*/ 4993466 w 5171021"/>
+              <a:gd name="connsiteY2" fmla="*/ 2855510 h 5630123"/>
+              <a:gd name="connsiteX3" fmla="*/ 2874519 w 5171021"/>
+              <a:gd name="connsiteY3" fmla="*/ 3198410 h 5630123"/>
+              <a:gd name="connsiteX4" fmla="*/ 2426111 w 5171021"/>
+              <a:gd name="connsiteY4" fmla="*/ 5326148 h 5630123"/>
+              <a:gd name="connsiteX5" fmla="*/ 307166 w 5171021"/>
+              <a:gd name="connsiteY5" fmla="*/ 5484409 h 5630123"/>
+              <a:gd name="connsiteX6" fmla="*/ 307166 w 5171021"/>
+              <a:gd name="connsiteY6" fmla="*/ 4068848 h 5630123"/>
+              <a:gd name="connsiteX7" fmla="*/ 2109591 w 5171021"/>
+              <a:gd name="connsiteY7" fmla="*/ 3963344 h 5630123"/>
+              <a:gd name="connsiteX8" fmla="*/ 2241476 w 5171021"/>
+              <a:gd name="connsiteY8" fmla="*/ 2292804 h 5630123"/>
+              <a:gd name="connsiteX9" fmla="*/ 3129500 w 5171021"/>
+              <a:gd name="connsiteY9" fmla="*/ 68350 h 5630123"/>
+              <a:gd name="connsiteX0" fmla="*/ 3147080 w 5171021"/>
+              <a:gd name="connsiteY0" fmla="*/ 85931 h 5630123"/>
+              <a:gd name="connsiteX1" fmla="*/ 5002260 w 5171021"/>
+              <a:gd name="connsiteY1" fmla="*/ 252987 h 5630123"/>
+              <a:gd name="connsiteX2" fmla="*/ 4993466 w 5171021"/>
+              <a:gd name="connsiteY2" fmla="*/ 2855510 h 5630123"/>
+              <a:gd name="connsiteX3" fmla="*/ 2874519 w 5171021"/>
+              <a:gd name="connsiteY3" fmla="*/ 3198410 h 5630123"/>
+              <a:gd name="connsiteX4" fmla="*/ 2426111 w 5171021"/>
+              <a:gd name="connsiteY4" fmla="*/ 5326148 h 5630123"/>
+              <a:gd name="connsiteX5" fmla="*/ 307166 w 5171021"/>
+              <a:gd name="connsiteY5" fmla="*/ 5484409 h 5630123"/>
+              <a:gd name="connsiteX6" fmla="*/ 307166 w 5171021"/>
+              <a:gd name="connsiteY6" fmla="*/ 4068848 h 5630123"/>
+              <a:gd name="connsiteX7" fmla="*/ 2109591 w 5171021"/>
+              <a:gd name="connsiteY7" fmla="*/ 3963344 h 5630123"/>
+              <a:gd name="connsiteX8" fmla="*/ 2241476 w 5171021"/>
+              <a:gd name="connsiteY8" fmla="*/ 2292804 h 5630123"/>
+              <a:gd name="connsiteX9" fmla="*/ 2927277 w 5171021"/>
+              <a:gd name="connsiteY9" fmla="*/ 33181 h 5630123"/>
+              <a:gd name="connsiteX0" fmla="*/ 3111911 w 5171021"/>
+              <a:gd name="connsiteY0" fmla="*/ 61658 h 5649811"/>
+              <a:gd name="connsiteX1" fmla="*/ 5002260 w 5171021"/>
+              <a:gd name="connsiteY1" fmla="*/ 272675 h 5649811"/>
+              <a:gd name="connsiteX2" fmla="*/ 4993466 w 5171021"/>
+              <a:gd name="connsiteY2" fmla="*/ 2875198 h 5649811"/>
+              <a:gd name="connsiteX3" fmla="*/ 2874519 w 5171021"/>
+              <a:gd name="connsiteY3" fmla="*/ 3218098 h 5649811"/>
+              <a:gd name="connsiteX4" fmla="*/ 2426111 w 5171021"/>
+              <a:gd name="connsiteY4" fmla="*/ 5345836 h 5649811"/>
+              <a:gd name="connsiteX5" fmla="*/ 307166 w 5171021"/>
+              <a:gd name="connsiteY5" fmla="*/ 5504097 h 5649811"/>
+              <a:gd name="connsiteX6" fmla="*/ 307166 w 5171021"/>
+              <a:gd name="connsiteY6" fmla="*/ 4088536 h 5649811"/>
+              <a:gd name="connsiteX7" fmla="*/ 2109591 w 5171021"/>
+              <a:gd name="connsiteY7" fmla="*/ 3983032 h 5649811"/>
+              <a:gd name="connsiteX8" fmla="*/ 2241476 w 5171021"/>
+              <a:gd name="connsiteY8" fmla="*/ 2312492 h 5649811"/>
+              <a:gd name="connsiteX9" fmla="*/ 2927277 w 5171021"/>
+              <a:gd name="connsiteY9" fmla="*/ 52869 h 5649811"/>
+              <a:gd name="connsiteX0" fmla="*/ 3111911 w 5174485"/>
+              <a:gd name="connsiteY0" fmla="*/ 20832 h 5608985"/>
+              <a:gd name="connsiteX1" fmla="*/ 5011052 w 5174485"/>
+              <a:gd name="connsiteY1" fmla="*/ 442864 h 5608985"/>
+              <a:gd name="connsiteX2" fmla="*/ 4993466 w 5174485"/>
+              <a:gd name="connsiteY2" fmla="*/ 2834372 h 5608985"/>
+              <a:gd name="connsiteX3" fmla="*/ 2874519 w 5174485"/>
+              <a:gd name="connsiteY3" fmla="*/ 3177272 h 5608985"/>
+              <a:gd name="connsiteX4" fmla="*/ 2426111 w 5174485"/>
+              <a:gd name="connsiteY4" fmla="*/ 5305010 h 5608985"/>
+              <a:gd name="connsiteX5" fmla="*/ 307166 w 5174485"/>
+              <a:gd name="connsiteY5" fmla="*/ 5463271 h 5608985"/>
+              <a:gd name="connsiteX6" fmla="*/ 307166 w 5174485"/>
+              <a:gd name="connsiteY6" fmla="*/ 4047710 h 5608985"/>
+              <a:gd name="connsiteX7" fmla="*/ 2109591 w 5174485"/>
+              <a:gd name="connsiteY7" fmla="*/ 3942206 h 5608985"/>
+              <a:gd name="connsiteX8" fmla="*/ 2241476 w 5174485"/>
+              <a:gd name="connsiteY8" fmla="*/ 2271666 h 5608985"/>
+              <a:gd name="connsiteX9" fmla="*/ 2927277 w 5174485"/>
+              <a:gd name="connsiteY9" fmla="*/ 12043 h 5608985"/>
+              <a:gd name="connsiteX0" fmla="*/ 3111911 w 5174485"/>
+              <a:gd name="connsiteY0" fmla="*/ 3358 h 5591511"/>
+              <a:gd name="connsiteX1" fmla="*/ 5011052 w 5174485"/>
+              <a:gd name="connsiteY1" fmla="*/ 425390 h 5591511"/>
+              <a:gd name="connsiteX2" fmla="*/ 4993466 w 5174485"/>
+              <a:gd name="connsiteY2" fmla="*/ 2816898 h 5591511"/>
+              <a:gd name="connsiteX3" fmla="*/ 2874519 w 5174485"/>
+              <a:gd name="connsiteY3" fmla="*/ 3159798 h 5591511"/>
+              <a:gd name="connsiteX4" fmla="*/ 2426111 w 5174485"/>
+              <a:gd name="connsiteY4" fmla="*/ 5287536 h 5591511"/>
+              <a:gd name="connsiteX5" fmla="*/ 307166 w 5174485"/>
+              <a:gd name="connsiteY5" fmla="*/ 5445797 h 5591511"/>
+              <a:gd name="connsiteX6" fmla="*/ 307166 w 5174485"/>
+              <a:gd name="connsiteY6" fmla="*/ 4030236 h 5591511"/>
+              <a:gd name="connsiteX7" fmla="*/ 2109591 w 5174485"/>
+              <a:gd name="connsiteY7" fmla="*/ 3924732 h 5591511"/>
+              <a:gd name="connsiteX8" fmla="*/ 2241476 w 5174485"/>
+              <a:gd name="connsiteY8" fmla="*/ 2254192 h 5591511"/>
+              <a:gd name="connsiteX9" fmla="*/ 3076746 w 5174485"/>
+              <a:gd name="connsiteY9" fmla="*/ 12153 h 5591511"/>
+              <a:gd name="connsiteX0" fmla="*/ 3111911 w 5174485"/>
+              <a:gd name="connsiteY0" fmla="*/ 213 h 5588366"/>
+              <a:gd name="connsiteX1" fmla="*/ 5011052 w 5174485"/>
+              <a:gd name="connsiteY1" fmla="*/ 422245 h 5588366"/>
+              <a:gd name="connsiteX2" fmla="*/ 4993466 w 5174485"/>
+              <a:gd name="connsiteY2" fmla="*/ 2813753 h 5588366"/>
+              <a:gd name="connsiteX3" fmla="*/ 2874519 w 5174485"/>
+              <a:gd name="connsiteY3" fmla="*/ 3156653 h 5588366"/>
+              <a:gd name="connsiteX4" fmla="*/ 2426111 w 5174485"/>
+              <a:gd name="connsiteY4" fmla="*/ 5284391 h 5588366"/>
+              <a:gd name="connsiteX5" fmla="*/ 307166 w 5174485"/>
+              <a:gd name="connsiteY5" fmla="*/ 5442652 h 5588366"/>
+              <a:gd name="connsiteX6" fmla="*/ 307166 w 5174485"/>
+              <a:gd name="connsiteY6" fmla="*/ 4027091 h 5588366"/>
+              <a:gd name="connsiteX7" fmla="*/ 2109591 w 5174485"/>
+              <a:gd name="connsiteY7" fmla="*/ 3921587 h 5588366"/>
+              <a:gd name="connsiteX8" fmla="*/ 2241476 w 5174485"/>
+              <a:gd name="connsiteY8" fmla="*/ 2251047 h 5588366"/>
+              <a:gd name="connsiteX9" fmla="*/ 3147084 w 5174485"/>
+              <a:gd name="connsiteY9" fmla="*/ 17800 h 5588366"/>
+              <a:gd name="connsiteX0" fmla="*/ 3111911 w 5174485"/>
+              <a:gd name="connsiteY0" fmla="*/ 20832 h 5608985"/>
+              <a:gd name="connsiteX1" fmla="*/ 5011052 w 5174485"/>
+              <a:gd name="connsiteY1" fmla="*/ 442864 h 5608985"/>
+              <a:gd name="connsiteX2" fmla="*/ 4993466 w 5174485"/>
+              <a:gd name="connsiteY2" fmla="*/ 2834372 h 5608985"/>
+              <a:gd name="connsiteX3" fmla="*/ 2874519 w 5174485"/>
+              <a:gd name="connsiteY3" fmla="*/ 3177272 h 5608985"/>
+              <a:gd name="connsiteX4" fmla="*/ 2426111 w 5174485"/>
+              <a:gd name="connsiteY4" fmla="*/ 5305010 h 5608985"/>
+              <a:gd name="connsiteX5" fmla="*/ 307166 w 5174485"/>
+              <a:gd name="connsiteY5" fmla="*/ 5463271 h 5608985"/>
+              <a:gd name="connsiteX6" fmla="*/ 307166 w 5174485"/>
+              <a:gd name="connsiteY6" fmla="*/ 4047710 h 5608985"/>
+              <a:gd name="connsiteX7" fmla="*/ 2109591 w 5174485"/>
+              <a:gd name="connsiteY7" fmla="*/ 3942206 h 5608985"/>
+              <a:gd name="connsiteX8" fmla="*/ 2241476 w 5174485"/>
+              <a:gd name="connsiteY8" fmla="*/ 2271666 h 5608985"/>
+              <a:gd name="connsiteX9" fmla="*/ 3147084 w 5174485"/>
+              <a:gd name="connsiteY9" fmla="*/ 12042 h 5608985"/>
+              <a:gd name="connsiteX0" fmla="*/ 3111911 w 5174485"/>
+              <a:gd name="connsiteY0" fmla="*/ 213 h 5588366"/>
+              <a:gd name="connsiteX1" fmla="*/ 5011052 w 5174485"/>
+              <a:gd name="connsiteY1" fmla="*/ 422245 h 5588366"/>
+              <a:gd name="connsiteX2" fmla="*/ 4993466 w 5174485"/>
+              <a:gd name="connsiteY2" fmla="*/ 2813753 h 5588366"/>
+              <a:gd name="connsiteX3" fmla="*/ 2874519 w 5174485"/>
+              <a:gd name="connsiteY3" fmla="*/ 3156653 h 5588366"/>
+              <a:gd name="connsiteX4" fmla="*/ 2426111 w 5174485"/>
+              <a:gd name="connsiteY4" fmla="*/ 5284391 h 5588366"/>
+              <a:gd name="connsiteX5" fmla="*/ 307166 w 5174485"/>
+              <a:gd name="connsiteY5" fmla="*/ 5442652 h 5588366"/>
+              <a:gd name="connsiteX6" fmla="*/ 307166 w 5174485"/>
+              <a:gd name="connsiteY6" fmla="*/ 4027091 h 5588366"/>
+              <a:gd name="connsiteX7" fmla="*/ 2109591 w 5174485"/>
+              <a:gd name="connsiteY7" fmla="*/ 3921587 h 5588366"/>
+              <a:gd name="connsiteX8" fmla="*/ 2241476 w 5174485"/>
+              <a:gd name="connsiteY8" fmla="*/ 2251047 h 5588366"/>
+              <a:gd name="connsiteX9" fmla="*/ 3120707 w 5174485"/>
+              <a:gd name="connsiteY9" fmla="*/ 17800 h 5588366"/>
+              <a:gd name="connsiteX0" fmla="*/ 3111911 w 5174485"/>
+              <a:gd name="connsiteY0" fmla="*/ 20832 h 5608985"/>
+              <a:gd name="connsiteX1" fmla="*/ 5011052 w 5174485"/>
+              <a:gd name="connsiteY1" fmla="*/ 442864 h 5608985"/>
+              <a:gd name="connsiteX2" fmla="*/ 4993466 w 5174485"/>
+              <a:gd name="connsiteY2" fmla="*/ 2834372 h 5608985"/>
+              <a:gd name="connsiteX3" fmla="*/ 2874519 w 5174485"/>
+              <a:gd name="connsiteY3" fmla="*/ 3177272 h 5608985"/>
+              <a:gd name="connsiteX4" fmla="*/ 2426111 w 5174485"/>
+              <a:gd name="connsiteY4" fmla="*/ 5305010 h 5608985"/>
+              <a:gd name="connsiteX5" fmla="*/ 307166 w 5174485"/>
+              <a:gd name="connsiteY5" fmla="*/ 5463271 h 5608985"/>
+              <a:gd name="connsiteX6" fmla="*/ 307166 w 5174485"/>
+              <a:gd name="connsiteY6" fmla="*/ 4047710 h 5608985"/>
+              <a:gd name="connsiteX7" fmla="*/ 2109591 w 5174485"/>
+              <a:gd name="connsiteY7" fmla="*/ 3942206 h 5608985"/>
+              <a:gd name="connsiteX8" fmla="*/ 2241476 w 5174485"/>
+              <a:gd name="connsiteY8" fmla="*/ 2271666 h 5608985"/>
+              <a:gd name="connsiteX9" fmla="*/ 3120707 w 5174485"/>
+              <a:gd name="connsiteY9" fmla="*/ 12042 h 5608985"/>
+              <a:gd name="connsiteX0" fmla="*/ 6318975 w 8381549"/>
+              <a:gd name="connsiteY0" fmla="*/ 213 h 5588366"/>
+              <a:gd name="connsiteX1" fmla="*/ 8218116 w 8381549"/>
+              <a:gd name="connsiteY1" fmla="*/ 422245 h 5588366"/>
+              <a:gd name="connsiteX2" fmla="*/ 8200530 w 8381549"/>
+              <a:gd name="connsiteY2" fmla="*/ 2813753 h 5588366"/>
+              <a:gd name="connsiteX3" fmla="*/ 6081583 w 8381549"/>
+              <a:gd name="connsiteY3" fmla="*/ 3156653 h 5588366"/>
+              <a:gd name="connsiteX4" fmla="*/ 5633175 w 8381549"/>
+              <a:gd name="connsiteY4" fmla="*/ 5284391 h 5588366"/>
+              <a:gd name="connsiteX5" fmla="*/ 3514230 w 8381549"/>
+              <a:gd name="connsiteY5" fmla="*/ 5442652 h 5588366"/>
+              <a:gd name="connsiteX6" fmla="*/ 3514230 w 8381549"/>
+              <a:gd name="connsiteY6" fmla="*/ 4027091 h 5588366"/>
+              <a:gd name="connsiteX7" fmla="*/ 5316655 w 8381549"/>
+              <a:gd name="connsiteY7" fmla="*/ 3921587 h 5588366"/>
+              <a:gd name="connsiteX8" fmla="*/ 5448540 w 8381549"/>
+              <a:gd name="connsiteY8" fmla="*/ 2251047 h 5588366"/>
+              <a:gd name="connsiteX9" fmla="*/ 58856 w 8381549"/>
+              <a:gd name="connsiteY9" fmla="*/ 1512492 h 5588366"/>
+              <a:gd name="connsiteX0" fmla="*/ 6308883 w 8371457"/>
+              <a:gd name="connsiteY0" fmla="*/ 213 h 5588366"/>
+              <a:gd name="connsiteX1" fmla="*/ 8208024 w 8371457"/>
+              <a:gd name="connsiteY1" fmla="*/ 422245 h 5588366"/>
+              <a:gd name="connsiteX2" fmla="*/ 8190438 w 8371457"/>
+              <a:gd name="connsiteY2" fmla="*/ 2813753 h 5588366"/>
+              <a:gd name="connsiteX3" fmla="*/ 6071491 w 8371457"/>
+              <a:gd name="connsiteY3" fmla="*/ 3156653 h 5588366"/>
+              <a:gd name="connsiteX4" fmla="*/ 5623083 w 8371457"/>
+              <a:gd name="connsiteY4" fmla="*/ 5284391 h 5588366"/>
+              <a:gd name="connsiteX5" fmla="*/ 3504138 w 8371457"/>
+              <a:gd name="connsiteY5" fmla="*/ 5442652 h 5588366"/>
+              <a:gd name="connsiteX6" fmla="*/ 3504138 w 8371457"/>
+              <a:gd name="connsiteY6" fmla="*/ 4027091 h 5588366"/>
+              <a:gd name="connsiteX7" fmla="*/ 5306563 w 8371457"/>
+              <a:gd name="connsiteY7" fmla="*/ 3921587 h 5588366"/>
+              <a:gd name="connsiteX8" fmla="*/ 5438448 w 8371457"/>
+              <a:gd name="connsiteY8" fmla="*/ 2251047 h 5588366"/>
+              <a:gd name="connsiteX9" fmla="*/ 48764 w 8371457"/>
+              <a:gd name="connsiteY9" fmla="*/ 1512492 h 5588366"/>
+              <a:gd name="connsiteX0" fmla="*/ 6169292 w 8231866"/>
+              <a:gd name="connsiteY0" fmla="*/ 213 h 5588366"/>
+              <a:gd name="connsiteX1" fmla="*/ 8068433 w 8231866"/>
+              <a:gd name="connsiteY1" fmla="*/ 422245 h 5588366"/>
+              <a:gd name="connsiteX2" fmla="*/ 8050847 w 8231866"/>
+              <a:gd name="connsiteY2" fmla="*/ 2813753 h 5588366"/>
+              <a:gd name="connsiteX3" fmla="*/ 5931900 w 8231866"/>
+              <a:gd name="connsiteY3" fmla="*/ 3156653 h 5588366"/>
+              <a:gd name="connsiteX4" fmla="*/ 5483492 w 8231866"/>
+              <a:gd name="connsiteY4" fmla="*/ 5284391 h 5588366"/>
+              <a:gd name="connsiteX5" fmla="*/ 3364547 w 8231866"/>
+              <a:gd name="connsiteY5" fmla="*/ 5442652 h 5588366"/>
+              <a:gd name="connsiteX6" fmla="*/ 3364547 w 8231866"/>
+              <a:gd name="connsiteY6" fmla="*/ 4027091 h 5588366"/>
+              <a:gd name="connsiteX7" fmla="*/ 5166972 w 8231866"/>
+              <a:gd name="connsiteY7" fmla="*/ 3921587 h 5588366"/>
+              <a:gd name="connsiteX8" fmla="*/ 5298857 w 8231866"/>
+              <a:gd name="connsiteY8" fmla="*/ 2251047 h 5588366"/>
+              <a:gd name="connsiteX9" fmla="*/ 49850 w 8231866"/>
+              <a:gd name="connsiteY9" fmla="*/ 703600 h 5588366"/>
+              <a:gd name="connsiteX0" fmla="*/ 6510790 w 8573364"/>
+              <a:gd name="connsiteY0" fmla="*/ 213 h 5588366"/>
+              <a:gd name="connsiteX1" fmla="*/ 8409931 w 8573364"/>
+              <a:gd name="connsiteY1" fmla="*/ 422245 h 5588366"/>
+              <a:gd name="connsiteX2" fmla="*/ 8392345 w 8573364"/>
+              <a:gd name="connsiteY2" fmla="*/ 2813753 h 5588366"/>
+              <a:gd name="connsiteX3" fmla="*/ 6273398 w 8573364"/>
+              <a:gd name="connsiteY3" fmla="*/ 3156653 h 5588366"/>
+              <a:gd name="connsiteX4" fmla="*/ 5824990 w 8573364"/>
+              <a:gd name="connsiteY4" fmla="*/ 5284391 h 5588366"/>
+              <a:gd name="connsiteX5" fmla="*/ 3706045 w 8573364"/>
+              <a:gd name="connsiteY5" fmla="*/ 5442652 h 5588366"/>
+              <a:gd name="connsiteX6" fmla="*/ 3706045 w 8573364"/>
+              <a:gd name="connsiteY6" fmla="*/ 4027091 h 5588366"/>
+              <a:gd name="connsiteX7" fmla="*/ 5508470 w 8573364"/>
+              <a:gd name="connsiteY7" fmla="*/ 3921587 h 5588366"/>
+              <a:gd name="connsiteX8" fmla="*/ 5640355 w 8573364"/>
+              <a:gd name="connsiteY8" fmla="*/ 2251047 h 5588366"/>
+              <a:gd name="connsiteX9" fmla="*/ 391348 w 8573364"/>
+              <a:gd name="connsiteY9" fmla="*/ 703600 h 5588366"/>
+              <a:gd name="connsiteX10" fmla="*/ 382555 w 8573364"/>
+              <a:gd name="connsiteY10" fmla="*/ 712392 h 5588366"/>
+              <a:gd name="connsiteX0" fmla="*/ 6195464 w 8258038"/>
+              <a:gd name="connsiteY0" fmla="*/ 213 h 5588366"/>
+              <a:gd name="connsiteX1" fmla="*/ 8094605 w 8258038"/>
+              <a:gd name="connsiteY1" fmla="*/ 422245 h 5588366"/>
+              <a:gd name="connsiteX2" fmla="*/ 8077019 w 8258038"/>
+              <a:gd name="connsiteY2" fmla="*/ 2813753 h 5588366"/>
+              <a:gd name="connsiteX3" fmla="*/ 5958072 w 8258038"/>
+              <a:gd name="connsiteY3" fmla="*/ 3156653 h 5588366"/>
+              <a:gd name="connsiteX4" fmla="*/ 5509664 w 8258038"/>
+              <a:gd name="connsiteY4" fmla="*/ 5284391 h 5588366"/>
+              <a:gd name="connsiteX5" fmla="*/ 3390719 w 8258038"/>
+              <a:gd name="connsiteY5" fmla="*/ 5442652 h 5588366"/>
+              <a:gd name="connsiteX6" fmla="*/ 3390719 w 8258038"/>
+              <a:gd name="connsiteY6" fmla="*/ 4027091 h 5588366"/>
+              <a:gd name="connsiteX7" fmla="*/ 5193144 w 8258038"/>
+              <a:gd name="connsiteY7" fmla="*/ 3921587 h 5588366"/>
+              <a:gd name="connsiteX8" fmla="*/ 5325029 w 8258038"/>
+              <a:gd name="connsiteY8" fmla="*/ 2251047 h 5588366"/>
+              <a:gd name="connsiteX9" fmla="*/ 76022 w 8258038"/>
+              <a:gd name="connsiteY9" fmla="*/ 703600 h 5588366"/>
+              <a:gd name="connsiteX10" fmla="*/ 6186676 w 8258038"/>
+              <a:gd name="connsiteY10" fmla="*/ 9007 h 5588366"/>
+              <a:gd name="connsiteX0" fmla="*/ 6169292 w 8231866"/>
+              <a:gd name="connsiteY0" fmla="*/ 44222 h 5632375"/>
+              <a:gd name="connsiteX1" fmla="*/ 8068433 w 8231866"/>
+              <a:gd name="connsiteY1" fmla="*/ 466254 h 5632375"/>
+              <a:gd name="connsiteX2" fmla="*/ 8050847 w 8231866"/>
+              <a:gd name="connsiteY2" fmla="*/ 2857762 h 5632375"/>
+              <a:gd name="connsiteX3" fmla="*/ 5931900 w 8231866"/>
+              <a:gd name="connsiteY3" fmla="*/ 3200662 h 5632375"/>
+              <a:gd name="connsiteX4" fmla="*/ 5483492 w 8231866"/>
+              <a:gd name="connsiteY4" fmla="*/ 5328400 h 5632375"/>
+              <a:gd name="connsiteX5" fmla="*/ 3364547 w 8231866"/>
+              <a:gd name="connsiteY5" fmla="*/ 5486661 h 5632375"/>
+              <a:gd name="connsiteX6" fmla="*/ 3364547 w 8231866"/>
+              <a:gd name="connsiteY6" fmla="*/ 4071100 h 5632375"/>
+              <a:gd name="connsiteX7" fmla="*/ 5166972 w 8231866"/>
+              <a:gd name="connsiteY7" fmla="*/ 3965596 h 5632375"/>
+              <a:gd name="connsiteX8" fmla="*/ 5298857 w 8231866"/>
+              <a:gd name="connsiteY8" fmla="*/ 2295056 h 5632375"/>
+              <a:gd name="connsiteX9" fmla="*/ 49850 w 8231866"/>
+              <a:gd name="connsiteY9" fmla="*/ 747609 h 5632375"/>
+              <a:gd name="connsiteX10" fmla="*/ 6160504 w 8231866"/>
+              <a:gd name="connsiteY10" fmla="*/ 53016 h 5632375"/>
+              <a:gd name="connsiteX0" fmla="*/ 6135813 w 8198387"/>
+              <a:gd name="connsiteY0" fmla="*/ 44222 h 5632375"/>
+              <a:gd name="connsiteX1" fmla="*/ 8034954 w 8198387"/>
+              <a:gd name="connsiteY1" fmla="*/ 466254 h 5632375"/>
+              <a:gd name="connsiteX2" fmla="*/ 8017368 w 8198387"/>
+              <a:gd name="connsiteY2" fmla="*/ 2857762 h 5632375"/>
+              <a:gd name="connsiteX3" fmla="*/ 5898421 w 8198387"/>
+              <a:gd name="connsiteY3" fmla="*/ 3200662 h 5632375"/>
+              <a:gd name="connsiteX4" fmla="*/ 5450013 w 8198387"/>
+              <a:gd name="connsiteY4" fmla="*/ 5328400 h 5632375"/>
+              <a:gd name="connsiteX5" fmla="*/ 3331068 w 8198387"/>
+              <a:gd name="connsiteY5" fmla="*/ 5486661 h 5632375"/>
+              <a:gd name="connsiteX6" fmla="*/ 3331068 w 8198387"/>
+              <a:gd name="connsiteY6" fmla="*/ 4071100 h 5632375"/>
+              <a:gd name="connsiteX7" fmla="*/ 5133493 w 8198387"/>
+              <a:gd name="connsiteY7" fmla="*/ 3965596 h 5632375"/>
+              <a:gd name="connsiteX8" fmla="*/ 5265378 w 8198387"/>
+              <a:gd name="connsiteY8" fmla="*/ 2295056 h 5632375"/>
+              <a:gd name="connsiteX9" fmla="*/ 16371 w 8198387"/>
+              <a:gd name="connsiteY9" fmla="*/ 747609 h 5632375"/>
+              <a:gd name="connsiteX10" fmla="*/ 6127025 w 8198387"/>
+              <a:gd name="connsiteY10" fmla="*/ 53016 h 5632375"/>
+              <a:gd name="connsiteX0" fmla="*/ 6135813 w 8198387"/>
+              <a:gd name="connsiteY0" fmla="*/ 44222 h 5632375"/>
+              <a:gd name="connsiteX1" fmla="*/ 8034954 w 8198387"/>
+              <a:gd name="connsiteY1" fmla="*/ 466254 h 5632375"/>
+              <a:gd name="connsiteX2" fmla="*/ 8017368 w 8198387"/>
+              <a:gd name="connsiteY2" fmla="*/ 2857762 h 5632375"/>
+              <a:gd name="connsiteX3" fmla="*/ 5898421 w 8198387"/>
+              <a:gd name="connsiteY3" fmla="*/ 3200662 h 5632375"/>
+              <a:gd name="connsiteX4" fmla="*/ 5450013 w 8198387"/>
+              <a:gd name="connsiteY4" fmla="*/ 5328400 h 5632375"/>
+              <a:gd name="connsiteX5" fmla="*/ 3331068 w 8198387"/>
+              <a:gd name="connsiteY5" fmla="*/ 5486661 h 5632375"/>
+              <a:gd name="connsiteX6" fmla="*/ 3331068 w 8198387"/>
+              <a:gd name="connsiteY6" fmla="*/ 4071100 h 5632375"/>
+              <a:gd name="connsiteX7" fmla="*/ 5133493 w 8198387"/>
+              <a:gd name="connsiteY7" fmla="*/ 3965596 h 5632375"/>
+              <a:gd name="connsiteX8" fmla="*/ 5318132 w 8198387"/>
+              <a:gd name="connsiteY8" fmla="*/ 2110417 h 5632375"/>
+              <a:gd name="connsiteX9" fmla="*/ 16371 w 8198387"/>
+              <a:gd name="connsiteY9" fmla="*/ 747609 h 5632375"/>
+              <a:gd name="connsiteX10" fmla="*/ 6127025 w 8198387"/>
+              <a:gd name="connsiteY10" fmla="*/ 53016 h 5632375"/>
+              <a:gd name="connsiteX0" fmla="*/ 6135813 w 8198387"/>
+              <a:gd name="connsiteY0" fmla="*/ 44222 h 5632375"/>
+              <a:gd name="connsiteX1" fmla="*/ 8034954 w 8198387"/>
+              <a:gd name="connsiteY1" fmla="*/ 466254 h 5632375"/>
+              <a:gd name="connsiteX2" fmla="*/ 8017368 w 8198387"/>
+              <a:gd name="connsiteY2" fmla="*/ 2857762 h 5632375"/>
+              <a:gd name="connsiteX3" fmla="*/ 5898421 w 8198387"/>
+              <a:gd name="connsiteY3" fmla="*/ 3200662 h 5632375"/>
+              <a:gd name="connsiteX4" fmla="*/ 5450013 w 8198387"/>
+              <a:gd name="connsiteY4" fmla="*/ 5328400 h 5632375"/>
+              <a:gd name="connsiteX5" fmla="*/ 3331068 w 8198387"/>
+              <a:gd name="connsiteY5" fmla="*/ 5486661 h 5632375"/>
+              <a:gd name="connsiteX6" fmla="*/ 3331068 w 8198387"/>
+              <a:gd name="connsiteY6" fmla="*/ 4071100 h 5632375"/>
+              <a:gd name="connsiteX7" fmla="*/ 5133493 w 8198387"/>
+              <a:gd name="connsiteY7" fmla="*/ 3965596 h 5632375"/>
+              <a:gd name="connsiteX8" fmla="*/ 5089532 w 8198387"/>
+              <a:gd name="connsiteY8" fmla="*/ 2207133 h 5632375"/>
+              <a:gd name="connsiteX9" fmla="*/ 16371 w 8198387"/>
+              <a:gd name="connsiteY9" fmla="*/ 747609 h 5632375"/>
+              <a:gd name="connsiteX10" fmla="*/ 6127025 w 8198387"/>
+              <a:gd name="connsiteY10" fmla="*/ 53016 h 5632375"/>
+              <a:gd name="connsiteX0" fmla="*/ 6135813 w 8198387"/>
+              <a:gd name="connsiteY0" fmla="*/ 44222 h 5632375"/>
+              <a:gd name="connsiteX1" fmla="*/ 8034954 w 8198387"/>
+              <a:gd name="connsiteY1" fmla="*/ 466254 h 5632375"/>
+              <a:gd name="connsiteX2" fmla="*/ 8017368 w 8198387"/>
+              <a:gd name="connsiteY2" fmla="*/ 2857762 h 5632375"/>
+              <a:gd name="connsiteX3" fmla="*/ 5898421 w 8198387"/>
+              <a:gd name="connsiteY3" fmla="*/ 3200662 h 5632375"/>
+              <a:gd name="connsiteX4" fmla="*/ 5450013 w 8198387"/>
+              <a:gd name="connsiteY4" fmla="*/ 5328400 h 5632375"/>
+              <a:gd name="connsiteX5" fmla="*/ 3331068 w 8198387"/>
+              <a:gd name="connsiteY5" fmla="*/ 5486661 h 5632375"/>
+              <a:gd name="connsiteX6" fmla="*/ 3331068 w 8198387"/>
+              <a:gd name="connsiteY6" fmla="*/ 4071100 h 5632375"/>
+              <a:gd name="connsiteX7" fmla="*/ 5133493 w 8198387"/>
+              <a:gd name="connsiteY7" fmla="*/ 3965596 h 5632375"/>
+              <a:gd name="connsiteX8" fmla="*/ 5089532 w 8198387"/>
+              <a:gd name="connsiteY8" fmla="*/ 2207133 h 5632375"/>
+              <a:gd name="connsiteX9" fmla="*/ 16371 w 8198387"/>
+              <a:gd name="connsiteY9" fmla="*/ 747609 h 5632375"/>
+              <a:gd name="connsiteX10" fmla="*/ 6127025 w 8198387"/>
+              <a:gd name="connsiteY10" fmla="*/ 53016 h 5632375"/>
+              <a:gd name="connsiteX0" fmla="*/ 6135813 w 8198387"/>
+              <a:gd name="connsiteY0" fmla="*/ 44222 h 5632375"/>
+              <a:gd name="connsiteX1" fmla="*/ 8034954 w 8198387"/>
+              <a:gd name="connsiteY1" fmla="*/ 466254 h 5632375"/>
+              <a:gd name="connsiteX2" fmla="*/ 8017368 w 8198387"/>
+              <a:gd name="connsiteY2" fmla="*/ 2857762 h 5632375"/>
+              <a:gd name="connsiteX3" fmla="*/ 5898421 w 8198387"/>
+              <a:gd name="connsiteY3" fmla="*/ 3200662 h 5632375"/>
+              <a:gd name="connsiteX4" fmla="*/ 5450013 w 8198387"/>
+              <a:gd name="connsiteY4" fmla="*/ 5328400 h 5632375"/>
+              <a:gd name="connsiteX5" fmla="*/ 3331068 w 8198387"/>
+              <a:gd name="connsiteY5" fmla="*/ 5486661 h 5632375"/>
+              <a:gd name="connsiteX6" fmla="*/ 3331068 w 8198387"/>
+              <a:gd name="connsiteY6" fmla="*/ 4071100 h 5632375"/>
+              <a:gd name="connsiteX7" fmla="*/ 5133493 w 8198387"/>
+              <a:gd name="connsiteY7" fmla="*/ 3965596 h 5632375"/>
+              <a:gd name="connsiteX8" fmla="*/ 5450017 w 8198387"/>
+              <a:gd name="connsiteY8" fmla="*/ 1407033 h 5632375"/>
+              <a:gd name="connsiteX9" fmla="*/ 16371 w 8198387"/>
+              <a:gd name="connsiteY9" fmla="*/ 747609 h 5632375"/>
+              <a:gd name="connsiteX10" fmla="*/ 6127025 w 8198387"/>
+              <a:gd name="connsiteY10" fmla="*/ 53016 h 5632375"/>
+            </a:gdLst>
+            <a:ahLst/>
+            <a:cxnLst>
+              <a:cxn ang="0">
+                <a:pos x="connsiteX0" y="connsiteY0"/>
+              </a:cxn>
+              <a:cxn ang="0">
+                <a:pos x="connsiteX1" y="connsiteY1"/>
+              </a:cxn>
+              <a:cxn ang="0">
+                <a:pos x="connsiteX2" y="connsiteY2"/>
+              </a:cxn>
+              <a:cxn ang="0">
+                <a:pos x="connsiteX3" y="connsiteY3"/>
+              </a:cxn>
+              <a:cxn ang="0">
+                <a:pos x="connsiteX4" y="connsiteY4"/>
+              </a:cxn>
+              <a:cxn ang="0">
+                <a:pos x="connsiteX5" y="connsiteY5"/>
+              </a:cxn>
+              <a:cxn ang="0">
+                <a:pos x="connsiteX6" y="connsiteY6"/>
+              </a:cxn>
+              <a:cxn ang="0">
+                <a:pos x="connsiteX7" y="connsiteY7"/>
+              </a:cxn>
+              <a:cxn ang="0">
+                <a:pos x="connsiteX8" y="connsiteY8"/>
+              </a:cxn>
+              <a:cxn ang="0">
+                <a:pos x="connsiteX9" y="connsiteY9"/>
+              </a:cxn>
+              <a:cxn ang="0">
+                <a:pos x="connsiteX10" y="connsiteY10"/>
+              </a:cxn>
+            </a:cxnLst>
+            <a:rect l="l" t="t" r="r" b="b"/>
+            <a:pathLst>
+              <a:path w="8198387" h="5632375">
+                <a:moveTo>
+                  <a:pt x="6135813" y="44222"/>
+                </a:moveTo>
+                <a:cubicBezTo>
+                  <a:pt x="6131417" y="44223"/>
+                  <a:pt x="8059865" y="20777"/>
+                  <a:pt x="8034954" y="466254"/>
+                </a:cubicBezTo>
+                <a:cubicBezTo>
+                  <a:pt x="8106758" y="885354"/>
+                  <a:pt x="8373457" y="2402028"/>
+                  <a:pt x="8017368" y="2857762"/>
+                </a:cubicBezTo>
+                <a:cubicBezTo>
+                  <a:pt x="7661279" y="3313496"/>
+                  <a:pt x="6326314" y="2788889"/>
+                  <a:pt x="5898421" y="3200662"/>
+                </a:cubicBezTo>
+                <a:cubicBezTo>
+                  <a:pt x="5470528" y="3612435"/>
+                  <a:pt x="5877905" y="4947400"/>
+                  <a:pt x="5450013" y="5328400"/>
+                </a:cubicBezTo>
+                <a:cubicBezTo>
+                  <a:pt x="5022121" y="5709400"/>
+                  <a:pt x="3684226" y="5696211"/>
+                  <a:pt x="3331068" y="5486661"/>
+                </a:cubicBezTo>
+                <a:cubicBezTo>
+                  <a:pt x="2977910" y="5277111"/>
+                  <a:pt x="2868739" y="4547349"/>
+                  <a:pt x="3331068" y="4071100"/>
+                </a:cubicBezTo>
+                <a:cubicBezTo>
+                  <a:pt x="3442437" y="3855689"/>
+                  <a:pt x="5126166" y="3969259"/>
+                  <a:pt x="5133493" y="3965596"/>
+                </a:cubicBezTo>
+                <a:cubicBezTo>
+                  <a:pt x="5458809" y="3942150"/>
+                  <a:pt x="5451849" y="1416192"/>
+                  <a:pt x="5450017" y="1407033"/>
+                </a:cubicBezTo>
+                <a:cubicBezTo>
+                  <a:pt x="4173667" y="1455390"/>
+                  <a:pt x="186357" y="2128001"/>
+                  <a:pt x="16371" y="747609"/>
+                </a:cubicBezTo>
+                <a:cubicBezTo>
+                  <a:pt x="-367560" y="-282556"/>
+                  <a:pt x="6128857" y="51184"/>
+                  <a:pt x="6127025" y="53016"/>
+                </a:cubicBezTo>
+              </a:path>
+            </a:pathLst>
+          </a:custGeom>
+          <a:noFill/>
+          <a:ln w="57150">
+            <a:solidFill>
+              <a:srgbClr val="FF0000"/>
+            </a:solidFill>
+          </a:ln>
+        </p:spPr>
+        <p:style>
+          <a:lnRef idx="2">
+            <a:schemeClr val="accent1">
+              <a:shade val="50000"/>
+            </a:schemeClr>
+          </a:lnRef>
+          <a:fillRef idx="1">
+            <a:schemeClr val="accent1"/>
+          </a:fillRef>
+          <a:effectRef idx="0">
+            <a:schemeClr val="accent1"/>
+          </a:effectRef>
+          <a:fontRef idx="minor">
+            <a:schemeClr val="lt1"/>
+          </a:fontRef>
+        </p:style>
+        <p:txBody>
+          <a:bodyPr rtlCol="0" anchor="ctr"/>
+          <a:lstStyle/>
+          <a:p>
+            <a:pPr algn="ctr"/>
+            <a:endParaRPr lang="en-US"/>
+          </a:p>
+        </p:txBody>
+      </p:sp>
+      <p:sp>
+        <p:nvSpPr>
+          <p:cNvPr id="16" name="Freeform 15"/>
+          <p:cNvSpPr/>
+          <p:nvPr/>
+        </p:nvSpPr>
+        <p:spPr>
+          <a:xfrm>
+            <a:off x="3486961" y="1423571"/>
+            <a:ext cx="7581968" cy="2652361"/>
+          </a:xfrm>
+          <a:custGeom>
+            <a:avLst/>
+            <a:gdLst>
+              <a:gd name="connsiteX0" fmla="*/ 3481754 w 3675287"/>
+              <a:gd name="connsiteY0" fmla="*/ 0 h 5374882"/>
+              <a:gd name="connsiteX1" fmla="*/ 3622431 w 3675287"/>
+              <a:gd name="connsiteY1" fmla="*/ 3130062 h 5374882"/>
+              <a:gd name="connsiteX2" fmla="*/ 2699239 w 3675287"/>
+              <a:gd name="connsiteY2" fmla="*/ 2980593 h 5374882"/>
+              <a:gd name="connsiteX3" fmla="*/ 1169377 w 3675287"/>
+              <a:gd name="connsiteY3" fmla="*/ 2883877 h 5374882"/>
+              <a:gd name="connsiteX4" fmla="*/ 1169377 w 3675287"/>
+              <a:gd name="connsiteY4" fmla="*/ 5363308 h 5374882"/>
+              <a:gd name="connsiteX5" fmla="*/ 0 w 3675287"/>
+              <a:gd name="connsiteY5" fmla="*/ 3640016 h 5374882"/>
+              <a:gd name="connsiteX0" fmla="*/ 3481754 w 3675287"/>
+              <a:gd name="connsiteY0" fmla="*/ 0 h 5368803"/>
+              <a:gd name="connsiteX1" fmla="*/ 3622431 w 3675287"/>
+              <a:gd name="connsiteY1" fmla="*/ 3130062 h 5368803"/>
+              <a:gd name="connsiteX2" fmla="*/ 2699239 w 3675287"/>
+              <a:gd name="connsiteY2" fmla="*/ 2980593 h 5368803"/>
+              <a:gd name="connsiteX3" fmla="*/ 1459523 w 3675287"/>
+              <a:gd name="connsiteY3" fmla="*/ 3138854 h 5368803"/>
+              <a:gd name="connsiteX4" fmla="*/ 1169377 w 3675287"/>
+              <a:gd name="connsiteY4" fmla="*/ 5363308 h 5368803"/>
+              <a:gd name="connsiteX5" fmla="*/ 0 w 3675287"/>
+              <a:gd name="connsiteY5" fmla="*/ 3640016 h 5368803"/>
+              <a:gd name="connsiteX0" fmla="*/ 3481754 w 3693290"/>
+              <a:gd name="connsiteY0" fmla="*/ 0 h 5368803"/>
+              <a:gd name="connsiteX1" fmla="*/ 3622431 w 3693290"/>
+              <a:gd name="connsiteY1" fmla="*/ 3130062 h 5368803"/>
+              <a:gd name="connsiteX2" fmla="*/ 2453054 w 3693290"/>
+              <a:gd name="connsiteY2" fmla="*/ 2787163 h 5368803"/>
+              <a:gd name="connsiteX3" fmla="*/ 1459523 w 3693290"/>
+              <a:gd name="connsiteY3" fmla="*/ 3138854 h 5368803"/>
+              <a:gd name="connsiteX4" fmla="*/ 1169377 w 3693290"/>
+              <a:gd name="connsiteY4" fmla="*/ 5363308 h 5368803"/>
+              <a:gd name="connsiteX5" fmla="*/ 0 w 3693290"/>
+              <a:gd name="connsiteY5" fmla="*/ 3640016 h 5368803"/>
+              <a:gd name="connsiteX0" fmla="*/ 3481754 w 3592584"/>
+              <a:gd name="connsiteY0" fmla="*/ 0 h 5368803"/>
+              <a:gd name="connsiteX1" fmla="*/ 3472962 w 3592584"/>
+              <a:gd name="connsiteY1" fmla="*/ 2576147 h 5368803"/>
+              <a:gd name="connsiteX2" fmla="*/ 2453054 w 3592584"/>
+              <a:gd name="connsiteY2" fmla="*/ 2787163 h 5368803"/>
+              <a:gd name="connsiteX3" fmla="*/ 1459523 w 3592584"/>
+              <a:gd name="connsiteY3" fmla="*/ 3138854 h 5368803"/>
+              <a:gd name="connsiteX4" fmla="*/ 1169377 w 3592584"/>
+              <a:gd name="connsiteY4" fmla="*/ 5363308 h 5368803"/>
+              <a:gd name="connsiteX5" fmla="*/ 0 w 3592584"/>
+              <a:gd name="connsiteY5" fmla="*/ 3640016 h 5368803"/>
+              <a:gd name="connsiteX0" fmla="*/ 3464169 w 3583370"/>
+              <a:gd name="connsiteY0" fmla="*/ 0 h 5386388"/>
+              <a:gd name="connsiteX1" fmla="*/ 3472962 w 3583370"/>
+              <a:gd name="connsiteY1" fmla="*/ 2593732 h 5386388"/>
+              <a:gd name="connsiteX2" fmla="*/ 2453054 w 3583370"/>
+              <a:gd name="connsiteY2" fmla="*/ 2804748 h 5386388"/>
+              <a:gd name="connsiteX3" fmla="*/ 1459523 w 3583370"/>
+              <a:gd name="connsiteY3" fmla="*/ 3156439 h 5386388"/>
+              <a:gd name="connsiteX4" fmla="*/ 1169377 w 3583370"/>
+              <a:gd name="connsiteY4" fmla="*/ 5380893 h 5386388"/>
+              <a:gd name="connsiteX5" fmla="*/ 0 w 3583370"/>
+              <a:gd name="connsiteY5" fmla="*/ 3657601 h 5386388"/>
+              <a:gd name="connsiteX0" fmla="*/ 3464169 w 3646910"/>
+              <a:gd name="connsiteY0" fmla="*/ 0 h 5386388"/>
+              <a:gd name="connsiteX1" fmla="*/ 3472962 w 3646910"/>
+              <a:gd name="connsiteY1" fmla="*/ 2593732 h 5386388"/>
+              <a:gd name="connsiteX2" fmla="*/ 1547446 w 3646910"/>
+              <a:gd name="connsiteY2" fmla="*/ 2734410 h 5386388"/>
+              <a:gd name="connsiteX3" fmla="*/ 1459523 w 3646910"/>
+              <a:gd name="connsiteY3" fmla="*/ 3156439 h 5386388"/>
+              <a:gd name="connsiteX4" fmla="*/ 1169377 w 3646910"/>
+              <a:gd name="connsiteY4" fmla="*/ 5380893 h 5386388"/>
+              <a:gd name="connsiteX5" fmla="*/ 0 w 3646910"/>
+              <a:gd name="connsiteY5" fmla="*/ 3657601 h 5386388"/>
+              <a:gd name="connsiteX0" fmla="*/ 3464169 w 3646910"/>
+              <a:gd name="connsiteY0" fmla="*/ 0 h 5445514"/>
+              <a:gd name="connsiteX1" fmla="*/ 3472962 w 3646910"/>
+              <a:gd name="connsiteY1" fmla="*/ 2593732 h 5445514"/>
+              <a:gd name="connsiteX2" fmla="*/ 1547446 w 3646910"/>
+              <a:gd name="connsiteY2" fmla="*/ 2734410 h 5445514"/>
+              <a:gd name="connsiteX3" fmla="*/ 1248507 w 3646910"/>
+              <a:gd name="connsiteY3" fmla="*/ 4853355 h 5445514"/>
+              <a:gd name="connsiteX4" fmla="*/ 1169377 w 3646910"/>
+              <a:gd name="connsiteY4" fmla="*/ 5380893 h 5445514"/>
+              <a:gd name="connsiteX5" fmla="*/ 0 w 3646910"/>
+              <a:gd name="connsiteY5" fmla="*/ 3657601 h 5445514"/>
+              <a:gd name="connsiteX0" fmla="*/ 4902949 w 5085690"/>
+              <a:gd name="connsiteY0" fmla="*/ 0 h 5338461"/>
+              <a:gd name="connsiteX1" fmla="*/ 4911742 w 5085690"/>
+              <a:gd name="connsiteY1" fmla="*/ 2593732 h 5338461"/>
+              <a:gd name="connsiteX2" fmla="*/ 2986226 w 5085690"/>
+              <a:gd name="connsiteY2" fmla="*/ 2734410 h 5338461"/>
+              <a:gd name="connsiteX3" fmla="*/ 2687287 w 5085690"/>
+              <a:gd name="connsiteY3" fmla="*/ 4853355 h 5338461"/>
+              <a:gd name="connsiteX4" fmla="*/ 14426 w 5085690"/>
+              <a:gd name="connsiteY4" fmla="*/ 5257800 h 5338461"/>
+              <a:gd name="connsiteX5" fmla="*/ 1438780 w 5085690"/>
+              <a:gd name="connsiteY5" fmla="*/ 3657601 h 5338461"/>
+              <a:gd name="connsiteX0" fmla="*/ 4945839 w 5128580"/>
+              <a:gd name="connsiteY0" fmla="*/ 0 h 5348008"/>
+              <a:gd name="connsiteX1" fmla="*/ 4954632 w 5128580"/>
+              <a:gd name="connsiteY1" fmla="*/ 2593732 h 5348008"/>
+              <a:gd name="connsiteX2" fmla="*/ 3029116 w 5128580"/>
+              <a:gd name="connsiteY2" fmla="*/ 2734410 h 5348008"/>
+              <a:gd name="connsiteX3" fmla="*/ 2730177 w 5128580"/>
+              <a:gd name="connsiteY3" fmla="*/ 4853355 h 5348008"/>
+              <a:gd name="connsiteX4" fmla="*/ 57316 w 5128580"/>
+              <a:gd name="connsiteY4" fmla="*/ 5257800 h 5348008"/>
+              <a:gd name="connsiteX5" fmla="*/ 620024 w 5128580"/>
+              <a:gd name="connsiteY5" fmla="*/ 3525717 h 5348008"/>
+              <a:gd name="connsiteX0" fmla="*/ 5165202 w 5347943"/>
+              <a:gd name="connsiteY0" fmla="*/ 0 h 5348008"/>
+              <a:gd name="connsiteX1" fmla="*/ 5173995 w 5347943"/>
+              <a:gd name="connsiteY1" fmla="*/ 2593732 h 5348008"/>
+              <a:gd name="connsiteX2" fmla="*/ 3248479 w 5347943"/>
+              <a:gd name="connsiteY2" fmla="*/ 2734410 h 5348008"/>
+              <a:gd name="connsiteX3" fmla="*/ 2949540 w 5347943"/>
+              <a:gd name="connsiteY3" fmla="*/ 4853355 h 5348008"/>
+              <a:gd name="connsiteX4" fmla="*/ 276679 w 5347943"/>
+              <a:gd name="connsiteY4" fmla="*/ 5257800 h 5348008"/>
+              <a:gd name="connsiteX5" fmla="*/ 839387 w 5347943"/>
+              <a:gd name="connsiteY5" fmla="*/ 3525717 h 5348008"/>
+              <a:gd name="connsiteX0" fmla="*/ 5165202 w 5346047"/>
+              <a:gd name="connsiteY0" fmla="*/ 0 h 5344184"/>
+              <a:gd name="connsiteX1" fmla="*/ 5173995 w 5346047"/>
+              <a:gd name="connsiteY1" fmla="*/ 2593732 h 5344184"/>
+              <a:gd name="connsiteX2" fmla="*/ 3274856 w 5346047"/>
+              <a:gd name="connsiteY2" fmla="*/ 2875087 h 5344184"/>
+              <a:gd name="connsiteX3" fmla="*/ 2949540 w 5346047"/>
+              <a:gd name="connsiteY3" fmla="*/ 4853355 h 5344184"/>
+              <a:gd name="connsiteX4" fmla="*/ 276679 w 5346047"/>
+              <a:gd name="connsiteY4" fmla="*/ 5257800 h 5344184"/>
+              <a:gd name="connsiteX5" fmla="*/ 839387 w 5346047"/>
+              <a:gd name="connsiteY5" fmla="*/ 3525717 h 5344184"/>
+              <a:gd name="connsiteX0" fmla="*/ 5165202 w 5283224"/>
+              <a:gd name="connsiteY0" fmla="*/ 0 h 5344184"/>
+              <a:gd name="connsiteX1" fmla="*/ 5173995 w 5283224"/>
+              <a:gd name="connsiteY1" fmla="*/ 2593732 h 5344184"/>
+              <a:gd name="connsiteX2" fmla="*/ 3274856 w 5283224"/>
+              <a:gd name="connsiteY2" fmla="*/ 2875087 h 5344184"/>
+              <a:gd name="connsiteX3" fmla="*/ 2949540 w 5283224"/>
+              <a:gd name="connsiteY3" fmla="*/ 4853355 h 5344184"/>
+              <a:gd name="connsiteX4" fmla="*/ 276679 w 5283224"/>
+              <a:gd name="connsiteY4" fmla="*/ 5257800 h 5344184"/>
+              <a:gd name="connsiteX5" fmla="*/ 839387 w 5283224"/>
+              <a:gd name="connsiteY5" fmla="*/ 3525717 h 5344184"/>
+              <a:gd name="connsiteX0" fmla="*/ 5165202 w 5229586"/>
+              <a:gd name="connsiteY0" fmla="*/ 0 h 5344184"/>
+              <a:gd name="connsiteX1" fmla="*/ 5173995 w 5229586"/>
+              <a:gd name="connsiteY1" fmla="*/ 2593732 h 5344184"/>
+              <a:gd name="connsiteX2" fmla="*/ 3274856 w 5229586"/>
+              <a:gd name="connsiteY2" fmla="*/ 2875087 h 5344184"/>
+              <a:gd name="connsiteX3" fmla="*/ 2949540 w 5229586"/>
+              <a:gd name="connsiteY3" fmla="*/ 4853355 h 5344184"/>
+              <a:gd name="connsiteX4" fmla="*/ 276679 w 5229586"/>
+              <a:gd name="connsiteY4" fmla="*/ 5257800 h 5344184"/>
+              <a:gd name="connsiteX5" fmla="*/ 839387 w 5229586"/>
+              <a:gd name="connsiteY5" fmla="*/ 3525717 h 5344184"/>
+              <a:gd name="connsiteX0" fmla="*/ 5165202 w 5177743"/>
+              <a:gd name="connsiteY0" fmla="*/ 0 h 5344184"/>
+              <a:gd name="connsiteX1" fmla="*/ 5173995 w 5177743"/>
+              <a:gd name="connsiteY1" fmla="*/ 2593732 h 5344184"/>
+              <a:gd name="connsiteX2" fmla="*/ 3274856 w 5177743"/>
+              <a:gd name="connsiteY2" fmla="*/ 2875087 h 5344184"/>
+              <a:gd name="connsiteX3" fmla="*/ 2949540 w 5177743"/>
+              <a:gd name="connsiteY3" fmla="*/ 4853355 h 5344184"/>
+              <a:gd name="connsiteX4" fmla="*/ 276679 w 5177743"/>
+              <a:gd name="connsiteY4" fmla="*/ 5257800 h 5344184"/>
+              <a:gd name="connsiteX5" fmla="*/ 839387 w 5177743"/>
+              <a:gd name="connsiteY5" fmla="*/ 3525717 h 5344184"/>
+              <a:gd name="connsiteX0" fmla="*/ 5165202 w 5377031"/>
+              <a:gd name="connsiteY0" fmla="*/ 0 h 5344184"/>
+              <a:gd name="connsiteX1" fmla="*/ 5173995 w 5377031"/>
+              <a:gd name="connsiteY1" fmla="*/ 2593732 h 5344184"/>
+              <a:gd name="connsiteX2" fmla="*/ 3274856 w 5377031"/>
+              <a:gd name="connsiteY2" fmla="*/ 2875087 h 5344184"/>
+              <a:gd name="connsiteX3" fmla="*/ 2949540 w 5377031"/>
+              <a:gd name="connsiteY3" fmla="*/ 4853355 h 5344184"/>
+              <a:gd name="connsiteX4" fmla="*/ 276679 w 5377031"/>
+              <a:gd name="connsiteY4" fmla="*/ 5257800 h 5344184"/>
+              <a:gd name="connsiteX5" fmla="*/ 839387 w 5377031"/>
+              <a:gd name="connsiteY5" fmla="*/ 3525717 h 5344184"/>
+              <a:gd name="connsiteX0" fmla="*/ 5270710 w 5355665"/>
+              <a:gd name="connsiteY0" fmla="*/ 0 h 5352976"/>
+              <a:gd name="connsiteX1" fmla="*/ 5173995 w 5355665"/>
+              <a:gd name="connsiteY1" fmla="*/ 2602524 h 5352976"/>
+              <a:gd name="connsiteX2" fmla="*/ 3274856 w 5355665"/>
+              <a:gd name="connsiteY2" fmla="*/ 2883879 h 5352976"/>
+              <a:gd name="connsiteX3" fmla="*/ 2949540 w 5355665"/>
+              <a:gd name="connsiteY3" fmla="*/ 4862147 h 5352976"/>
+              <a:gd name="connsiteX4" fmla="*/ 276679 w 5355665"/>
+              <a:gd name="connsiteY4" fmla="*/ 5266592 h 5352976"/>
+              <a:gd name="connsiteX5" fmla="*/ 839387 w 5355665"/>
+              <a:gd name="connsiteY5" fmla="*/ 3534509 h 5352976"/>
+              <a:gd name="connsiteX0" fmla="*/ 5270710 w 5325507"/>
+              <a:gd name="connsiteY0" fmla="*/ 0 h 5352976"/>
+              <a:gd name="connsiteX1" fmla="*/ 5121241 w 5325507"/>
+              <a:gd name="connsiteY1" fmla="*/ 2672863 h 5352976"/>
+              <a:gd name="connsiteX2" fmla="*/ 3274856 w 5325507"/>
+              <a:gd name="connsiteY2" fmla="*/ 2883879 h 5352976"/>
+              <a:gd name="connsiteX3" fmla="*/ 2949540 w 5325507"/>
+              <a:gd name="connsiteY3" fmla="*/ 4862147 h 5352976"/>
+              <a:gd name="connsiteX4" fmla="*/ 276679 w 5325507"/>
+              <a:gd name="connsiteY4" fmla="*/ 5266592 h 5352976"/>
+              <a:gd name="connsiteX5" fmla="*/ 839387 w 5325507"/>
+              <a:gd name="connsiteY5" fmla="*/ 3534509 h 5352976"/>
+              <a:gd name="connsiteX0" fmla="*/ 5270710 w 5336991"/>
+              <a:gd name="connsiteY0" fmla="*/ 0 h 5348300"/>
+              <a:gd name="connsiteX1" fmla="*/ 5121241 w 5336991"/>
+              <a:gd name="connsiteY1" fmla="*/ 2672863 h 5348300"/>
+              <a:gd name="connsiteX2" fmla="*/ 3099010 w 5336991"/>
+              <a:gd name="connsiteY2" fmla="*/ 3068517 h 5348300"/>
+              <a:gd name="connsiteX3" fmla="*/ 2949540 w 5336991"/>
+              <a:gd name="connsiteY3" fmla="*/ 4862147 h 5348300"/>
+              <a:gd name="connsiteX4" fmla="*/ 276679 w 5336991"/>
+              <a:gd name="connsiteY4" fmla="*/ 5266592 h 5348300"/>
+              <a:gd name="connsiteX5" fmla="*/ 839387 w 5336991"/>
+              <a:gd name="connsiteY5" fmla="*/ 3534509 h 5348300"/>
+              <a:gd name="connsiteX0" fmla="*/ 5246398 w 5312679"/>
+              <a:gd name="connsiteY0" fmla="*/ 0 h 5376914"/>
+              <a:gd name="connsiteX1" fmla="*/ 5096929 w 5312679"/>
+              <a:gd name="connsiteY1" fmla="*/ 2672863 h 5376914"/>
+              <a:gd name="connsiteX2" fmla="*/ 3074698 w 5312679"/>
+              <a:gd name="connsiteY2" fmla="*/ 3068517 h 5376914"/>
+              <a:gd name="connsiteX3" fmla="*/ 2573536 w 5312679"/>
+              <a:gd name="connsiteY3" fmla="*/ 4967655 h 5376914"/>
+              <a:gd name="connsiteX4" fmla="*/ 252367 w 5312679"/>
+              <a:gd name="connsiteY4" fmla="*/ 5266592 h 5376914"/>
+              <a:gd name="connsiteX5" fmla="*/ 815075 w 5312679"/>
+              <a:gd name="connsiteY5" fmla="*/ 3534509 h 5376914"/>
+              <a:gd name="connsiteX0" fmla="*/ 5250027 w 5316308"/>
+              <a:gd name="connsiteY0" fmla="*/ 0 h 5473046"/>
+              <a:gd name="connsiteX1" fmla="*/ 5100558 w 5316308"/>
+              <a:gd name="connsiteY1" fmla="*/ 2672863 h 5473046"/>
+              <a:gd name="connsiteX2" fmla="*/ 3078327 w 5316308"/>
+              <a:gd name="connsiteY2" fmla="*/ 3068517 h 5473046"/>
+              <a:gd name="connsiteX3" fmla="*/ 2629919 w 5316308"/>
+              <a:gd name="connsiteY3" fmla="*/ 5196255 h 5473046"/>
+              <a:gd name="connsiteX4" fmla="*/ 255996 w 5316308"/>
+              <a:gd name="connsiteY4" fmla="*/ 5266592 h 5473046"/>
+              <a:gd name="connsiteX5" fmla="*/ 818704 w 5316308"/>
+              <a:gd name="connsiteY5" fmla="*/ 3534509 h 5473046"/>
+              <a:gd name="connsiteX0" fmla="*/ 5080423 w 5146704"/>
+              <a:gd name="connsiteY0" fmla="*/ 0 h 5458401"/>
+              <a:gd name="connsiteX1" fmla="*/ 4930954 w 5146704"/>
+              <a:gd name="connsiteY1" fmla="*/ 2672863 h 5458401"/>
+              <a:gd name="connsiteX2" fmla="*/ 2908723 w 5146704"/>
+              <a:gd name="connsiteY2" fmla="*/ 3068517 h 5458401"/>
+              <a:gd name="connsiteX3" fmla="*/ 2460315 w 5146704"/>
+              <a:gd name="connsiteY3" fmla="*/ 5196255 h 5458401"/>
+              <a:gd name="connsiteX4" fmla="*/ 86392 w 5146704"/>
+              <a:gd name="connsiteY4" fmla="*/ 5266592 h 5458401"/>
+              <a:gd name="connsiteX5" fmla="*/ 1132677 w 5146704"/>
+              <a:gd name="connsiteY5" fmla="*/ 3763109 h 5458401"/>
+              <a:gd name="connsiteX0" fmla="*/ 5195236 w 5261517"/>
+              <a:gd name="connsiteY0" fmla="*/ 0 h 5443730"/>
+              <a:gd name="connsiteX1" fmla="*/ 5045767 w 5261517"/>
+              <a:gd name="connsiteY1" fmla="*/ 2672863 h 5443730"/>
+              <a:gd name="connsiteX2" fmla="*/ 3023536 w 5261517"/>
+              <a:gd name="connsiteY2" fmla="*/ 3068517 h 5443730"/>
+              <a:gd name="connsiteX3" fmla="*/ 2575128 w 5261517"/>
+              <a:gd name="connsiteY3" fmla="*/ 5196255 h 5443730"/>
+              <a:gd name="connsiteX4" fmla="*/ 69321 w 5261517"/>
+              <a:gd name="connsiteY4" fmla="*/ 5240216 h 5443730"/>
+              <a:gd name="connsiteX5" fmla="*/ 1247490 w 5261517"/>
+              <a:gd name="connsiteY5" fmla="*/ 3763109 h 5443730"/>
+              <a:gd name="connsiteX0" fmla="*/ 5358727 w 5425008"/>
+              <a:gd name="connsiteY0" fmla="*/ 0 h 5431673"/>
+              <a:gd name="connsiteX1" fmla="*/ 5209258 w 5425008"/>
+              <a:gd name="connsiteY1" fmla="*/ 2672863 h 5431673"/>
+              <a:gd name="connsiteX2" fmla="*/ 3187027 w 5425008"/>
+              <a:gd name="connsiteY2" fmla="*/ 3068517 h 5431673"/>
+              <a:gd name="connsiteX3" fmla="*/ 2738619 w 5425008"/>
+              <a:gd name="connsiteY3" fmla="*/ 5196255 h 5431673"/>
+              <a:gd name="connsiteX4" fmla="*/ 232812 w 5425008"/>
+              <a:gd name="connsiteY4" fmla="*/ 5240216 h 5431673"/>
+              <a:gd name="connsiteX5" fmla="*/ 865858 w 5425008"/>
+              <a:gd name="connsiteY5" fmla="*/ 3965332 h 5431673"/>
+              <a:gd name="connsiteX0" fmla="*/ 5358727 w 5425008"/>
+              <a:gd name="connsiteY0" fmla="*/ 0 h 5431673"/>
+              <a:gd name="connsiteX1" fmla="*/ 5209258 w 5425008"/>
+              <a:gd name="connsiteY1" fmla="*/ 2672863 h 5431673"/>
+              <a:gd name="connsiteX2" fmla="*/ 3187027 w 5425008"/>
+              <a:gd name="connsiteY2" fmla="*/ 3068517 h 5431673"/>
+              <a:gd name="connsiteX3" fmla="*/ 2738619 w 5425008"/>
+              <a:gd name="connsiteY3" fmla="*/ 5196255 h 5431673"/>
+              <a:gd name="connsiteX4" fmla="*/ 232812 w 5425008"/>
+              <a:gd name="connsiteY4" fmla="*/ 5240216 h 5431673"/>
+              <a:gd name="connsiteX5" fmla="*/ 865858 w 5425008"/>
+              <a:gd name="connsiteY5" fmla="*/ 3965332 h 5431673"/>
+              <a:gd name="connsiteX6" fmla="*/ 901029 w 5425008"/>
+              <a:gd name="connsiteY6" fmla="*/ 3947750 h 5431673"/>
+              <a:gd name="connsiteX0" fmla="*/ 5358727 w 5425008"/>
+              <a:gd name="connsiteY0" fmla="*/ 0 h 5431673"/>
+              <a:gd name="connsiteX1" fmla="*/ 5209258 w 5425008"/>
+              <a:gd name="connsiteY1" fmla="*/ 2672863 h 5431673"/>
+              <a:gd name="connsiteX2" fmla="*/ 3187027 w 5425008"/>
+              <a:gd name="connsiteY2" fmla="*/ 3068517 h 5431673"/>
+              <a:gd name="connsiteX3" fmla="*/ 2738619 w 5425008"/>
+              <a:gd name="connsiteY3" fmla="*/ 5196255 h 5431673"/>
+              <a:gd name="connsiteX4" fmla="*/ 232812 w 5425008"/>
+              <a:gd name="connsiteY4" fmla="*/ 5240216 h 5431673"/>
+              <a:gd name="connsiteX5" fmla="*/ 865858 w 5425008"/>
+              <a:gd name="connsiteY5" fmla="*/ 3965332 h 5431673"/>
+              <a:gd name="connsiteX6" fmla="*/ 1560452 w 5425008"/>
+              <a:gd name="connsiteY6" fmla="*/ 3683981 h 5431673"/>
+              <a:gd name="connsiteX0" fmla="*/ 5225177 w 5291458"/>
+              <a:gd name="connsiteY0" fmla="*/ 0 h 5431673"/>
+              <a:gd name="connsiteX1" fmla="*/ 5075708 w 5291458"/>
+              <a:gd name="connsiteY1" fmla="*/ 2672863 h 5431673"/>
+              <a:gd name="connsiteX2" fmla="*/ 3053477 w 5291458"/>
+              <a:gd name="connsiteY2" fmla="*/ 3068517 h 5431673"/>
+              <a:gd name="connsiteX3" fmla="*/ 2605069 w 5291458"/>
+              <a:gd name="connsiteY3" fmla="*/ 5196255 h 5431673"/>
+              <a:gd name="connsiteX4" fmla="*/ 99262 w 5291458"/>
+              <a:gd name="connsiteY4" fmla="*/ 5240216 h 5431673"/>
+              <a:gd name="connsiteX5" fmla="*/ 732308 w 5291458"/>
+              <a:gd name="connsiteY5" fmla="*/ 3965332 h 5431673"/>
+              <a:gd name="connsiteX6" fmla="*/ 1426902 w 5291458"/>
+              <a:gd name="connsiteY6" fmla="*/ 3683981 h 5431673"/>
+              <a:gd name="connsiteX0" fmla="*/ 5285808 w 5352089"/>
+              <a:gd name="connsiteY0" fmla="*/ 0 h 5433221"/>
+              <a:gd name="connsiteX1" fmla="*/ 5136339 w 5352089"/>
+              <a:gd name="connsiteY1" fmla="*/ 2672863 h 5433221"/>
+              <a:gd name="connsiteX2" fmla="*/ 3114108 w 5352089"/>
+              <a:gd name="connsiteY2" fmla="*/ 3068517 h 5433221"/>
+              <a:gd name="connsiteX3" fmla="*/ 2665700 w 5352089"/>
+              <a:gd name="connsiteY3" fmla="*/ 5196255 h 5433221"/>
+              <a:gd name="connsiteX4" fmla="*/ 159893 w 5352089"/>
+              <a:gd name="connsiteY4" fmla="*/ 5240216 h 5433221"/>
+              <a:gd name="connsiteX5" fmla="*/ 546755 w 5352089"/>
+              <a:gd name="connsiteY5" fmla="*/ 3938955 h 5433221"/>
+              <a:gd name="connsiteX6" fmla="*/ 1487533 w 5352089"/>
+              <a:gd name="connsiteY6" fmla="*/ 3683981 h 5433221"/>
+              <a:gd name="connsiteX0" fmla="*/ 5285808 w 5352089"/>
+              <a:gd name="connsiteY0" fmla="*/ 0 h 5433221"/>
+              <a:gd name="connsiteX1" fmla="*/ 5136339 w 5352089"/>
+              <a:gd name="connsiteY1" fmla="*/ 2672863 h 5433221"/>
+              <a:gd name="connsiteX2" fmla="*/ 3114108 w 5352089"/>
+              <a:gd name="connsiteY2" fmla="*/ 3068517 h 5433221"/>
+              <a:gd name="connsiteX3" fmla="*/ 2665700 w 5352089"/>
+              <a:gd name="connsiteY3" fmla="*/ 5196255 h 5433221"/>
+              <a:gd name="connsiteX4" fmla="*/ 159893 w 5352089"/>
+              <a:gd name="connsiteY4" fmla="*/ 5240216 h 5433221"/>
+              <a:gd name="connsiteX5" fmla="*/ 546755 w 5352089"/>
+              <a:gd name="connsiteY5" fmla="*/ 3938955 h 5433221"/>
+              <a:gd name="connsiteX6" fmla="*/ 2507441 w 5352089"/>
+              <a:gd name="connsiteY6" fmla="*/ 3842243 h 5433221"/>
+              <a:gd name="connsiteX0" fmla="*/ 5285808 w 5352089"/>
+              <a:gd name="connsiteY0" fmla="*/ 0 h 5433221"/>
+              <a:gd name="connsiteX1" fmla="*/ 5136339 w 5352089"/>
+              <a:gd name="connsiteY1" fmla="*/ 2672863 h 5433221"/>
+              <a:gd name="connsiteX2" fmla="*/ 3114108 w 5352089"/>
+              <a:gd name="connsiteY2" fmla="*/ 3068517 h 5433221"/>
+              <a:gd name="connsiteX3" fmla="*/ 2665700 w 5352089"/>
+              <a:gd name="connsiteY3" fmla="*/ 5196255 h 5433221"/>
+              <a:gd name="connsiteX4" fmla="*/ 159893 w 5352089"/>
+              <a:gd name="connsiteY4" fmla="*/ 5240216 h 5433221"/>
+              <a:gd name="connsiteX5" fmla="*/ 546755 w 5352089"/>
+              <a:gd name="connsiteY5" fmla="*/ 3938955 h 5433221"/>
+              <a:gd name="connsiteX6" fmla="*/ 2507441 w 5352089"/>
+              <a:gd name="connsiteY6" fmla="*/ 3842243 h 5433221"/>
+              <a:gd name="connsiteX7" fmla="*/ 2498650 w 5352089"/>
+              <a:gd name="connsiteY7" fmla="*/ 3798280 h 5433221"/>
+              <a:gd name="connsiteX0" fmla="*/ 5285808 w 5352089"/>
+              <a:gd name="connsiteY0" fmla="*/ 0 h 5433221"/>
+              <a:gd name="connsiteX1" fmla="*/ 5136339 w 5352089"/>
+              <a:gd name="connsiteY1" fmla="*/ 2672863 h 5433221"/>
+              <a:gd name="connsiteX2" fmla="*/ 3114108 w 5352089"/>
+              <a:gd name="connsiteY2" fmla="*/ 3068517 h 5433221"/>
+              <a:gd name="connsiteX3" fmla="*/ 2665700 w 5352089"/>
+              <a:gd name="connsiteY3" fmla="*/ 5196255 h 5433221"/>
+              <a:gd name="connsiteX4" fmla="*/ 159893 w 5352089"/>
+              <a:gd name="connsiteY4" fmla="*/ 5240216 h 5433221"/>
+              <a:gd name="connsiteX5" fmla="*/ 546755 w 5352089"/>
+              <a:gd name="connsiteY5" fmla="*/ 3938955 h 5433221"/>
+              <a:gd name="connsiteX6" fmla="*/ 2507441 w 5352089"/>
+              <a:gd name="connsiteY6" fmla="*/ 3842243 h 5433221"/>
+              <a:gd name="connsiteX7" fmla="*/ 2270050 w 5352089"/>
+              <a:gd name="connsiteY7" fmla="*/ 2127742 h 5433221"/>
+              <a:gd name="connsiteX0" fmla="*/ 5285808 w 5352089"/>
+              <a:gd name="connsiteY0" fmla="*/ 0 h 5433221"/>
+              <a:gd name="connsiteX1" fmla="*/ 5136339 w 5352089"/>
+              <a:gd name="connsiteY1" fmla="*/ 2672863 h 5433221"/>
+              <a:gd name="connsiteX2" fmla="*/ 3114108 w 5352089"/>
+              <a:gd name="connsiteY2" fmla="*/ 3068517 h 5433221"/>
+              <a:gd name="connsiteX3" fmla="*/ 2665700 w 5352089"/>
+              <a:gd name="connsiteY3" fmla="*/ 5196255 h 5433221"/>
+              <a:gd name="connsiteX4" fmla="*/ 159893 w 5352089"/>
+              <a:gd name="connsiteY4" fmla="*/ 5240216 h 5433221"/>
+              <a:gd name="connsiteX5" fmla="*/ 546755 w 5352089"/>
+              <a:gd name="connsiteY5" fmla="*/ 3938955 h 5433221"/>
+              <a:gd name="connsiteX6" fmla="*/ 2507441 w 5352089"/>
+              <a:gd name="connsiteY6" fmla="*/ 3842243 h 5433221"/>
+              <a:gd name="connsiteX7" fmla="*/ 2270050 w 5352089"/>
+              <a:gd name="connsiteY7" fmla="*/ 2127742 h 5433221"/>
+              <a:gd name="connsiteX8" fmla="*/ 2270050 w 5352089"/>
+              <a:gd name="connsiteY8" fmla="*/ 2083780 h 5433221"/>
+              <a:gd name="connsiteX0" fmla="*/ 5285808 w 5352089"/>
+              <a:gd name="connsiteY0" fmla="*/ 0 h 5433221"/>
+              <a:gd name="connsiteX1" fmla="*/ 5136339 w 5352089"/>
+              <a:gd name="connsiteY1" fmla="*/ 2672863 h 5433221"/>
+              <a:gd name="connsiteX2" fmla="*/ 3114108 w 5352089"/>
+              <a:gd name="connsiteY2" fmla="*/ 3068517 h 5433221"/>
+              <a:gd name="connsiteX3" fmla="*/ 2665700 w 5352089"/>
+              <a:gd name="connsiteY3" fmla="*/ 5196255 h 5433221"/>
+              <a:gd name="connsiteX4" fmla="*/ 159893 w 5352089"/>
+              <a:gd name="connsiteY4" fmla="*/ 5240216 h 5433221"/>
+              <a:gd name="connsiteX5" fmla="*/ 546755 w 5352089"/>
+              <a:gd name="connsiteY5" fmla="*/ 3938955 h 5433221"/>
+              <a:gd name="connsiteX6" fmla="*/ 2507441 w 5352089"/>
+              <a:gd name="connsiteY6" fmla="*/ 3842243 h 5433221"/>
+              <a:gd name="connsiteX7" fmla="*/ 2270050 w 5352089"/>
+              <a:gd name="connsiteY7" fmla="*/ 2127742 h 5433221"/>
+              <a:gd name="connsiteX8" fmla="*/ 2393143 w 5352089"/>
+              <a:gd name="connsiteY8" fmla="*/ 17587 h 5433221"/>
+              <a:gd name="connsiteX0" fmla="*/ 5285808 w 5327158"/>
+              <a:gd name="connsiteY0" fmla="*/ 197987 h 5631208"/>
+              <a:gd name="connsiteX1" fmla="*/ 5259434 w 5327158"/>
+              <a:gd name="connsiteY1" fmla="*/ 197990 h 5631208"/>
+              <a:gd name="connsiteX2" fmla="*/ 5136339 w 5327158"/>
+              <a:gd name="connsiteY2" fmla="*/ 2870850 h 5631208"/>
+              <a:gd name="connsiteX3" fmla="*/ 3114108 w 5327158"/>
+              <a:gd name="connsiteY3" fmla="*/ 3266504 h 5631208"/>
+              <a:gd name="connsiteX4" fmla="*/ 2665700 w 5327158"/>
+              <a:gd name="connsiteY4" fmla="*/ 5394242 h 5631208"/>
+              <a:gd name="connsiteX5" fmla="*/ 159893 w 5327158"/>
+              <a:gd name="connsiteY5" fmla="*/ 5438203 h 5631208"/>
+              <a:gd name="connsiteX6" fmla="*/ 546755 w 5327158"/>
+              <a:gd name="connsiteY6" fmla="*/ 4136942 h 5631208"/>
+              <a:gd name="connsiteX7" fmla="*/ 2507441 w 5327158"/>
+              <a:gd name="connsiteY7" fmla="*/ 4040230 h 5631208"/>
+              <a:gd name="connsiteX8" fmla="*/ 2270050 w 5327158"/>
+              <a:gd name="connsiteY8" fmla="*/ 2325729 h 5631208"/>
+              <a:gd name="connsiteX9" fmla="*/ 2393143 w 5327158"/>
+              <a:gd name="connsiteY9" fmla="*/ 215574 h 5631208"/>
+              <a:gd name="connsiteX0" fmla="*/ 5285808 w 5285808"/>
+              <a:gd name="connsiteY0" fmla="*/ 217749 h 5650970"/>
+              <a:gd name="connsiteX1" fmla="*/ 3483388 w 5285808"/>
+              <a:gd name="connsiteY1" fmla="*/ 191375 h 5650970"/>
+              <a:gd name="connsiteX2" fmla="*/ 5136339 w 5285808"/>
+              <a:gd name="connsiteY2" fmla="*/ 2890612 h 5650970"/>
+              <a:gd name="connsiteX3" fmla="*/ 3114108 w 5285808"/>
+              <a:gd name="connsiteY3" fmla="*/ 3286266 h 5650970"/>
+              <a:gd name="connsiteX4" fmla="*/ 2665700 w 5285808"/>
+              <a:gd name="connsiteY4" fmla="*/ 5414004 h 5650970"/>
+              <a:gd name="connsiteX5" fmla="*/ 159893 w 5285808"/>
+              <a:gd name="connsiteY5" fmla="*/ 5457965 h 5650970"/>
+              <a:gd name="connsiteX6" fmla="*/ 546755 w 5285808"/>
+              <a:gd name="connsiteY6" fmla="*/ 4156704 h 5650970"/>
+              <a:gd name="connsiteX7" fmla="*/ 2507441 w 5285808"/>
+              <a:gd name="connsiteY7" fmla="*/ 4059992 h 5650970"/>
+              <a:gd name="connsiteX8" fmla="*/ 2270050 w 5285808"/>
+              <a:gd name="connsiteY8" fmla="*/ 2345491 h 5650970"/>
+              <a:gd name="connsiteX9" fmla="*/ 2393143 w 5285808"/>
+              <a:gd name="connsiteY9" fmla="*/ 235336 h 5650970"/>
+              <a:gd name="connsiteX0" fmla="*/ 2498646 w 5137934"/>
+              <a:gd name="connsiteY0" fmla="*/ 224433 h 5648862"/>
+              <a:gd name="connsiteX1" fmla="*/ 3483388 w 5137934"/>
+              <a:gd name="connsiteY1" fmla="*/ 189267 h 5648862"/>
+              <a:gd name="connsiteX2" fmla="*/ 5136339 w 5137934"/>
+              <a:gd name="connsiteY2" fmla="*/ 2888504 h 5648862"/>
+              <a:gd name="connsiteX3" fmla="*/ 3114108 w 5137934"/>
+              <a:gd name="connsiteY3" fmla="*/ 3284158 h 5648862"/>
+              <a:gd name="connsiteX4" fmla="*/ 2665700 w 5137934"/>
+              <a:gd name="connsiteY4" fmla="*/ 5411896 h 5648862"/>
+              <a:gd name="connsiteX5" fmla="*/ 159893 w 5137934"/>
+              <a:gd name="connsiteY5" fmla="*/ 5455857 h 5648862"/>
+              <a:gd name="connsiteX6" fmla="*/ 546755 w 5137934"/>
+              <a:gd name="connsiteY6" fmla="*/ 4154596 h 5648862"/>
+              <a:gd name="connsiteX7" fmla="*/ 2507441 w 5137934"/>
+              <a:gd name="connsiteY7" fmla="*/ 4057884 h 5648862"/>
+              <a:gd name="connsiteX8" fmla="*/ 2270050 w 5137934"/>
+              <a:gd name="connsiteY8" fmla="*/ 2343383 h 5648862"/>
+              <a:gd name="connsiteX9" fmla="*/ 2393143 w 5137934"/>
+              <a:gd name="connsiteY9" fmla="*/ 233228 h 5648862"/>
+              <a:gd name="connsiteX0" fmla="*/ 2498646 w 5367160"/>
+              <a:gd name="connsiteY0" fmla="*/ 61659 h 5486088"/>
+              <a:gd name="connsiteX1" fmla="*/ 5338565 w 5367160"/>
+              <a:gd name="connsiteY1" fmla="*/ 272677 h 5486088"/>
+              <a:gd name="connsiteX2" fmla="*/ 5136339 w 5367160"/>
+              <a:gd name="connsiteY2" fmla="*/ 2725730 h 5486088"/>
+              <a:gd name="connsiteX3" fmla="*/ 3114108 w 5367160"/>
+              <a:gd name="connsiteY3" fmla="*/ 3121384 h 5486088"/>
+              <a:gd name="connsiteX4" fmla="*/ 2665700 w 5367160"/>
+              <a:gd name="connsiteY4" fmla="*/ 5249122 h 5486088"/>
+              <a:gd name="connsiteX5" fmla="*/ 159893 w 5367160"/>
+              <a:gd name="connsiteY5" fmla="*/ 5293083 h 5486088"/>
+              <a:gd name="connsiteX6" fmla="*/ 546755 w 5367160"/>
+              <a:gd name="connsiteY6" fmla="*/ 3991822 h 5486088"/>
+              <a:gd name="connsiteX7" fmla="*/ 2507441 w 5367160"/>
+              <a:gd name="connsiteY7" fmla="*/ 3895110 h 5486088"/>
+              <a:gd name="connsiteX8" fmla="*/ 2270050 w 5367160"/>
+              <a:gd name="connsiteY8" fmla="*/ 2180609 h 5486088"/>
+              <a:gd name="connsiteX9" fmla="*/ 2393143 w 5367160"/>
+              <a:gd name="connsiteY9" fmla="*/ 70454 h 5486088"/>
+              <a:gd name="connsiteX0" fmla="*/ 2498646 w 5367160"/>
+              <a:gd name="connsiteY0" fmla="*/ 61659 h 5486088"/>
+              <a:gd name="connsiteX1" fmla="*/ 5338565 w 5367160"/>
+              <a:gd name="connsiteY1" fmla="*/ 272677 h 5486088"/>
+              <a:gd name="connsiteX2" fmla="*/ 5136339 w 5367160"/>
+              <a:gd name="connsiteY2" fmla="*/ 2725730 h 5486088"/>
+              <a:gd name="connsiteX3" fmla="*/ 3114108 w 5367160"/>
+              <a:gd name="connsiteY3" fmla="*/ 3121384 h 5486088"/>
+              <a:gd name="connsiteX4" fmla="*/ 2665700 w 5367160"/>
+              <a:gd name="connsiteY4" fmla="*/ 5249122 h 5486088"/>
+              <a:gd name="connsiteX5" fmla="*/ 159893 w 5367160"/>
+              <a:gd name="connsiteY5" fmla="*/ 5293083 h 5486088"/>
+              <a:gd name="connsiteX6" fmla="*/ 546755 w 5367160"/>
+              <a:gd name="connsiteY6" fmla="*/ 3991822 h 5486088"/>
+              <a:gd name="connsiteX7" fmla="*/ 2507441 w 5367160"/>
+              <a:gd name="connsiteY7" fmla="*/ 3895110 h 5486088"/>
+              <a:gd name="connsiteX8" fmla="*/ 2270050 w 5367160"/>
+              <a:gd name="connsiteY8" fmla="*/ 2180609 h 5486088"/>
+              <a:gd name="connsiteX9" fmla="*/ 2393143 w 5367160"/>
+              <a:gd name="connsiteY9" fmla="*/ 70454 h 5486088"/>
+              <a:gd name="connsiteX0" fmla="*/ 2498646 w 5367160"/>
+              <a:gd name="connsiteY0" fmla="*/ 61659 h 5486088"/>
+              <a:gd name="connsiteX1" fmla="*/ 5338565 w 5367160"/>
+              <a:gd name="connsiteY1" fmla="*/ 272677 h 5486088"/>
+              <a:gd name="connsiteX2" fmla="*/ 5136339 w 5367160"/>
+              <a:gd name="connsiteY2" fmla="*/ 2725730 h 5486088"/>
+              <a:gd name="connsiteX3" fmla="*/ 3114108 w 5367160"/>
+              <a:gd name="connsiteY3" fmla="*/ 3121384 h 5486088"/>
+              <a:gd name="connsiteX4" fmla="*/ 2665700 w 5367160"/>
+              <a:gd name="connsiteY4" fmla="*/ 5249122 h 5486088"/>
+              <a:gd name="connsiteX5" fmla="*/ 159893 w 5367160"/>
+              <a:gd name="connsiteY5" fmla="*/ 5293083 h 5486088"/>
+              <a:gd name="connsiteX6" fmla="*/ 546755 w 5367160"/>
+              <a:gd name="connsiteY6" fmla="*/ 3991822 h 5486088"/>
+              <a:gd name="connsiteX7" fmla="*/ 2507441 w 5367160"/>
+              <a:gd name="connsiteY7" fmla="*/ 3895110 h 5486088"/>
+              <a:gd name="connsiteX8" fmla="*/ 2270050 w 5367160"/>
+              <a:gd name="connsiteY8" fmla="*/ 2180609 h 5486088"/>
+              <a:gd name="connsiteX9" fmla="*/ 2393143 w 5367160"/>
+              <a:gd name="connsiteY9" fmla="*/ 70454 h 5486088"/>
+              <a:gd name="connsiteX0" fmla="*/ 2498646 w 5406249"/>
+              <a:gd name="connsiteY0" fmla="*/ 4 h 5424433"/>
+              <a:gd name="connsiteX1" fmla="*/ 5400111 w 5406249"/>
+              <a:gd name="connsiteY1" fmla="*/ 439622 h 5424433"/>
+              <a:gd name="connsiteX2" fmla="*/ 5136339 w 5406249"/>
+              <a:gd name="connsiteY2" fmla="*/ 2664075 h 5424433"/>
+              <a:gd name="connsiteX3" fmla="*/ 3114108 w 5406249"/>
+              <a:gd name="connsiteY3" fmla="*/ 3059729 h 5424433"/>
+              <a:gd name="connsiteX4" fmla="*/ 2665700 w 5406249"/>
+              <a:gd name="connsiteY4" fmla="*/ 5187467 h 5424433"/>
+              <a:gd name="connsiteX5" fmla="*/ 159893 w 5406249"/>
+              <a:gd name="connsiteY5" fmla="*/ 5231428 h 5424433"/>
+              <a:gd name="connsiteX6" fmla="*/ 546755 w 5406249"/>
+              <a:gd name="connsiteY6" fmla="*/ 3930167 h 5424433"/>
+              <a:gd name="connsiteX7" fmla="*/ 2507441 w 5406249"/>
+              <a:gd name="connsiteY7" fmla="*/ 3833455 h 5424433"/>
+              <a:gd name="connsiteX8" fmla="*/ 2270050 w 5406249"/>
+              <a:gd name="connsiteY8" fmla="*/ 2118954 h 5424433"/>
+              <a:gd name="connsiteX9" fmla="*/ 2393143 w 5406249"/>
+              <a:gd name="connsiteY9" fmla="*/ 8799 h 5424433"/>
+              <a:gd name="connsiteX0" fmla="*/ 2498646 w 5406249"/>
+              <a:gd name="connsiteY0" fmla="*/ 4 h 5424433"/>
+              <a:gd name="connsiteX1" fmla="*/ 5400111 w 5406249"/>
+              <a:gd name="connsiteY1" fmla="*/ 439622 h 5424433"/>
+              <a:gd name="connsiteX2" fmla="*/ 5136339 w 5406249"/>
+              <a:gd name="connsiteY2" fmla="*/ 2664075 h 5424433"/>
+              <a:gd name="connsiteX3" fmla="*/ 3114108 w 5406249"/>
+              <a:gd name="connsiteY3" fmla="*/ 3059729 h 5424433"/>
+              <a:gd name="connsiteX4" fmla="*/ 2665700 w 5406249"/>
+              <a:gd name="connsiteY4" fmla="*/ 5187467 h 5424433"/>
+              <a:gd name="connsiteX5" fmla="*/ 159893 w 5406249"/>
+              <a:gd name="connsiteY5" fmla="*/ 5231428 h 5424433"/>
+              <a:gd name="connsiteX6" fmla="*/ 546755 w 5406249"/>
+              <a:gd name="connsiteY6" fmla="*/ 3930167 h 5424433"/>
+              <a:gd name="connsiteX7" fmla="*/ 2507441 w 5406249"/>
+              <a:gd name="connsiteY7" fmla="*/ 3833455 h 5424433"/>
+              <a:gd name="connsiteX8" fmla="*/ 2270050 w 5406249"/>
+              <a:gd name="connsiteY8" fmla="*/ 2118954 h 5424433"/>
+              <a:gd name="connsiteX9" fmla="*/ 2393143 w 5406249"/>
+              <a:gd name="connsiteY9" fmla="*/ 8799 h 5424433"/>
+              <a:gd name="connsiteX0" fmla="*/ 2498646 w 5406249"/>
+              <a:gd name="connsiteY0" fmla="*/ 4 h 5424433"/>
+              <a:gd name="connsiteX1" fmla="*/ 5400111 w 5406249"/>
+              <a:gd name="connsiteY1" fmla="*/ 439622 h 5424433"/>
+              <a:gd name="connsiteX2" fmla="*/ 5136339 w 5406249"/>
+              <a:gd name="connsiteY2" fmla="*/ 2664075 h 5424433"/>
+              <a:gd name="connsiteX3" fmla="*/ 3114108 w 5406249"/>
+              <a:gd name="connsiteY3" fmla="*/ 3059729 h 5424433"/>
+              <a:gd name="connsiteX4" fmla="*/ 2665700 w 5406249"/>
+              <a:gd name="connsiteY4" fmla="*/ 5187467 h 5424433"/>
+              <a:gd name="connsiteX5" fmla="*/ 159893 w 5406249"/>
+              <a:gd name="connsiteY5" fmla="*/ 5231428 h 5424433"/>
+              <a:gd name="connsiteX6" fmla="*/ 546755 w 5406249"/>
+              <a:gd name="connsiteY6" fmla="*/ 3930167 h 5424433"/>
+              <a:gd name="connsiteX7" fmla="*/ 2507441 w 5406249"/>
+              <a:gd name="connsiteY7" fmla="*/ 3833455 h 5424433"/>
+              <a:gd name="connsiteX8" fmla="*/ 2270050 w 5406249"/>
+              <a:gd name="connsiteY8" fmla="*/ 2118954 h 5424433"/>
+              <a:gd name="connsiteX9" fmla="*/ 2393143 w 5406249"/>
+              <a:gd name="connsiteY9" fmla="*/ 8799 h 5424433"/>
+              <a:gd name="connsiteX0" fmla="*/ 2498646 w 5406249"/>
+              <a:gd name="connsiteY0" fmla="*/ 4 h 5424433"/>
+              <a:gd name="connsiteX1" fmla="*/ 5400111 w 5406249"/>
+              <a:gd name="connsiteY1" fmla="*/ 439622 h 5424433"/>
+              <a:gd name="connsiteX2" fmla="*/ 5136339 w 5406249"/>
+              <a:gd name="connsiteY2" fmla="*/ 2664075 h 5424433"/>
+              <a:gd name="connsiteX3" fmla="*/ 3114108 w 5406249"/>
+              <a:gd name="connsiteY3" fmla="*/ 3059729 h 5424433"/>
+              <a:gd name="connsiteX4" fmla="*/ 2665700 w 5406249"/>
+              <a:gd name="connsiteY4" fmla="*/ 5187467 h 5424433"/>
+              <a:gd name="connsiteX5" fmla="*/ 159893 w 5406249"/>
+              <a:gd name="connsiteY5" fmla="*/ 5231428 h 5424433"/>
+              <a:gd name="connsiteX6" fmla="*/ 546755 w 5406249"/>
+              <a:gd name="connsiteY6" fmla="*/ 3930167 h 5424433"/>
+              <a:gd name="connsiteX7" fmla="*/ 2507441 w 5406249"/>
+              <a:gd name="connsiteY7" fmla="*/ 3833455 h 5424433"/>
+              <a:gd name="connsiteX8" fmla="*/ 2270050 w 5406249"/>
+              <a:gd name="connsiteY8" fmla="*/ 2118954 h 5424433"/>
+              <a:gd name="connsiteX9" fmla="*/ 2393143 w 5406249"/>
+              <a:gd name="connsiteY9" fmla="*/ 8799 h 5424433"/>
+              <a:gd name="connsiteX0" fmla="*/ 2498646 w 5406249"/>
+              <a:gd name="connsiteY0" fmla="*/ 8790 h 5433219"/>
+              <a:gd name="connsiteX1" fmla="*/ 5400111 w 5406249"/>
+              <a:gd name="connsiteY1" fmla="*/ 448408 h 5433219"/>
+              <a:gd name="connsiteX2" fmla="*/ 5136339 w 5406249"/>
+              <a:gd name="connsiteY2" fmla="*/ 2672861 h 5433219"/>
+              <a:gd name="connsiteX3" fmla="*/ 3114108 w 5406249"/>
+              <a:gd name="connsiteY3" fmla="*/ 3068515 h 5433219"/>
+              <a:gd name="connsiteX4" fmla="*/ 2665700 w 5406249"/>
+              <a:gd name="connsiteY4" fmla="*/ 5196253 h 5433219"/>
+              <a:gd name="connsiteX5" fmla="*/ 159893 w 5406249"/>
+              <a:gd name="connsiteY5" fmla="*/ 5240214 h 5433219"/>
+              <a:gd name="connsiteX6" fmla="*/ 546755 w 5406249"/>
+              <a:gd name="connsiteY6" fmla="*/ 3938953 h 5433219"/>
+              <a:gd name="connsiteX7" fmla="*/ 2507441 w 5406249"/>
+              <a:gd name="connsiteY7" fmla="*/ 3842241 h 5433219"/>
+              <a:gd name="connsiteX8" fmla="*/ 2270050 w 5406249"/>
+              <a:gd name="connsiteY8" fmla="*/ 2127740 h 5433219"/>
+              <a:gd name="connsiteX9" fmla="*/ 2525028 w 5406249"/>
+              <a:gd name="connsiteY9" fmla="*/ 0 h 5433219"/>
+              <a:gd name="connsiteX0" fmla="*/ 2498646 w 5406249"/>
+              <a:gd name="connsiteY0" fmla="*/ 8790 h 5433219"/>
+              <a:gd name="connsiteX1" fmla="*/ 5400111 w 5406249"/>
+              <a:gd name="connsiteY1" fmla="*/ 448408 h 5433219"/>
+              <a:gd name="connsiteX2" fmla="*/ 5136339 w 5406249"/>
+              <a:gd name="connsiteY2" fmla="*/ 2672861 h 5433219"/>
+              <a:gd name="connsiteX3" fmla="*/ 3114108 w 5406249"/>
+              <a:gd name="connsiteY3" fmla="*/ 3068515 h 5433219"/>
+              <a:gd name="connsiteX4" fmla="*/ 2665700 w 5406249"/>
+              <a:gd name="connsiteY4" fmla="*/ 5196253 h 5433219"/>
+              <a:gd name="connsiteX5" fmla="*/ 159893 w 5406249"/>
+              <a:gd name="connsiteY5" fmla="*/ 5240214 h 5433219"/>
+              <a:gd name="connsiteX6" fmla="*/ 546755 w 5406249"/>
+              <a:gd name="connsiteY6" fmla="*/ 3938953 h 5433219"/>
+              <a:gd name="connsiteX7" fmla="*/ 2507441 w 5406249"/>
+              <a:gd name="connsiteY7" fmla="*/ 3842241 h 5433219"/>
+              <a:gd name="connsiteX8" fmla="*/ 2270050 w 5406249"/>
+              <a:gd name="connsiteY8" fmla="*/ 2127740 h 5433219"/>
+              <a:gd name="connsiteX9" fmla="*/ 2525028 w 5406249"/>
+              <a:gd name="connsiteY9" fmla="*/ 0 h 5433219"/>
+              <a:gd name="connsiteX0" fmla="*/ 2498646 w 5406249"/>
+              <a:gd name="connsiteY0" fmla="*/ 4 h 5424433"/>
+              <a:gd name="connsiteX1" fmla="*/ 5400111 w 5406249"/>
+              <a:gd name="connsiteY1" fmla="*/ 439622 h 5424433"/>
+              <a:gd name="connsiteX2" fmla="*/ 5136339 w 5406249"/>
+              <a:gd name="connsiteY2" fmla="*/ 2664075 h 5424433"/>
+              <a:gd name="connsiteX3" fmla="*/ 3114108 w 5406249"/>
+              <a:gd name="connsiteY3" fmla="*/ 3059729 h 5424433"/>
+              <a:gd name="connsiteX4" fmla="*/ 2665700 w 5406249"/>
+              <a:gd name="connsiteY4" fmla="*/ 5187467 h 5424433"/>
+              <a:gd name="connsiteX5" fmla="*/ 159893 w 5406249"/>
+              <a:gd name="connsiteY5" fmla="*/ 5231428 h 5424433"/>
+              <a:gd name="connsiteX6" fmla="*/ 546755 w 5406249"/>
+              <a:gd name="connsiteY6" fmla="*/ 3930167 h 5424433"/>
+              <a:gd name="connsiteX7" fmla="*/ 2507441 w 5406249"/>
+              <a:gd name="connsiteY7" fmla="*/ 3833455 h 5424433"/>
+              <a:gd name="connsiteX8" fmla="*/ 2270050 w 5406249"/>
+              <a:gd name="connsiteY8" fmla="*/ 2118954 h 5424433"/>
+              <a:gd name="connsiteX9" fmla="*/ 2454689 w 5406249"/>
+              <a:gd name="connsiteY9" fmla="*/ 6 h 5424433"/>
+              <a:gd name="connsiteX0" fmla="*/ 2498646 w 5394218"/>
+              <a:gd name="connsiteY0" fmla="*/ 66284 h 5490713"/>
+              <a:gd name="connsiteX1" fmla="*/ 5382526 w 5394218"/>
+              <a:gd name="connsiteY1" fmla="*/ 268510 h 5490713"/>
+              <a:gd name="connsiteX2" fmla="*/ 5136339 w 5394218"/>
+              <a:gd name="connsiteY2" fmla="*/ 2730355 h 5490713"/>
+              <a:gd name="connsiteX3" fmla="*/ 3114108 w 5394218"/>
+              <a:gd name="connsiteY3" fmla="*/ 3126009 h 5490713"/>
+              <a:gd name="connsiteX4" fmla="*/ 2665700 w 5394218"/>
+              <a:gd name="connsiteY4" fmla="*/ 5253747 h 5490713"/>
+              <a:gd name="connsiteX5" fmla="*/ 159893 w 5394218"/>
+              <a:gd name="connsiteY5" fmla="*/ 5297708 h 5490713"/>
+              <a:gd name="connsiteX6" fmla="*/ 546755 w 5394218"/>
+              <a:gd name="connsiteY6" fmla="*/ 3996447 h 5490713"/>
+              <a:gd name="connsiteX7" fmla="*/ 2507441 w 5394218"/>
+              <a:gd name="connsiteY7" fmla="*/ 3899735 h 5490713"/>
+              <a:gd name="connsiteX8" fmla="*/ 2270050 w 5394218"/>
+              <a:gd name="connsiteY8" fmla="*/ 2185234 h 5490713"/>
+              <a:gd name="connsiteX9" fmla="*/ 2454689 w 5394218"/>
+              <a:gd name="connsiteY9" fmla="*/ 66286 h 5490713"/>
+              <a:gd name="connsiteX0" fmla="*/ 2498646 w 5442810"/>
+              <a:gd name="connsiteY0" fmla="*/ 66284 h 5490713"/>
+              <a:gd name="connsiteX1" fmla="*/ 5382526 w 5442810"/>
+              <a:gd name="connsiteY1" fmla="*/ 268510 h 5490713"/>
+              <a:gd name="connsiteX2" fmla="*/ 5233055 w 5442810"/>
+              <a:gd name="connsiteY2" fmla="*/ 2783109 h 5490713"/>
+              <a:gd name="connsiteX3" fmla="*/ 3114108 w 5442810"/>
+              <a:gd name="connsiteY3" fmla="*/ 3126009 h 5490713"/>
+              <a:gd name="connsiteX4" fmla="*/ 2665700 w 5442810"/>
+              <a:gd name="connsiteY4" fmla="*/ 5253747 h 5490713"/>
+              <a:gd name="connsiteX5" fmla="*/ 159893 w 5442810"/>
+              <a:gd name="connsiteY5" fmla="*/ 5297708 h 5490713"/>
+              <a:gd name="connsiteX6" fmla="*/ 546755 w 5442810"/>
+              <a:gd name="connsiteY6" fmla="*/ 3996447 h 5490713"/>
+              <a:gd name="connsiteX7" fmla="*/ 2507441 w 5442810"/>
+              <a:gd name="connsiteY7" fmla="*/ 3899735 h 5490713"/>
+              <a:gd name="connsiteX8" fmla="*/ 2270050 w 5442810"/>
+              <a:gd name="connsiteY8" fmla="*/ 2185234 h 5490713"/>
+              <a:gd name="connsiteX9" fmla="*/ 2454689 w 5442810"/>
+              <a:gd name="connsiteY9" fmla="*/ 66286 h 5490713"/>
+              <a:gd name="connsiteX0" fmla="*/ 2498646 w 5442810"/>
+              <a:gd name="connsiteY0" fmla="*/ 66284 h 5490713"/>
+              <a:gd name="connsiteX1" fmla="*/ 5382526 w 5442810"/>
+              <a:gd name="connsiteY1" fmla="*/ 268510 h 5490713"/>
+              <a:gd name="connsiteX2" fmla="*/ 5233055 w 5442810"/>
+              <a:gd name="connsiteY2" fmla="*/ 2783109 h 5490713"/>
+              <a:gd name="connsiteX3" fmla="*/ 3114108 w 5442810"/>
+              <a:gd name="connsiteY3" fmla="*/ 3126009 h 5490713"/>
+              <a:gd name="connsiteX4" fmla="*/ 2665700 w 5442810"/>
+              <a:gd name="connsiteY4" fmla="*/ 5253747 h 5490713"/>
+              <a:gd name="connsiteX5" fmla="*/ 159893 w 5442810"/>
+              <a:gd name="connsiteY5" fmla="*/ 5297708 h 5490713"/>
+              <a:gd name="connsiteX6" fmla="*/ 546755 w 5442810"/>
+              <a:gd name="connsiteY6" fmla="*/ 3996447 h 5490713"/>
+              <a:gd name="connsiteX7" fmla="*/ 2507441 w 5442810"/>
+              <a:gd name="connsiteY7" fmla="*/ 3899735 h 5490713"/>
+              <a:gd name="connsiteX8" fmla="*/ 2481065 w 5442810"/>
+              <a:gd name="connsiteY8" fmla="*/ 2220403 h 5490713"/>
+              <a:gd name="connsiteX9" fmla="*/ 2454689 w 5442810"/>
+              <a:gd name="connsiteY9" fmla="*/ 66286 h 5490713"/>
+              <a:gd name="connsiteX0" fmla="*/ 2498646 w 5442810"/>
+              <a:gd name="connsiteY0" fmla="*/ 66284 h 5490713"/>
+              <a:gd name="connsiteX1" fmla="*/ 5382526 w 5442810"/>
+              <a:gd name="connsiteY1" fmla="*/ 268510 h 5490713"/>
+              <a:gd name="connsiteX2" fmla="*/ 5233055 w 5442810"/>
+              <a:gd name="connsiteY2" fmla="*/ 2783109 h 5490713"/>
+              <a:gd name="connsiteX3" fmla="*/ 3114108 w 5442810"/>
+              <a:gd name="connsiteY3" fmla="*/ 3126009 h 5490713"/>
+              <a:gd name="connsiteX4" fmla="*/ 2665700 w 5442810"/>
+              <a:gd name="connsiteY4" fmla="*/ 5253747 h 5490713"/>
+              <a:gd name="connsiteX5" fmla="*/ 159893 w 5442810"/>
+              <a:gd name="connsiteY5" fmla="*/ 5297708 h 5490713"/>
+              <a:gd name="connsiteX6" fmla="*/ 546755 w 5442810"/>
+              <a:gd name="connsiteY6" fmla="*/ 3996447 h 5490713"/>
+              <a:gd name="connsiteX7" fmla="*/ 2349180 w 5442810"/>
+              <a:gd name="connsiteY7" fmla="*/ 3890943 h 5490713"/>
+              <a:gd name="connsiteX8" fmla="*/ 2481065 w 5442810"/>
+              <a:gd name="connsiteY8" fmla="*/ 2220403 h 5490713"/>
+              <a:gd name="connsiteX9" fmla="*/ 2454689 w 5442810"/>
+              <a:gd name="connsiteY9" fmla="*/ 66286 h 5490713"/>
+              <a:gd name="connsiteX0" fmla="*/ 3386669 w 5442810"/>
+              <a:gd name="connsiteY0" fmla="*/ 40482 h 5517665"/>
+              <a:gd name="connsiteX1" fmla="*/ 5382526 w 5442810"/>
+              <a:gd name="connsiteY1" fmla="*/ 295462 h 5517665"/>
+              <a:gd name="connsiteX2" fmla="*/ 5233055 w 5442810"/>
+              <a:gd name="connsiteY2" fmla="*/ 2810061 h 5517665"/>
+              <a:gd name="connsiteX3" fmla="*/ 3114108 w 5442810"/>
+              <a:gd name="connsiteY3" fmla="*/ 3152961 h 5517665"/>
+              <a:gd name="connsiteX4" fmla="*/ 2665700 w 5442810"/>
+              <a:gd name="connsiteY4" fmla="*/ 5280699 h 5517665"/>
+              <a:gd name="connsiteX5" fmla="*/ 159893 w 5442810"/>
+              <a:gd name="connsiteY5" fmla="*/ 5324660 h 5517665"/>
+              <a:gd name="connsiteX6" fmla="*/ 546755 w 5442810"/>
+              <a:gd name="connsiteY6" fmla="*/ 4023399 h 5517665"/>
+              <a:gd name="connsiteX7" fmla="*/ 2349180 w 5442810"/>
+              <a:gd name="connsiteY7" fmla="*/ 3917895 h 5517665"/>
+              <a:gd name="connsiteX8" fmla="*/ 2481065 w 5442810"/>
+              <a:gd name="connsiteY8" fmla="*/ 2247355 h 5517665"/>
+              <a:gd name="connsiteX9" fmla="*/ 2454689 w 5442810"/>
+              <a:gd name="connsiteY9" fmla="*/ 93238 h 5517665"/>
+              <a:gd name="connsiteX0" fmla="*/ 3386669 w 5442810"/>
+              <a:gd name="connsiteY0" fmla="*/ 40482 h 5517665"/>
+              <a:gd name="connsiteX1" fmla="*/ 5382526 w 5442810"/>
+              <a:gd name="connsiteY1" fmla="*/ 295462 h 5517665"/>
+              <a:gd name="connsiteX2" fmla="*/ 5233055 w 5442810"/>
+              <a:gd name="connsiteY2" fmla="*/ 2810061 h 5517665"/>
+              <a:gd name="connsiteX3" fmla="*/ 3114108 w 5442810"/>
+              <a:gd name="connsiteY3" fmla="*/ 3152961 h 5517665"/>
+              <a:gd name="connsiteX4" fmla="*/ 2665700 w 5442810"/>
+              <a:gd name="connsiteY4" fmla="*/ 5280699 h 5517665"/>
+              <a:gd name="connsiteX5" fmla="*/ 159893 w 5442810"/>
+              <a:gd name="connsiteY5" fmla="*/ 5324660 h 5517665"/>
+              <a:gd name="connsiteX6" fmla="*/ 546755 w 5442810"/>
+              <a:gd name="connsiteY6" fmla="*/ 4023399 h 5517665"/>
+              <a:gd name="connsiteX7" fmla="*/ 2349180 w 5442810"/>
+              <a:gd name="connsiteY7" fmla="*/ 3917895 h 5517665"/>
+              <a:gd name="connsiteX8" fmla="*/ 2481065 w 5442810"/>
+              <a:gd name="connsiteY8" fmla="*/ 2247355 h 5517665"/>
+              <a:gd name="connsiteX9" fmla="*/ 3369089 w 5442810"/>
+              <a:gd name="connsiteY9" fmla="*/ 31692 h 5517665"/>
+              <a:gd name="connsiteX0" fmla="*/ 3386669 w 5442810"/>
+              <a:gd name="connsiteY0" fmla="*/ 40482 h 5517665"/>
+              <a:gd name="connsiteX1" fmla="*/ 5382526 w 5442810"/>
+              <a:gd name="connsiteY1" fmla="*/ 295462 h 5517665"/>
+              <a:gd name="connsiteX2" fmla="*/ 5233055 w 5442810"/>
+              <a:gd name="connsiteY2" fmla="*/ 2810061 h 5517665"/>
+              <a:gd name="connsiteX3" fmla="*/ 3114108 w 5442810"/>
+              <a:gd name="connsiteY3" fmla="*/ 3152961 h 5517665"/>
+              <a:gd name="connsiteX4" fmla="*/ 2665700 w 5442810"/>
+              <a:gd name="connsiteY4" fmla="*/ 5280699 h 5517665"/>
+              <a:gd name="connsiteX5" fmla="*/ 159893 w 5442810"/>
+              <a:gd name="connsiteY5" fmla="*/ 5324660 h 5517665"/>
+              <a:gd name="connsiteX6" fmla="*/ 546755 w 5442810"/>
+              <a:gd name="connsiteY6" fmla="*/ 4023399 h 5517665"/>
+              <a:gd name="connsiteX7" fmla="*/ 2349180 w 5442810"/>
+              <a:gd name="connsiteY7" fmla="*/ 3917895 h 5517665"/>
+              <a:gd name="connsiteX8" fmla="*/ 2481065 w 5442810"/>
+              <a:gd name="connsiteY8" fmla="*/ 2247355 h 5517665"/>
+              <a:gd name="connsiteX9" fmla="*/ 3369089 w 5442810"/>
+              <a:gd name="connsiteY9" fmla="*/ 31692 h 5517665"/>
+              <a:gd name="connsiteX0" fmla="*/ 3386669 w 5442810"/>
+              <a:gd name="connsiteY0" fmla="*/ 40482 h 5517665"/>
+              <a:gd name="connsiteX1" fmla="*/ 5382526 w 5442810"/>
+              <a:gd name="connsiteY1" fmla="*/ 295462 h 5517665"/>
+              <a:gd name="connsiteX2" fmla="*/ 5233055 w 5442810"/>
+              <a:gd name="connsiteY2" fmla="*/ 2810061 h 5517665"/>
+              <a:gd name="connsiteX3" fmla="*/ 3114108 w 5442810"/>
+              <a:gd name="connsiteY3" fmla="*/ 3152961 h 5517665"/>
+              <a:gd name="connsiteX4" fmla="*/ 2665700 w 5442810"/>
+              <a:gd name="connsiteY4" fmla="*/ 5280699 h 5517665"/>
+              <a:gd name="connsiteX5" fmla="*/ 159893 w 5442810"/>
+              <a:gd name="connsiteY5" fmla="*/ 5324660 h 5517665"/>
+              <a:gd name="connsiteX6" fmla="*/ 546755 w 5442810"/>
+              <a:gd name="connsiteY6" fmla="*/ 4023399 h 5517665"/>
+              <a:gd name="connsiteX7" fmla="*/ 2349180 w 5442810"/>
+              <a:gd name="connsiteY7" fmla="*/ 3917895 h 5517665"/>
+              <a:gd name="connsiteX8" fmla="*/ 2481065 w 5442810"/>
+              <a:gd name="connsiteY8" fmla="*/ 2247355 h 5517665"/>
+              <a:gd name="connsiteX9" fmla="*/ 3193243 w 5442810"/>
+              <a:gd name="connsiteY9" fmla="*/ 31692 h 5517665"/>
+              <a:gd name="connsiteX0" fmla="*/ 3386669 w 5442810"/>
+              <a:gd name="connsiteY0" fmla="*/ 40482 h 5517665"/>
+              <a:gd name="connsiteX1" fmla="*/ 5382526 w 5442810"/>
+              <a:gd name="connsiteY1" fmla="*/ 295462 h 5517665"/>
+              <a:gd name="connsiteX2" fmla="*/ 5233055 w 5442810"/>
+              <a:gd name="connsiteY2" fmla="*/ 2810061 h 5517665"/>
+              <a:gd name="connsiteX3" fmla="*/ 3114108 w 5442810"/>
+              <a:gd name="connsiteY3" fmla="*/ 3152961 h 5517665"/>
+              <a:gd name="connsiteX4" fmla="*/ 2665700 w 5442810"/>
+              <a:gd name="connsiteY4" fmla="*/ 5280699 h 5517665"/>
+              <a:gd name="connsiteX5" fmla="*/ 159893 w 5442810"/>
+              <a:gd name="connsiteY5" fmla="*/ 5324660 h 5517665"/>
+              <a:gd name="connsiteX6" fmla="*/ 546755 w 5442810"/>
+              <a:gd name="connsiteY6" fmla="*/ 4023399 h 5517665"/>
+              <a:gd name="connsiteX7" fmla="*/ 2349180 w 5442810"/>
+              <a:gd name="connsiteY7" fmla="*/ 3917895 h 5517665"/>
+              <a:gd name="connsiteX8" fmla="*/ 2481065 w 5442810"/>
+              <a:gd name="connsiteY8" fmla="*/ 2247355 h 5517665"/>
+              <a:gd name="connsiteX9" fmla="*/ 3193243 w 5442810"/>
+              <a:gd name="connsiteY9" fmla="*/ 31692 h 5517665"/>
+              <a:gd name="connsiteX0" fmla="*/ 3386669 w 5412517"/>
+              <a:gd name="connsiteY0" fmla="*/ 40482 h 5517665"/>
+              <a:gd name="connsiteX1" fmla="*/ 5312188 w 5412517"/>
+              <a:gd name="connsiteY1" fmla="*/ 295462 h 5517665"/>
+              <a:gd name="connsiteX2" fmla="*/ 5233055 w 5412517"/>
+              <a:gd name="connsiteY2" fmla="*/ 2810061 h 5517665"/>
+              <a:gd name="connsiteX3" fmla="*/ 3114108 w 5412517"/>
+              <a:gd name="connsiteY3" fmla="*/ 3152961 h 5517665"/>
+              <a:gd name="connsiteX4" fmla="*/ 2665700 w 5412517"/>
+              <a:gd name="connsiteY4" fmla="*/ 5280699 h 5517665"/>
+              <a:gd name="connsiteX5" fmla="*/ 159893 w 5412517"/>
+              <a:gd name="connsiteY5" fmla="*/ 5324660 h 5517665"/>
+              <a:gd name="connsiteX6" fmla="*/ 546755 w 5412517"/>
+              <a:gd name="connsiteY6" fmla="*/ 4023399 h 5517665"/>
+              <a:gd name="connsiteX7" fmla="*/ 2349180 w 5412517"/>
+              <a:gd name="connsiteY7" fmla="*/ 3917895 h 5517665"/>
+              <a:gd name="connsiteX8" fmla="*/ 2481065 w 5412517"/>
+              <a:gd name="connsiteY8" fmla="*/ 2247355 h 5517665"/>
+              <a:gd name="connsiteX9" fmla="*/ 3193243 w 5412517"/>
+              <a:gd name="connsiteY9" fmla="*/ 31692 h 5517665"/>
+              <a:gd name="connsiteX0" fmla="*/ 3386669 w 5516867"/>
+              <a:gd name="connsiteY0" fmla="*/ 40482 h 5517665"/>
+              <a:gd name="connsiteX1" fmla="*/ 5312188 w 5516867"/>
+              <a:gd name="connsiteY1" fmla="*/ 295462 h 5517665"/>
+              <a:gd name="connsiteX2" fmla="*/ 5233055 w 5516867"/>
+              <a:gd name="connsiteY2" fmla="*/ 2810061 h 5517665"/>
+              <a:gd name="connsiteX3" fmla="*/ 3114108 w 5516867"/>
+              <a:gd name="connsiteY3" fmla="*/ 3152961 h 5517665"/>
+              <a:gd name="connsiteX4" fmla="*/ 2665700 w 5516867"/>
+              <a:gd name="connsiteY4" fmla="*/ 5280699 h 5517665"/>
+              <a:gd name="connsiteX5" fmla="*/ 159893 w 5516867"/>
+              <a:gd name="connsiteY5" fmla="*/ 5324660 h 5517665"/>
+              <a:gd name="connsiteX6" fmla="*/ 546755 w 5516867"/>
+              <a:gd name="connsiteY6" fmla="*/ 4023399 h 5517665"/>
+              <a:gd name="connsiteX7" fmla="*/ 2349180 w 5516867"/>
+              <a:gd name="connsiteY7" fmla="*/ 3917895 h 5517665"/>
+              <a:gd name="connsiteX8" fmla="*/ 2481065 w 5516867"/>
+              <a:gd name="connsiteY8" fmla="*/ 2247355 h 5517665"/>
+              <a:gd name="connsiteX9" fmla="*/ 3193243 w 5516867"/>
+              <a:gd name="connsiteY9" fmla="*/ 31692 h 5517665"/>
+              <a:gd name="connsiteX0" fmla="*/ 3386669 w 5440613"/>
+              <a:gd name="connsiteY0" fmla="*/ 40482 h 5517665"/>
+              <a:gd name="connsiteX1" fmla="*/ 5312188 w 5440613"/>
+              <a:gd name="connsiteY1" fmla="*/ 295462 h 5517665"/>
+              <a:gd name="connsiteX2" fmla="*/ 5233055 w 5440613"/>
+              <a:gd name="connsiteY2" fmla="*/ 2810061 h 5517665"/>
+              <a:gd name="connsiteX3" fmla="*/ 3114108 w 5440613"/>
+              <a:gd name="connsiteY3" fmla="*/ 3152961 h 5517665"/>
+              <a:gd name="connsiteX4" fmla="*/ 2665700 w 5440613"/>
+              <a:gd name="connsiteY4" fmla="*/ 5280699 h 5517665"/>
+              <a:gd name="connsiteX5" fmla="*/ 159893 w 5440613"/>
+              <a:gd name="connsiteY5" fmla="*/ 5324660 h 5517665"/>
+              <a:gd name="connsiteX6" fmla="*/ 546755 w 5440613"/>
+              <a:gd name="connsiteY6" fmla="*/ 4023399 h 5517665"/>
+              <a:gd name="connsiteX7" fmla="*/ 2349180 w 5440613"/>
+              <a:gd name="connsiteY7" fmla="*/ 3917895 h 5517665"/>
+              <a:gd name="connsiteX8" fmla="*/ 2481065 w 5440613"/>
+              <a:gd name="connsiteY8" fmla="*/ 2247355 h 5517665"/>
+              <a:gd name="connsiteX9" fmla="*/ 3193243 w 5440613"/>
+              <a:gd name="connsiteY9" fmla="*/ 31692 h 5517665"/>
+              <a:gd name="connsiteX0" fmla="*/ 3386669 w 5410610"/>
+              <a:gd name="connsiteY0" fmla="*/ 85931 h 5563114"/>
+              <a:gd name="connsiteX1" fmla="*/ 5241849 w 5410610"/>
+              <a:gd name="connsiteY1" fmla="*/ 252987 h 5563114"/>
+              <a:gd name="connsiteX2" fmla="*/ 5233055 w 5410610"/>
+              <a:gd name="connsiteY2" fmla="*/ 2855510 h 5563114"/>
+              <a:gd name="connsiteX3" fmla="*/ 3114108 w 5410610"/>
+              <a:gd name="connsiteY3" fmla="*/ 3198410 h 5563114"/>
+              <a:gd name="connsiteX4" fmla="*/ 2665700 w 5410610"/>
+              <a:gd name="connsiteY4" fmla="*/ 5326148 h 5563114"/>
+              <a:gd name="connsiteX5" fmla="*/ 159893 w 5410610"/>
+              <a:gd name="connsiteY5" fmla="*/ 5370109 h 5563114"/>
+              <a:gd name="connsiteX6" fmla="*/ 546755 w 5410610"/>
+              <a:gd name="connsiteY6" fmla="*/ 4068848 h 5563114"/>
+              <a:gd name="connsiteX7" fmla="*/ 2349180 w 5410610"/>
+              <a:gd name="connsiteY7" fmla="*/ 3963344 h 5563114"/>
+              <a:gd name="connsiteX8" fmla="*/ 2481065 w 5410610"/>
+              <a:gd name="connsiteY8" fmla="*/ 2292804 h 5563114"/>
+              <a:gd name="connsiteX9" fmla="*/ 3193243 w 5410610"/>
+              <a:gd name="connsiteY9" fmla="*/ 77141 h 5563114"/>
+              <a:gd name="connsiteX0" fmla="*/ 3386669 w 5410610"/>
+              <a:gd name="connsiteY0" fmla="*/ 85931 h 5563114"/>
+              <a:gd name="connsiteX1" fmla="*/ 5241849 w 5410610"/>
+              <a:gd name="connsiteY1" fmla="*/ 252987 h 5563114"/>
+              <a:gd name="connsiteX2" fmla="*/ 5233055 w 5410610"/>
+              <a:gd name="connsiteY2" fmla="*/ 2855510 h 5563114"/>
+              <a:gd name="connsiteX3" fmla="*/ 3114108 w 5410610"/>
+              <a:gd name="connsiteY3" fmla="*/ 3198410 h 5563114"/>
+              <a:gd name="connsiteX4" fmla="*/ 2665700 w 5410610"/>
+              <a:gd name="connsiteY4" fmla="*/ 5326148 h 5563114"/>
+              <a:gd name="connsiteX5" fmla="*/ 159893 w 5410610"/>
+              <a:gd name="connsiteY5" fmla="*/ 5370109 h 5563114"/>
+              <a:gd name="connsiteX6" fmla="*/ 546755 w 5410610"/>
+              <a:gd name="connsiteY6" fmla="*/ 4068848 h 5563114"/>
+              <a:gd name="connsiteX7" fmla="*/ 2349180 w 5410610"/>
+              <a:gd name="connsiteY7" fmla="*/ 3963344 h 5563114"/>
+              <a:gd name="connsiteX8" fmla="*/ 2481065 w 5410610"/>
+              <a:gd name="connsiteY8" fmla="*/ 2292804 h 5563114"/>
+              <a:gd name="connsiteX9" fmla="*/ 3325128 w 5410610"/>
+              <a:gd name="connsiteY9" fmla="*/ 138688 h 5563114"/>
+              <a:gd name="connsiteX0" fmla="*/ 3386669 w 5410610"/>
+              <a:gd name="connsiteY0" fmla="*/ 85931 h 5563114"/>
+              <a:gd name="connsiteX1" fmla="*/ 5241849 w 5410610"/>
+              <a:gd name="connsiteY1" fmla="*/ 252987 h 5563114"/>
+              <a:gd name="connsiteX2" fmla="*/ 5233055 w 5410610"/>
+              <a:gd name="connsiteY2" fmla="*/ 2855510 h 5563114"/>
+              <a:gd name="connsiteX3" fmla="*/ 3114108 w 5410610"/>
+              <a:gd name="connsiteY3" fmla="*/ 3198410 h 5563114"/>
+              <a:gd name="connsiteX4" fmla="*/ 2665700 w 5410610"/>
+              <a:gd name="connsiteY4" fmla="*/ 5326148 h 5563114"/>
+              <a:gd name="connsiteX5" fmla="*/ 159893 w 5410610"/>
+              <a:gd name="connsiteY5" fmla="*/ 5370109 h 5563114"/>
+              <a:gd name="connsiteX6" fmla="*/ 546755 w 5410610"/>
+              <a:gd name="connsiteY6" fmla="*/ 4068848 h 5563114"/>
+              <a:gd name="connsiteX7" fmla="*/ 2349180 w 5410610"/>
+              <a:gd name="connsiteY7" fmla="*/ 3963344 h 5563114"/>
+              <a:gd name="connsiteX8" fmla="*/ 2481065 w 5410610"/>
+              <a:gd name="connsiteY8" fmla="*/ 2292804 h 5563114"/>
+              <a:gd name="connsiteX9" fmla="*/ 3395466 w 5410610"/>
+              <a:gd name="connsiteY9" fmla="*/ 41973 h 5563114"/>
+              <a:gd name="connsiteX0" fmla="*/ 3386669 w 5410610"/>
+              <a:gd name="connsiteY0" fmla="*/ 85931 h 5563114"/>
+              <a:gd name="connsiteX1" fmla="*/ 5241849 w 5410610"/>
+              <a:gd name="connsiteY1" fmla="*/ 252987 h 5563114"/>
+              <a:gd name="connsiteX2" fmla="*/ 5233055 w 5410610"/>
+              <a:gd name="connsiteY2" fmla="*/ 2855510 h 5563114"/>
+              <a:gd name="connsiteX3" fmla="*/ 3114108 w 5410610"/>
+              <a:gd name="connsiteY3" fmla="*/ 3198410 h 5563114"/>
+              <a:gd name="connsiteX4" fmla="*/ 2665700 w 5410610"/>
+              <a:gd name="connsiteY4" fmla="*/ 5326148 h 5563114"/>
+              <a:gd name="connsiteX5" fmla="*/ 159893 w 5410610"/>
+              <a:gd name="connsiteY5" fmla="*/ 5370109 h 5563114"/>
+              <a:gd name="connsiteX6" fmla="*/ 546755 w 5410610"/>
+              <a:gd name="connsiteY6" fmla="*/ 4068848 h 5563114"/>
+              <a:gd name="connsiteX7" fmla="*/ 2349180 w 5410610"/>
+              <a:gd name="connsiteY7" fmla="*/ 3963344 h 5563114"/>
+              <a:gd name="connsiteX8" fmla="*/ 2481065 w 5410610"/>
+              <a:gd name="connsiteY8" fmla="*/ 2292804 h 5563114"/>
+              <a:gd name="connsiteX9" fmla="*/ 3413051 w 5410610"/>
+              <a:gd name="connsiteY9" fmla="*/ 85935 h 5563114"/>
+              <a:gd name="connsiteX0" fmla="*/ 3386669 w 5410610"/>
+              <a:gd name="connsiteY0" fmla="*/ 85931 h 5563114"/>
+              <a:gd name="connsiteX1" fmla="*/ 5241849 w 5410610"/>
+              <a:gd name="connsiteY1" fmla="*/ 252987 h 5563114"/>
+              <a:gd name="connsiteX2" fmla="*/ 5233055 w 5410610"/>
+              <a:gd name="connsiteY2" fmla="*/ 2855510 h 5563114"/>
+              <a:gd name="connsiteX3" fmla="*/ 3114108 w 5410610"/>
+              <a:gd name="connsiteY3" fmla="*/ 3198410 h 5563114"/>
+              <a:gd name="connsiteX4" fmla="*/ 2665700 w 5410610"/>
+              <a:gd name="connsiteY4" fmla="*/ 5326148 h 5563114"/>
+              <a:gd name="connsiteX5" fmla="*/ 159893 w 5410610"/>
+              <a:gd name="connsiteY5" fmla="*/ 5370109 h 5563114"/>
+              <a:gd name="connsiteX6" fmla="*/ 546755 w 5410610"/>
+              <a:gd name="connsiteY6" fmla="*/ 4068848 h 5563114"/>
+              <a:gd name="connsiteX7" fmla="*/ 2349180 w 5410610"/>
+              <a:gd name="connsiteY7" fmla="*/ 3963344 h 5563114"/>
+              <a:gd name="connsiteX8" fmla="*/ 2481065 w 5410610"/>
+              <a:gd name="connsiteY8" fmla="*/ 2292804 h 5563114"/>
+              <a:gd name="connsiteX9" fmla="*/ 3369089 w 5410610"/>
+              <a:gd name="connsiteY9" fmla="*/ 68350 h 5563114"/>
+              <a:gd name="connsiteX0" fmla="*/ 3147080 w 5171021"/>
+              <a:gd name="connsiteY0" fmla="*/ 85931 h 5630123"/>
+              <a:gd name="connsiteX1" fmla="*/ 5002260 w 5171021"/>
+              <a:gd name="connsiteY1" fmla="*/ 252987 h 5630123"/>
+              <a:gd name="connsiteX2" fmla="*/ 4993466 w 5171021"/>
+              <a:gd name="connsiteY2" fmla="*/ 2855510 h 5630123"/>
+              <a:gd name="connsiteX3" fmla="*/ 2874519 w 5171021"/>
+              <a:gd name="connsiteY3" fmla="*/ 3198410 h 5630123"/>
+              <a:gd name="connsiteX4" fmla="*/ 2426111 w 5171021"/>
+              <a:gd name="connsiteY4" fmla="*/ 5326148 h 5630123"/>
+              <a:gd name="connsiteX5" fmla="*/ 307166 w 5171021"/>
+              <a:gd name="connsiteY5" fmla="*/ 5484409 h 5630123"/>
+              <a:gd name="connsiteX6" fmla="*/ 307166 w 5171021"/>
+              <a:gd name="connsiteY6" fmla="*/ 4068848 h 5630123"/>
+              <a:gd name="connsiteX7" fmla="*/ 2109591 w 5171021"/>
+              <a:gd name="connsiteY7" fmla="*/ 3963344 h 5630123"/>
+              <a:gd name="connsiteX8" fmla="*/ 2241476 w 5171021"/>
+              <a:gd name="connsiteY8" fmla="*/ 2292804 h 5630123"/>
+              <a:gd name="connsiteX9" fmla="*/ 3129500 w 5171021"/>
+              <a:gd name="connsiteY9" fmla="*/ 68350 h 5630123"/>
+              <a:gd name="connsiteX0" fmla="*/ 3147080 w 5171021"/>
+              <a:gd name="connsiteY0" fmla="*/ 85931 h 5630123"/>
+              <a:gd name="connsiteX1" fmla="*/ 5002260 w 5171021"/>
+              <a:gd name="connsiteY1" fmla="*/ 252987 h 5630123"/>
+              <a:gd name="connsiteX2" fmla="*/ 4993466 w 5171021"/>
+              <a:gd name="connsiteY2" fmla="*/ 2855510 h 5630123"/>
+              <a:gd name="connsiteX3" fmla="*/ 2874519 w 5171021"/>
+              <a:gd name="connsiteY3" fmla="*/ 3198410 h 5630123"/>
+              <a:gd name="connsiteX4" fmla="*/ 2426111 w 5171021"/>
+              <a:gd name="connsiteY4" fmla="*/ 5326148 h 5630123"/>
+              <a:gd name="connsiteX5" fmla="*/ 307166 w 5171021"/>
+              <a:gd name="connsiteY5" fmla="*/ 5484409 h 5630123"/>
+              <a:gd name="connsiteX6" fmla="*/ 307166 w 5171021"/>
+              <a:gd name="connsiteY6" fmla="*/ 4068848 h 5630123"/>
+              <a:gd name="connsiteX7" fmla="*/ 2109591 w 5171021"/>
+              <a:gd name="connsiteY7" fmla="*/ 3963344 h 5630123"/>
+              <a:gd name="connsiteX8" fmla="*/ 2241476 w 5171021"/>
+              <a:gd name="connsiteY8" fmla="*/ 2292804 h 5630123"/>
+              <a:gd name="connsiteX9" fmla="*/ 2927277 w 5171021"/>
+              <a:gd name="connsiteY9" fmla="*/ 33181 h 5630123"/>
+              <a:gd name="connsiteX0" fmla="*/ 3111911 w 5171021"/>
+              <a:gd name="connsiteY0" fmla="*/ 61658 h 5649811"/>
+              <a:gd name="connsiteX1" fmla="*/ 5002260 w 5171021"/>
+              <a:gd name="connsiteY1" fmla="*/ 272675 h 5649811"/>
+              <a:gd name="connsiteX2" fmla="*/ 4993466 w 5171021"/>
+              <a:gd name="connsiteY2" fmla="*/ 2875198 h 5649811"/>
+              <a:gd name="connsiteX3" fmla="*/ 2874519 w 5171021"/>
+              <a:gd name="connsiteY3" fmla="*/ 3218098 h 5649811"/>
+              <a:gd name="connsiteX4" fmla="*/ 2426111 w 5171021"/>
+              <a:gd name="connsiteY4" fmla="*/ 5345836 h 5649811"/>
+              <a:gd name="connsiteX5" fmla="*/ 307166 w 5171021"/>
+              <a:gd name="connsiteY5" fmla="*/ 5504097 h 5649811"/>
+              <a:gd name="connsiteX6" fmla="*/ 307166 w 5171021"/>
+              <a:gd name="connsiteY6" fmla="*/ 4088536 h 5649811"/>
+              <a:gd name="connsiteX7" fmla="*/ 2109591 w 5171021"/>
+              <a:gd name="connsiteY7" fmla="*/ 3983032 h 5649811"/>
+              <a:gd name="connsiteX8" fmla="*/ 2241476 w 5171021"/>
+              <a:gd name="connsiteY8" fmla="*/ 2312492 h 5649811"/>
+              <a:gd name="connsiteX9" fmla="*/ 2927277 w 5171021"/>
+              <a:gd name="connsiteY9" fmla="*/ 52869 h 5649811"/>
+              <a:gd name="connsiteX0" fmla="*/ 3111911 w 5174485"/>
+              <a:gd name="connsiteY0" fmla="*/ 20832 h 5608985"/>
+              <a:gd name="connsiteX1" fmla="*/ 5011052 w 5174485"/>
+              <a:gd name="connsiteY1" fmla="*/ 442864 h 5608985"/>
+              <a:gd name="connsiteX2" fmla="*/ 4993466 w 5174485"/>
+              <a:gd name="connsiteY2" fmla="*/ 2834372 h 5608985"/>
+              <a:gd name="connsiteX3" fmla="*/ 2874519 w 5174485"/>
+              <a:gd name="connsiteY3" fmla="*/ 3177272 h 5608985"/>
+              <a:gd name="connsiteX4" fmla="*/ 2426111 w 5174485"/>
+              <a:gd name="connsiteY4" fmla="*/ 5305010 h 5608985"/>
+              <a:gd name="connsiteX5" fmla="*/ 307166 w 5174485"/>
+              <a:gd name="connsiteY5" fmla="*/ 5463271 h 5608985"/>
+              <a:gd name="connsiteX6" fmla="*/ 307166 w 5174485"/>
+              <a:gd name="connsiteY6" fmla="*/ 4047710 h 5608985"/>
+              <a:gd name="connsiteX7" fmla="*/ 2109591 w 5174485"/>
+              <a:gd name="connsiteY7" fmla="*/ 3942206 h 5608985"/>
+              <a:gd name="connsiteX8" fmla="*/ 2241476 w 5174485"/>
+              <a:gd name="connsiteY8" fmla="*/ 2271666 h 5608985"/>
+              <a:gd name="connsiteX9" fmla="*/ 2927277 w 5174485"/>
+              <a:gd name="connsiteY9" fmla="*/ 12043 h 5608985"/>
+              <a:gd name="connsiteX0" fmla="*/ 3111911 w 5174485"/>
+              <a:gd name="connsiteY0" fmla="*/ 3358 h 5591511"/>
+              <a:gd name="connsiteX1" fmla="*/ 5011052 w 5174485"/>
+              <a:gd name="connsiteY1" fmla="*/ 425390 h 5591511"/>
+              <a:gd name="connsiteX2" fmla="*/ 4993466 w 5174485"/>
+              <a:gd name="connsiteY2" fmla="*/ 2816898 h 5591511"/>
+              <a:gd name="connsiteX3" fmla="*/ 2874519 w 5174485"/>
+              <a:gd name="connsiteY3" fmla="*/ 3159798 h 5591511"/>
+              <a:gd name="connsiteX4" fmla="*/ 2426111 w 5174485"/>
+              <a:gd name="connsiteY4" fmla="*/ 5287536 h 5591511"/>
+              <a:gd name="connsiteX5" fmla="*/ 307166 w 5174485"/>
+              <a:gd name="connsiteY5" fmla="*/ 5445797 h 5591511"/>
+              <a:gd name="connsiteX6" fmla="*/ 307166 w 5174485"/>
+              <a:gd name="connsiteY6" fmla="*/ 4030236 h 5591511"/>
+              <a:gd name="connsiteX7" fmla="*/ 2109591 w 5174485"/>
+              <a:gd name="connsiteY7" fmla="*/ 3924732 h 5591511"/>
+              <a:gd name="connsiteX8" fmla="*/ 2241476 w 5174485"/>
+              <a:gd name="connsiteY8" fmla="*/ 2254192 h 5591511"/>
+              <a:gd name="connsiteX9" fmla="*/ 3076746 w 5174485"/>
+              <a:gd name="connsiteY9" fmla="*/ 12153 h 5591511"/>
+              <a:gd name="connsiteX0" fmla="*/ 3111911 w 5174485"/>
+              <a:gd name="connsiteY0" fmla="*/ 213 h 5588366"/>
+              <a:gd name="connsiteX1" fmla="*/ 5011052 w 5174485"/>
+              <a:gd name="connsiteY1" fmla="*/ 422245 h 5588366"/>
+              <a:gd name="connsiteX2" fmla="*/ 4993466 w 5174485"/>
+              <a:gd name="connsiteY2" fmla="*/ 2813753 h 5588366"/>
+              <a:gd name="connsiteX3" fmla="*/ 2874519 w 5174485"/>
+              <a:gd name="connsiteY3" fmla="*/ 3156653 h 5588366"/>
+              <a:gd name="connsiteX4" fmla="*/ 2426111 w 5174485"/>
+              <a:gd name="connsiteY4" fmla="*/ 5284391 h 5588366"/>
+              <a:gd name="connsiteX5" fmla="*/ 307166 w 5174485"/>
+              <a:gd name="connsiteY5" fmla="*/ 5442652 h 5588366"/>
+              <a:gd name="connsiteX6" fmla="*/ 307166 w 5174485"/>
+              <a:gd name="connsiteY6" fmla="*/ 4027091 h 5588366"/>
+              <a:gd name="connsiteX7" fmla="*/ 2109591 w 5174485"/>
+              <a:gd name="connsiteY7" fmla="*/ 3921587 h 5588366"/>
+              <a:gd name="connsiteX8" fmla="*/ 2241476 w 5174485"/>
+              <a:gd name="connsiteY8" fmla="*/ 2251047 h 5588366"/>
+              <a:gd name="connsiteX9" fmla="*/ 3147084 w 5174485"/>
+              <a:gd name="connsiteY9" fmla="*/ 17800 h 5588366"/>
+              <a:gd name="connsiteX0" fmla="*/ 3111911 w 5174485"/>
+              <a:gd name="connsiteY0" fmla="*/ 20832 h 5608985"/>
+              <a:gd name="connsiteX1" fmla="*/ 5011052 w 5174485"/>
+              <a:gd name="connsiteY1" fmla="*/ 442864 h 5608985"/>
+              <a:gd name="connsiteX2" fmla="*/ 4993466 w 5174485"/>
+              <a:gd name="connsiteY2" fmla="*/ 2834372 h 5608985"/>
+              <a:gd name="connsiteX3" fmla="*/ 2874519 w 5174485"/>
+              <a:gd name="connsiteY3" fmla="*/ 3177272 h 5608985"/>
+              <a:gd name="connsiteX4" fmla="*/ 2426111 w 5174485"/>
+              <a:gd name="connsiteY4" fmla="*/ 5305010 h 5608985"/>
+              <a:gd name="connsiteX5" fmla="*/ 307166 w 5174485"/>
+              <a:gd name="connsiteY5" fmla="*/ 5463271 h 5608985"/>
+              <a:gd name="connsiteX6" fmla="*/ 307166 w 5174485"/>
+              <a:gd name="connsiteY6" fmla="*/ 4047710 h 5608985"/>
+              <a:gd name="connsiteX7" fmla="*/ 2109591 w 5174485"/>
+              <a:gd name="connsiteY7" fmla="*/ 3942206 h 5608985"/>
+              <a:gd name="connsiteX8" fmla="*/ 2241476 w 5174485"/>
+              <a:gd name="connsiteY8" fmla="*/ 2271666 h 5608985"/>
+              <a:gd name="connsiteX9" fmla="*/ 3147084 w 5174485"/>
+              <a:gd name="connsiteY9" fmla="*/ 12042 h 5608985"/>
+              <a:gd name="connsiteX0" fmla="*/ 3111911 w 5174485"/>
+              <a:gd name="connsiteY0" fmla="*/ 213 h 5588366"/>
+              <a:gd name="connsiteX1" fmla="*/ 5011052 w 5174485"/>
+              <a:gd name="connsiteY1" fmla="*/ 422245 h 5588366"/>
+              <a:gd name="connsiteX2" fmla="*/ 4993466 w 5174485"/>
+              <a:gd name="connsiteY2" fmla="*/ 2813753 h 5588366"/>
+              <a:gd name="connsiteX3" fmla="*/ 2874519 w 5174485"/>
+              <a:gd name="connsiteY3" fmla="*/ 3156653 h 5588366"/>
+              <a:gd name="connsiteX4" fmla="*/ 2426111 w 5174485"/>
+              <a:gd name="connsiteY4" fmla="*/ 5284391 h 5588366"/>
+              <a:gd name="connsiteX5" fmla="*/ 307166 w 5174485"/>
+              <a:gd name="connsiteY5" fmla="*/ 5442652 h 5588366"/>
+              <a:gd name="connsiteX6" fmla="*/ 307166 w 5174485"/>
+              <a:gd name="connsiteY6" fmla="*/ 4027091 h 5588366"/>
+              <a:gd name="connsiteX7" fmla="*/ 2109591 w 5174485"/>
+              <a:gd name="connsiteY7" fmla="*/ 3921587 h 5588366"/>
+              <a:gd name="connsiteX8" fmla="*/ 2241476 w 5174485"/>
+              <a:gd name="connsiteY8" fmla="*/ 2251047 h 5588366"/>
+              <a:gd name="connsiteX9" fmla="*/ 3120707 w 5174485"/>
+              <a:gd name="connsiteY9" fmla="*/ 17800 h 5588366"/>
+              <a:gd name="connsiteX0" fmla="*/ 3111911 w 5174485"/>
+              <a:gd name="connsiteY0" fmla="*/ 20832 h 5608985"/>
+              <a:gd name="connsiteX1" fmla="*/ 5011052 w 5174485"/>
+              <a:gd name="connsiteY1" fmla="*/ 442864 h 5608985"/>
+              <a:gd name="connsiteX2" fmla="*/ 4993466 w 5174485"/>
+              <a:gd name="connsiteY2" fmla="*/ 2834372 h 5608985"/>
+              <a:gd name="connsiteX3" fmla="*/ 2874519 w 5174485"/>
+              <a:gd name="connsiteY3" fmla="*/ 3177272 h 5608985"/>
+              <a:gd name="connsiteX4" fmla="*/ 2426111 w 5174485"/>
+              <a:gd name="connsiteY4" fmla="*/ 5305010 h 5608985"/>
+              <a:gd name="connsiteX5" fmla="*/ 307166 w 5174485"/>
+              <a:gd name="connsiteY5" fmla="*/ 5463271 h 5608985"/>
+              <a:gd name="connsiteX6" fmla="*/ 307166 w 5174485"/>
+              <a:gd name="connsiteY6" fmla="*/ 4047710 h 5608985"/>
+              <a:gd name="connsiteX7" fmla="*/ 2109591 w 5174485"/>
+              <a:gd name="connsiteY7" fmla="*/ 3942206 h 5608985"/>
+              <a:gd name="connsiteX8" fmla="*/ 2241476 w 5174485"/>
+              <a:gd name="connsiteY8" fmla="*/ 2271666 h 5608985"/>
+              <a:gd name="connsiteX9" fmla="*/ 3120707 w 5174485"/>
+              <a:gd name="connsiteY9" fmla="*/ 12042 h 5608985"/>
+              <a:gd name="connsiteX0" fmla="*/ 6318975 w 8381549"/>
+              <a:gd name="connsiteY0" fmla="*/ 213 h 5588366"/>
+              <a:gd name="connsiteX1" fmla="*/ 8218116 w 8381549"/>
+              <a:gd name="connsiteY1" fmla="*/ 422245 h 5588366"/>
+              <a:gd name="connsiteX2" fmla="*/ 8200530 w 8381549"/>
+              <a:gd name="connsiteY2" fmla="*/ 2813753 h 5588366"/>
+              <a:gd name="connsiteX3" fmla="*/ 6081583 w 8381549"/>
+              <a:gd name="connsiteY3" fmla="*/ 3156653 h 5588366"/>
+              <a:gd name="connsiteX4" fmla="*/ 5633175 w 8381549"/>
+              <a:gd name="connsiteY4" fmla="*/ 5284391 h 5588366"/>
+              <a:gd name="connsiteX5" fmla="*/ 3514230 w 8381549"/>
+              <a:gd name="connsiteY5" fmla="*/ 5442652 h 5588366"/>
+              <a:gd name="connsiteX6" fmla="*/ 3514230 w 8381549"/>
+              <a:gd name="connsiteY6" fmla="*/ 4027091 h 5588366"/>
+              <a:gd name="connsiteX7" fmla="*/ 5316655 w 8381549"/>
+              <a:gd name="connsiteY7" fmla="*/ 3921587 h 5588366"/>
+              <a:gd name="connsiteX8" fmla="*/ 5448540 w 8381549"/>
+              <a:gd name="connsiteY8" fmla="*/ 2251047 h 5588366"/>
+              <a:gd name="connsiteX9" fmla="*/ 58856 w 8381549"/>
+              <a:gd name="connsiteY9" fmla="*/ 1512492 h 5588366"/>
+              <a:gd name="connsiteX0" fmla="*/ 6308883 w 8371457"/>
+              <a:gd name="connsiteY0" fmla="*/ 213 h 5588366"/>
+              <a:gd name="connsiteX1" fmla="*/ 8208024 w 8371457"/>
+              <a:gd name="connsiteY1" fmla="*/ 422245 h 5588366"/>
+              <a:gd name="connsiteX2" fmla="*/ 8190438 w 8371457"/>
+              <a:gd name="connsiteY2" fmla="*/ 2813753 h 5588366"/>
+              <a:gd name="connsiteX3" fmla="*/ 6071491 w 8371457"/>
+              <a:gd name="connsiteY3" fmla="*/ 3156653 h 5588366"/>
+              <a:gd name="connsiteX4" fmla="*/ 5623083 w 8371457"/>
+              <a:gd name="connsiteY4" fmla="*/ 5284391 h 5588366"/>
+              <a:gd name="connsiteX5" fmla="*/ 3504138 w 8371457"/>
+              <a:gd name="connsiteY5" fmla="*/ 5442652 h 5588366"/>
+              <a:gd name="connsiteX6" fmla="*/ 3504138 w 8371457"/>
+              <a:gd name="connsiteY6" fmla="*/ 4027091 h 5588366"/>
+              <a:gd name="connsiteX7" fmla="*/ 5306563 w 8371457"/>
+              <a:gd name="connsiteY7" fmla="*/ 3921587 h 5588366"/>
+              <a:gd name="connsiteX8" fmla="*/ 5438448 w 8371457"/>
+              <a:gd name="connsiteY8" fmla="*/ 2251047 h 5588366"/>
+              <a:gd name="connsiteX9" fmla="*/ 48764 w 8371457"/>
+              <a:gd name="connsiteY9" fmla="*/ 1512492 h 5588366"/>
+              <a:gd name="connsiteX0" fmla="*/ 6169292 w 8231866"/>
+              <a:gd name="connsiteY0" fmla="*/ 213 h 5588366"/>
+              <a:gd name="connsiteX1" fmla="*/ 8068433 w 8231866"/>
+              <a:gd name="connsiteY1" fmla="*/ 422245 h 5588366"/>
+              <a:gd name="connsiteX2" fmla="*/ 8050847 w 8231866"/>
+              <a:gd name="connsiteY2" fmla="*/ 2813753 h 5588366"/>
+              <a:gd name="connsiteX3" fmla="*/ 5931900 w 8231866"/>
+              <a:gd name="connsiteY3" fmla="*/ 3156653 h 5588366"/>
+              <a:gd name="connsiteX4" fmla="*/ 5483492 w 8231866"/>
+              <a:gd name="connsiteY4" fmla="*/ 5284391 h 5588366"/>
+              <a:gd name="connsiteX5" fmla="*/ 3364547 w 8231866"/>
+              <a:gd name="connsiteY5" fmla="*/ 5442652 h 5588366"/>
+              <a:gd name="connsiteX6" fmla="*/ 3364547 w 8231866"/>
+              <a:gd name="connsiteY6" fmla="*/ 4027091 h 5588366"/>
+              <a:gd name="connsiteX7" fmla="*/ 5166972 w 8231866"/>
+              <a:gd name="connsiteY7" fmla="*/ 3921587 h 5588366"/>
+              <a:gd name="connsiteX8" fmla="*/ 5298857 w 8231866"/>
+              <a:gd name="connsiteY8" fmla="*/ 2251047 h 5588366"/>
+              <a:gd name="connsiteX9" fmla="*/ 49850 w 8231866"/>
+              <a:gd name="connsiteY9" fmla="*/ 703600 h 5588366"/>
+              <a:gd name="connsiteX0" fmla="*/ 6510790 w 8573364"/>
+              <a:gd name="connsiteY0" fmla="*/ 213 h 5588366"/>
+              <a:gd name="connsiteX1" fmla="*/ 8409931 w 8573364"/>
+              <a:gd name="connsiteY1" fmla="*/ 422245 h 5588366"/>
+              <a:gd name="connsiteX2" fmla="*/ 8392345 w 8573364"/>
+              <a:gd name="connsiteY2" fmla="*/ 2813753 h 5588366"/>
+              <a:gd name="connsiteX3" fmla="*/ 6273398 w 8573364"/>
+              <a:gd name="connsiteY3" fmla="*/ 3156653 h 5588366"/>
+              <a:gd name="connsiteX4" fmla="*/ 5824990 w 8573364"/>
+              <a:gd name="connsiteY4" fmla="*/ 5284391 h 5588366"/>
+              <a:gd name="connsiteX5" fmla="*/ 3706045 w 8573364"/>
+              <a:gd name="connsiteY5" fmla="*/ 5442652 h 5588366"/>
+              <a:gd name="connsiteX6" fmla="*/ 3706045 w 8573364"/>
+              <a:gd name="connsiteY6" fmla="*/ 4027091 h 5588366"/>
+              <a:gd name="connsiteX7" fmla="*/ 5508470 w 8573364"/>
+              <a:gd name="connsiteY7" fmla="*/ 3921587 h 5588366"/>
+              <a:gd name="connsiteX8" fmla="*/ 5640355 w 8573364"/>
+              <a:gd name="connsiteY8" fmla="*/ 2251047 h 5588366"/>
+              <a:gd name="connsiteX9" fmla="*/ 391348 w 8573364"/>
+              <a:gd name="connsiteY9" fmla="*/ 703600 h 5588366"/>
+              <a:gd name="connsiteX10" fmla="*/ 382555 w 8573364"/>
+              <a:gd name="connsiteY10" fmla="*/ 712392 h 5588366"/>
+              <a:gd name="connsiteX0" fmla="*/ 6195464 w 8258038"/>
+              <a:gd name="connsiteY0" fmla="*/ 213 h 5588366"/>
+              <a:gd name="connsiteX1" fmla="*/ 8094605 w 8258038"/>
+              <a:gd name="connsiteY1" fmla="*/ 422245 h 5588366"/>
+              <a:gd name="connsiteX2" fmla="*/ 8077019 w 8258038"/>
+              <a:gd name="connsiteY2" fmla="*/ 2813753 h 5588366"/>
+              <a:gd name="connsiteX3" fmla="*/ 5958072 w 8258038"/>
+              <a:gd name="connsiteY3" fmla="*/ 3156653 h 5588366"/>
+              <a:gd name="connsiteX4" fmla="*/ 5509664 w 8258038"/>
+              <a:gd name="connsiteY4" fmla="*/ 5284391 h 5588366"/>
+              <a:gd name="connsiteX5" fmla="*/ 3390719 w 8258038"/>
+              <a:gd name="connsiteY5" fmla="*/ 5442652 h 5588366"/>
+              <a:gd name="connsiteX6" fmla="*/ 3390719 w 8258038"/>
+              <a:gd name="connsiteY6" fmla="*/ 4027091 h 5588366"/>
+              <a:gd name="connsiteX7" fmla="*/ 5193144 w 8258038"/>
+              <a:gd name="connsiteY7" fmla="*/ 3921587 h 5588366"/>
+              <a:gd name="connsiteX8" fmla="*/ 5325029 w 8258038"/>
+              <a:gd name="connsiteY8" fmla="*/ 2251047 h 5588366"/>
+              <a:gd name="connsiteX9" fmla="*/ 76022 w 8258038"/>
+              <a:gd name="connsiteY9" fmla="*/ 703600 h 5588366"/>
+              <a:gd name="connsiteX10" fmla="*/ 6186676 w 8258038"/>
+              <a:gd name="connsiteY10" fmla="*/ 9007 h 5588366"/>
+              <a:gd name="connsiteX0" fmla="*/ 6169292 w 8231866"/>
+              <a:gd name="connsiteY0" fmla="*/ 44222 h 5632375"/>
+              <a:gd name="connsiteX1" fmla="*/ 8068433 w 8231866"/>
+              <a:gd name="connsiteY1" fmla="*/ 466254 h 5632375"/>
+              <a:gd name="connsiteX2" fmla="*/ 8050847 w 8231866"/>
+              <a:gd name="connsiteY2" fmla="*/ 2857762 h 5632375"/>
+              <a:gd name="connsiteX3" fmla="*/ 5931900 w 8231866"/>
+              <a:gd name="connsiteY3" fmla="*/ 3200662 h 5632375"/>
+              <a:gd name="connsiteX4" fmla="*/ 5483492 w 8231866"/>
+              <a:gd name="connsiteY4" fmla="*/ 5328400 h 5632375"/>
+              <a:gd name="connsiteX5" fmla="*/ 3364547 w 8231866"/>
+              <a:gd name="connsiteY5" fmla="*/ 5486661 h 5632375"/>
+              <a:gd name="connsiteX6" fmla="*/ 3364547 w 8231866"/>
+              <a:gd name="connsiteY6" fmla="*/ 4071100 h 5632375"/>
+              <a:gd name="connsiteX7" fmla="*/ 5166972 w 8231866"/>
+              <a:gd name="connsiteY7" fmla="*/ 3965596 h 5632375"/>
+              <a:gd name="connsiteX8" fmla="*/ 5298857 w 8231866"/>
+              <a:gd name="connsiteY8" fmla="*/ 2295056 h 5632375"/>
+              <a:gd name="connsiteX9" fmla="*/ 49850 w 8231866"/>
+              <a:gd name="connsiteY9" fmla="*/ 747609 h 5632375"/>
+              <a:gd name="connsiteX10" fmla="*/ 6160504 w 8231866"/>
+              <a:gd name="connsiteY10" fmla="*/ 53016 h 5632375"/>
+              <a:gd name="connsiteX0" fmla="*/ 6135813 w 8198387"/>
+              <a:gd name="connsiteY0" fmla="*/ 44222 h 5632375"/>
+              <a:gd name="connsiteX1" fmla="*/ 8034954 w 8198387"/>
+              <a:gd name="connsiteY1" fmla="*/ 466254 h 5632375"/>
+              <a:gd name="connsiteX2" fmla="*/ 8017368 w 8198387"/>
+              <a:gd name="connsiteY2" fmla="*/ 2857762 h 5632375"/>
+              <a:gd name="connsiteX3" fmla="*/ 5898421 w 8198387"/>
+              <a:gd name="connsiteY3" fmla="*/ 3200662 h 5632375"/>
+              <a:gd name="connsiteX4" fmla="*/ 5450013 w 8198387"/>
+              <a:gd name="connsiteY4" fmla="*/ 5328400 h 5632375"/>
+              <a:gd name="connsiteX5" fmla="*/ 3331068 w 8198387"/>
+              <a:gd name="connsiteY5" fmla="*/ 5486661 h 5632375"/>
+              <a:gd name="connsiteX6" fmla="*/ 3331068 w 8198387"/>
+              <a:gd name="connsiteY6" fmla="*/ 4071100 h 5632375"/>
+              <a:gd name="connsiteX7" fmla="*/ 5133493 w 8198387"/>
+              <a:gd name="connsiteY7" fmla="*/ 3965596 h 5632375"/>
+              <a:gd name="connsiteX8" fmla="*/ 5265378 w 8198387"/>
+              <a:gd name="connsiteY8" fmla="*/ 2295056 h 5632375"/>
+              <a:gd name="connsiteX9" fmla="*/ 16371 w 8198387"/>
+              <a:gd name="connsiteY9" fmla="*/ 747609 h 5632375"/>
+              <a:gd name="connsiteX10" fmla="*/ 6127025 w 8198387"/>
+              <a:gd name="connsiteY10" fmla="*/ 53016 h 5632375"/>
+              <a:gd name="connsiteX0" fmla="*/ 6135813 w 8198387"/>
+              <a:gd name="connsiteY0" fmla="*/ 44222 h 5632375"/>
+              <a:gd name="connsiteX1" fmla="*/ 8034954 w 8198387"/>
+              <a:gd name="connsiteY1" fmla="*/ 466254 h 5632375"/>
+              <a:gd name="connsiteX2" fmla="*/ 8017368 w 8198387"/>
+              <a:gd name="connsiteY2" fmla="*/ 2857762 h 5632375"/>
+              <a:gd name="connsiteX3" fmla="*/ 5898421 w 8198387"/>
+              <a:gd name="connsiteY3" fmla="*/ 3200662 h 5632375"/>
+              <a:gd name="connsiteX4" fmla="*/ 5450013 w 8198387"/>
+              <a:gd name="connsiteY4" fmla="*/ 5328400 h 5632375"/>
+              <a:gd name="connsiteX5" fmla="*/ 3331068 w 8198387"/>
+              <a:gd name="connsiteY5" fmla="*/ 5486661 h 5632375"/>
+              <a:gd name="connsiteX6" fmla="*/ 3331068 w 8198387"/>
+              <a:gd name="connsiteY6" fmla="*/ 4071100 h 5632375"/>
+              <a:gd name="connsiteX7" fmla="*/ 5133493 w 8198387"/>
+              <a:gd name="connsiteY7" fmla="*/ 3965596 h 5632375"/>
+              <a:gd name="connsiteX8" fmla="*/ 5318132 w 8198387"/>
+              <a:gd name="connsiteY8" fmla="*/ 2110417 h 5632375"/>
+              <a:gd name="connsiteX9" fmla="*/ 16371 w 8198387"/>
+              <a:gd name="connsiteY9" fmla="*/ 747609 h 5632375"/>
+              <a:gd name="connsiteX10" fmla="*/ 6127025 w 8198387"/>
+              <a:gd name="connsiteY10" fmla="*/ 53016 h 5632375"/>
+              <a:gd name="connsiteX0" fmla="*/ 6135813 w 8198387"/>
+              <a:gd name="connsiteY0" fmla="*/ 44222 h 5632375"/>
+              <a:gd name="connsiteX1" fmla="*/ 8034954 w 8198387"/>
+              <a:gd name="connsiteY1" fmla="*/ 466254 h 5632375"/>
+              <a:gd name="connsiteX2" fmla="*/ 8017368 w 8198387"/>
+              <a:gd name="connsiteY2" fmla="*/ 2857762 h 5632375"/>
+              <a:gd name="connsiteX3" fmla="*/ 5898421 w 8198387"/>
+              <a:gd name="connsiteY3" fmla="*/ 3200662 h 5632375"/>
+              <a:gd name="connsiteX4" fmla="*/ 5450013 w 8198387"/>
+              <a:gd name="connsiteY4" fmla="*/ 5328400 h 5632375"/>
+              <a:gd name="connsiteX5" fmla="*/ 3331068 w 8198387"/>
+              <a:gd name="connsiteY5" fmla="*/ 5486661 h 5632375"/>
+              <a:gd name="connsiteX6" fmla="*/ 3331068 w 8198387"/>
+              <a:gd name="connsiteY6" fmla="*/ 4071100 h 5632375"/>
+              <a:gd name="connsiteX7" fmla="*/ 5133493 w 8198387"/>
+              <a:gd name="connsiteY7" fmla="*/ 3965596 h 5632375"/>
+              <a:gd name="connsiteX8" fmla="*/ 5089532 w 8198387"/>
+              <a:gd name="connsiteY8" fmla="*/ 2207133 h 5632375"/>
+              <a:gd name="connsiteX9" fmla="*/ 16371 w 8198387"/>
+              <a:gd name="connsiteY9" fmla="*/ 747609 h 5632375"/>
+              <a:gd name="connsiteX10" fmla="*/ 6127025 w 8198387"/>
+              <a:gd name="connsiteY10" fmla="*/ 53016 h 5632375"/>
+              <a:gd name="connsiteX0" fmla="*/ 6135813 w 8198387"/>
+              <a:gd name="connsiteY0" fmla="*/ 44222 h 5632375"/>
+              <a:gd name="connsiteX1" fmla="*/ 8034954 w 8198387"/>
+              <a:gd name="connsiteY1" fmla="*/ 466254 h 5632375"/>
+              <a:gd name="connsiteX2" fmla="*/ 8017368 w 8198387"/>
+              <a:gd name="connsiteY2" fmla="*/ 2857762 h 5632375"/>
+              <a:gd name="connsiteX3" fmla="*/ 5898421 w 8198387"/>
+              <a:gd name="connsiteY3" fmla="*/ 3200662 h 5632375"/>
+              <a:gd name="connsiteX4" fmla="*/ 5450013 w 8198387"/>
+              <a:gd name="connsiteY4" fmla="*/ 5328400 h 5632375"/>
+              <a:gd name="connsiteX5" fmla="*/ 3331068 w 8198387"/>
+              <a:gd name="connsiteY5" fmla="*/ 5486661 h 5632375"/>
+              <a:gd name="connsiteX6" fmla="*/ 3331068 w 8198387"/>
+              <a:gd name="connsiteY6" fmla="*/ 4071100 h 5632375"/>
+              <a:gd name="connsiteX7" fmla="*/ 5133493 w 8198387"/>
+              <a:gd name="connsiteY7" fmla="*/ 3965596 h 5632375"/>
+              <a:gd name="connsiteX8" fmla="*/ 5089532 w 8198387"/>
+              <a:gd name="connsiteY8" fmla="*/ 2207133 h 5632375"/>
+              <a:gd name="connsiteX9" fmla="*/ 16371 w 8198387"/>
+              <a:gd name="connsiteY9" fmla="*/ 747609 h 5632375"/>
+              <a:gd name="connsiteX10" fmla="*/ 6127025 w 8198387"/>
+              <a:gd name="connsiteY10" fmla="*/ 53016 h 5632375"/>
+              <a:gd name="connsiteX0" fmla="*/ 6135813 w 8198387"/>
+              <a:gd name="connsiteY0" fmla="*/ 44222 h 5632375"/>
+              <a:gd name="connsiteX1" fmla="*/ 8034954 w 8198387"/>
+              <a:gd name="connsiteY1" fmla="*/ 466254 h 5632375"/>
+              <a:gd name="connsiteX2" fmla="*/ 8017368 w 8198387"/>
+              <a:gd name="connsiteY2" fmla="*/ 2857762 h 5632375"/>
+              <a:gd name="connsiteX3" fmla="*/ 5898421 w 8198387"/>
+              <a:gd name="connsiteY3" fmla="*/ 3200662 h 5632375"/>
+              <a:gd name="connsiteX4" fmla="*/ 5450013 w 8198387"/>
+              <a:gd name="connsiteY4" fmla="*/ 5328400 h 5632375"/>
+              <a:gd name="connsiteX5" fmla="*/ 3331068 w 8198387"/>
+              <a:gd name="connsiteY5" fmla="*/ 5486661 h 5632375"/>
+              <a:gd name="connsiteX6" fmla="*/ 3331068 w 8198387"/>
+              <a:gd name="connsiteY6" fmla="*/ 4071100 h 5632375"/>
+              <a:gd name="connsiteX7" fmla="*/ 5133493 w 8198387"/>
+              <a:gd name="connsiteY7" fmla="*/ 3965596 h 5632375"/>
+              <a:gd name="connsiteX8" fmla="*/ 5450017 w 8198387"/>
+              <a:gd name="connsiteY8" fmla="*/ 1407033 h 5632375"/>
+              <a:gd name="connsiteX9" fmla="*/ 16371 w 8198387"/>
+              <a:gd name="connsiteY9" fmla="*/ 747609 h 5632375"/>
+              <a:gd name="connsiteX10" fmla="*/ 6127025 w 8198387"/>
+              <a:gd name="connsiteY10" fmla="*/ 53016 h 5632375"/>
+              <a:gd name="connsiteX0" fmla="*/ 6135813 w 8198387"/>
+              <a:gd name="connsiteY0" fmla="*/ 44222 h 5632375"/>
+              <a:gd name="connsiteX1" fmla="*/ 8034954 w 8198387"/>
+              <a:gd name="connsiteY1" fmla="*/ 466254 h 5632375"/>
+              <a:gd name="connsiteX2" fmla="*/ 8017368 w 8198387"/>
+              <a:gd name="connsiteY2" fmla="*/ 2857762 h 5632375"/>
+              <a:gd name="connsiteX3" fmla="*/ 5898421 w 8198387"/>
+              <a:gd name="connsiteY3" fmla="*/ 3200662 h 5632375"/>
+              <a:gd name="connsiteX4" fmla="*/ 5450013 w 8198387"/>
+              <a:gd name="connsiteY4" fmla="*/ 5328400 h 5632375"/>
+              <a:gd name="connsiteX5" fmla="*/ 3331068 w 8198387"/>
+              <a:gd name="connsiteY5" fmla="*/ 5486661 h 5632375"/>
+              <a:gd name="connsiteX6" fmla="*/ 3331068 w 8198387"/>
+              <a:gd name="connsiteY6" fmla="*/ 4071100 h 5632375"/>
+              <a:gd name="connsiteX7" fmla="*/ 5133493 w 8198387"/>
+              <a:gd name="connsiteY7" fmla="*/ 3965596 h 5632375"/>
+              <a:gd name="connsiteX8" fmla="*/ 16371 w 8198387"/>
+              <a:gd name="connsiteY8" fmla="*/ 747609 h 5632375"/>
+              <a:gd name="connsiteX9" fmla="*/ 6127025 w 8198387"/>
+              <a:gd name="connsiteY9" fmla="*/ 53016 h 5632375"/>
+              <a:gd name="connsiteX0" fmla="*/ 6165272 w 8227846"/>
+              <a:gd name="connsiteY0" fmla="*/ 44222 h 5632375"/>
+              <a:gd name="connsiteX1" fmla="*/ 8064413 w 8227846"/>
+              <a:gd name="connsiteY1" fmla="*/ 466254 h 5632375"/>
+              <a:gd name="connsiteX2" fmla="*/ 8046827 w 8227846"/>
+              <a:gd name="connsiteY2" fmla="*/ 2857762 h 5632375"/>
+              <a:gd name="connsiteX3" fmla="*/ 5927880 w 8227846"/>
+              <a:gd name="connsiteY3" fmla="*/ 3200662 h 5632375"/>
+              <a:gd name="connsiteX4" fmla="*/ 5479472 w 8227846"/>
+              <a:gd name="connsiteY4" fmla="*/ 5328400 h 5632375"/>
+              <a:gd name="connsiteX5" fmla="*/ 3360527 w 8227846"/>
+              <a:gd name="connsiteY5" fmla="*/ 5486661 h 5632375"/>
+              <a:gd name="connsiteX6" fmla="*/ 3360527 w 8227846"/>
+              <a:gd name="connsiteY6" fmla="*/ 4071100 h 5632375"/>
+              <a:gd name="connsiteX7" fmla="*/ 45830 w 8227846"/>
+              <a:gd name="connsiteY7" fmla="*/ 747609 h 5632375"/>
+              <a:gd name="connsiteX8" fmla="*/ 6156484 w 8227846"/>
+              <a:gd name="connsiteY8" fmla="*/ 53016 h 5632375"/>
+              <a:gd name="connsiteX0" fmla="*/ 6170157 w 8232731"/>
+              <a:gd name="connsiteY0" fmla="*/ 44222 h 5872629"/>
+              <a:gd name="connsiteX1" fmla="*/ 8069298 w 8232731"/>
+              <a:gd name="connsiteY1" fmla="*/ 466254 h 5872629"/>
+              <a:gd name="connsiteX2" fmla="*/ 8051712 w 8232731"/>
+              <a:gd name="connsiteY2" fmla="*/ 2857762 h 5872629"/>
+              <a:gd name="connsiteX3" fmla="*/ 5932765 w 8232731"/>
+              <a:gd name="connsiteY3" fmla="*/ 3200662 h 5872629"/>
+              <a:gd name="connsiteX4" fmla="*/ 5484357 w 8232731"/>
+              <a:gd name="connsiteY4" fmla="*/ 5328400 h 5872629"/>
+              <a:gd name="connsiteX5" fmla="*/ 3365412 w 8232731"/>
+              <a:gd name="connsiteY5" fmla="*/ 5486661 h 5872629"/>
+              <a:gd name="connsiteX6" fmla="*/ 50715 w 8232731"/>
+              <a:gd name="connsiteY6" fmla="*/ 747609 h 5872629"/>
+              <a:gd name="connsiteX7" fmla="*/ 6161369 w 8232731"/>
+              <a:gd name="connsiteY7" fmla="*/ 53016 h 5872629"/>
+              <a:gd name="connsiteX0" fmla="*/ 6263290 w 8325864"/>
+              <a:gd name="connsiteY0" fmla="*/ 44222 h 5328414"/>
+              <a:gd name="connsiteX1" fmla="*/ 8162431 w 8325864"/>
+              <a:gd name="connsiteY1" fmla="*/ 466254 h 5328414"/>
+              <a:gd name="connsiteX2" fmla="*/ 8144845 w 8325864"/>
+              <a:gd name="connsiteY2" fmla="*/ 2857762 h 5328414"/>
+              <a:gd name="connsiteX3" fmla="*/ 6025898 w 8325864"/>
+              <a:gd name="connsiteY3" fmla="*/ 3200662 h 5328414"/>
+              <a:gd name="connsiteX4" fmla="*/ 5577490 w 8325864"/>
+              <a:gd name="connsiteY4" fmla="*/ 5328400 h 5328414"/>
+              <a:gd name="connsiteX5" fmla="*/ 1322014 w 8325864"/>
+              <a:gd name="connsiteY5" fmla="*/ 3165492 h 5328414"/>
+              <a:gd name="connsiteX6" fmla="*/ 143848 w 8325864"/>
+              <a:gd name="connsiteY6" fmla="*/ 747609 h 5328414"/>
+              <a:gd name="connsiteX7" fmla="*/ 6254502 w 8325864"/>
+              <a:gd name="connsiteY7" fmla="*/ 53016 h 5328414"/>
+              <a:gd name="connsiteX0" fmla="*/ 6253091 w 8315665"/>
+              <a:gd name="connsiteY0" fmla="*/ 44222 h 3329460"/>
+              <a:gd name="connsiteX1" fmla="*/ 8152232 w 8315665"/>
+              <a:gd name="connsiteY1" fmla="*/ 466254 h 3329460"/>
+              <a:gd name="connsiteX2" fmla="*/ 8134646 w 8315665"/>
+              <a:gd name="connsiteY2" fmla="*/ 2857762 h 3329460"/>
+              <a:gd name="connsiteX3" fmla="*/ 6015699 w 8315665"/>
+              <a:gd name="connsiteY3" fmla="*/ 3200662 h 3329460"/>
+              <a:gd name="connsiteX4" fmla="*/ 4960621 w 8315665"/>
+              <a:gd name="connsiteY4" fmla="*/ 3121530 h 3329460"/>
+              <a:gd name="connsiteX5" fmla="*/ 1311815 w 8315665"/>
+              <a:gd name="connsiteY5" fmla="*/ 3165492 h 3329460"/>
+              <a:gd name="connsiteX6" fmla="*/ 133649 w 8315665"/>
+              <a:gd name="connsiteY6" fmla="*/ 747609 h 3329460"/>
+              <a:gd name="connsiteX7" fmla="*/ 6244303 w 8315665"/>
+              <a:gd name="connsiteY7" fmla="*/ 53016 h 3329460"/>
+              <a:gd name="connsiteX0" fmla="*/ 6253091 w 8318232"/>
+              <a:gd name="connsiteY0" fmla="*/ 44222 h 3341027"/>
+              <a:gd name="connsiteX1" fmla="*/ 8152232 w 8318232"/>
+              <a:gd name="connsiteY1" fmla="*/ 466254 h 3341027"/>
+              <a:gd name="connsiteX2" fmla="*/ 8134646 w 8318232"/>
+              <a:gd name="connsiteY2" fmla="*/ 2857762 h 3341027"/>
+              <a:gd name="connsiteX3" fmla="*/ 5980529 w 8318232"/>
+              <a:gd name="connsiteY3" fmla="*/ 2866554 h 3341027"/>
+              <a:gd name="connsiteX4" fmla="*/ 4960621 w 8318232"/>
+              <a:gd name="connsiteY4" fmla="*/ 3121530 h 3341027"/>
+              <a:gd name="connsiteX5" fmla="*/ 1311815 w 8318232"/>
+              <a:gd name="connsiteY5" fmla="*/ 3165492 h 3341027"/>
+              <a:gd name="connsiteX6" fmla="*/ 133649 w 8318232"/>
+              <a:gd name="connsiteY6" fmla="*/ 747609 h 3341027"/>
+              <a:gd name="connsiteX7" fmla="*/ 6244303 w 8318232"/>
+              <a:gd name="connsiteY7" fmla="*/ 53016 h 3341027"/>
+              <a:gd name="connsiteX0" fmla="*/ 6253091 w 8755733"/>
+              <a:gd name="connsiteY0" fmla="*/ 44222 h 3341027"/>
+              <a:gd name="connsiteX1" fmla="*/ 8152232 w 8755733"/>
+              <a:gd name="connsiteY1" fmla="*/ 466254 h 3341027"/>
+              <a:gd name="connsiteX2" fmla="*/ 8662185 w 8755733"/>
+              <a:gd name="connsiteY2" fmla="*/ 2321431 h 3341027"/>
+              <a:gd name="connsiteX3" fmla="*/ 5980529 w 8755733"/>
+              <a:gd name="connsiteY3" fmla="*/ 2866554 h 3341027"/>
+              <a:gd name="connsiteX4" fmla="*/ 4960621 w 8755733"/>
+              <a:gd name="connsiteY4" fmla="*/ 3121530 h 3341027"/>
+              <a:gd name="connsiteX5" fmla="*/ 1311815 w 8755733"/>
+              <a:gd name="connsiteY5" fmla="*/ 3165492 h 3341027"/>
+              <a:gd name="connsiteX6" fmla="*/ 133649 w 8755733"/>
+              <a:gd name="connsiteY6" fmla="*/ 747609 h 3341027"/>
+              <a:gd name="connsiteX7" fmla="*/ 6244303 w 8755733"/>
+              <a:gd name="connsiteY7" fmla="*/ 53016 h 3341027"/>
+              <a:gd name="connsiteX0" fmla="*/ 6253091 w 8755733"/>
+              <a:gd name="connsiteY0" fmla="*/ 213 h 3297018"/>
+              <a:gd name="connsiteX1" fmla="*/ 8152232 w 8755733"/>
+              <a:gd name="connsiteY1" fmla="*/ 422245 h 3297018"/>
+              <a:gd name="connsiteX2" fmla="*/ 8662185 w 8755733"/>
+              <a:gd name="connsiteY2" fmla="*/ 2277422 h 3297018"/>
+              <a:gd name="connsiteX3" fmla="*/ 5980529 w 8755733"/>
+              <a:gd name="connsiteY3" fmla="*/ 2822545 h 3297018"/>
+              <a:gd name="connsiteX4" fmla="*/ 4960621 w 8755733"/>
+              <a:gd name="connsiteY4" fmla="*/ 3077521 h 3297018"/>
+              <a:gd name="connsiteX5" fmla="*/ 1311815 w 8755733"/>
+              <a:gd name="connsiteY5" fmla="*/ 3121483 h 3297018"/>
+              <a:gd name="connsiteX6" fmla="*/ 133649 w 8755733"/>
+              <a:gd name="connsiteY6" fmla="*/ 703600 h 3297018"/>
+              <a:gd name="connsiteX7" fmla="*/ 6323434 w 8755733"/>
+              <a:gd name="connsiteY7" fmla="*/ 817899 h 3297018"/>
+              <a:gd name="connsiteX0" fmla="*/ 6253091 w 8884401"/>
+              <a:gd name="connsiteY0" fmla="*/ 0 h 3296805"/>
+              <a:gd name="connsiteX1" fmla="*/ 8679771 w 8884401"/>
+              <a:gd name="connsiteY1" fmla="*/ 1011116 h 3296805"/>
+              <a:gd name="connsiteX2" fmla="*/ 8662185 w 8884401"/>
+              <a:gd name="connsiteY2" fmla="*/ 2277209 h 3296805"/>
+              <a:gd name="connsiteX3" fmla="*/ 5980529 w 8884401"/>
+              <a:gd name="connsiteY3" fmla="*/ 2822332 h 3296805"/>
+              <a:gd name="connsiteX4" fmla="*/ 4960621 w 8884401"/>
+              <a:gd name="connsiteY4" fmla="*/ 3077308 h 3296805"/>
+              <a:gd name="connsiteX5" fmla="*/ 1311815 w 8884401"/>
+              <a:gd name="connsiteY5" fmla="*/ 3121270 h 3296805"/>
+              <a:gd name="connsiteX6" fmla="*/ 133649 w 8884401"/>
+              <a:gd name="connsiteY6" fmla="*/ 703387 h 3296805"/>
+              <a:gd name="connsiteX7" fmla="*/ 6323434 w 8884401"/>
+              <a:gd name="connsiteY7" fmla="*/ 817686 h 3296805"/>
+              <a:gd name="connsiteX0" fmla="*/ 6253091 w 8662964"/>
+              <a:gd name="connsiteY0" fmla="*/ 0 h 3296805"/>
+              <a:gd name="connsiteX1" fmla="*/ 8662185 w 8662964"/>
+              <a:gd name="connsiteY1" fmla="*/ 2277209 h 3296805"/>
+              <a:gd name="connsiteX2" fmla="*/ 5980529 w 8662964"/>
+              <a:gd name="connsiteY2" fmla="*/ 2822332 h 3296805"/>
+              <a:gd name="connsiteX3" fmla="*/ 4960621 w 8662964"/>
+              <a:gd name="connsiteY3" fmla="*/ 3077308 h 3296805"/>
+              <a:gd name="connsiteX4" fmla="*/ 1311815 w 8662964"/>
+              <a:gd name="connsiteY4" fmla="*/ 3121270 h 3296805"/>
+              <a:gd name="connsiteX5" fmla="*/ 133649 w 8662964"/>
+              <a:gd name="connsiteY5" fmla="*/ 703387 h 3296805"/>
+              <a:gd name="connsiteX6" fmla="*/ 6323434 w 8662964"/>
+              <a:gd name="connsiteY6" fmla="*/ 817686 h 3296805"/>
+              <a:gd name="connsiteX0" fmla="*/ 6253091 w 8847536"/>
+              <a:gd name="connsiteY0" fmla="*/ 0 h 3296805"/>
+              <a:gd name="connsiteX1" fmla="*/ 8846823 w 8847536"/>
+              <a:gd name="connsiteY1" fmla="*/ 1652955 h 3296805"/>
+              <a:gd name="connsiteX2" fmla="*/ 5980529 w 8847536"/>
+              <a:gd name="connsiteY2" fmla="*/ 2822332 h 3296805"/>
+              <a:gd name="connsiteX3" fmla="*/ 4960621 w 8847536"/>
+              <a:gd name="connsiteY3" fmla="*/ 3077308 h 3296805"/>
+              <a:gd name="connsiteX4" fmla="*/ 1311815 w 8847536"/>
+              <a:gd name="connsiteY4" fmla="*/ 3121270 h 3296805"/>
+              <a:gd name="connsiteX5" fmla="*/ 133649 w 8847536"/>
+              <a:gd name="connsiteY5" fmla="*/ 703387 h 3296805"/>
+              <a:gd name="connsiteX6" fmla="*/ 6323434 w 8847536"/>
+              <a:gd name="connsiteY6" fmla="*/ 817686 h 3296805"/>
+              <a:gd name="connsiteX0" fmla="*/ 6253091 w 8847832"/>
+              <a:gd name="connsiteY0" fmla="*/ 0 h 3296805"/>
+              <a:gd name="connsiteX1" fmla="*/ 8846823 w 8847832"/>
+              <a:gd name="connsiteY1" fmla="*/ 1652955 h 3296805"/>
+              <a:gd name="connsiteX2" fmla="*/ 5980529 w 8847832"/>
+              <a:gd name="connsiteY2" fmla="*/ 2822332 h 3296805"/>
+              <a:gd name="connsiteX3" fmla="*/ 4960621 w 8847832"/>
+              <a:gd name="connsiteY3" fmla="*/ 3077308 h 3296805"/>
+              <a:gd name="connsiteX4" fmla="*/ 1311815 w 8847832"/>
+              <a:gd name="connsiteY4" fmla="*/ 3121270 h 3296805"/>
+              <a:gd name="connsiteX5" fmla="*/ 133649 w 8847832"/>
+              <a:gd name="connsiteY5" fmla="*/ 703387 h 3296805"/>
+              <a:gd name="connsiteX6" fmla="*/ 6323434 w 8847832"/>
+              <a:gd name="connsiteY6" fmla="*/ 817686 h 3296805"/>
+              <a:gd name="connsiteX0" fmla="*/ 8301698 w 8996180"/>
+              <a:gd name="connsiteY0" fmla="*/ 509481 h 3023771"/>
+              <a:gd name="connsiteX1" fmla="*/ 8846823 w 8996180"/>
+              <a:gd name="connsiteY1" fmla="*/ 1379921 h 3023771"/>
+              <a:gd name="connsiteX2" fmla="*/ 5980529 w 8996180"/>
+              <a:gd name="connsiteY2" fmla="*/ 2549298 h 3023771"/>
+              <a:gd name="connsiteX3" fmla="*/ 4960621 w 8996180"/>
+              <a:gd name="connsiteY3" fmla="*/ 2804274 h 3023771"/>
+              <a:gd name="connsiteX4" fmla="*/ 1311815 w 8996180"/>
+              <a:gd name="connsiteY4" fmla="*/ 2848236 h 3023771"/>
+              <a:gd name="connsiteX5" fmla="*/ 133649 w 8996180"/>
+              <a:gd name="connsiteY5" fmla="*/ 430353 h 3023771"/>
+              <a:gd name="connsiteX6" fmla="*/ 6323434 w 8996180"/>
+              <a:gd name="connsiteY6" fmla="*/ 544652 h 3023771"/>
+              <a:gd name="connsiteX0" fmla="*/ 8301698 w 8814555"/>
+              <a:gd name="connsiteY0" fmla="*/ 509481 h 3023771"/>
+              <a:gd name="connsiteX1" fmla="*/ 8609431 w 8814555"/>
+              <a:gd name="connsiteY1" fmla="*/ 1933836 h 3023771"/>
+              <a:gd name="connsiteX2" fmla="*/ 5980529 w 8814555"/>
+              <a:gd name="connsiteY2" fmla="*/ 2549298 h 3023771"/>
+              <a:gd name="connsiteX3" fmla="*/ 4960621 w 8814555"/>
+              <a:gd name="connsiteY3" fmla="*/ 2804274 h 3023771"/>
+              <a:gd name="connsiteX4" fmla="*/ 1311815 w 8814555"/>
+              <a:gd name="connsiteY4" fmla="*/ 2848236 h 3023771"/>
+              <a:gd name="connsiteX5" fmla="*/ 133649 w 8814555"/>
+              <a:gd name="connsiteY5" fmla="*/ 430353 h 3023771"/>
+              <a:gd name="connsiteX6" fmla="*/ 6323434 w 8814555"/>
+              <a:gd name="connsiteY6" fmla="*/ 544652 h 3023771"/>
+              <a:gd name="connsiteX0" fmla="*/ 8301698 w 8814555"/>
+              <a:gd name="connsiteY0" fmla="*/ 517705 h 3031995"/>
+              <a:gd name="connsiteX1" fmla="*/ 8609431 w 8814555"/>
+              <a:gd name="connsiteY1" fmla="*/ 1942060 h 3031995"/>
+              <a:gd name="connsiteX2" fmla="*/ 5980529 w 8814555"/>
+              <a:gd name="connsiteY2" fmla="*/ 2557522 h 3031995"/>
+              <a:gd name="connsiteX3" fmla="*/ 4960621 w 8814555"/>
+              <a:gd name="connsiteY3" fmla="*/ 2812498 h 3031995"/>
+              <a:gd name="connsiteX4" fmla="*/ 1311815 w 8814555"/>
+              <a:gd name="connsiteY4" fmla="*/ 2856460 h 3031995"/>
+              <a:gd name="connsiteX5" fmla="*/ 133649 w 8814555"/>
+              <a:gd name="connsiteY5" fmla="*/ 438577 h 3031995"/>
+              <a:gd name="connsiteX6" fmla="*/ 8284118 w 8814555"/>
+              <a:gd name="connsiteY6" fmla="*/ 517707 h 3031995"/>
+              <a:gd name="connsiteX0" fmla="*/ 6991446 w 7504303"/>
+              <a:gd name="connsiteY0" fmla="*/ 696 h 2436193"/>
+              <a:gd name="connsiteX1" fmla="*/ 7299179 w 7504303"/>
+              <a:gd name="connsiteY1" fmla="*/ 1425051 h 2436193"/>
+              <a:gd name="connsiteX2" fmla="*/ 4670277 w 7504303"/>
+              <a:gd name="connsiteY2" fmla="*/ 2040513 h 2436193"/>
+              <a:gd name="connsiteX3" fmla="*/ 3650369 w 7504303"/>
+              <a:gd name="connsiteY3" fmla="*/ 2295489 h 2436193"/>
+              <a:gd name="connsiteX4" fmla="*/ 1563 w 7504303"/>
+              <a:gd name="connsiteY4" fmla="*/ 2339451 h 2436193"/>
+              <a:gd name="connsiteX5" fmla="*/ 4125158 w 7504303"/>
+              <a:gd name="connsiteY5" fmla="*/ 985437 h 2436193"/>
+              <a:gd name="connsiteX6" fmla="*/ 6973866 w 7504303"/>
+              <a:gd name="connsiteY6" fmla="*/ 698 h 2436193"/>
+              <a:gd name="connsiteX0" fmla="*/ 6991446 w 7504303"/>
+              <a:gd name="connsiteY0" fmla="*/ 4861 h 2440358"/>
+              <a:gd name="connsiteX1" fmla="*/ 7299179 w 7504303"/>
+              <a:gd name="connsiteY1" fmla="*/ 1429216 h 2440358"/>
+              <a:gd name="connsiteX2" fmla="*/ 4670277 w 7504303"/>
+              <a:gd name="connsiteY2" fmla="*/ 2044678 h 2440358"/>
+              <a:gd name="connsiteX3" fmla="*/ 3650369 w 7504303"/>
+              <a:gd name="connsiteY3" fmla="*/ 2299654 h 2440358"/>
+              <a:gd name="connsiteX4" fmla="*/ 1563 w 7504303"/>
+              <a:gd name="connsiteY4" fmla="*/ 2343616 h 2440358"/>
+              <a:gd name="connsiteX5" fmla="*/ 4125158 w 7504303"/>
+              <a:gd name="connsiteY5" fmla="*/ 989602 h 2440358"/>
+              <a:gd name="connsiteX6" fmla="*/ 6973866 w 7504303"/>
+              <a:gd name="connsiteY6" fmla="*/ 4863 h 2440358"/>
+              <a:gd name="connsiteX0" fmla="*/ 6991446 w 7504303"/>
+              <a:gd name="connsiteY0" fmla="*/ 4861 h 2440358"/>
+              <a:gd name="connsiteX1" fmla="*/ 7299179 w 7504303"/>
+              <a:gd name="connsiteY1" fmla="*/ 1429216 h 2440358"/>
+              <a:gd name="connsiteX2" fmla="*/ 4670277 w 7504303"/>
+              <a:gd name="connsiteY2" fmla="*/ 2044678 h 2440358"/>
+              <a:gd name="connsiteX3" fmla="*/ 3650369 w 7504303"/>
+              <a:gd name="connsiteY3" fmla="*/ 2299654 h 2440358"/>
+              <a:gd name="connsiteX4" fmla="*/ 1563 w 7504303"/>
+              <a:gd name="connsiteY4" fmla="*/ 2343616 h 2440358"/>
+              <a:gd name="connsiteX5" fmla="*/ 4125158 w 7504303"/>
+              <a:gd name="connsiteY5" fmla="*/ 989602 h 2440358"/>
+              <a:gd name="connsiteX6" fmla="*/ 6973866 w 7504303"/>
+              <a:gd name="connsiteY6" fmla="*/ 4863 h 2440358"/>
+              <a:gd name="connsiteX0" fmla="*/ 7202374 w 7715231"/>
+              <a:gd name="connsiteY0" fmla="*/ 4861 h 2302949"/>
+              <a:gd name="connsiteX1" fmla="*/ 7510107 w 7715231"/>
+              <a:gd name="connsiteY1" fmla="*/ 1429216 h 2302949"/>
+              <a:gd name="connsiteX2" fmla="*/ 4881205 w 7715231"/>
+              <a:gd name="connsiteY2" fmla="*/ 2044678 h 2302949"/>
+              <a:gd name="connsiteX3" fmla="*/ 3861297 w 7715231"/>
+              <a:gd name="connsiteY3" fmla="*/ 2299654 h 2302949"/>
+              <a:gd name="connsiteX4" fmla="*/ 1475 w 7715231"/>
+              <a:gd name="connsiteY4" fmla="*/ 1886416 h 2302949"/>
+              <a:gd name="connsiteX5" fmla="*/ 4336086 w 7715231"/>
+              <a:gd name="connsiteY5" fmla="*/ 989602 h 2302949"/>
+              <a:gd name="connsiteX6" fmla="*/ 7184794 w 7715231"/>
+              <a:gd name="connsiteY6" fmla="*/ 4863 h 2302949"/>
+              <a:gd name="connsiteX0" fmla="*/ 7208162 w 7721019"/>
+              <a:gd name="connsiteY0" fmla="*/ 20 h 2298108"/>
+              <a:gd name="connsiteX1" fmla="*/ 7515895 w 7721019"/>
+              <a:gd name="connsiteY1" fmla="*/ 1424375 h 2298108"/>
+              <a:gd name="connsiteX2" fmla="*/ 4886993 w 7721019"/>
+              <a:gd name="connsiteY2" fmla="*/ 2039837 h 2298108"/>
+              <a:gd name="connsiteX3" fmla="*/ 3867085 w 7721019"/>
+              <a:gd name="connsiteY3" fmla="*/ 2294813 h 2298108"/>
+              <a:gd name="connsiteX4" fmla="*/ 7263 w 7721019"/>
+              <a:gd name="connsiteY4" fmla="*/ 1881575 h 2298108"/>
+              <a:gd name="connsiteX5" fmla="*/ 4948544 w 7721019"/>
+              <a:gd name="connsiteY5" fmla="*/ 1222153 h 2298108"/>
+              <a:gd name="connsiteX6" fmla="*/ 7190582 w 7721019"/>
+              <a:gd name="connsiteY6" fmla="*/ 22 h 2298108"/>
+              <a:gd name="connsiteX0" fmla="*/ 7208162 w 7721019"/>
+              <a:gd name="connsiteY0" fmla="*/ 62295 h 2360383"/>
+              <a:gd name="connsiteX1" fmla="*/ 7515895 w 7721019"/>
+              <a:gd name="connsiteY1" fmla="*/ 1486650 h 2360383"/>
+              <a:gd name="connsiteX2" fmla="*/ 4886993 w 7721019"/>
+              <a:gd name="connsiteY2" fmla="*/ 2102112 h 2360383"/>
+              <a:gd name="connsiteX3" fmla="*/ 3867085 w 7721019"/>
+              <a:gd name="connsiteY3" fmla="*/ 2357088 h 2360383"/>
+              <a:gd name="connsiteX4" fmla="*/ 7263 w 7721019"/>
+              <a:gd name="connsiteY4" fmla="*/ 1943850 h 2360383"/>
+              <a:gd name="connsiteX5" fmla="*/ 4948544 w 7721019"/>
+              <a:gd name="connsiteY5" fmla="*/ 1284428 h 2360383"/>
+              <a:gd name="connsiteX6" fmla="*/ 7190582 w 7721019"/>
+              <a:gd name="connsiteY6" fmla="*/ 62297 h 2360383"/>
+              <a:gd name="connsiteX0" fmla="*/ 7206972 w 7719829"/>
+              <a:gd name="connsiteY0" fmla="*/ 106673 h 2404761"/>
+              <a:gd name="connsiteX1" fmla="*/ 7514705 w 7719829"/>
+              <a:gd name="connsiteY1" fmla="*/ 1531028 h 2404761"/>
+              <a:gd name="connsiteX2" fmla="*/ 4885803 w 7719829"/>
+              <a:gd name="connsiteY2" fmla="*/ 2146490 h 2404761"/>
+              <a:gd name="connsiteX3" fmla="*/ 3865895 w 7719829"/>
+              <a:gd name="connsiteY3" fmla="*/ 2401466 h 2404761"/>
+              <a:gd name="connsiteX4" fmla="*/ 6073 w 7719829"/>
+              <a:gd name="connsiteY4" fmla="*/ 1988228 h 2404761"/>
+              <a:gd name="connsiteX5" fmla="*/ 4850639 w 7719829"/>
+              <a:gd name="connsiteY5" fmla="*/ 1196922 h 2404761"/>
+              <a:gd name="connsiteX6" fmla="*/ 7189392 w 7719829"/>
+              <a:gd name="connsiteY6" fmla="*/ 106675 h 2404761"/>
+              <a:gd name="connsiteX0" fmla="*/ 7215749 w 7728606"/>
+              <a:gd name="connsiteY0" fmla="*/ 106673 h 2426868"/>
+              <a:gd name="connsiteX1" fmla="*/ 7523482 w 7728606"/>
+              <a:gd name="connsiteY1" fmla="*/ 1531028 h 2426868"/>
+              <a:gd name="connsiteX2" fmla="*/ 4894580 w 7728606"/>
+              <a:gd name="connsiteY2" fmla="*/ 2146490 h 2426868"/>
+              <a:gd name="connsiteX3" fmla="*/ 3874672 w 7728606"/>
+              <a:gd name="connsiteY3" fmla="*/ 2401466 h 2426868"/>
+              <a:gd name="connsiteX4" fmla="*/ 6058 w 7728606"/>
+              <a:gd name="connsiteY4" fmla="*/ 1557405 h 2426868"/>
+              <a:gd name="connsiteX5" fmla="*/ 4859416 w 7728606"/>
+              <a:gd name="connsiteY5" fmla="*/ 1196922 h 2426868"/>
+              <a:gd name="connsiteX6" fmla="*/ 7198169 w 7728606"/>
+              <a:gd name="connsiteY6" fmla="*/ 106675 h 2426868"/>
+              <a:gd name="connsiteX0" fmla="*/ 7481874 w 7994731"/>
+              <a:gd name="connsiteY0" fmla="*/ 106673 h 2852267"/>
+              <a:gd name="connsiteX1" fmla="*/ 7789607 w 7994731"/>
+              <a:gd name="connsiteY1" fmla="*/ 1531028 h 2852267"/>
+              <a:gd name="connsiteX2" fmla="*/ 5160705 w 7994731"/>
+              <a:gd name="connsiteY2" fmla="*/ 2146490 h 2852267"/>
+              <a:gd name="connsiteX3" fmla="*/ 1098659 w 7994731"/>
+              <a:gd name="connsiteY3" fmla="*/ 2841081 h 2852267"/>
+              <a:gd name="connsiteX4" fmla="*/ 272183 w 7994731"/>
+              <a:gd name="connsiteY4" fmla="*/ 1557405 h 2852267"/>
+              <a:gd name="connsiteX5" fmla="*/ 5125541 w 7994731"/>
+              <a:gd name="connsiteY5" fmla="*/ 1196922 h 2852267"/>
+              <a:gd name="connsiteX6" fmla="*/ 7464294 w 7994731"/>
+              <a:gd name="connsiteY6" fmla="*/ 106675 h 2852267"/>
+              <a:gd name="connsiteX0" fmla="*/ 7465815 w 7978672"/>
+              <a:gd name="connsiteY0" fmla="*/ 106673 h 2936293"/>
+              <a:gd name="connsiteX1" fmla="*/ 7773548 w 7978672"/>
+              <a:gd name="connsiteY1" fmla="*/ 1531028 h 2936293"/>
+              <a:gd name="connsiteX2" fmla="*/ 5144646 w 7978672"/>
+              <a:gd name="connsiteY2" fmla="*/ 2146490 h 2936293"/>
+              <a:gd name="connsiteX3" fmla="*/ 1082600 w 7978672"/>
+              <a:gd name="connsiteY3" fmla="*/ 2841081 h 2936293"/>
+              <a:gd name="connsiteX4" fmla="*/ 256124 w 7978672"/>
+              <a:gd name="connsiteY4" fmla="*/ 1557405 h 2936293"/>
+              <a:gd name="connsiteX5" fmla="*/ 5109482 w 7978672"/>
+              <a:gd name="connsiteY5" fmla="*/ 1196922 h 2936293"/>
+              <a:gd name="connsiteX6" fmla="*/ 7448235 w 7978672"/>
+              <a:gd name="connsiteY6" fmla="*/ 106675 h 2936293"/>
+              <a:gd name="connsiteX0" fmla="*/ 7491253 w 8004110"/>
+              <a:gd name="connsiteY0" fmla="*/ 106673 h 2884827"/>
+              <a:gd name="connsiteX1" fmla="*/ 7798986 w 8004110"/>
+              <a:gd name="connsiteY1" fmla="*/ 1531028 h 2884827"/>
+              <a:gd name="connsiteX2" fmla="*/ 5170084 w 8004110"/>
+              <a:gd name="connsiteY2" fmla="*/ 2146490 h 2884827"/>
+              <a:gd name="connsiteX3" fmla="*/ 1108038 w 8004110"/>
+              <a:gd name="connsiteY3" fmla="*/ 2841081 h 2884827"/>
+              <a:gd name="connsiteX4" fmla="*/ 281562 w 8004110"/>
+              <a:gd name="connsiteY4" fmla="*/ 1557405 h 2884827"/>
+              <a:gd name="connsiteX5" fmla="*/ 5134920 w 8004110"/>
+              <a:gd name="connsiteY5" fmla="*/ 1196922 h 2884827"/>
+              <a:gd name="connsiteX6" fmla="*/ 7473673 w 8004110"/>
+              <a:gd name="connsiteY6" fmla="*/ 106675 h 2884827"/>
+              <a:gd name="connsiteX0" fmla="*/ 7504468 w 8017325"/>
+              <a:gd name="connsiteY0" fmla="*/ 106673 h 2856991"/>
+              <a:gd name="connsiteX1" fmla="*/ 7812201 w 8017325"/>
+              <a:gd name="connsiteY1" fmla="*/ 1531028 h 2856991"/>
+              <a:gd name="connsiteX2" fmla="*/ 5183299 w 8017325"/>
+              <a:gd name="connsiteY2" fmla="*/ 2146490 h 2856991"/>
+              <a:gd name="connsiteX3" fmla="*/ 1121253 w 8017325"/>
+              <a:gd name="connsiteY3" fmla="*/ 2841081 h 2856991"/>
+              <a:gd name="connsiteX4" fmla="*/ 294777 w 8017325"/>
+              <a:gd name="connsiteY4" fmla="*/ 1557405 h 2856991"/>
+              <a:gd name="connsiteX5" fmla="*/ 5148135 w 8017325"/>
+              <a:gd name="connsiteY5" fmla="*/ 1196922 h 2856991"/>
+              <a:gd name="connsiteX6" fmla="*/ 7486888 w 8017325"/>
+              <a:gd name="connsiteY6" fmla="*/ 106675 h 2856991"/>
+              <a:gd name="connsiteX0" fmla="*/ 7376961 w 7889818"/>
+              <a:gd name="connsiteY0" fmla="*/ 106673 h 2952773"/>
+              <a:gd name="connsiteX1" fmla="*/ 7684694 w 7889818"/>
+              <a:gd name="connsiteY1" fmla="*/ 1531028 h 2952773"/>
+              <a:gd name="connsiteX2" fmla="*/ 5055792 w 7889818"/>
+              <a:gd name="connsiteY2" fmla="*/ 2146490 h 2952773"/>
+              <a:gd name="connsiteX3" fmla="*/ 1556454 w 7889818"/>
+              <a:gd name="connsiteY3" fmla="*/ 2937796 h 2952773"/>
+              <a:gd name="connsiteX4" fmla="*/ 167270 w 7889818"/>
+              <a:gd name="connsiteY4" fmla="*/ 1557405 h 2952773"/>
+              <a:gd name="connsiteX5" fmla="*/ 5020628 w 7889818"/>
+              <a:gd name="connsiteY5" fmla="*/ 1196922 h 2952773"/>
+              <a:gd name="connsiteX6" fmla="*/ 7359381 w 7889818"/>
+              <a:gd name="connsiteY6" fmla="*/ 106675 h 2952773"/>
+              <a:gd name="connsiteX0" fmla="*/ 7196969 w 7709826"/>
+              <a:gd name="connsiteY0" fmla="*/ 106673 h 2951666"/>
+              <a:gd name="connsiteX1" fmla="*/ 7504702 w 7709826"/>
+              <a:gd name="connsiteY1" fmla="*/ 1531028 h 2951666"/>
+              <a:gd name="connsiteX2" fmla="*/ 4875800 w 7709826"/>
+              <a:gd name="connsiteY2" fmla="*/ 2146490 h 2951666"/>
+              <a:gd name="connsiteX3" fmla="*/ 1376462 w 7709826"/>
+              <a:gd name="connsiteY3" fmla="*/ 2937796 h 2951666"/>
+              <a:gd name="connsiteX4" fmla="*/ 171916 w 7709826"/>
+              <a:gd name="connsiteY4" fmla="*/ 1434313 h 2951666"/>
+              <a:gd name="connsiteX5" fmla="*/ 4840636 w 7709826"/>
+              <a:gd name="connsiteY5" fmla="*/ 1196922 h 2951666"/>
+              <a:gd name="connsiteX6" fmla="*/ 7179389 w 7709826"/>
+              <a:gd name="connsiteY6" fmla="*/ 106675 h 2951666"/>
+              <a:gd name="connsiteX0" fmla="*/ 7093255 w 7606112"/>
+              <a:gd name="connsiteY0" fmla="*/ 106673 h 2951666"/>
+              <a:gd name="connsiteX1" fmla="*/ 7400988 w 7606112"/>
+              <a:gd name="connsiteY1" fmla="*/ 1531028 h 2951666"/>
+              <a:gd name="connsiteX2" fmla="*/ 4772086 w 7606112"/>
+              <a:gd name="connsiteY2" fmla="*/ 2146490 h 2951666"/>
+              <a:gd name="connsiteX3" fmla="*/ 1272748 w 7606112"/>
+              <a:gd name="connsiteY3" fmla="*/ 2937796 h 2951666"/>
+              <a:gd name="connsiteX4" fmla="*/ 68202 w 7606112"/>
+              <a:gd name="connsiteY4" fmla="*/ 1434313 h 2951666"/>
+              <a:gd name="connsiteX5" fmla="*/ 4736922 w 7606112"/>
+              <a:gd name="connsiteY5" fmla="*/ 1196922 h 2951666"/>
+              <a:gd name="connsiteX6" fmla="*/ 7075675 w 7606112"/>
+              <a:gd name="connsiteY6" fmla="*/ 106675 h 2951666"/>
+              <a:gd name="connsiteX0" fmla="*/ 7151492 w 7664349"/>
+              <a:gd name="connsiteY0" fmla="*/ 106673 h 2949368"/>
+              <a:gd name="connsiteX1" fmla="*/ 7459225 w 7664349"/>
+              <a:gd name="connsiteY1" fmla="*/ 1531028 h 2949368"/>
+              <a:gd name="connsiteX2" fmla="*/ 4830323 w 7664349"/>
+              <a:gd name="connsiteY2" fmla="*/ 2146490 h 2949368"/>
+              <a:gd name="connsiteX3" fmla="*/ 1330985 w 7664349"/>
+              <a:gd name="connsiteY3" fmla="*/ 2937796 h 2949368"/>
+              <a:gd name="connsiteX4" fmla="*/ 64893 w 7664349"/>
+              <a:gd name="connsiteY4" fmla="*/ 1504652 h 2949368"/>
+              <a:gd name="connsiteX5" fmla="*/ 4795159 w 7664349"/>
+              <a:gd name="connsiteY5" fmla="*/ 1196922 h 2949368"/>
+              <a:gd name="connsiteX6" fmla="*/ 7133912 w 7664349"/>
+              <a:gd name="connsiteY6" fmla="*/ 106675 h 2949368"/>
+              <a:gd name="connsiteX0" fmla="*/ 7467776 w 7980633"/>
+              <a:gd name="connsiteY0" fmla="*/ 106673 h 2767737"/>
+              <a:gd name="connsiteX1" fmla="*/ 7775509 w 7980633"/>
+              <a:gd name="connsiteY1" fmla="*/ 1531028 h 2767737"/>
+              <a:gd name="connsiteX2" fmla="*/ 5146607 w 7980633"/>
+              <a:gd name="connsiteY2" fmla="*/ 2146490 h 2767737"/>
+              <a:gd name="connsiteX3" fmla="*/ 829585 w 7980633"/>
+              <a:gd name="connsiteY3" fmla="*/ 2753157 h 2767737"/>
+              <a:gd name="connsiteX4" fmla="*/ 381177 w 7980633"/>
+              <a:gd name="connsiteY4" fmla="*/ 1504652 h 2767737"/>
+              <a:gd name="connsiteX5" fmla="*/ 5111443 w 7980633"/>
+              <a:gd name="connsiteY5" fmla="*/ 1196922 h 2767737"/>
+              <a:gd name="connsiteX6" fmla="*/ 7450196 w 7980633"/>
+              <a:gd name="connsiteY6" fmla="*/ 106675 h 2767737"/>
+              <a:gd name="connsiteX0" fmla="*/ 7376598 w 7889455"/>
+              <a:gd name="connsiteY0" fmla="*/ 106673 h 2753780"/>
+              <a:gd name="connsiteX1" fmla="*/ 7684331 w 7889455"/>
+              <a:gd name="connsiteY1" fmla="*/ 1531028 h 2753780"/>
+              <a:gd name="connsiteX2" fmla="*/ 5055429 w 7889455"/>
+              <a:gd name="connsiteY2" fmla="*/ 2146490 h 2753780"/>
+              <a:gd name="connsiteX3" fmla="*/ 738407 w 7889455"/>
+              <a:gd name="connsiteY3" fmla="*/ 2753157 h 2753780"/>
+              <a:gd name="connsiteX4" fmla="*/ 289999 w 7889455"/>
+              <a:gd name="connsiteY4" fmla="*/ 1504652 h 2753780"/>
+              <a:gd name="connsiteX5" fmla="*/ 5020265 w 7889455"/>
+              <a:gd name="connsiteY5" fmla="*/ 1196922 h 2753780"/>
+              <a:gd name="connsiteX6" fmla="*/ 7359018 w 7889455"/>
+              <a:gd name="connsiteY6" fmla="*/ 106675 h 2753780"/>
+              <a:gd name="connsiteX0" fmla="*/ 7364534 w 7877391"/>
+              <a:gd name="connsiteY0" fmla="*/ 106673 h 2692317"/>
+              <a:gd name="connsiteX1" fmla="*/ 7672267 w 7877391"/>
+              <a:gd name="connsiteY1" fmla="*/ 1531028 h 2692317"/>
+              <a:gd name="connsiteX2" fmla="*/ 5043365 w 7877391"/>
+              <a:gd name="connsiteY2" fmla="*/ 2146490 h 2692317"/>
+              <a:gd name="connsiteX3" fmla="*/ 770305 w 7877391"/>
+              <a:gd name="connsiteY3" fmla="*/ 2691611 h 2692317"/>
+              <a:gd name="connsiteX4" fmla="*/ 277935 w 7877391"/>
+              <a:gd name="connsiteY4" fmla="*/ 1504652 h 2692317"/>
+              <a:gd name="connsiteX5" fmla="*/ 5008201 w 7877391"/>
+              <a:gd name="connsiteY5" fmla="*/ 1196922 h 2692317"/>
+              <a:gd name="connsiteX6" fmla="*/ 7346954 w 7877391"/>
+              <a:gd name="connsiteY6" fmla="*/ 106675 h 2692317"/>
+              <a:gd name="connsiteX0" fmla="*/ 7144151 w 7657008"/>
+              <a:gd name="connsiteY0" fmla="*/ 106673 h 2692317"/>
+              <a:gd name="connsiteX1" fmla="*/ 7451884 w 7657008"/>
+              <a:gd name="connsiteY1" fmla="*/ 1531028 h 2692317"/>
+              <a:gd name="connsiteX2" fmla="*/ 4822982 w 7657008"/>
+              <a:gd name="connsiteY2" fmla="*/ 2146490 h 2692317"/>
+              <a:gd name="connsiteX3" fmla="*/ 549922 w 7657008"/>
+              <a:gd name="connsiteY3" fmla="*/ 2691611 h 2692317"/>
+              <a:gd name="connsiteX4" fmla="*/ 57552 w 7657008"/>
+              <a:gd name="connsiteY4" fmla="*/ 1504652 h 2692317"/>
+              <a:gd name="connsiteX5" fmla="*/ 4787818 w 7657008"/>
+              <a:gd name="connsiteY5" fmla="*/ 1196922 h 2692317"/>
+              <a:gd name="connsiteX6" fmla="*/ 7126571 w 7657008"/>
+              <a:gd name="connsiteY6" fmla="*/ 106675 h 2692317"/>
+              <a:gd name="connsiteX0" fmla="*/ 7130908 w 7643765"/>
+              <a:gd name="connsiteY0" fmla="*/ 106673 h 2716111"/>
+              <a:gd name="connsiteX1" fmla="*/ 7438641 w 7643765"/>
+              <a:gd name="connsiteY1" fmla="*/ 1531028 h 2716111"/>
+              <a:gd name="connsiteX2" fmla="*/ 4809739 w 7643765"/>
+              <a:gd name="connsiteY2" fmla="*/ 2146490 h 2716111"/>
+              <a:gd name="connsiteX3" fmla="*/ 536679 w 7643765"/>
+              <a:gd name="connsiteY3" fmla="*/ 2691611 h 2716111"/>
+              <a:gd name="connsiteX4" fmla="*/ 184986 w 7643765"/>
+              <a:gd name="connsiteY4" fmla="*/ 1311222 h 2716111"/>
+              <a:gd name="connsiteX5" fmla="*/ 4774575 w 7643765"/>
+              <a:gd name="connsiteY5" fmla="*/ 1196922 h 2716111"/>
+              <a:gd name="connsiteX6" fmla="*/ 7113328 w 7643765"/>
+              <a:gd name="connsiteY6" fmla="*/ 106675 h 2716111"/>
+              <a:gd name="connsiteX0" fmla="*/ 7130908 w 7643765"/>
+              <a:gd name="connsiteY0" fmla="*/ 71253 h 2680691"/>
+              <a:gd name="connsiteX1" fmla="*/ 7438641 w 7643765"/>
+              <a:gd name="connsiteY1" fmla="*/ 1495608 h 2680691"/>
+              <a:gd name="connsiteX2" fmla="*/ 4809739 w 7643765"/>
+              <a:gd name="connsiteY2" fmla="*/ 2111070 h 2680691"/>
+              <a:gd name="connsiteX3" fmla="*/ 536679 w 7643765"/>
+              <a:gd name="connsiteY3" fmla="*/ 2656191 h 2680691"/>
+              <a:gd name="connsiteX4" fmla="*/ 184986 w 7643765"/>
+              <a:gd name="connsiteY4" fmla="*/ 1275802 h 2680691"/>
+              <a:gd name="connsiteX5" fmla="*/ 4774575 w 7643765"/>
+              <a:gd name="connsiteY5" fmla="*/ 1161502 h 2680691"/>
+              <a:gd name="connsiteX6" fmla="*/ 7113328 w 7643765"/>
+              <a:gd name="connsiteY6" fmla="*/ 71255 h 2680691"/>
+              <a:gd name="connsiteX0" fmla="*/ 7130908 w 7643765"/>
+              <a:gd name="connsiteY0" fmla="*/ 71253 h 2680691"/>
+              <a:gd name="connsiteX1" fmla="*/ 7438641 w 7643765"/>
+              <a:gd name="connsiteY1" fmla="*/ 1495608 h 2680691"/>
+              <a:gd name="connsiteX2" fmla="*/ 4809739 w 7643765"/>
+              <a:gd name="connsiteY2" fmla="*/ 2111070 h 2680691"/>
+              <a:gd name="connsiteX3" fmla="*/ 536679 w 7643765"/>
+              <a:gd name="connsiteY3" fmla="*/ 2656191 h 2680691"/>
+              <a:gd name="connsiteX4" fmla="*/ 184986 w 7643765"/>
+              <a:gd name="connsiteY4" fmla="*/ 1275802 h 2680691"/>
+              <a:gd name="connsiteX5" fmla="*/ 4774575 w 7643765"/>
+              <a:gd name="connsiteY5" fmla="*/ 1161502 h 2680691"/>
+              <a:gd name="connsiteX6" fmla="*/ 7113328 w 7643765"/>
+              <a:gd name="connsiteY6" fmla="*/ 71255 h 2680691"/>
+              <a:gd name="connsiteX0" fmla="*/ 7130908 w 7512865"/>
+              <a:gd name="connsiteY0" fmla="*/ 71253 h 2680691"/>
+              <a:gd name="connsiteX1" fmla="*/ 7438641 w 7512865"/>
+              <a:gd name="connsiteY1" fmla="*/ 1495608 h 2680691"/>
+              <a:gd name="connsiteX2" fmla="*/ 4809739 w 7512865"/>
+              <a:gd name="connsiteY2" fmla="*/ 2111070 h 2680691"/>
+              <a:gd name="connsiteX3" fmla="*/ 536679 w 7512865"/>
+              <a:gd name="connsiteY3" fmla="*/ 2656191 h 2680691"/>
+              <a:gd name="connsiteX4" fmla="*/ 184986 w 7512865"/>
+              <a:gd name="connsiteY4" fmla="*/ 1275802 h 2680691"/>
+              <a:gd name="connsiteX5" fmla="*/ 4774575 w 7512865"/>
+              <a:gd name="connsiteY5" fmla="*/ 1161502 h 2680691"/>
+              <a:gd name="connsiteX6" fmla="*/ 7113328 w 7512865"/>
+              <a:gd name="connsiteY6" fmla="*/ 71255 h 2680691"/>
+              <a:gd name="connsiteX0" fmla="*/ 7130908 w 7481097"/>
+              <a:gd name="connsiteY0" fmla="*/ 71253 h 2681391"/>
+              <a:gd name="connsiteX1" fmla="*/ 7385888 w 7481097"/>
+              <a:gd name="connsiteY1" fmla="*/ 1390101 h 2681391"/>
+              <a:gd name="connsiteX2" fmla="*/ 4809739 w 7481097"/>
+              <a:gd name="connsiteY2" fmla="*/ 2111070 h 2681391"/>
+              <a:gd name="connsiteX3" fmla="*/ 536679 w 7481097"/>
+              <a:gd name="connsiteY3" fmla="*/ 2656191 h 2681391"/>
+              <a:gd name="connsiteX4" fmla="*/ 184986 w 7481097"/>
+              <a:gd name="connsiteY4" fmla="*/ 1275802 h 2681391"/>
+              <a:gd name="connsiteX5" fmla="*/ 4774575 w 7481097"/>
+              <a:gd name="connsiteY5" fmla="*/ 1161502 h 2681391"/>
+              <a:gd name="connsiteX6" fmla="*/ 7113328 w 7481097"/>
+              <a:gd name="connsiteY6" fmla="*/ 71255 h 2681391"/>
+              <a:gd name="connsiteX0" fmla="*/ 7130908 w 7481097"/>
+              <a:gd name="connsiteY0" fmla="*/ 53680 h 2663818"/>
+              <a:gd name="connsiteX1" fmla="*/ 7385888 w 7481097"/>
+              <a:gd name="connsiteY1" fmla="*/ 1372528 h 2663818"/>
+              <a:gd name="connsiteX2" fmla="*/ 4809739 w 7481097"/>
+              <a:gd name="connsiteY2" fmla="*/ 2093497 h 2663818"/>
+              <a:gd name="connsiteX3" fmla="*/ 536679 w 7481097"/>
+              <a:gd name="connsiteY3" fmla="*/ 2638618 h 2663818"/>
+              <a:gd name="connsiteX4" fmla="*/ 184986 w 7481097"/>
+              <a:gd name="connsiteY4" fmla="*/ 1258229 h 2663818"/>
+              <a:gd name="connsiteX5" fmla="*/ 4774575 w 7481097"/>
+              <a:gd name="connsiteY5" fmla="*/ 1143929 h 2663818"/>
+              <a:gd name="connsiteX6" fmla="*/ 7394682 w 7481097"/>
+              <a:gd name="connsiteY6" fmla="*/ 80059 h 2663818"/>
+              <a:gd name="connsiteX0" fmla="*/ 7130908 w 7481097"/>
+              <a:gd name="connsiteY0" fmla="*/ 77216 h 2687354"/>
+              <a:gd name="connsiteX1" fmla="*/ 7385888 w 7481097"/>
+              <a:gd name="connsiteY1" fmla="*/ 1396064 h 2687354"/>
+              <a:gd name="connsiteX2" fmla="*/ 4809739 w 7481097"/>
+              <a:gd name="connsiteY2" fmla="*/ 2117033 h 2687354"/>
+              <a:gd name="connsiteX3" fmla="*/ 536679 w 7481097"/>
+              <a:gd name="connsiteY3" fmla="*/ 2662154 h 2687354"/>
+              <a:gd name="connsiteX4" fmla="*/ 184986 w 7481097"/>
+              <a:gd name="connsiteY4" fmla="*/ 1281765 h 2687354"/>
+              <a:gd name="connsiteX5" fmla="*/ 4774575 w 7481097"/>
+              <a:gd name="connsiteY5" fmla="*/ 1167465 h 2687354"/>
+              <a:gd name="connsiteX6" fmla="*/ 6770428 w 7481097"/>
+              <a:gd name="connsiteY6" fmla="*/ 68425 h 2687354"/>
+              <a:gd name="connsiteX0" fmla="*/ 7350715 w 7715329"/>
+              <a:gd name="connsiteY0" fmla="*/ 129970 h 2687354"/>
+              <a:gd name="connsiteX1" fmla="*/ 7385888 w 7715329"/>
+              <a:gd name="connsiteY1" fmla="*/ 1396064 h 2687354"/>
+              <a:gd name="connsiteX2" fmla="*/ 4809739 w 7715329"/>
+              <a:gd name="connsiteY2" fmla="*/ 2117033 h 2687354"/>
+              <a:gd name="connsiteX3" fmla="*/ 536679 w 7715329"/>
+              <a:gd name="connsiteY3" fmla="*/ 2662154 h 2687354"/>
+              <a:gd name="connsiteX4" fmla="*/ 184986 w 7715329"/>
+              <a:gd name="connsiteY4" fmla="*/ 1281765 h 2687354"/>
+              <a:gd name="connsiteX5" fmla="*/ 4774575 w 7715329"/>
+              <a:gd name="connsiteY5" fmla="*/ 1167465 h 2687354"/>
+              <a:gd name="connsiteX6" fmla="*/ 6770428 w 7715329"/>
+              <a:gd name="connsiteY6" fmla="*/ 68425 h 2687354"/>
+              <a:gd name="connsiteX0" fmla="*/ 7350715 w 7591460"/>
+              <a:gd name="connsiteY0" fmla="*/ 129970 h 2687354"/>
+              <a:gd name="connsiteX1" fmla="*/ 7385888 w 7591460"/>
+              <a:gd name="connsiteY1" fmla="*/ 1396064 h 2687354"/>
+              <a:gd name="connsiteX2" fmla="*/ 4809739 w 7591460"/>
+              <a:gd name="connsiteY2" fmla="*/ 2117033 h 2687354"/>
+              <a:gd name="connsiteX3" fmla="*/ 536679 w 7591460"/>
+              <a:gd name="connsiteY3" fmla="*/ 2662154 h 2687354"/>
+              <a:gd name="connsiteX4" fmla="*/ 184986 w 7591460"/>
+              <a:gd name="connsiteY4" fmla="*/ 1281765 h 2687354"/>
+              <a:gd name="connsiteX5" fmla="*/ 4774575 w 7591460"/>
+              <a:gd name="connsiteY5" fmla="*/ 1167465 h 2687354"/>
+              <a:gd name="connsiteX6" fmla="*/ 6770428 w 7591460"/>
+              <a:gd name="connsiteY6" fmla="*/ 68425 h 2687354"/>
+              <a:gd name="connsiteX0" fmla="*/ 7324338 w 7581968"/>
+              <a:gd name="connsiteY0" fmla="*/ 121178 h 2687354"/>
+              <a:gd name="connsiteX1" fmla="*/ 7385888 w 7581968"/>
+              <a:gd name="connsiteY1" fmla="*/ 1396064 h 2687354"/>
+              <a:gd name="connsiteX2" fmla="*/ 4809739 w 7581968"/>
+              <a:gd name="connsiteY2" fmla="*/ 2117033 h 2687354"/>
+              <a:gd name="connsiteX3" fmla="*/ 536679 w 7581968"/>
+              <a:gd name="connsiteY3" fmla="*/ 2662154 h 2687354"/>
+              <a:gd name="connsiteX4" fmla="*/ 184986 w 7581968"/>
+              <a:gd name="connsiteY4" fmla="*/ 1281765 h 2687354"/>
+              <a:gd name="connsiteX5" fmla="*/ 4774575 w 7581968"/>
+              <a:gd name="connsiteY5" fmla="*/ 1167465 h 2687354"/>
+              <a:gd name="connsiteX6" fmla="*/ 6770428 w 7581968"/>
+              <a:gd name="connsiteY6" fmla="*/ 68425 h 2687354"/>
+              <a:gd name="connsiteX0" fmla="*/ 7324338 w 7581968"/>
+              <a:gd name="connsiteY0" fmla="*/ 121178 h 2687354"/>
+              <a:gd name="connsiteX1" fmla="*/ 7385888 w 7581968"/>
+              <a:gd name="connsiteY1" fmla="*/ 1396064 h 2687354"/>
+              <a:gd name="connsiteX2" fmla="*/ 4809739 w 7581968"/>
+              <a:gd name="connsiteY2" fmla="*/ 2117033 h 2687354"/>
+              <a:gd name="connsiteX3" fmla="*/ 536679 w 7581968"/>
+              <a:gd name="connsiteY3" fmla="*/ 2662154 h 2687354"/>
+              <a:gd name="connsiteX4" fmla="*/ 184986 w 7581968"/>
+              <a:gd name="connsiteY4" fmla="*/ 1281765 h 2687354"/>
+              <a:gd name="connsiteX5" fmla="*/ 4774575 w 7581968"/>
+              <a:gd name="connsiteY5" fmla="*/ 1167465 h 2687354"/>
+              <a:gd name="connsiteX6" fmla="*/ 6796804 w 7581968"/>
+              <a:gd name="connsiteY6" fmla="*/ 68425 h 2687354"/>
+              <a:gd name="connsiteX0" fmla="*/ 7324338 w 7581968"/>
+              <a:gd name="connsiteY0" fmla="*/ 86185 h 2652361"/>
+              <a:gd name="connsiteX1" fmla="*/ 7385888 w 7581968"/>
+              <a:gd name="connsiteY1" fmla="*/ 1361071 h 2652361"/>
+              <a:gd name="connsiteX2" fmla="*/ 4809739 w 7581968"/>
+              <a:gd name="connsiteY2" fmla="*/ 2082040 h 2652361"/>
+              <a:gd name="connsiteX3" fmla="*/ 536679 w 7581968"/>
+              <a:gd name="connsiteY3" fmla="*/ 2627161 h 2652361"/>
+              <a:gd name="connsiteX4" fmla="*/ 184986 w 7581968"/>
+              <a:gd name="connsiteY4" fmla="*/ 1246772 h 2652361"/>
+              <a:gd name="connsiteX5" fmla="*/ 4774575 w 7581968"/>
+              <a:gd name="connsiteY5" fmla="*/ 1132472 h 2652361"/>
+              <a:gd name="connsiteX6" fmla="*/ 7315550 w 7581968"/>
+              <a:gd name="connsiteY6" fmla="*/ 86186 h 2652361"/>
+            </a:gdLst>
+            <a:ahLst/>
+            <a:cxnLst>
+              <a:cxn ang="0">
+                <a:pos x="connsiteX0" y="connsiteY0"/>
+              </a:cxn>
+              <a:cxn ang="0">
+                <a:pos x="connsiteX1" y="connsiteY1"/>
+              </a:cxn>
+              <a:cxn ang="0">
+                <a:pos x="connsiteX2" y="connsiteY2"/>
+              </a:cxn>
+              <a:cxn ang="0">
+                <a:pos x="connsiteX3" y="connsiteY3"/>
+              </a:cxn>
+              <a:cxn ang="0">
+                <a:pos x="connsiteX4" y="connsiteY4"/>
+              </a:cxn>
+              <a:cxn ang="0">
+                <a:pos x="connsiteX5" y="connsiteY5"/>
+              </a:cxn>
+              <a:cxn ang="0">
+                <a:pos x="connsiteX6" y="connsiteY6"/>
+              </a:cxn>
+            </a:cxnLst>
+            <a:rect l="l" t="t" r="r" b="b"/>
+            <a:pathLst>
+              <a:path w="7581968" h="2652361">
+                <a:moveTo>
+                  <a:pt x="7324338" y="86185"/>
+                </a:moveTo>
+                <a:cubicBezTo>
+                  <a:pt x="7439372" y="24273"/>
+                  <a:pt x="7804988" y="1028429"/>
+                  <a:pt x="7385888" y="1361071"/>
+                </a:cubicBezTo>
+                <a:cubicBezTo>
+                  <a:pt x="6966788" y="1693713"/>
+                  <a:pt x="5951274" y="1871025"/>
+                  <a:pt x="4809739" y="2082040"/>
+                </a:cubicBezTo>
+                <a:cubicBezTo>
+                  <a:pt x="3668204" y="2293055"/>
+                  <a:pt x="1307471" y="2766372"/>
+                  <a:pt x="536679" y="2627161"/>
+                </a:cubicBezTo>
+                <a:cubicBezTo>
+                  <a:pt x="-234113" y="2487950"/>
+                  <a:pt x="-2584" y="1355210"/>
+                  <a:pt x="184986" y="1246772"/>
+                </a:cubicBezTo>
+                <a:cubicBezTo>
+                  <a:pt x="372556" y="1138334"/>
+                  <a:pt x="4528390" y="1510542"/>
+                  <a:pt x="4774575" y="1132472"/>
+                </a:cubicBezTo>
+                <a:cubicBezTo>
+                  <a:pt x="4724751" y="-442816"/>
+                  <a:pt x="7317382" y="84354"/>
+                  <a:pt x="7315550" y="86186"/>
+                </a:cubicBezTo>
+              </a:path>
+            </a:pathLst>
+          </a:custGeom>
+          <a:noFill/>
+          <a:ln w="57150">
+            <a:solidFill>
+              <a:srgbClr val="FF0000"/>
+            </a:solidFill>
+          </a:ln>
+        </p:spPr>
+        <p:style>
+          <a:lnRef idx="2">
+            <a:schemeClr val="accent1">
+              <a:shade val="50000"/>
+            </a:schemeClr>
+          </a:lnRef>
+          <a:fillRef idx="1">
+            <a:schemeClr val="accent1"/>
+          </a:fillRef>
+          <a:effectRef idx="0">
+            <a:schemeClr val="accent1"/>
+          </a:effectRef>
+          <a:fontRef idx="minor">
+            <a:schemeClr val="lt1"/>
+          </a:fontRef>
+        </p:style>
+        <p:txBody>
+          <a:bodyPr rtlCol="0" anchor="ctr"/>
+          <a:lstStyle/>
+          <a:p>
+            <a:pPr algn="ctr"/>
             <a:endParaRPr lang="en-US"/>
           </a:p>
         </p:txBody>
@@ -4126,6 +8063,470 @@
   <p:clrMapOvr>
     <a:masterClrMapping/>
   </p:clrMapOvr>
+  <p:timing>
+    <p:tnLst>
+      <p:par>
+        <p:cTn id="1" dur="indefinite" restart="never" nodeType="tmRoot">
+          <p:childTnLst>
+            <p:seq concurrent="1" nextAc="seek">
+              <p:cTn id="2" dur="indefinite" nodeType="mainSeq">
+                <p:childTnLst>
+                  <p:par>
+                    <p:cTn id="3" fill="hold">
+                      <p:stCondLst>
+                        <p:cond delay="indefinite"/>
+                      </p:stCondLst>
+                      <p:childTnLst>
+                        <p:par>
+                          <p:cTn id="4" fill="hold">
+                            <p:stCondLst>
+                              <p:cond delay="0"/>
+                            </p:stCondLst>
+                            <p:childTnLst>
+                              <p:par>
+                                <p:cTn id="5" presetID="10" presetClass="entr" presetSubtype="0" fill="hold" grpId="0" nodeType="clickEffect">
+                                  <p:stCondLst>
+                                    <p:cond delay="0"/>
+                                  </p:stCondLst>
+                                  <p:childTnLst>
+                                    <p:set>
+                                      <p:cBhvr>
+                                        <p:cTn id="6" dur="1" fill="hold">
+                                          <p:stCondLst>
+                                            <p:cond delay="0"/>
+                                          </p:stCondLst>
+                                        </p:cTn>
+                                        <p:tgtEl>
+                                          <p:spTgt spid="7"/>
+                                        </p:tgtEl>
+                                        <p:attrNameLst>
+                                          <p:attrName>style.visibility</p:attrName>
+                                        </p:attrNameLst>
+                                      </p:cBhvr>
+                                      <p:to>
+                                        <p:strVal val="visible"/>
+                                      </p:to>
+                                    </p:set>
+                                    <p:animEffect transition="in" filter="fade">
+                                      <p:cBhvr>
+                                        <p:cTn id="7" dur="500"/>
+                                        <p:tgtEl>
+                                          <p:spTgt spid="7"/>
+                                        </p:tgtEl>
+                                      </p:cBhvr>
+                                    </p:animEffect>
+                                  </p:childTnLst>
+                                </p:cTn>
+                              </p:par>
+                            </p:childTnLst>
+                          </p:cTn>
+                        </p:par>
+                      </p:childTnLst>
+                    </p:cTn>
+                  </p:par>
+                  <p:par>
+                    <p:cTn id="8" fill="hold">
+                      <p:stCondLst>
+                        <p:cond delay="indefinite"/>
+                      </p:stCondLst>
+                      <p:childTnLst>
+                        <p:par>
+                          <p:cTn id="9" fill="hold">
+                            <p:stCondLst>
+                              <p:cond delay="0"/>
+                            </p:stCondLst>
+                            <p:childTnLst>
+                              <p:par>
+                                <p:cTn id="10" presetID="10" presetClass="exit" presetSubtype="0" fill="hold" grpId="1" nodeType="clickEffect">
+                                  <p:stCondLst>
+                                    <p:cond delay="0"/>
+                                  </p:stCondLst>
+                                  <p:childTnLst>
+                                    <p:animEffect transition="out" filter="fade">
+                                      <p:cBhvr>
+                                        <p:cTn id="11" dur="500"/>
+                                        <p:tgtEl>
+                                          <p:spTgt spid="7"/>
+                                        </p:tgtEl>
+                                      </p:cBhvr>
+                                    </p:animEffect>
+                                    <p:set>
+                                      <p:cBhvr>
+                                        <p:cTn id="12" dur="1" fill="hold">
+                                          <p:stCondLst>
+                                            <p:cond delay="499"/>
+                                          </p:stCondLst>
+                                        </p:cTn>
+                                        <p:tgtEl>
+                                          <p:spTgt spid="7"/>
+                                        </p:tgtEl>
+                                        <p:attrNameLst>
+                                          <p:attrName>style.visibility</p:attrName>
+                                        </p:attrNameLst>
+                                      </p:cBhvr>
+                                      <p:to>
+                                        <p:strVal val="hidden"/>
+                                      </p:to>
+                                    </p:set>
+                                  </p:childTnLst>
+                                </p:cTn>
+                              </p:par>
+                            </p:childTnLst>
+                          </p:cTn>
+                        </p:par>
+                      </p:childTnLst>
+                    </p:cTn>
+                  </p:par>
+                  <p:par>
+                    <p:cTn id="13" fill="hold">
+                      <p:stCondLst>
+                        <p:cond delay="indefinite"/>
+                      </p:stCondLst>
+                      <p:childTnLst>
+                        <p:par>
+                          <p:cTn id="14" fill="hold">
+                            <p:stCondLst>
+                              <p:cond delay="0"/>
+                            </p:stCondLst>
+                            <p:childTnLst>
+                              <p:par>
+                                <p:cTn id="15" presetID="10" presetClass="entr" presetSubtype="0" fill="hold" grpId="0" nodeType="clickEffect">
+                                  <p:stCondLst>
+                                    <p:cond delay="0"/>
+                                  </p:stCondLst>
+                                  <p:childTnLst>
+                                    <p:set>
+                                      <p:cBhvr>
+                                        <p:cTn id="16" dur="1" fill="hold">
+                                          <p:stCondLst>
+                                            <p:cond delay="0"/>
+                                          </p:stCondLst>
+                                        </p:cTn>
+                                        <p:tgtEl>
+                                          <p:spTgt spid="8"/>
+                                        </p:tgtEl>
+                                        <p:attrNameLst>
+                                          <p:attrName>style.visibility</p:attrName>
+                                        </p:attrNameLst>
+                                      </p:cBhvr>
+                                      <p:to>
+                                        <p:strVal val="visible"/>
+                                      </p:to>
+                                    </p:set>
+                                    <p:animEffect transition="in" filter="fade">
+                                      <p:cBhvr>
+                                        <p:cTn id="17" dur="500"/>
+                                        <p:tgtEl>
+                                          <p:spTgt spid="8"/>
+                                        </p:tgtEl>
+                                      </p:cBhvr>
+                                    </p:animEffect>
+                                  </p:childTnLst>
+                                </p:cTn>
+                              </p:par>
+                            </p:childTnLst>
+                          </p:cTn>
+                        </p:par>
+                      </p:childTnLst>
+                    </p:cTn>
+                  </p:par>
+                  <p:par>
+                    <p:cTn id="18" fill="hold">
+                      <p:stCondLst>
+                        <p:cond delay="indefinite"/>
+                      </p:stCondLst>
+                      <p:childTnLst>
+                        <p:par>
+                          <p:cTn id="19" fill="hold">
+                            <p:stCondLst>
+                              <p:cond delay="0"/>
+                            </p:stCondLst>
+                            <p:childTnLst>
+                              <p:par>
+                                <p:cTn id="20" presetID="10" presetClass="exit" presetSubtype="0" fill="hold" grpId="1" nodeType="clickEffect">
+                                  <p:stCondLst>
+                                    <p:cond delay="0"/>
+                                  </p:stCondLst>
+                                  <p:childTnLst>
+                                    <p:animEffect transition="out" filter="fade">
+                                      <p:cBhvr>
+                                        <p:cTn id="21" dur="500"/>
+                                        <p:tgtEl>
+                                          <p:spTgt spid="8"/>
+                                        </p:tgtEl>
+                                      </p:cBhvr>
+                                    </p:animEffect>
+                                    <p:set>
+                                      <p:cBhvr>
+                                        <p:cTn id="22" dur="1" fill="hold">
+                                          <p:stCondLst>
+                                            <p:cond delay="499"/>
+                                          </p:stCondLst>
+                                        </p:cTn>
+                                        <p:tgtEl>
+                                          <p:spTgt spid="8"/>
+                                        </p:tgtEl>
+                                        <p:attrNameLst>
+                                          <p:attrName>style.visibility</p:attrName>
+                                        </p:attrNameLst>
+                                      </p:cBhvr>
+                                      <p:to>
+                                        <p:strVal val="hidden"/>
+                                      </p:to>
+                                    </p:set>
+                                  </p:childTnLst>
+                                </p:cTn>
+                              </p:par>
+                            </p:childTnLst>
+                          </p:cTn>
+                        </p:par>
+                      </p:childTnLst>
+                    </p:cTn>
+                  </p:par>
+                  <p:par>
+                    <p:cTn id="23" fill="hold">
+                      <p:stCondLst>
+                        <p:cond delay="indefinite"/>
+                      </p:stCondLst>
+                      <p:childTnLst>
+                        <p:par>
+                          <p:cTn id="24" fill="hold">
+                            <p:stCondLst>
+                              <p:cond delay="0"/>
+                            </p:stCondLst>
+                            <p:childTnLst>
+                              <p:par>
+                                <p:cTn id="25" presetID="10" presetClass="entr" presetSubtype="0" fill="hold" grpId="1" nodeType="clickEffect">
+                                  <p:stCondLst>
+                                    <p:cond delay="0"/>
+                                  </p:stCondLst>
+                                  <p:childTnLst>
+                                    <p:set>
+                                      <p:cBhvr>
+                                        <p:cTn id="26" dur="1" fill="hold">
+                                          <p:stCondLst>
+                                            <p:cond delay="0"/>
+                                          </p:stCondLst>
+                                        </p:cTn>
+                                        <p:tgtEl>
+                                          <p:spTgt spid="15"/>
+                                        </p:tgtEl>
+                                        <p:attrNameLst>
+                                          <p:attrName>style.visibility</p:attrName>
+                                        </p:attrNameLst>
+                                      </p:cBhvr>
+                                      <p:to>
+                                        <p:strVal val="visible"/>
+                                      </p:to>
+                                    </p:set>
+                                    <p:animEffect transition="in" filter="fade">
+                                      <p:cBhvr>
+                                        <p:cTn id="27" dur="500"/>
+                                        <p:tgtEl>
+                                          <p:spTgt spid="15"/>
+                                        </p:tgtEl>
+                                      </p:cBhvr>
+                                    </p:animEffect>
+                                  </p:childTnLst>
+                                </p:cTn>
+                              </p:par>
+                            </p:childTnLst>
+                          </p:cTn>
+                        </p:par>
+                      </p:childTnLst>
+                    </p:cTn>
+                  </p:par>
+                  <p:par>
+                    <p:cTn id="28" fill="hold">
+                      <p:stCondLst>
+                        <p:cond delay="indefinite"/>
+                      </p:stCondLst>
+                      <p:childTnLst>
+                        <p:par>
+                          <p:cTn id="29" fill="hold">
+                            <p:stCondLst>
+                              <p:cond delay="0"/>
+                            </p:stCondLst>
+                            <p:childTnLst>
+                              <p:par>
+                                <p:cTn id="30" presetID="10" presetClass="exit" presetSubtype="0" fill="hold" grpId="0" nodeType="clickEffect">
+                                  <p:stCondLst>
+                                    <p:cond delay="0"/>
+                                  </p:stCondLst>
+                                  <p:childTnLst>
+                                    <p:animEffect transition="out" filter="fade">
+                                      <p:cBhvr>
+                                        <p:cTn id="31" dur="500"/>
+                                        <p:tgtEl>
+                                          <p:spTgt spid="15"/>
+                                        </p:tgtEl>
+                                      </p:cBhvr>
+                                    </p:animEffect>
+                                    <p:set>
+                                      <p:cBhvr>
+                                        <p:cTn id="32" dur="1" fill="hold">
+                                          <p:stCondLst>
+                                            <p:cond delay="499"/>
+                                          </p:stCondLst>
+                                        </p:cTn>
+                                        <p:tgtEl>
+                                          <p:spTgt spid="15"/>
+                                        </p:tgtEl>
+                                        <p:attrNameLst>
+                                          <p:attrName>style.visibility</p:attrName>
+                                        </p:attrNameLst>
+                                      </p:cBhvr>
+                                      <p:to>
+                                        <p:strVal val="hidden"/>
+                                      </p:to>
+                                    </p:set>
+                                  </p:childTnLst>
+                                </p:cTn>
+                              </p:par>
+                            </p:childTnLst>
+                          </p:cTn>
+                        </p:par>
+                      </p:childTnLst>
+                    </p:cTn>
+                  </p:par>
+                  <p:par>
+                    <p:cTn id="33" fill="hold">
+                      <p:stCondLst>
+                        <p:cond delay="indefinite"/>
+                      </p:stCondLst>
+                      <p:childTnLst>
+                        <p:par>
+                          <p:cTn id="34" fill="hold">
+                            <p:stCondLst>
+                              <p:cond delay="0"/>
+                            </p:stCondLst>
+                            <p:childTnLst>
+                              <p:par>
+                                <p:cTn id="35" presetID="10" presetClass="entr" presetSubtype="0" fill="hold" grpId="1" nodeType="clickEffect">
+                                  <p:stCondLst>
+                                    <p:cond delay="0"/>
+                                  </p:stCondLst>
+                                  <p:childTnLst>
+                                    <p:set>
+                                      <p:cBhvr>
+                                        <p:cTn id="36" dur="1" fill="hold">
+                                          <p:stCondLst>
+                                            <p:cond delay="0"/>
+                                          </p:stCondLst>
+                                        </p:cTn>
+                                        <p:tgtEl>
+                                          <p:spTgt spid="16"/>
+                                        </p:tgtEl>
+                                        <p:attrNameLst>
+                                          <p:attrName>style.visibility</p:attrName>
+                                        </p:attrNameLst>
+                                      </p:cBhvr>
+                                      <p:to>
+                                        <p:strVal val="visible"/>
+                                      </p:to>
+                                    </p:set>
+                                    <p:animEffect transition="in" filter="fade">
+                                      <p:cBhvr>
+                                        <p:cTn id="37" dur="500"/>
+                                        <p:tgtEl>
+                                          <p:spTgt spid="16"/>
+                                        </p:tgtEl>
+                                      </p:cBhvr>
+                                    </p:animEffect>
+                                  </p:childTnLst>
+                                </p:cTn>
+                              </p:par>
+                            </p:childTnLst>
+                          </p:cTn>
+                        </p:par>
+                      </p:childTnLst>
+                    </p:cTn>
+                  </p:par>
+                  <p:par>
+                    <p:cTn id="38" fill="hold">
+                      <p:stCondLst>
+                        <p:cond delay="indefinite"/>
+                      </p:stCondLst>
+                      <p:childTnLst>
+                        <p:par>
+                          <p:cTn id="39" fill="hold">
+                            <p:stCondLst>
+                              <p:cond delay="0"/>
+                            </p:stCondLst>
+                            <p:childTnLst>
+                              <p:par>
+                                <p:cTn id="40" presetID="10" presetClass="exit" presetSubtype="0" fill="hold" grpId="0" nodeType="clickEffect">
+                                  <p:stCondLst>
+                                    <p:cond delay="0"/>
+                                  </p:stCondLst>
+                                  <p:childTnLst>
+                                    <p:animEffect transition="out" filter="fade">
+                                      <p:cBhvr>
+                                        <p:cTn id="41" dur="500"/>
+                                        <p:tgtEl>
+                                          <p:spTgt spid="16"/>
+                                        </p:tgtEl>
+                                      </p:cBhvr>
+                                    </p:animEffect>
+                                    <p:set>
+                                      <p:cBhvr>
+                                        <p:cTn id="42" dur="1" fill="hold">
+                                          <p:stCondLst>
+                                            <p:cond delay="499"/>
+                                          </p:stCondLst>
+                                        </p:cTn>
+                                        <p:tgtEl>
+                                          <p:spTgt spid="16"/>
+                                        </p:tgtEl>
+                                        <p:attrNameLst>
+                                          <p:attrName>style.visibility</p:attrName>
+                                        </p:attrNameLst>
+                                      </p:cBhvr>
+                                      <p:to>
+                                        <p:strVal val="hidden"/>
+                                      </p:to>
+                                    </p:set>
+                                  </p:childTnLst>
+                                </p:cTn>
+                              </p:par>
+                            </p:childTnLst>
+                          </p:cTn>
+                        </p:par>
+                      </p:childTnLst>
+                    </p:cTn>
+                  </p:par>
+                </p:childTnLst>
+              </p:cTn>
+              <p:prevCondLst>
+                <p:cond evt="onPrev" delay="0">
+                  <p:tgtEl>
+                    <p:sldTgt/>
+                  </p:tgtEl>
+                </p:cond>
+              </p:prevCondLst>
+              <p:nextCondLst>
+                <p:cond evt="onNext" delay="0">
+                  <p:tgtEl>
+                    <p:sldTgt/>
+                  </p:tgtEl>
+                </p:cond>
+              </p:nextCondLst>
+            </p:seq>
+          </p:childTnLst>
+        </p:cTn>
+      </p:par>
+    </p:tnLst>
+    <p:bldLst>
+      <p:bldP spid="7" grpId="0" animBg="1"/>
+      <p:bldP spid="7" grpId="1" animBg="1"/>
+      <p:bldP spid="8" grpId="0" animBg="1"/>
+      <p:bldP spid="8" grpId="1" animBg="1"/>
+      <p:bldP spid="15" grpId="0" animBg="1"/>
+      <p:bldP spid="15" grpId="1" animBg="1"/>
+      <p:bldP spid="16" grpId="0" animBg="1"/>
+      <p:bldP spid="16" grpId="1" animBg="1"/>
+    </p:bldLst>
+  </p:timing>
 </p:sld>
 </file>
 
@@ -4148,6 +8549,81 @@
       </p:grpSpPr>
       <p:sp>
         <p:nvSpPr>
+          <p:cNvPr id="2" name="Title 1"/>
+          <p:cNvSpPr>
+            <a:spLocks noGrp="1"/>
+          </p:cNvSpPr>
+          <p:nvPr>
+            <p:ph type="title"/>
+          </p:nvPr>
+        </p:nvSpPr>
+        <p:spPr/>
+        <p:txBody>
+          <a:bodyPr/>
+          <a:lstStyle/>
+          <a:p>
+            <a:endParaRPr lang="en-US"/>
+          </a:p>
+        </p:txBody>
+      </p:sp>
+      <p:sp>
+        <p:nvSpPr>
+          <p:cNvPr id="3" name="Content Placeholder 2"/>
+          <p:cNvSpPr>
+            <a:spLocks noGrp="1"/>
+          </p:cNvSpPr>
+          <p:nvPr>
+            <p:ph idx="1"/>
+          </p:nvPr>
+        </p:nvSpPr>
+        <p:spPr/>
+        <p:txBody>
+          <a:bodyPr/>
+          <a:lstStyle/>
+          <a:p>
+            <a:endParaRPr lang="en-US"/>
+          </a:p>
+        </p:txBody>
+      </p:sp>
+    </p:spTree>
+    <p:extLst>
+      <p:ext uri="{BB962C8B-B14F-4D97-AF65-F5344CB8AC3E}">
+        <p14:creationId xmlns:p14="http://schemas.microsoft.com/office/powerpoint/2010/main" val="1551958750"/>
+      </p:ext>
+    </p:extLst>
+  </p:cSld>
+  <p:clrMapOvr>
+    <a:masterClrMapping/>
+  </p:clrMapOvr>
+  <p:timing>
+    <p:tnLst>
+      <p:par>
+        <p:cTn id="1" dur="indefinite" restart="never" nodeType="tmRoot"/>
+      </p:par>
+    </p:tnLst>
+  </p:timing>
+</p:sld>
+</file>
+
+<file path=ppt/slides/slide18.xml><?xml version="1.0" encoding="utf-8"?>
+<p:sld xmlns:a="http://schemas.openxmlformats.org/drawingml/2006/main" xmlns:r="http://schemas.openxmlformats.org/officeDocument/2006/relationships" xmlns:p="http://schemas.openxmlformats.org/presentationml/2006/main">
+  <p:cSld>
+    <p:spTree>
+      <p:nvGrpSpPr>
+        <p:cNvPr id="1" name=""/>
+        <p:cNvGrpSpPr/>
+        <p:nvPr/>
+      </p:nvGrpSpPr>
+      <p:grpSpPr>
+        <a:xfrm>
+          <a:off x="0" y="0"/>
+          <a:ext cx="0" cy="0"/>
+          <a:chOff x="0" y="0"/>
+          <a:chExt cx="0" cy="0"/>
+        </a:xfrm>
+      </p:grpSpPr>
+      <p:sp>
+        <p:nvSpPr>
           <p:cNvPr id="2" name="Title 1">
             <a:extLst>
               <a:ext uri="{FF2B5EF4-FFF2-40B4-BE49-F238E27FC236}">
@@ -4221,10 +8697,17 @@
   <p:clrMapOvr>
     <a:masterClrMapping/>
   </p:clrMapOvr>
+  <p:timing>
+    <p:tnLst>
+      <p:par>
+        <p:cTn id="1" dur="indefinite" restart="never" nodeType="tmRoot"/>
+      </p:par>
+    </p:tnLst>
+  </p:timing>
 </p:sld>
 </file>
 
-<file path=ppt/slides/slide18.xml><?xml version="1.0" encoding="utf-8"?>
+<file path=ppt/slides/slide19.xml><?xml version="1.0" encoding="utf-8"?>
 <p:sld xmlns:a="http://schemas.openxmlformats.org/drawingml/2006/main" xmlns:r="http://schemas.openxmlformats.org/officeDocument/2006/relationships" xmlns:p="http://schemas.openxmlformats.org/presentationml/2006/main">
   <p:cSld>
     <p:spTree>
@@ -4411,6 +8894,13 @@
   <p:clrMapOvr>
     <a:masterClrMapping/>
   </p:clrMapOvr>
+  <p:timing>
+    <p:tnLst>
+      <p:par>
+        <p:cTn id="1" dur="indefinite" restart="never" nodeType="tmRoot"/>
+      </p:par>
+    </p:tnLst>
+  </p:timing>
 </p:sld>
 </file>
 
@@ -4512,6 +9002,13 @@
   <p:clrMapOvr>
     <a:masterClrMapping/>
   </p:clrMapOvr>
+  <p:timing>
+    <p:tnLst>
+      <p:par>
+        <p:cTn id="1" dur="indefinite" restart="never" nodeType="tmRoot"/>
+      </p:par>
+    </p:tnLst>
+  </p:timing>
 </p:sld>
 </file>
 
@@ -4649,6 +9146,13 @@
   <p:clrMapOvr>
     <a:masterClrMapping/>
   </p:clrMapOvr>
+  <p:timing>
+    <p:tnLst>
+      <p:par>
+        <p:cTn id="1" dur="indefinite" restart="never" nodeType="tmRoot"/>
+      </p:par>
+    </p:tnLst>
+  </p:timing>
 </p:sld>
 </file>
 
@@ -4795,6 +9299,13 @@
   <p:clrMapOvr>
     <a:masterClrMapping/>
   </p:clrMapOvr>
+  <p:timing>
+    <p:tnLst>
+      <p:par>
+        <p:cTn id="1" dur="indefinite" restart="never" nodeType="tmRoot"/>
+      </p:par>
+    </p:tnLst>
+  </p:timing>
 </p:sld>
 </file>
 
@@ -4908,6 +9419,13 @@
   <p:clrMapOvr>
     <a:masterClrMapping/>
   </p:clrMapOvr>
+  <p:timing>
+    <p:tnLst>
+      <p:par>
+        <p:cTn id="1" dur="indefinite" restart="never" nodeType="tmRoot"/>
+      </p:par>
+    </p:tnLst>
+  </p:timing>
 </p:sld>
 </file>
 
@@ -4994,6 +9512,13 @@
   <p:clrMapOvr>
     <a:masterClrMapping/>
   </p:clrMapOvr>
+  <p:timing>
+    <p:tnLst>
+      <p:par>
+        <p:cTn id="1" dur="indefinite" restart="never" nodeType="tmRoot"/>
+      </p:par>
+    </p:tnLst>
+  </p:timing>
 </p:sld>
 </file>
 
@@ -5094,6 +9619,13 @@
   <p:clrMapOvr>
     <a:masterClrMapping/>
   </p:clrMapOvr>
+  <p:timing>
+    <p:tnLst>
+      <p:par>
+        <p:cTn id="1" dur="indefinite" restart="never" nodeType="tmRoot"/>
+      </p:par>
+    </p:tnLst>
+  </p:timing>
 </p:sld>
 </file>
 
@@ -5142,6 +9674,10 @@
           </a:bodyPr>
           <a:lstStyle/>
           <a:p>
+            <a:r>
+              <a:rPr lang="en-US" dirty="0"/>
+              <a:t/>
+            </a:r>
             <a:br>
               <a:rPr lang="en-US" dirty="0"/>
             </a:br>
@@ -5229,6 +9765,13 @@
   <p:clrMapOvr>
     <a:masterClrMapping/>
   </p:clrMapOvr>
+  <p:timing>
+    <p:tnLst>
+      <p:par>
+        <p:cTn id="1" dur="indefinite" restart="never" nodeType="tmRoot"/>
+      </p:par>
+    </p:tnLst>
+  </p:timing>
 </p:sld>
 </file>
 

</xml_diff>

<commit_message>
Added website to presentation
</commit_message>
<xml_diff>
--- a/Crimson Clubs (Requirements).pptx
+++ b/Crimson Clubs (Requirements).pptx
@@ -20,10 +20,11 @@
     <p:sldId id="274" r:id="rId14"/>
     <p:sldId id="275" r:id="rId15"/>
     <p:sldId id="276" r:id="rId16"/>
-    <p:sldId id="272" r:id="rId17"/>
+    <p:sldId id="279" r:id="rId17"/>
     <p:sldId id="278" r:id="rId18"/>
-    <p:sldId id="266" r:id="rId19"/>
-    <p:sldId id="269" r:id="rId20"/>
+    <p:sldId id="272" r:id="rId19"/>
+    <p:sldId id="266" r:id="rId20"/>
+    <p:sldId id="269" r:id="rId21"/>
   </p:sldIdLst>
   <p:sldSz cx="12192000" cy="6858000"/>
   <p:notesSz cx="6858000" cy="9144000"/>
@@ -4097,6 +4098,177 @@
 </file>
 
 <file path=ppt/slides/slide16.xml><?xml version="1.0" encoding="utf-8"?>
+<p:sld xmlns:a="http://schemas.openxmlformats.org/drawingml/2006/main" xmlns:r="http://schemas.openxmlformats.org/officeDocument/2006/relationships" xmlns:p="http://schemas.openxmlformats.org/presentationml/2006/main">
+  <p:cSld>
+    <p:spTree>
+      <p:nvGrpSpPr>
+        <p:cNvPr id="1" name=""/>
+        <p:cNvGrpSpPr/>
+        <p:nvPr/>
+      </p:nvGrpSpPr>
+      <p:grpSpPr>
+        <a:xfrm>
+          <a:off x="0" y="0"/>
+          <a:ext cx="0" cy="0"/>
+          <a:chOff x="0" y="0"/>
+          <a:chExt cx="0" cy="0"/>
+        </a:xfrm>
+      </p:grpSpPr>
+      <p:sp>
+        <p:nvSpPr>
+          <p:cNvPr id="2" name="Title 1"/>
+          <p:cNvSpPr>
+            <a:spLocks noGrp="1"/>
+          </p:cNvSpPr>
+          <p:nvPr>
+            <p:ph type="title"/>
+          </p:nvPr>
+        </p:nvSpPr>
+        <p:spPr/>
+        <p:txBody>
+          <a:bodyPr/>
+          <a:lstStyle/>
+          <a:p>
+            <a:r>
+              <a:rPr lang="en-US" dirty="0" smtClean="0"/>
+              <a:t>Website</a:t>
+            </a:r>
+            <a:endParaRPr lang="en-US" dirty="0"/>
+          </a:p>
+        </p:txBody>
+      </p:sp>
+      <p:sp>
+        <p:nvSpPr>
+          <p:cNvPr id="3" name="Content Placeholder 2"/>
+          <p:cNvSpPr>
+            <a:spLocks noGrp="1"/>
+          </p:cNvSpPr>
+          <p:nvPr>
+            <p:ph idx="1"/>
+          </p:nvPr>
+        </p:nvSpPr>
+        <p:spPr/>
+        <p:txBody>
+          <a:bodyPr/>
+          <a:lstStyle/>
+          <a:p>
+            <a:r>
+              <a:rPr lang="en-US" dirty="0"/>
+              <a:t>The frontend website will use AJAX calls instead of form </a:t>
+            </a:r>
+            <a:r>
+              <a:rPr lang="en-US" dirty="0" smtClean="0"/>
+              <a:t>submissions.</a:t>
+            </a:r>
+          </a:p>
+          <a:p>
+            <a:r>
+              <a:rPr lang="en-US" dirty="0"/>
+              <a:t>The backend will be C# .NET using MVC</a:t>
+            </a:r>
+            <a:r>
+              <a:rPr lang="en-US" dirty="0" smtClean="0"/>
+              <a:t>.</a:t>
+            </a:r>
+          </a:p>
+          <a:p>
+            <a:r>
+              <a:rPr lang="en-US" dirty="0"/>
+              <a:t>The database with be T-SQL.</a:t>
+            </a:r>
+          </a:p>
+          <a:p>
+            <a:endParaRPr lang="en-US" dirty="0"/>
+          </a:p>
+        </p:txBody>
+      </p:sp>
+    </p:spTree>
+    <p:extLst>
+      <p:ext uri="{BB962C8B-B14F-4D97-AF65-F5344CB8AC3E}">
+        <p14:creationId xmlns:p14="http://schemas.microsoft.com/office/powerpoint/2010/main" val="315865446"/>
+      </p:ext>
+    </p:extLst>
+  </p:cSld>
+  <p:clrMapOvr>
+    <a:masterClrMapping/>
+  </p:clrMapOvr>
+  <p:timing>
+    <p:tnLst>
+      <p:par>
+        <p:cTn id="1" dur="indefinite" restart="never" nodeType="tmRoot"/>
+      </p:par>
+    </p:tnLst>
+  </p:timing>
+</p:sld>
+</file>
+
+<file path=ppt/slides/slide17.xml><?xml version="1.0" encoding="utf-8"?>
+<p:sld xmlns:a="http://schemas.openxmlformats.org/drawingml/2006/main" xmlns:r="http://schemas.openxmlformats.org/officeDocument/2006/relationships" xmlns:p="http://schemas.openxmlformats.org/presentationml/2006/main">
+  <p:cSld>
+    <p:spTree>
+      <p:nvGrpSpPr>
+        <p:cNvPr id="1" name=""/>
+        <p:cNvGrpSpPr/>
+        <p:nvPr/>
+      </p:nvGrpSpPr>
+      <p:grpSpPr>
+        <a:xfrm>
+          <a:off x="0" y="0"/>
+          <a:ext cx="0" cy="0"/>
+          <a:chOff x="0" y="0"/>
+          <a:chExt cx="0" cy="0"/>
+        </a:xfrm>
+      </p:grpSpPr>
+      <p:pic>
+        <p:nvPicPr>
+          <p:cNvPr id="6" name="Content Placeholder 5"/>
+          <p:cNvPicPr>
+            <a:picLocks noGrp="1" noChangeAspect="1"/>
+          </p:cNvPicPr>
+          <p:nvPr>
+            <p:ph idx="1"/>
+          </p:nvPr>
+        </p:nvPicPr>
+        <p:blipFill>
+          <a:blip r:embed="rId2">
+            <a:extLst>
+              <a:ext uri="{28A0092B-C50C-407E-A947-70E740481C1C}">
+                <a14:useLocalDpi xmlns:a14="http://schemas.microsoft.com/office/drawing/2010/main" val="0"/>
+              </a:ext>
+            </a:extLst>
+          </a:blip>
+          <a:stretch>
+            <a:fillRect/>
+          </a:stretch>
+        </p:blipFill>
+        <p:spPr>
+          <a:xfrm>
+            <a:off x="-1" y="0"/>
+            <a:ext cx="11295529" cy="6858000"/>
+          </a:xfrm>
+        </p:spPr>
+      </p:pic>
+    </p:spTree>
+    <p:extLst>
+      <p:ext uri="{BB962C8B-B14F-4D97-AF65-F5344CB8AC3E}">
+        <p14:creationId xmlns:p14="http://schemas.microsoft.com/office/powerpoint/2010/main" val="1551958750"/>
+      </p:ext>
+    </p:extLst>
+  </p:cSld>
+  <p:clrMapOvr>
+    <a:masterClrMapping/>
+  </p:clrMapOvr>
+  <p:timing>
+    <p:tnLst>
+      <p:par>
+        <p:cTn id="1" dur="indefinite" restart="never" nodeType="tmRoot"/>
+      </p:par>
+    </p:tnLst>
+  </p:timing>
+</p:sld>
+</file>
+
+<file path=ppt/slides/slide18.xml><?xml version="1.0" encoding="utf-8"?>
 <p:sld xmlns:a="http://schemas.openxmlformats.org/drawingml/2006/main" xmlns:r="http://schemas.openxmlformats.org/officeDocument/2006/relationships" xmlns:p="http://schemas.openxmlformats.org/presentationml/2006/main">
   <p:cSld>
     <p:spTree>
@@ -8530,82 +8702,7 @@
 </p:sld>
 </file>
 
-<file path=ppt/slides/slide17.xml><?xml version="1.0" encoding="utf-8"?>
-<p:sld xmlns:a="http://schemas.openxmlformats.org/drawingml/2006/main" xmlns:r="http://schemas.openxmlformats.org/officeDocument/2006/relationships" xmlns:p="http://schemas.openxmlformats.org/presentationml/2006/main">
-  <p:cSld>
-    <p:spTree>
-      <p:nvGrpSpPr>
-        <p:cNvPr id="1" name=""/>
-        <p:cNvGrpSpPr/>
-        <p:nvPr/>
-      </p:nvGrpSpPr>
-      <p:grpSpPr>
-        <a:xfrm>
-          <a:off x="0" y="0"/>
-          <a:ext cx="0" cy="0"/>
-          <a:chOff x="0" y="0"/>
-          <a:chExt cx="0" cy="0"/>
-        </a:xfrm>
-      </p:grpSpPr>
-      <p:sp>
-        <p:nvSpPr>
-          <p:cNvPr id="2" name="Title 1"/>
-          <p:cNvSpPr>
-            <a:spLocks noGrp="1"/>
-          </p:cNvSpPr>
-          <p:nvPr>
-            <p:ph type="title"/>
-          </p:nvPr>
-        </p:nvSpPr>
-        <p:spPr/>
-        <p:txBody>
-          <a:bodyPr/>
-          <a:lstStyle/>
-          <a:p>
-            <a:endParaRPr lang="en-US"/>
-          </a:p>
-        </p:txBody>
-      </p:sp>
-      <p:sp>
-        <p:nvSpPr>
-          <p:cNvPr id="3" name="Content Placeholder 2"/>
-          <p:cNvSpPr>
-            <a:spLocks noGrp="1"/>
-          </p:cNvSpPr>
-          <p:nvPr>
-            <p:ph idx="1"/>
-          </p:nvPr>
-        </p:nvSpPr>
-        <p:spPr/>
-        <p:txBody>
-          <a:bodyPr/>
-          <a:lstStyle/>
-          <a:p>
-            <a:endParaRPr lang="en-US"/>
-          </a:p>
-        </p:txBody>
-      </p:sp>
-    </p:spTree>
-    <p:extLst>
-      <p:ext uri="{BB962C8B-B14F-4D97-AF65-F5344CB8AC3E}">
-        <p14:creationId xmlns:p14="http://schemas.microsoft.com/office/powerpoint/2010/main" val="1551958750"/>
-      </p:ext>
-    </p:extLst>
-  </p:cSld>
-  <p:clrMapOvr>
-    <a:masterClrMapping/>
-  </p:clrMapOvr>
-  <p:timing>
-    <p:tnLst>
-      <p:par>
-        <p:cTn id="1" dur="indefinite" restart="never" nodeType="tmRoot"/>
-      </p:par>
-    </p:tnLst>
-  </p:timing>
-</p:sld>
-</file>
-
-<file path=ppt/slides/slide18.xml><?xml version="1.0" encoding="utf-8"?>
+<file path=ppt/slides/slide19.xml><?xml version="1.0" encoding="utf-8"?>
 <p:sld xmlns:a="http://schemas.openxmlformats.org/drawingml/2006/main" xmlns:r="http://schemas.openxmlformats.org/officeDocument/2006/relationships" xmlns:p="http://schemas.openxmlformats.org/presentationml/2006/main">
   <p:cSld>
     <p:spTree>
@@ -8704,95 +8801,6 @@
       </p:par>
     </p:tnLst>
   </p:timing>
-</p:sld>
-</file>
-
-<file path=ppt/slides/slide19.xml><?xml version="1.0" encoding="utf-8"?>
-<p:sld xmlns:a="http://schemas.openxmlformats.org/drawingml/2006/main" xmlns:r="http://schemas.openxmlformats.org/officeDocument/2006/relationships" xmlns:p="http://schemas.openxmlformats.org/presentationml/2006/main">
-  <p:cSld>
-    <p:spTree>
-      <p:nvGrpSpPr>
-        <p:cNvPr id="1" name=""/>
-        <p:cNvGrpSpPr/>
-        <p:nvPr/>
-      </p:nvGrpSpPr>
-      <p:grpSpPr>
-        <a:xfrm>
-          <a:off x="0" y="0"/>
-          <a:ext cx="0" cy="0"/>
-          <a:chOff x="0" y="0"/>
-          <a:chExt cx="0" cy="0"/>
-        </a:xfrm>
-      </p:grpSpPr>
-      <p:sp>
-        <p:nvSpPr>
-          <p:cNvPr id="2" name="Title 1">
-            <a:extLst>
-              <a:ext uri="{FF2B5EF4-FFF2-40B4-BE49-F238E27FC236}">
-                <a16:creationId xmlns:a16="http://schemas.microsoft.com/office/drawing/2014/main" id="{642F46A1-65B2-4322-BA2F-9B65B842D8B5}"/>
-              </a:ext>
-            </a:extLst>
-          </p:cNvPr>
-          <p:cNvSpPr>
-            <a:spLocks noGrp="1"/>
-          </p:cNvSpPr>
-          <p:nvPr>
-            <p:ph type="title"/>
-          </p:nvPr>
-        </p:nvSpPr>
-        <p:spPr/>
-        <p:txBody>
-          <a:bodyPr/>
-          <a:lstStyle/>
-          <a:p>
-            <a:r>
-              <a:rPr lang="en-US" dirty="0"/>
-              <a:t>Potential Risks</a:t>
-            </a:r>
-          </a:p>
-        </p:txBody>
-      </p:sp>
-      <p:sp>
-        <p:nvSpPr>
-          <p:cNvPr id="3" name="Content Placeholder 2">
-            <a:extLst>
-              <a:ext uri="{FF2B5EF4-FFF2-40B4-BE49-F238E27FC236}">
-                <a16:creationId xmlns:a16="http://schemas.microsoft.com/office/drawing/2014/main" id="{6E05FA0E-9C68-437B-90B5-4F41436F04AC}"/>
-              </a:ext>
-            </a:extLst>
-          </p:cNvPr>
-          <p:cNvSpPr>
-            <a:spLocks noGrp="1"/>
-          </p:cNvSpPr>
-          <p:nvPr>
-            <p:ph idx="1"/>
-          </p:nvPr>
-        </p:nvSpPr>
-        <p:spPr/>
-        <p:txBody>
-          <a:bodyPr/>
-          <a:lstStyle/>
-          <a:p>
-            <a:r>
-              <a:rPr lang="en-US" dirty="0"/>
-              <a:t>Security (login and personal information)</a:t>
-            </a:r>
-          </a:p>
-          <a:p>
-            <a:endParaRPr lang="en-US" dirty="0"/>
-          </a:p>
-        </p:txBody>
-      </p:sp>
-    </p:spTree>
-    <p:extLst>
-      <p:ext uri="{BB962C8B-B14F-4D97-AF65-F5344CB8AC3E}">
-        <p14:creationId xmlns:p14="http://schemas.microsoft.com/office/powerpoint/2010/main" val="4130592635"/>
-      </p:ext>
-    </p:extLst>
-  </p:cSld>
-  <p:clrMapOvr>
-    <a:masterClrMapping/>
-  </p:clrMapOvr>
 </p:sld>
 </file>
 
@@ -8901,6 +8909,95 @@
       </p:par>
     </p:tnLst>
   </p:timing>
+</p:sld>
+</file>
+
+<file path=ppt/slides/slide20.xml><?xml version="1.0" encoding="utf-8"?>
+<p:sld xmlns:a="http://schemas.openxmlformats.org/drawingml/2006/main" xmlns:r="http://schemas.openxmlformats.org/officeDocument/2006/relationships" xmlns:p="http://schemas.openxmlformats.org/presentationml/2006/main">
+  <p:cSld>
+    <p:spTree>
+      <p:nvGrpSpPr>
+        <p:cNvPr id="1" name=""/>
+        <p:cNvGrpSpPr/>
+        <p:nvPr/>
+      </p:nvGrpSpPr>
+      <p:grpSpPr>
+        <a:xfrm>
+          <a:off x="0" y="0"/>
+          <a:ext cx="0" cy="0"/>
+          <a:chOff x="0" y="0"/>
+          <a:chExt cx="0" cy="0"/>
+        </a:xfrm>
+      </p:grpSpPr>
+      <p:sp>
+        <p:nvSpPr>
+          <p:cNvPr id="2" name="Title 1">
+            <a:extLst>
+              <a:ext uri="{FF2B5EF4-FFF2-40B4-BE49-F238E27FC236}">
+                <a16:creationId xmlns:a16="http://schemas.microsoft.com/office/drawing/2014/main" id="{642F46A1-65B2-4322-BA2F-9B65B842D8B5}"/>
+              </a:ext>
+            </a:extLst>
+          </p:cNvPr>
+          <p:cNvSpPr>
+            <a:spLocks noGrp="1"/>
+          </p:cNvSpPr>
+          <p:nvPr>
+            <p:ph type="title"/>
+          </p:nvPr>
+        </p:nvSpPr>
+        <p:spPr/>
+        <p:txBody>
+          <a:bodyPr/>
+          <a:lstStyle/>
+          <a:p>
+            <a:r>
+              <a:rPr lang="en-US" dirty="0"/>
+              <a:t>Potential Risks</a:t>
+            </a:r>
+          </a:p>
+        </p:txBody>
+      </p:sp>
+      <p:sp>
+        <p:nvSpPr>
+          <p:cNvPr id="3" name="Content Placeholder 2">
+            <a:extLst>
+              <a:ext uri="{FF2B5EF4-FFF2-40B4-BE49-F238E27FC236}">
+                <a16:creationId xmlns:a16="http://schemas.microsoft.com/office/drawing/2014/main" id="{6E05FA0E-9C68-437B-90B5-4F41436F04AC}"/>
+              </a:ext>
+            </a:extLst>
+          </p:cNvPr>
+          <p:cNvSpPr>
+            <a:spLocks noGrp="1"/>
+          </p:cNvSpPr>
+          <p:nvPr>
+            <p:ph idx="1"/>
+          </p:nvPr>
+        </p:nvSpPr>
+        <p:spPr/>
+        <p:txBody>
+          <a:bodyPr/>
+          <a:lstStyle/>
+          <a:p>
+            <a:r>
+              <a:rPr lang="en-US" dirty="0"/>
+              <a:t>Security (login and personal information)</a:t>
+            </a:r>
+          </a:p>
+          <a:p>
+            <a:endParaRPr lang="en-US" dirty="0"/>
+          </a:p>
+        </p:txBody>
+      </p:sp>
+    </p:spTree>
+    <p:extLst>
+      <p:ext uri="{BB962C8B-B14F-4D97-AF65-F5344CB8AC3E}">
+        <p14:creationId xmlns:p14="http://schemas.microsoft.com/office/powerpoint/2010/main" val="4130592635"/>
+      </p:ext>
+    </p:extLst>
+  </p:cSld>
+  <p:clrMapOvr>
+    <a:masterClrMapping/>
+  </p:clrMapOvr>
 </p:sld>
 </file>
 

</xml_diff>